<commit_message>
Edited ppt and paper
</commit_message>
<xml_diff>
--- a/Documentation/Research Paper/CSPROJ Presentation.pptx
+++ b/Documentation/Research Paper/CSPROJ Presentation.pptx
@@ -5,12 +5,20 @@
     <p:sldMasterId id="2147483648" r:id="rId1"/>
   </p:sldMasterIdLst>
   <p:notesMasterIdLst>
-    <p:notesMasterId r:id="rId5"/>
+    <p:notesMasterId r:id="rId13"/>
   </p:notesMasterIdLst>
   <p:sldIdLst>
     <p:sldId id="257" r:id="rId2"/>
     <p:sldId id="258" r:id="rId3"/>
-    <p:sldId id="259" r:id="rId4"/>
+    <p:sldId id="264" r:id="rId4"/>
+    <p:sldId id="261" r:id="rId5"/>
+    <p:sldId id="262" r:id="rId6"/>
+    <p:sldId id="263" r:id="rId7"/>
+    <p:sldId id="260" r:id="rId8"/>
+    <p:sldId id="265" r:id="rId9"/>
+    <p:sldId id="266" r:id="rId10"/>
+    <p:sldId id="267" r:id="rId11"/>
+    <p:sldId id="259" r:id="rId12"/>
   </p:sldIdLst>
   <p:sldSz cx="12192000" cy="6858000"/>
   <p:notesSz cx="6858000" cy="9144000"/>
@@ -598,6 +606,115 @@
 </p:notes>
 </file>
 
+<file path=ppt/notesSlides/notesSlide10.xml><?xml version="1.0" encoding="utf-8"?>
+<p:notes xmlns:a="http://schemas.openxmlformats.org/drawingml/2006/main" xmlns:r="http://schemas.openxmlformats.org/officeDocument/2006/relationships" xmlns:p="http://schemas.openxmlformats.org/presentationml/2006/main">
+  <p:cSld>
+    <p:spTree>
+      <p:nvGrpSpPr>
+        <p:cNvPr id="1" name=""/>
+        <p:cNvGrpSpPr/>
+        <p:nvPr/>
+      </p:nvGrpSpPr>
+      <p:grpSpPr>
+        <a:xfrm>
+          <a:off x="0" y="0"/>
+          <a:ext cx="0" cy="0"/>
+          <a:chOff x="0" y="0"/>
+          <a:chExt cx="0" cy="0"/>
+        </a:xfrm>
+      </p:grpSpPr>
+      <p:sp>
+        <p:nvSpPr>
+          <p:cNvPr id="2" name="Slide Image Placeholder 1"/>
+          <p:cNvSpPr>
+            <a:spLocks noGrp="1" noRot="1" noChangeAspect="1"/>
+          </p:cNvSpPr>
+          <p:nvPr>
+            <p:ph type="sldImg"/>
+          </p:nvPr>
+        </p:nvSpPr>
+        <p:spPr/>
+      </p:sp>
+      <p:sp>
+        <p:nvSpPr>
+          <p:cNvPr id="3" name="Notes Placeholder 2"/>
+          <p:cNvSpPr>
+            <a:spLocks noGrp="1"/>
+          </p:cNvSpPr>
+          <p:nvPr>
+            <p:ph type="body" idx="1"/>
+          </p:nvPr>
+        </p:nvSpPr>
+        <p:spPr/>
+        <p:txBody>
+          <a:bodyPr/>
+          <a:lstStyle/>
+          <a:p>
+            <a:pPr marL="0" marR="0" lvl="0" indent="0" algn="l" defTabSz="914400" rtl="0" eaLnBrk="1" fontAlgn="auto" latinLnBrk="0" hangingPunct="1">
+              <a:lnSpc>
+                <a:spcPct val="100000"/>
+              </a:lnSpc>
+              <a:spcBef>
+                <a:spcPts val="0"/>
+              </a:spcBef>
+              <a:spcAft>
+                <a:spcPts val="0"/>
+              </a:spcAft>
+              <a:buClrTx/>
+              <a:buSzTx/>
+              <a:buFontTx/>
+              <a:buNone/>
+              <a:tabLst/>
+              <a:defRPr/>
+            </a:pPr>
+            <a:endParaRPr lang="en-PH" sz="1200" kern="1200" dirty="0">
+              <a:solidFill>
+                <a:schemeClr val="tx1"/>
+              </a:solidFill>
+              <a:effectLst/>
+              <a:latin typeface="+mn-lt"/>
+              <a:ea typeface="+mn-ea"/>
+              <a:cs typeface="+mn-cs"/>
+            </a:endParaRPr>
+          </a:p>
+        </p:txBody>
+      </p:sp>
+      <p:sp>
+        <p:nvSpPr>
+          <p:cNvPr id="4" name="Slide Number Placeholder 3"/>
+          <p:cNvSpPr>
+            <a:spLocks noGrp="1"/>
+          </p:cNvSpPr>
+          <p:nvPr>
+            <p:ph type="sldNum" sz="quarter" idx="10"/>
+          </p:nvPr>
+        </p:nvSpPr>
+        <p:spPr/>
+        <p:txBody>
+          <a:bodyPr/>
+          <a:lstStyle/>
+          <a:p>
+            <a:fld id="{213B05C4-94C7-4412-9CB1-C9F207621576}" type="slidenum">
+              <a:rPr lang="en-PH" smtClean="0"/>
+              <a:t>11</a:t>
+            </a:fld>
+            <a:endParaRPr lang="en-PH"/>
+          </a:p>
+        </p:txBody>
+      </p:sp>
+    </p:spTree>
+    <p:extLst>
+      <p:ext uri="{BB962C8B-B14F-4D97-AF65-F5344CB8AC3E}">
+        <p14:creationId xmlns:p14="http://schemas.microsoft.com/office/powerpoint/2010/main" val="1610382430"/>
+      </p:ext>
+    </p:extLst>
+  </p:cSld>
+  <p:clrMapOvr>
+    <a:masterClrMapping/>
+  </p:clrMapOvr>
+</p:notes>
+</file>
+
 <file path=ppt/notesSlides/notesSlide2.xml><?xml version="1.0" encoding="utf-8"?>
 <p:notes xmlns:a="http://schemas.openxmlformats.org/drawingml/2006/main" xmlns:r="http://schemas.openxmlformats.org/officeDocument/2006/relationships" xmlns:p="http://schemas.openxmlformats.org/presentationml/2006/main">
   <p:cSld>
@@ -642,23 +759,350 @@
           <a:bodyPr/>
           <a:lstStyle/>
           <a:p>
-            <a:pPr marL="0" marR="0" lvl="0" indent="0" algn="l" defTabSz="914400" rtl="0" eaLnBrk="1" fontAlgn="auto" latinLnBrk="0" hangingPunct="1">
-              <a:lnSpc>
-                <a:spcPct val="100000"/>
-              </a:lnSpc>
-              <a:spcBef>
-                <a:spcPts val="0"/>
-              </a:spcBef>
-              <a:spcAft>
-                <a:spcPts val="0"/>
-              </a:spcAft>
-              <a:buClrTx/>
-              <a:buSzTx/>
-              <a:buFontTx/>
-              <a:buNone/>
-              <a:tabLst/>
-              <a:defRPr/>
-            </a:pPr>
+            <a:endParaRPr lang="en-PH" sz="1200" kern="1200" dirty="0">
+              <a:solidFill>
+                <a:schemeClr val="tx1"/>
+              </a:solidFill>
+              <a:effectLst/>
+              <a:latin typeface="+mn-lt"/>
+              <a:ea typeface="+mn-ea"/>
+              <a:cs typeface="+mn-cs"/>
+            </a:endParaRPr>
+          </a:p>
+        </p:txBody>
+      </p:sp>
+      <p:sp>
+        <p:nvSpPr>
+          <p:cNvPr id="4" name="Slide Number Placeholder 3"/>
+          <p:cNvSpPr>
+            <a:spLocks noGrp="1"/>
+          </p:cNvSpPr>
+          <p:nvPr>
+            <p:ph type="sldNum" sz="quarter" idx="10"/>
+          </p:nvPr>
+        </p:nvSpPr>
+        <p:spPr/>
+        <p:txBody>
+          <a:bodyPr/>
+          <a:lstStyle/>
+          <a:p>
+            <a:fld id="{213B05C4-94C7-4412-9CB1-C9F207621576}" type="slidenum">
+              <a:rPr lang="en-PH" smtClean="0"/>
+              <a:t>3</a:t>
+            </a:fld>
+            <a:endParaRPr lang="en-PH"/>
+          </a:p>
+        </p:txBody>
+      </p:sp>
+    </p:spTree>
+    <p:extLst>
+      <p:ext uri="{BB962C8B-B14F-4D97-AF65-F5344CB8AC3E}">
+        <p14:creationId xmlns:p14="http://schemas.microsoft.com/office/powerpoint/2010/main" val="3040062780"/>
+      </p:ext>
+    </p:extLst>
+  </p:cSld>
+  <p:clrMapOvr>
+    <a:masterClrMapping/>
+  </p:clrMapOvr>
+</p:notes>
+</file>
+
+<file path=ppt/notesSlides/notesSlide3.xml><?xml version="1.0" encoding="utf-8"?>
+<p:notes xmlns:a="http://schemas.openxmlformats.org/drawingml/2006/main" xmlns:r="http://schemas.openxmlformats.org/officeDocument/2006/relationships" xmlns:p="http://schemas.openxmlformats.org/presentationml/2006/main">
+  <p:cSld>
+    <p:spTree>
+      <p:nvGrpSpPr>
+        <p:cNvPr id="1" name=""/>
+        <p:cNvGrpSpPr/>
+        <p:nvPr/>
+      </p:nvGrpSpPr>
+      <p:grpSpPr>
+        <a:xfrm>
+          <a:off x="0" y="0"/>
+          <a:ext cx="0" cy="0"/>
+          <a:chOff x="0" y="0"/>
+          <a:chExt cx="0" cy="0"/>
+        </a:xfrm>
+      </p:grpSpPr>
+      <p:sp>
+        <p:nvSpPr>
+          <p:cNvPr id="2" name="Slide Image Placeholder 1"/>
+          <p:cNvSpPr>
+            <a:spLocks noGrp="1" noRot="1" noChangeAspect="1"/>
+          </p:cNvSpPr>
+          <p:nvPr>
+            <p:ph type="sldImg"/>
+          </p:nvPr>
+        </p:nvSpPr>
+        <p:spPr/>
+      </p:sp>
+      <p:sp>
+        <p:nvSpPr>
+          <p:cNvPr id="3" name="Notes Placeholder 2"/>
+          <p:cNvSpPr>
+            <a:spLocks noGrp="1"/>
+          </p:cNvSpPr>
+          <p:nvPr>
+            <p:ph type="body" idx="1"/>
+          </p:nvPr>
+        </p:nvSpPr>
+        <p:spPr/>
+        <p:txBody>
+          <a:bodyPr/>
+          <a:lstStyle/>
+          <a:p>
+            <a:endParaRPr lang="en-PH" dirty="0"/>
+          </a:p>
+        </p:txBody>
+      </p:sp>
+      <p:sp>
+        <p:nvSpPr>
+          <p:cNvPr id="4" name="Slide Number Placeholder 3"/>
+          <p:cNvSpPr>
+            <a:spLocks noGrp="1"/>
+          </p:cNvSpPr>
+          <p:nvPr>
+            <p:ph type="sldNum" sz="quarter" idx="10"/>
+          </p:nvPr>
+        </p:nvSpPr>
+        <p:spPr/>
+        <p:txBody>
+          <a:bodyPr/>
+          <a:lstStyle/>
+          <a:p>
+            <a:fld id="{86FFBDB5-9589-48C5-8577-C15F048505D7}" type="slidenum">
+              <a:rPr lang="en-PH" smtClean="0"/>
+              <a:t>4</a:t>
+            </a:fld>
+            <a:endParaRPr lang="en-PH"/>
+          </a:p>
+        </p:txBody>
+      </p:sp>
+    </p:spTree>
+    <p:extLst>
+      <p:ext uri="{BB962C8B-B14F-4D97-AF65-F5344CB8AC3E}">
+        <p14:creationId xmlns:p14="http://schemas.microsoft.com/office/powerpoint/2010/main" val="2527699601"/>
+      </p:ext>
+    </p:extLst>
+  </p:cSld>
+  <p:clrMapOvr>
+    <a:masterClrMapping/>
+  </p:clrMapOvr>
+</p:notes>
+</file>
+
+<file path=ppt/notesSlides/notesSlide4.xml><?xml version="1.0" encoding="utf-8"?>
+<p:notes xmlns:a="http://schemas.openxmlformats.org/drawingml/2006/main" xmlns:r="http://schemas.openxmlformats.org/officeDocument/2006/relationships" xmlns:p="http://schemas.openxmlformats.org/presentationml/2006/main">
+  <p:cSld>
+    <p:spTree>
+      <p:nvGrpSpPr>
+        <p:cNvPr id="1" name=""/>
+        <p:cNvGrpSpPr/>
+        <p:nvPr/>
+      </p:nvGrpSpPr>
+      <p:grpSpPr>
+        <a:xfrm>
+          <a:off x="0" y="0"/>
+          <a:ext cx="0" cy="0"/>
+          <a:chOff x="0" y="0"/>
+          <a:chExt cx="0" cy="0"/>
+        </a:xfrm>
+      </p:grpSpPr>
+      <p:sp>
+        <p:nvSpPr>
+          <p:cNvPr id="2" name="Slide Image Placeholder 1"/>
+          <p:cNvSpPr>
+            <a:spLocks noGrp="1" noRot="1" noChangeAspect="1"/>
+          </p:cNvSpPr>
+          <p:nvPr>
+            <p:ph type="sldImg"/>
+          </p:nvPr>
+        </p:nvSpPr>
+        <p:spPr/>
+      </p:sp>
+      <p:sp>
+        <p:nvSpPr>
+          <p:cNvPr id="3" name="Notes Placeholder 2"/>
+          <p:cNvSpPr>
+            <a:spLocks noGrp="1"/>
+          </p:cNvSpPr>
+          <p:nvPr>
+            <p:ph type="body" idx="1"/>
+          </p:nvPr>
+        </p:nvSpPr>
+        <p:spPr/>
+        <p:txBody>
+          <a:bodyPr/>
+          <a:lstStyle/>
+          <a:p>
+            <a:endParaRPr lang="en-PH" dirty="0"/>
+          </a:p>
+        </p:txBody>
+      </p:sp>
+      <p:sp>
+        <p:nvSpPr>
+          <p:cNvPr id="4" name="Slide Number Placeholder 3"/>
+          <p:cNvSpPr>
+            <a:spLocks noGrp="1"/>
+          </p:cNvSpPr>
+          <p:nvPr>
+            <p:ph type="sldNum" sz="quarter" idx="10"/>
+          </p:nvPr>
+        </p:nvSpPr>
+        <p:spPr/>
+        <p:txBody>
+          <a:bodyPr/>
+          <a:lstStyle/>
+          <a:p>
+            <a:fld id="{86FFBDB5-9589-48C5-8577-C15F048505D7}" type="slidenum">
+              <a:rPr lang="en-PH" smtClean="0"/>
+              <a:t>5</a:t>
+            </a:fld>
+            <a:endParaRPr lang="en-PH"/>
+          </a:p>
+        </p:txBody>
+      </p:sp>
+    </p:spTree>
+    <p:extLst>
+      <p:ext uri="{BB962C8B-B14F-4D97-AF65-F5344CB8AC3E}">
+        <p14:creationId xmlns:p14="http://schemas.microsoft.com/office/powerpoint/2010/main" val="2292345644"/>
+      </p:ext>
+    </p:extLst>
+  </p:cSld>
+  <p:clrMapOvr>
+    <a:masterClrMapping/>
+  </p:clrMapOvr>
+</p:notes>
+</file>
+
+<file path=ppt/notesSlides/notesSlide5.xml><?xml version="1.0" encoding="utf-8"?>
+<p:notes xmlns:a="http://schemas.openxmlformats.org/drawingml/2006/main" xmlns:r="http://schemas.openxmlformats.org/officeDocument/2006/relationships" xmlns:p="http://schemas.openxmlformats.org/presentationml/2006/main">
+  <p:cSld>
+    <p:spTree>
+      <p:nvGrpSpPr>
+        <p:cNvPr id="1" name=""/>
+        <p:cNvGrpSpPr/>
+        <p:nvPr/>
+      </p:nvGrpSpPr>
+      <p:grpSpPr>
+        <a:xfrm>
+          <a:off x="0" y="0"/>
+          <a:ext cx="0" cy="0"/>
+          <a:chOff x="0" y="0"/>
+          <a:chExt cx="0" cy="0"/>
+        </a:xfrm>
+      </p:grpSpPr>
+      <p:sp>
+        <p:nvSpPr>
+          <p:cNvPr id="2" name="Slide Image Placeholder 1"/>
+          <p:cNvSpPr>
+            <a:spLocks noGrp="1" noRot="1" noChangeAspect="1"/>
+          </p:cNvSpPr>
+          <p:nvPr>
+            <p:ph type="sldImg"/>
+          </p:nvPr>
+        </p:nvSpPr>
+        <p:spPr/>
+      </p:sp>
+      <p:sp>
+        <p:nvSpPr>
+          <p:cNvPr id="3" name="Notes Placeholder 2"/>
+          <p:cNvSpPr>
+            <a:spLocks noGrp="1"/>
+          </p:cNvSpPr>
+          <p:nvPr>
+            <p:ph type="body" idx="1"/>
+          </p:nvPr>
+        </p:nvSpPr>
+        <p:spPr/>
+        <p:txBody>
+          <a:bodyPr/>
+          <a:lstStyle/>
+          <a:p>
+            <a:endParaRPr lang="en-PH" dirty="0"/>
+          </a:p>
+        </p:txBody>
+      </p:sp>
+      <p:sp>
+        <p:nvSpPr>
+          <p:cNvPr id="4" name="Slide Number Placeholder 3"/>
+          <p:cNvSpPr>
+            <a:spLocks noGrp="1"/>
+          </p:cNvSpPr>
+          <p:nvPr>
+            <p:ph type="sldNum" sz="quarter" idx="10"/>
+          </p:nvPr>
+        </p:nvSpPr>
+        <p:spPr/>
+        <p:txBody>
+          <a:bodyPr/>
+          <a:lstStyle/>
+          <a:p>
+            <a:fld id="{86FFBDB5-9589-48C5-8577-C15F048505D7}" type="slidenum">
+              <a:rPr lang="en-PH" smtClean="0"/>
+              <a:t>6</a:t>
+            </a:fld>
+            <a:endParaRPr lang="en-PH"/>
+          </a:p>
+        </p:txBody>
+      </p:sp>
+    </p:spTree>
+    <p:extLst>
+      <p:ext uri="{BB962C8B-B14F-4D97-AF65-F5344CB8AC3E}">
+        <p14:creationId xmlns:p14="http://schemas.microsoft.com/office/powerpoint/2010/main" val="3921709507"/>
+      </p:ext>
+    </p:extLst>
+  </p:cSld>
+  <p:clrMapOvr>
+    <a:masterClrMapping/>
+  </p:clrMapOvr>
+</p:notes>
+</file>
+
+<file path=ppt/notesSlides/notesSlide6.xml><?xml version="1.0" encoding="utf-8"?>
+<p:notes xmlns:a="http://schemas.openxmlformats.org/drawingml/2006/main" xmlns:r="http://schemas.openxmlformats.org/officeDocument/2006/relationships" xmlns:p="http://schemas.openxmlformats.org/presentationml/2006/main">
+  <p:cSld>
+    <p:spTree>
+      <p:nvGrpSpPr>
+        <p:cNvPr id="1" name=""/>
+        <p:cNvGrpSpPr/>
+        <p:nvPr/>
+      </p:nvGrpSpPr>
+      <p:grpSpPr>
+        <a:xfrm>
+          <a:off x="0" y="0"/>
+          <a:ext cx="0" cy="0"/>
+          <a:chOff x="0" y="0"/>
+          <a:chExt cx="0" cy="0"/>
+        </a:xfrm>
+      </p:grpSpPr>
+      <p:sp>
+        <p:nvSpPr>
+          <p:cNvPr id="2" name="Slide Image Placeholder 1"/>
+          <p:cNvSpPr>
+            <a:spLocks noGrp="1" noRot="1" noChangeAspect="1"/>
+          </p:cNvSpPr>
+          <p:nvPr>
+            <p:ph type="sldImg"/>
+          </p:nvPr>
+        </p:nvSpPr>
+        <p:spPr/>
+      </p:sp>
+      <p:sp>
+        <p:nvSpPr>
+          <p:cNvPr id="3" name="Notes Placeholder 2"/>
+          <p:cNvSpPr>
+            <a:spLocks noGrp="1"/>
+          </p:cNvSpPr>
+          <p:nvPr>
+            <p:ph type="body" idx="1"/>
+          </p:nvPr>
+        </p:nvSpPr>
+        <p:spPr/>
+        <p:txBody>
+          <a:bodyPr/>
+          <a:lstStyle/>
+          <a:p>
             <a:r>
               <a:rPr lang="en-PH" sz="1200" kern="1200" dirty="0">
                 <a:solidFill>
@@ -669,31 +1113,7 @@
                 <a:ea typeface="+mn-ea"/>
                 <a:cs typeface="+mn-cs"/>
               </a:rPr>
-              <a:t>In 2010, the Philippines adopted the Automated Election System (AES) to comply with the Republic Act No. 9369 which stated that the Commission on Election (COMELEC) should use an AES that establishes transparency and credibility. However, during the 2016 Presidential Election, the possibility of electoral fraud continues to persist through the existence of a ‘secret server’ and the controversy behind the hashing algorithm used in system. The study aims to propose a technical solution that would eliminate the possibility of unofficial servers by implementing a public key infrastructure and using the </a:t>
-            </a:r>
-            <a:r>
-              <a:rPr lang="en-PH" sz="1200" kern="1200" dirty="0" err="1">
-                <a:solidFill>
-                  <a:schemeClr val="tx1"/>
-                </a:solidFill>
-                <a:effectLst/>
-                <a:latin typeface="+mn-lt"/>
-                <a:ea typeface="+mn-ea"/>
-                <a:cs typeface="+mn-cs"/>
-              </a:rPr>
-              <a:t>Diffie</a:t>
-            </a:r>
-            <a:r>
-              <a:rPr lang="en-PH" sz="1200" kern="1200" dirty="0">
-                <a:solidFill>
-                  <a:schemeClr val="tx1"/>
-                </a:solidFill>
-                <a:effectLst/>
-                <a:latin typeface="+mn-lt"/>
-                <a:ea typeface="+mn-ea"/>
-                <a:cs typeface="+mn-cs"/>
-              </a:rPr>
-              <a:t>-Hellman algorithm as security measures for the transmission of votes on the server-level. With the said approach, the Voting Counting Machine (VCM) will be able to verify if the server it is sending the election results to is indeed authenticated and an official server. The credibility of the election returns will be restored once the likelihood of electoral fraud is removed from the system.</a:t>
+              <a:t>The scope of the study would only include the issues and possible solutions for the security of the transmission of election returns on the server-level of the automated election system in the Philippines. Solutions for the issues present prior and subsequent the transmission of the election returns will not be provided in this study. The focus of the research will only be upon the elimination of transmission of election returns to unofficial servers as well as the validity of election returns being received. Further study on the other parts of the automated election system will no longer be covered.</a:t>
             </a:r>
           </a:p>
         </p:txBody>
@@ -715,7 +1135,7 @@
           <a:p>
             <a:fld id="{213B05C4-94C7-4412-9CB1-C9F207621576}" type="slidenum">
               <a:rPr lang="en-PH" smtClean="0"/>
-              <a:t>3</a:t>
+              <a:t>7</a:t>
             </a:fld>
             <a:endParaRPr lang="en-PH"/>
           </a:p>
@@ -724,7 +1144,283 @@
     </p:spTree>
     <p:extLst>
       <p:ext uri="{BB962C8B-B14F-4D97-AF65-F5344CB8AC3E}">
-        <p14:creationId xmlns:p14="http://schemas.microsoft.com/office/powerpoint/2010/main" val="1610382430"/>
+        <p14:creationId xmlns:p14="http://schemas.microsoft.com/office/powerpoint/2010/main" val="1262949092"/>
+      </p:ext>
+    </p:extLst>
+  </p:cSld>
+  <p:clrMapOvr>
+    <a:masterClrMapping/>
+  </p:clrMapOvr>
+</p:notes>
+</file>
+
+<file path=ppt/notesSlides/notesSlide7.xml><?xml version="1.0" encoding="utf-8"?>
+<p:notes xmlns:a="http://schemas.openxmlformats.org/drawingml/2006/main" xmlns:r="http://schemas.openxmlformats.org/officeDocument/2006/relationships" xmlns:p="http://schemas.openxmlformats.org/presentationml/2006/main">
+  <p:cSld>
+    <p:spTree>
+      <p:nvGrpSpPr>
+        <p:cNvPr id="1" name=""/>
+        <p:cNvGrpSpPr/>
+        <p:nvPr/>
+      </p:nvGrpSpPr>
+      <p:grpSpPr>
+        <a:xfrm>
+          <a:off x="0" y="0"/>
+          <a:ext cx="0" cy="0"/>
+          <a:chOff x="0" y="0"/>
+          <a:chExt cx="0" cy="0"/>
+        </a:xfrm>
+      </p:grpSpPr>
+      <p:sp>
+        <p:nvSpPr>
+          <p:cNvPr id="2" name="Slide Image Placeholder 1"/>
+          <p:cNvSpPr>
+            <a:spLocks noGrp="1" noRot="1" noChangeAspect="1"/>
+          </p:cNvSpPr>
+          <p:nvPr>
+            <p:ph type="sldImg"/>
+          </p:nvPr>
+        </p:nvSpPr>
+        <p:spPr/>
+      </p:sp>
+      <p:sp>
+        <p:nvSpPr>
+          <p:cNvPr id="3" name="Notes Placeholder 2"/>
+          <p:cNvSpPr>
+            <a:spLocks noGrp="1"/>
+          </p:cNvSpPr>
+          <p:nvPr>
+            <p:ph type="body" idx="1"/>
+          </p:nvPr>
+        </p:nvSpPr>
+        <p:spPr/>
+        <p:txBody>
+          <a:bodyPr/>
+          <a:lstStyle/>
+          <a:p>
+            <a:endParaRPr lang="en-PH" sz="1200" kern="1200" dirty="0">
+              <a:solidFill>
+                <a:schemeClr val="tx1"/>
+              </a:solidFill>
+              <a:effectLst/>
+              <a:latin typeface="+mn-lt"/>
+              <a:ea typeface="+mn-ea"/>
+              <a:cs typeface="+mn-cs"/>
+            </a:endParaRPr>
+          </a:p>
+        </p:txBody>
+      </p:sp>
+      <p:sp>
+        <p:nvSpPr>
+          <p:cNvPr id="4" name="Slide Number Placeholder 3"/>
+          <p:cNvSpPr>
+            <a:spLocks noGrp="1"/>
+          </p:cNvSpPr>
+          <p:nvPr>
+            <p:ph type="sldNum" sz="quarter" idx="10"/>
+          </p:nvPr>
+        </p:nvSpPr>
+        <p:spPr/>
+        <p:txBody>
+          <a:bodyPr/>
+          <a:lstStyle/>
+          <a:p>
+            <a:fld id="{213B05C4-94C7-4412-9CB1-C9F207621576}" type="slidenum">
+              <a:rPr lang="en-PH" smtClean="0"/>
+              <a:t>8</a:t>
+            </a:fld>
+            <a:endParaRPr lang="en-PH"/>
+          </a:p>
+        </p:txBody>
+      </p:sp>
+    </p:spTree>
+    <p:extLst>
+      <p:ext uri="{BB962C8B-B14F-4D97-AF65-F5344CB8AC3E}">
+        <p14:creationId xmlns:p14="http://schemas.microsoft.com/office/powerpoint/2010/main" val="1602568077"/>
+      </p:ext>
+    </p:extLst>
+  </p:cSld>
+  <p:clrMapOvr>
+    <a:masterClrMapping/>
+  </p:clrMapOvr>
+</p:notes>
+</file>
+
+<file path=ppt/notesSlides/notesSlide8.xml><?xml version="1.0" encoding="utf-8"?>
+<p:notes xmlns:a="http://schemas.openxmlformats.org/drawingml/2006/main" xmlns:r="http://schemas.openxmlformats.org/officeDocument/2006/relationships" xmlns:p="http://schemas.openxmlformats.org/presentationml/2006/main">
+  <p:cSld>
+    <p:spTree>
+      <p:nvGrpSpPr>
+        <p:cNvPr id="1" name=""/>
+        <p:cNvGrpSpPr/>
+        <p:nvPr/>
+      </p:nvGrpSpPr>
+      <p:grpSpPr>
+        <a:xfrm>
+          <a:off x="0" y="0"/>
+          <a:ext cx="0" cy="0"/>
+          <a:chOff x="0" y="0"/>
+          <a:chExt cx="0" cy="0"/>
+        </a:xfrm>
+      </p:grpSpPr>
+      <p:sp>
+        <p:nvSpPr>
+          <p:cNvPr id="2" name="Slide Image Placeholder 1"/>
+          <p:cNvSpPr>
+            <a:spLocks noGrp="1" noRot="1" noChangeAspect="1"/>
+          </p:cNvSpPr>
+          <p:nvPr>
+            <p:ph type="sldImg"/>
+          </p:nvPr>
+        </p:nvSpPr>
+        <p:spPr/>
+      </p:sp>
+      <p:sp>
+        <p:nvSpPr>
+          <p:cNvPr id="3" name="Notes Placeholder 2"/>
+          <p:cNvSpPr>
+            <a:spLocks noGrp="1"/>
+          </p:cNvSpPr>
+          <p:nvPr>
+            <p:ph type="body" idx="1"/>
+          </p:nvPr>
+        </p:nvSpPr>
+        <p:spPr/>
+        <p:txBody>
+          <a:bodyPr/>
+          <a:lstStyle/>
+          <a:p>
+            <a:endParaRPr lang="en-PH" sz="1200" kern="1200" dirty="0">
+              <a:solidFill>
+                <a:schemeClr val="tx1"/>
+              </a:solidFill>
+              <a:effectLst/>
+              <a:latin typeface="+mn-lt"/>
+              <a:ea typeface="+mn-ea"/>
+              <a:cs typeface="+mn-cs"/>
+            </a:endParaRPr>
+          </a:p>
+        </p:txBody>
+      </p:sp>
+      <p:sp>
+        <p:nvSpPr>
+          <p:cNvPr id="4" name="Slide Number Placeholder 3"/>
+          <p:cNvSpPr>
+            <a:spLocks noGrp="1"/>
+          </p:cNvSpPr>
+          <p:nvPr>
+            <p:ph type="sldNum" sz="quarter" idx="10"/>
+          </p:nvPr>
+        </p:nvSpPr>
+        <p:spPr/>
+        <p:txBody>
+          <a:bodyPr/>
+          <a:lstStyle/>
+          <a:p>
+            <a:fld id="{213B05C4-94C7-4412-9CB1-C9F207621576}" type="slidenum">
+              <a:rPr lang="en-PH" smtClean="0"/>
+              <a:t>9</a:t>
+            </a:fld>
+            <a:endParaRPr lang="en-PH"/>
+          </a:p>
+        </p:txBody>
+      </p:sp>
+    </p:spTree>
+    <p:extLst>
+      <p:ext uri="{BB962C8B-B14F-4D97-AF65-F5344CB8AC3E}">
+        <p14:creationId xmlns:p14="http://schemas.microsoft.com/office/powerpoint/2010/main" val="1197368536"/>
+      </p:ext>
+    </p:extLst>
+  </p:cSld>
+  <p:clrMapOvr>
+    <a:masterClrMapping/>
+  </p:clrMapOvr>
+</p:notes>
+</file>
+
+<file path=ppt/notesSlides/notesSlide9.xml><?xml version="1.0" encoding="utf-8"?>
+<p:notes xmlns:a="http://schemas.openxmlformats.org/drawingml/2006/main" xmlns:r="http://schemas.openxmlformats.org/officeDocument/2006/relationships" xmlns:p="http://schemas.openxmlformats.org/presentationml/2006/main">
+  <p:cSld>
+    <p:spTree>
+      <p:nvGrpSpPr>
+        <p:cNvPr id="1" name=""/>
+        <p:cNvGrpSpPr/>
+        <p:nvPr/>
+      </p:nvGrpSpPr>
+      <p:grpSpPr>
+        <a:xfrm>
+          <a:off x="0" y="0"/>
+          <a:ext cx="0" cy="0"/>
+          <a:chOff x="0" y="0"/>
+          <a:chExt cx="0" cy="0"/>
+        </a:xfrm>
+      </p:grpSpPr>
+      <p:sp>
+        <p:nvSpPr>
+          <p:cNvPr id="2" name="Slide Image Placeholder 1"/>
+          <p:cNvSpPr>
+            <a:spLocks noGrp="1" noRot="1" noChangeAspect="1"/>
+          </p:cNvSpPr>
+          <p:nvPr>
+            <p:ph type="sldImg"/>
+          </p:nvPr>
+        </p:nvSpPr>
+        <p:spPr/>
+      </p:sp>
+      <p:sp>
+        <p:nvSpPr>
+          <p:cNvPr id="3" name="Notes Placeholder 2"/>
+          <p:cNvSpPr>
+            <a:spLocks noGrp="1"/>
+          </p:cNvSpPr>
+          <p:nvPr>
+            <p:ph type="body" idx="1"/>
+          </p:nvPr>
+        </p:nvSpPr>
+        <p:spPr/>
+        <p:txBody>
+          <a:bodyPr/>
+          <a:lstStyle/>
+          <a:p>
+            <a:endParaRPr lang="en-PH" sz="1200" kern="1200" dirty="0">
+              <a:solidFill>
+                <a:schemeClr val="tx1"/>
+              </a:solidFill>
+              <a:effectLst/>
+              <a:latin typeface="+mn-lt"/>
+              <a:ea typeface="+mn-ea"/>
+              <a:cs typeface="+mn-cs"/>
+            </a:endParaRPr>
+          </a:p>
+        </p:txBody>
+      </p:sp>
+      <p:sp>
+        <p:nvSpPr>
+          <p:cNvPr id="4" name="Slide Number Placeholder 3"/>
+          <p:cNvSpPr>
+            <a:spLocks noGrp="1"/>
+          </p:cNvSpPr>
+          <p:nvPr>
+            <p:ph type="sldNum" sz="quarter" idx="10"/>
+          </p:nvPr>
+        </p:nvSpPr>
+        <p:spPr/>
+        <p:txBody>
+          <a:bodyPr/>
+          <a:lstStyle/>
+          <a:p>
+            <a:fld id="{213B05C4-94C7-4412-9CB1-C9F207621576}" type="slidenum">
+              <a:rPr lang="en-PH" smtClean="0"/>
+              <a:t>10</a:t>
+            </a:fld>
+            <a:endParaRPr lang="en-PH"/>
+          </a:p>
+        </p:txBody>
+      </p:sp>
+    </p:spTree>
+    <p:extLst>
+      <p:ext uri="{BB962C8B-B14F-4D97-AF65-F5344CB8AC3E}">
+        <p14:creationId xmlns:p14="http://schemas.microsoft.com/office/powerpoint/2010/main" val="1153255828"/>
       </p:ext>
     </p:extLst>
   </p:cSld>
@@ -3733,6 +4429,268 @@
 </p:sld>
 </file>
 
+<file path=ppt/slides/slide10.xml><?xml version="1.0" encoding="utf-8"?>
+<p:sld xmlns:a="http://schemas.openxmlformats.org/drawingml/2006/main" xmlns:r="http://schemas.openxmlformats.org/officeDocument/2006/relationships" xmlns:p="http://schemas.openxmlformats.org/presentationml/2006/main">
+  <p:cSld>
+    <p:spTree>
+      <p:nvGrpSpPr>
+        <p:cNvPr id="1" name=""/>
+        <p:cNvGrpSpPr/>
+        <p:nvPr/>
+      </p:nvGrpSpPr>
+      <p:grpSpPr>
+        <a:xfrm>
+          <a:off x="0" y="0"/>
+          <a:ext cx="0" cy="0"/>
+          <a:chOff x="0" y="0"/>
+          <a:chExt cx="0" cy="0"/>
+        </a:xfrm>
+      </p:grpSpPr>
+      <p:sp>
+        <p:nvSpPr>
+          <p:cNvPr id="2" name="Title 1"/>
+          <p:cNvSpPr>
+            <a:spLocks noGrp="1"/>
+          </p:cNvSpPr>
+          <p:nvPr>
+            <p:ph type="title"/>
+          </p:nvPr>
+        </p:nvSpPr>
+        <p:spPr/>
+        <p:txBody>
+          <a:bodyPr/>
+          <a:lstStyle/>
+          <a:p>
+            <a:r>
+              <a:rPr lang="en-PH" dirty="0"/>
+              <a:t>Theoretical Background</a:t>
+            </a:r>
+          </a:p>
+        </p:txBody>
+      </p:sp>
+      <p:sp>
+        <p:nvSpPr>
+          <p:cNvPr id="3" name="Content Placeholder 2"/>
+          <p:cNvSpPr>
+            <a:spLocks noGrp="1"/>
+          </p:cNvSpPr>
+          <p:nvPr>
+            <p:ph idx="1"/>
+          </p:nvPr>
+        </p:nvSpPr>
+        <p:spPr/>
+        <p:txBody>
+          <a:bodyPr/>
+          <a:lstStyle/>
+          <a:p>
+            <a:endParaRPr lang="en-PH" dirty="0"/>
+          </a:p>
+        </p:txBody>
+      </p:sp>
+      <p:pic>
+        <p:nvPicPr>
+          <p:cNvPr id="4" name="Picture 3"/>
+          <p:cNvPicPr>
+            <a:picLocks noChangeAspect="1"/>
+          </p:cNvPicPr>
+          <p:nvPr/>
+        </p:nvPicPr>
+        <p:blipFill>
+          <a:blip r:embed="rId3">
+            <a:extLst>
+              <a:ext uri="{28A0092B-C50C-407E-A947-70E740481C1C}">
+                <a14:useLocalDpi xmlns:a14="http://schemas.microsoft.com/office/drawing/2010/main" val="0"/>
+              </a:ext>
+            </a:extLst>
+          </a:blip>
+          <a:stretch>
+            <a:fillRect/>
+          </a:stretch>
+        </p:blipFill>
+        <p:spPr>
+          <a:xfrm>
+            <a:off x="10595595" y="4723195"/>
+            <a:ext cx="2435221" cy="2435221"/>
+          </a:xfrm>
+          <a:prstGeom prst="rect">
+            <a:avLst/>
+          </a:prstGeom>
+        </p:spPr>
+      </p:pic>
+      <p:pic>
+        <p:nvPicPr>
+          <p:cNvPr id="5" name="Picture 4"/>
+          <p:cNvPicPr>
+            <a:picLocks noChangeAspect="1"/>
+          </p:cNvPicPr>
+          <p:nvPr/>
+        </p:nvPicPr>
+        <p:blipFill>
+          <a:blip r:embed="rId4" cstate="hqprint">
+            <a:extLst>
+              <a:ext uri="{28A0092B-C50C-407E-A947-70E740481C1C}">
+                <a14:useLocalDpi xmlns:a14="http://schemas.microsoft.com/office/drawing/2010/main" val="0"/>
+              </a:ext>
+            </a:extLst>
+          </a:blip>
+          <a:stretch>
+            <a:fillRect/>
+          </a:stretch>
+        </p:blipFill>
+        <p:spPr>
+          <a:xfrm>
+            <a:off x="10045148" y="3917853"/>
+            <a:ext cx="1610683" cy="1610683"/>
+          </a:xfrm>
+          <a:prstGeom prst="rect">
+            <a:avLst/>
+          </a:prstGeom>
+        </p:spPr>
+      </p:pic>
+    </p:spTree>
+    <p:extLst>
+      <p:ext uri="{BB962C8B-B14F-4D97-AF65-F5344CB8AC3E}">
+        <p14:creationId xmlns:p14="http://schemas.microsoft.com/office/powerpoint/2010/main" val="3420978495"/>
+      </p:ext>
+    </p:extLst>
+  </p:cSld>
+  <p:clrMapOvr>
+    <a:masterClrMapping/>
+  </p:clrMapOvr>
+</p:sld>
+</file>
+
+<file path=ppt/slides/slide11.xml><?xml version="1.0" encoding="utf-8"?>
+<p:sld xmlns:a="http://schemas.openxmlformats.org/drawingml/2006/main" xmlns:r="http://schemas.openxmlformats.org/officeDocument/2006/relationships" xmlns:p="http://schemas.openxmlformats.org/presentationml/2006/main">
+  <p:cSld>
+    <p:spTree>
+      <p:nvGrpSpPr>
+        <p:cNvPr id="1" name=""/>
+        <p:cNvGrpSpPr/>
+        <p:nvPr/>
+      </p:nvGrpSpPr>
+      <p:grpSpPr>
+        <a:xfrm>
+          <a:off x="0" y="0"/>
+          <a:ext cx="0" cy="0"/>
+          <a:chOff x="0" y="0"/>
+          <a:chExt cx="0" cy="0"/>
+        </a:xfrm>
+      </p:grpSpPr>
+      <p:sp>
+        <p:nvSpPr>
+          <p:cNvPr id="2" name="Title 1"/>
+          <p:cNvSpPr>
+            <a:spLocks noGrp="1"/>
+          </p:cNvSpPr>
+          <p:nvPr>
+            <p:ph type="title"/>
+          </p:nvPr>
+        </p:nvSpPr>
+        <p:spPr/>
+        <p:txBody>
+          <a:bodyPr/>
+          <a:lstStyle/>
+          <a:p>
+            <a:r>
+              <a:rPr lang="en-PH" dirty="0"/>
+              <a:t>Proposed Solution to the Problem</a:t>
+            </a:r>
+          </a:p>
+        </p:txBody>
+      </p:sp>
+      <p:sp>
+        <p:nvSpPr>
+          <p:cNvPr id="3" name="Content Placeholder 2"/>
+          <p:cNvSpPr>
+            <a:spLocks noGrp="1"/>
+          </p:cNvSpPr>
+          <p:nvPr>
+            <p:ph idx="1"/>
+          </p:nvPr>
+        </p:nvSpPr>
+        <p:spPr/>
+        <p:txBody>
+          <a:bodyPr/>
+          <a:lstStyle/>
+          <a:p>
+            <a:endParaRPr lang="en-PH" dirty="0"/>
+          </a:p>
+        </p:txBody>
+      </p:sp>
+      <p:pic>
+        <p:nvPicPr>
+          <p:cNvPr id="4" name="Picture 3"/>
+          <p:cNvPicPr>
+            <a:picLocks noChangeAspect="1"/>
+          </p:cNvPicPr>
+          <p:nvPr/>
+        </p:nvPicPr>
+        <p:blipFill>
+          <a:blip r:embed="rId3">
+            <a:extLst>
+              <a:ext uri="{28A0092B-C50C-407E-A947-70E740481C1C}">
+                <a14:useLocalDpi xmlns:a14="http://schemas.microsoft.com/office/drawing/2010/main" val="0"/>
+              </a:ext>
+            </a:extLst>
+          </a:blip>
+          <a:stretch>
+            <a:fillRect/>
+          </a:stretch>
+        </p:blipFill>
+        <p:spPr>
+          <a:xfrm>
+            <a:off x="10595595" y="4723195"/>
+            <a:ext cx="2435221" cy="2435221"/>
+          </a:xfrm>
+          <a:prstGeom prst="rect">
+            <a:avLst/>
+          </a:prstGeom>
+        </p:spPr>
+      </p:pic>
+      <p:pic>
+        <p:nvPicPr>
+          <p:cNvPr id="5" name="Picture 4"/>
+          <p:cNvPicPr>
+            <a:picLocks noChangeAspect="1"/>
+          </p:cNvPicPr>
+          <p:nvPr/>
+        </p:nvPicPr>
+        <p:blipFill>
+          <a:blip r:embed="rId4" cstate="hqprint">
+            <a:extLst>
+              <a:ext uri="{28A0092B-C50C-407E-A947-70E740481C1C}">
+                <a14:useLocalDpi xmlns:a14="http://schemas.microsoft.com/office/drawing/2010/main" val="0"/>
+              </a:ext>
+            </a:extLst>
+          </a:blip>
+          <a:stretch>
+            <a:fillRect/>
+          </a:stretch>
+        </p:blipFill>
+        <p:spPr>
+          <a:xfrm>
+            <a:off x="10045148" y="3917853"/>
+            <a:ext cx="1610683" cy="1610683"/>
+          </a:xfrm>
+          <a:prstGeom prst="rect">
+            <a:avLst/>
+          </a:prstGeom>
+        </p:spPr>
+      </p:pic>
+    </p:spTree>
+    <p:extLst>
+      <p:ext uri="{BB962C8B-B14F-4D97-AF65-F5344CB8AC3E}">
+        <p14:creationId xmlns:p14="http://schemas.microsoft.com/office/powerpoint/2010/main" val="3984246945"/>
+      </p:ext>
+    </p:extLst>
+  </p:cSld>
+  <p:clrMapOvr>
+    <a:masterClrMapping/>
+  </p:clrMapOvr>
+</p:sld>
+</file>
+
 <file path=ppt/slides/slide2.xml><?xml version="1.0" encoding="utf-8"?>
 <p:sld xmlns:a="http://schemas.openxmlformats.org/drawingml/2006/main" xmlns:r="http://schemas.openxmlformats.org/officeDocument/2006/relationships" xmlns:p="http://schemas.openxmlformats.org/presentationml/2006/main">
   <p:cSld>
@@ -3817,15 +4775,7 @@
           <a:p>
             <a:r>
               <a:rPr lang="en-PH" dirty="0"/>
-              <a:t>The study aims to propose a </a:t>
-            </a:r>
-            <a:r>
-              <a:rPr lang="en-PH" dirty="0" err="1"/>
-              <a:t>techinal</a:t>
-            </a:r>
-            <a:r>
-              <a:rPr lang="en-PH" dirty="0"/>
-              <a:t> solution.</a:t>
+              <a:t>The study aims to propose a technical solution.</a:t>
             </a:r>
           </a:p>
           <a:p>
@@ -3951,85 +4901,27 @@
           <a:p>
             <a:r>
               <a:rPr lang="en-PH" dirty="0"/>
-              <a:t>Background of </a:t>
-            </a:r>
-            <a:r>
-              <a:rPr lang="en-PH"/>
-              <a:t>the Problem</a:t>
-            </a:r>
+              <a:t>Background of the Problem</a:t>
+            </a:r>
+          </a:p>
+        </p:txBody>
+      </p:sp>
+      <p:sp>
+        <p:nvSpPr>
+          <p:cNvPr id="3" name="Content Placeholder 2"/>
+          <p:cNvSpPr>
+            <a:spLocks noGrp="1"/>
+          </p:cNvSpPr>
+          <p:nvPr>
+            <p:ph idx="1"/>
+          </p:nvPr>
+        </p:nvSpPr>
+        <p:spPr/>
+        <p:txBody>
+          <a:bodyPr/>
+          <a:lstStyle/>
+          <a:p>
             <a:endParaRPr lang="en-PH" dirty="0"/>
-          </a:p>
-        </p:txBody>
-      </p:sp>
-      <p:sp>
-        <p:nvSpPr>
-          <p:cNvPr id="3" name="Content Placeholder 2"/>
-          <p:cNvSpPr>
-            <a:spLocks noGrp="1"/>
-          </p:cNvSpPr>
-          <p:nvPr>
-            <p:ph idx="1"/>
-          </p:nvPr>
-        </p:nvSpPr>
-        <p:spPr/>
-        <p:txBody>
-          <a:bodyPr/>
-          <a:lstStyle/>
-          <a:p>
-            <a:r>
-              <a:rPr lang="en-PH" dirty="0"/>
-              <a:t>The Philippines adopted the automated election system in 2010.</a:t>
-            </a:r>
-          </a:p>
-          <a:p>
-            <a:r>
-              <a:rPr lang="en-PH" dirty="0"/>
-              <a:t>It should be transparent and credible according to R.A. 9369.</a:t>
-            </a:r>
-          </a:p>
-          <a:p>
-            <a:r>
-              <a:rPr lang="en-PH" dirty="0"/>
-              <a:t>In 2016 Presidential Election, there was a “secret server.”</a:t>
-            </a:r>
-          </a:p>
-          <a:p>
-            <a:r>
-              <a:rPr lang="en-PH" dirty="0"/>
-              <a:t>The hashing function used was said to be </a:t>
-            </a:r>
-            <a:r>
-              <a:rPr lang="en-PH" i="1" dirty="0"/>
-              <a:t>obsolete.</a:t>
-            </a:r>
-          </a:p>
-          <a:p>
-            <a:r>
-              <a:rPr lang="en-PH" dirty="0"/>
-              <a:t>The study aims to propose a </a:t>
-            </a:r>
-            <a:r>
-              <a:rPr lang="en-PH" dirty="0" err="1"/>
-              <a:t>techinal</a:t>
-            </a:r>
-            <a:r>
-              <a:rPr lang="en-PH" dirty="0"/>
-              <a:t> solution.</a:t>
-            </a:r>
-          </a:p>
-          <a:p>
-            <a:r>
-              <a:rPr lang="en-PH" dirty="0"/>
-              <a:t>Through PKI and </a:t>
-            </a:r>
-            <a:r>
-              <a:rPr lang="en-PH" dirty="0" err="1"/>
-              <a:t>Diffie</a:t>
-            </a:r>
-            <a:r>
-              <a:rPr lang="en-PH" dirty="0"/>
-              <a:t>-Hellman algorithm.</a:t>
-            </a:r>
           </a:p>
         </p:txBody>
       </p:sp>
@@ -4096,7 +4988,936 @@
     </p:spTree>
     <p:extLst>
       <p:ext uri="{BB962C8B-B14F-4D97-AF65-F5344CB8AC3E}">
-        <p14:creationId xmlns:p14="http://schemas.microsoft.com/office/powerpoint/2010/main" val="3984246945"/>
+        <p14:creationId xmlns:p14="http://schemas.microsoft.com/office/powerpoint/2010/main" val="2978419117"/>
+      </p:ext>
+    </p:extLst>
+  </p:cSld>
+  <p:clrMapOvr>
+    <a:masterClrMapping/>
+  </p:clrMapOvr>
+</p:sld>
+</file>
+
+<file path=ppt/slides/slide4.xml><?xml version="1.0" encoding="utf-8"?>
+<p:sld xmlns:a="http://schemas.openxmlformats.org/drawingml/2006/main" xmlns:r="http://schemas.openxmlformats.org/officeDocument/2006/relationships" xmlns:p="http://schemas.openxmlformats.org/presentationml/2006/main">
+  <p:cSld>
+    <p:spTree>
+      <p:nvGrpSpPr>
+        <p:cNvPr id="1" name=""/>
+        <p:cNvGrpSpPr/>
+        <p:nvPr/>
+      </p:nvGrpSpPr>
+      <p:grpSpPr>
+        <a:xfrm>
+          <a:off x="0" y="0"/>
+          <a:ext cx="0" cy="0"/>
+          <a:chOff x="0" y="0"/>
+          <a:chExt cx="0" cy="0"/>
+        </a:xfrm>
+      </p:grpSpPr>
+      <p:sp>
+        <p:nvSpPr>
+          <p:cNvPr id="2" name="Title 1"/>
+          <p:cNvSpPr>
+            <a:spLocks noGrp="1"/>
+          </p:cNvSpPr>
+          <p:nvPr>
+            <p:ph type="title"/>
+          </p:nvPr>
+        </p:nvSpPr>
+        <p:spPr/>
+        <p:txBody>
+          <a:bodyPr/>
+          <a:lstStyle/>
+          <a:p>
+            <a:r>
+              <a:rPr lang="en-PH" dirty="0"/>
+              <a:t>Statement of the Problem</a:t>
+            </a:r>
+          </a:p>
+        </p:txBody>
+      </p:sp>
+      <p:sp>
+        <p:nvSpPr>
+          <p:cNvPr id="3" name="Content Placeholder 2"/>
+          <p:cNvSpPr>
+            <a:spLocks noGrp="1"/>
+          </p:cNvSpPr>
+          <p:nvPr>
+            <p:ph idx="1"/>
+          </p:nvPr>
+        </p:nvSpPr>
+        <p:spPr/>
+        <p:txBody>
+          <a:bodyPr>
+            <a:normAutofit/>
+          </a:bodyPr>
+          <a:lstStyle/>
+          <a:p>
+            <a:pPr marL="457200" lvl="1" indent="0" algn="ctr">
+              <a:buNone/>
+            </a:pPr>
+            <a:endParaRPr lang="en-PH" sz="3200" dirty="0"/>
+          </a:p>
+          <a:p>
+            <a:pPr marL="457200" lvl="1" indent="0" algn="ctr">
+              <a:buNone/>
+            </a:pPr>
+            <a:r>
+              <a:rPr lang="en-PH" sz="3200" dirty="0"/>
+              <a:t>How can the Philippine automated election system eliminate the possibility of unofficial servers to secure the transmission of election returns on the server-level?</a:t>
+            </a:r>
+          </a:p>
+        </p:txBody>
+      </p:sp>
+      <p:pic>
+        <p:nvPicPr>
+          <p:cNvPr id="6" name="Picture 5"/>
+          <p:cNvPicPr>
+            <a:picLocks noChangeAspect="1"/>
+          </p:cNvPicPr>
+          <p:nvPr/>
+        </p:nvPicPr>
+        <p:blipFill>
+          <a:blip r:embed="rId3">
+            <a:extLst>
+              <a:ext uri="{28A0092B-C50C-407E-A947-70E740481C1C}">
+                <a14:useLocalDpi xmlns:a14="http://schemas.microsoft.com/office/drawing/2010/main" val="0"/>
+              </a:ext>
+            </a:extLst>
+          </a:blip>
+          <a:stretch>
+            <a:fillRect/>
+          </a:stretch>
+        </p:blipFill>
+        <p:spPr>
+          <a:xfrm>
+            <a:off x="10595595" y="4723195"/>
+            <a:ext cx="2435221" cy="2435221"/>
+          </a:xfrm>
+          <a:prstGeom prst="rect">
+            <a:avLst/>
+          </a:prstGeom>
+        </p:spPr>
+      </p:pic>
+      <p:pic>
+        <p:nvPicPr>
+          <p:cNvPr id="7" name="Picture 6"/>
+          <p:cNvPicPr>
+            <a:picLocks noChangeAspect="1"/>
+          </p:cNvPicPr>
+          <p:nvPr/>
+        </p:nvPicPr>
+        <p:blipFill>
+          <a:blip r:embed="rId4" cstate="hqprint">
+            <a:extLst>
+              <a:ext uri="{28A0092B-C50C-407E-A947-70E740481C1C}">
+                <a14:useLocalDpi xmlns:a14="http://schemas.microsoft.com/office/drawing/2010/main" val="0"/>
+              </a:ext>
+            </a:extLst>
+          </a:blip>
+          <a:stretch>
+            <a:fillRect/>
+          </a:stretch>
+        </p:blipFill>
+        <p:spPr>
+          <a:xfrm>
+            <a:off x="10045148" y="3917853"/>
+            <a:ext cx="1610683" cy="1610683"/>
+          </a:xfrm>
+          <a:prstGeom prst="rect">
+            <a:avLst/>
+          </a:prstGeom>
+        </p:spPr>
+      </p:pic>
+    </p:spTree>
+    <p:extLst>
+      <p:ext uri="{BB962C8B-B14F-4D97-AF65-F5344CB8AC3E}">
+        <p14:creationId xmlns:p14="http://schemas.microsoft.com/office/powerpoint/2010/main" val="1509484594"/>
+      </p:ext>
+    </p:extLst>
+  </p:cSld>
+  <p:clrMapOvr>
+    <a:masterClrMapping/>
+  </p:clrMapOvr>
+</p:sld>
+</file>
+
+<file path=ppt/slides/slide5.xml><?xml version="1.0" encoding="utf-8"?>
+<p:sld xmlns:a="http://schemas.openxmlformats.org/drawingml/2006/main" xmlns:r="http://schemas.openxmlformats.org/officeDocument/2006/relationships" xmlns:p="http://schemas.openxmlformats.org/presentationml/2006/main">
+  <p:cSld>
+    <p:spTree>
+      <p:nvGrpSpPr>
+        <p:cNvPr id="1" name=""/>
+        <p:cNvGrpSpPr/>
+        <p:nvPr/>
+      </p:nvGrpSpPr>
+      <p:grpSpPr>
+        <a:xfrm>
+          <a:off x="0" y="0"/>
+          <a:ext cx="0" cy="0"/>
+          <a:chOff x="0" y="0"/>
+          <a:chExt cx="0" cy="0"/>
+        </a:xfrm>
+      </p:grpSpPr>
+      <p:sp>
+        <p:nvSpPr>
+          <p:cNvPr id="2" name="Title 1"/>
+          <p:cNvSpPr>
+            <a:spLocks noGrp="1"/>
+          </p:cNvSpPr>
+          <p:nvPr>
+            <p:ph type="title"/>
+          </p:nvPr>
+        </p:nvSpPr>
+        <p:spPr/>
+        <p:txBody>
+          <a:bodyPr/>
+          <a:lstStyle/>
+          <a:p>
+            <a:r>
+              <a:rPr lang="en-PH" dirty="0"/>
+              <a:t>Objectives</a:t>
+            </a:r>
+          </a:p>
+        </p:txBody>
+      </p:sp>
+      <p:sp>
+        <p:nvSpPr>
+          <p:cNvPr id="3" name="Content Placeholder 2"/>
+          <p:cNvSpPr>
+            <a:spLocks noGrp="1"/>
+          </p:cNvSpPr>
+          <p:nvPr>
+            <p:ph idx="1"/>
+          </p:nvPr>
+        </p:nvSpPr>
+        <p:spPr>
+          <a:xfrm>
+            <a:off x="838200" y="1825625"/>
+            <a:ext cx="8623300" cy="4351338"/>
+          </a:xfrm>
+        </p:spPr>
+        <p:txBody>
+          <a:bodyPr/>
+          <a:lstStyle/>
+          <a:p>
+            <a:r>
+              <a:rPr lang="en-PH" dirty="0"/>
+              <a:t>General Objectives</a:t>
+            </a:r>
+          </a:p>
+          <a:p>
+            <a:pPr lvl="1"/>
+            <a:r>
+              <a:rPr lang="en-PH" dirty="0"/>
+              <a:t>To know the vital issues currently present in the transmission of the votes</a:t>
+            </a:r>
+          </a:p>
+          <a:p>
+            <a:pPr lvl="1"/>
+            <a:r>
+              <a:rPr lang="en-PH" dirty="0"/>
+              <a:t>To propose a system that would prevent electoral fraud in the transmission of votes in the automated election system</a:t>
+            </a:r>
+          </a:p>
+          <a:p>
+            <a:r>
+              <a:rPr lang="en-PH" dirty="0"/>
+              <a:t>Specific Objectives</a:t>
+            </a:r>
+          </a:p>
+          <a:p>
+            <a:pPr lvl="1"/>
+            <a:r>
+              <a:rPr lang="en-PH" dirty="0"/>
+              <a:t>To provide a technical solution that allows the verification of  the servers’ authenticity through the use of a public key infrastructure as a security mechanism</a:t>
+            </a:r>
+          </a:p>
+        </p:txBody>
+      </p:sp>
+      <p:pic>
+        <p:nvPicPr>
+          <p:cNvPr id="6" name="Picture 5"/>
+          <p:cNvPicPr>
+            <a:picLocks noChangeAspect="1"/>
+          </p:cNvPicPr>
+          <p:nvPr/>
+        </p:nvPicPr>
+        <p:blipFill>
+          <a:blip r:embed="rId3">
+            <a:extLst>
+              <a:ext uri="{28A0092B-C50C-407E-A947-70E740481C1C}">
+                <a14:useLocalDpi xmlns:a14="http://schemas.microsoft.com/office/drawing/2010/main" val="0"/>
+              </a:ext>
+            </a:extLst>
+          </a:blip>
+          <a:stretch>
+            <a:fillRect/>
+          </a:stretch>
+        </p:blipFill>
+        <p:spPr>
+          <a:xfrm>
+            <a:off x="10595595" y="4723195"/>
+            <a:ext cx="2435221" cy="2435221"/>
+          </a:xfrm>
+          <a:prstGeom prst="rect">
+            <a:avLst/>
+          </a:prstGeom>
+        </p:spPr>
+      </p:pic>
+      <p:pic>
+        <p:nvPicPr>
+          <p:cNvPr id="7" name="Picture 6"/>
+          <p:cNvPicPr>
+            <a:picLocks noChangeAspect="1"/>
+          </p:cNvPicPr>
+          <p:nvPr/>
+        </p:nvPicPr>
+        <p:blipFill>
+          <a:blip r:embed="rId4" cstate="hqprint">
+            <a:extLst>
+              <a:ext uri="{28A0092B-C50C-407E-A947-70E740481C1C}">
+                <a14:useLocalDpi xmlns:a14="http://schemas.microsoft.com/office/drawing/2010/main" val="0"/>
+              </a:ext>
+            </a:extLst>
+          </a:blip>
+          <a:stretch>
+            <a:fillRect/>
+          </a:stretch>
+        </p:blipFill>
+        <p:spPr>
+          <a:xfrm>
+            <a:off x="10045148" y="3917853"/>
+            <a:ext cx="1610683" cy="1610683"/>
+          </a:xfrm>
+          <a:prstGeom prst="rect">
+            <a:avLst/>
+          </a:prstGeom>
+        </p:spPr>
+      </p:pic>
+    </p:spTree>
+    <p:extLst>
+      <p:ext uri="{BB962C8B-B14F-4D97-AF65-F5344CB8AC3E}">
+        <p14:creationId xmlns:p14="http://schemas.microsoft.com/office/powerpoint/2010/main" val="62891387"/>
+      </p:ext>
+    </p:extLst>
+  </p:cSld>
+  <p:clrMapOvr>
+    <a:masterClrMapping/>
+  </p:clrMapOvr>
+</p:sld>
+</file>
+
+<file path=ppt/slides/slide6.xml><?xml version="1.0" encoding="utf-8"?>
+<p:sld xmlns:a="http://schemas.openxmlformats.org/drawingml/2006/main" xmlns:r="http://schemas.openxmlformats.org/officeDocument/2006/relationships" xmlns:p="http://schemas.openxmlformats.org/presentationml/2006/main">
+  <p:cSld>
+    <p:spTree>
+      <p:nvGrpSpPr>
+        <p:cNvPr id="1" name=""/>
+        <p:cNvGrpSpPr/>
+        <p:nvPr/>
+      </p:nvGrpSpPr>
+      <p:grpSpPr>
+        <a:xfrm>
+          <a:off x="0" y="0"/>
+          <a:ext cx="0" cy="0"/>
+          <a:chOff x="0" y="0"/>
+          <a:chExt cx="0" cy="0"/>
+        </a:xfrm>
+      </p:grpSpPr>
+      <p:sp>
+        <p:nvSpPr>
+          <p:cNvPr id="2" name="Title 1"/>
+          <p:cNvSpPr>
+            <a:spLocks noGrp="1"/>
+          </p:cNvSpPr>
+          <p:nvPr>
+            <p:ph type="title"/>
+          </p:nvPr>
+        </p:nvSpPr>
+        <p:spPr/>
+        <p:txBody>
+          <a:bodyPr/>
+          <a:lstStyle/>
+          <a:p>
+            <a:r>
+              <a:rPr lang="en-PH" dirty="0"/>
+              <a:t>Significance of the Study</a:t>
+            </a:r>
+          </a:p>
+        </p:txBody>
+      </p:sp>
+      <p:sp>
+        <p:nvSpPr>
+          <p:cNvPr id="3" name="Content Placeholder 2"/>
+          <p:cNvSpPr>
+            <a:spLocks noGrp="1"/>
+          </p:cNvSpPr>
+          <p:nvPr>
+            <p:ph idx="1"/>
+          </p:nvPr>
+        </p:nvSpPr>
+        <p:spPr>
+          <a:xfrm>
+            <a:off x="838200" y="1825625"/>
+            <a:ext cx="9044112" cy="4351338"/>
+          </a:xfrm>
+        </p:spPr>
+        <p:txBody>
+          <a:bodyPr/>
+          <a:lstStyle/>
+          <a:p>
+            <a:r>
+              <a:rPr lang="en-US" sz="2400" dirty="0"/>
+              <a:t>To the Filipino Citizens</a:t>
+            </a:r>
+          </a:p>
+          <a:p>
+            <a:pPr lvl="1"/>
+            <a:r>
+              <a:rPr lang="en-US" dirty="0"/>
+              <a:t>Ensure the security of the casted votes</a:t>
+            </a:r>
+          </a:p>
+          <a:p>
+            <a:pPr lvl="1"/>
+            <a:r>
+              <a:rPr lang="en-US" dirty="0"/>
+              <a:t>Prevent malicious individuals from manipulating the results 	</a:t>
+            </a:r>
+          </a:p>
+          <a:p>
+            <a:r>
+              <a:rPr lang="en-US" sz="2400" dirty="0"/>
+              <a:t>To the COMELEC</a:t>
+            </a:r>
+          </a:p>
+          <a:p>
+            <a:pPr lvl="1"/>
+            <a:r>
+              <a:rPr lang="en-US" dirty="0"/>
+              <a:t>Contribute to the goal of conducting a transparent election</a:t>
+            </a:r>
+          </a:p>
+          <a:p>
+            <a:r>
+              <a:rPr lang="en-US" sz="2400" dirty="0"/>
+              <a:t>To the Future Researchers</a:t>
+            </a:r>
+          </a:p>
+          <a:p>
+            <a:pPr lvl="1"/>
+            <a:r>
+              <a:rPr lang="en-US" dirty="0"/>
+              <a:t>Serve as a guide and inspiration for other developers</a:t>
+            </a:r>
+          </a:p>
+          <a:p>
+            <a:pPr lvl="1"/>
+            <a:r>
+              <a:rPr lang="en-US" dirty="0"/>
+              <a:t>Those who want to pursue the prospect of AES</a:t>
+            </a:r>
+          </a:p>
+          <a:p>
+            <a:endParaRPr lang="en-PH" dirty="0"/>
+          </a:p>
+        </p:txBody>
+      </p:sp>
+      <p:pic>
+        <p:nvPicPr>
+          <p:cNvPr id="6" name="Picture 5"/>
+          <p:cNvPicPr>
+            <a:picLocks noChangeAspect="1"/>
+          </p:cNvPicPr>
+          <p:nvPr/>
+        </p:nvPicPr>
+        <p:blipFill>
+          <a:blip r:embed="rId3">
+            <a:extLst>
+              <a:ext uri="{28A0092B-C50C-407E-A947-70E740481C1C}">
+                <a14:useLocalDpi xmlns:a14="http://schemas.microsoft.com/office/drawing/2010/main" val="0"/>
+              </a:ext>
+            </a:extLst>
+          </a:blip>
+          <a:stretch>
+            <a:fillRect/>
+          </a:stretch>
+        </p:blipFill>
+        <p:spPr>
+          <a:xfrm>
+            <a:off x="10595595" y="4723195"/>
+            <a:ext cx="2435221" cy="2435221"/>
+          </a:xfrm>
+          <a:prstGeom prst="rect">
+            <a:avLst/>
+          </a:prstGeom>
+        </p:spPr>
+      </p:pic>
+      <p:pic>
+        <p:nvPicPr>
+          <p:cNvPr id="7" name="Picture 6"/>
+          <p:cNvPicPr>
+            <a:picLocks noChangeAspect="1"/>
+          </p:cNvPicPr>
+          <p:nvPr/>
+        </p:nvPicPr>
+        <p:blipFill>
+          <a:blip r:embed="rId4" cstate="hqprint">
+            <a:extLst>
+              <a:ext uri="{28A0092B-C50C-407E-A947-70E740481C1C}">
+                <a14:useLocalDpi xmlns:a14="http://schemas.microsoft.com/office/drawing/2010/main" val="0"/>
+              </a:ext>
+            </a:extLst>
+          </a:blip>
+          <a:stretch>
+            <a:fillRect/>
+          </a:stretch>
+        </p:blipFill>
+        <p:spPr>
+          <a:xfrm>
+            <a:off x="10045148" y="3917853"/>
+            <a:ext cx="1610683" cy="1610683"/>
+          </a:xfrm>
+          <a:prstGeom prst="rect">
+            <a:avLst/>
+          </a:prstGeom>
+        </p:spPr>
+      </p:pic>
+    </p:spTree>
+    <p:extLst>
+      <p:ext uri="{BB962C8B-B14F-4D97-AF65-F5344CB8AC3E}">
+        <p14:creationId xmlns:p14="http://schemas.microsoft.com/office/powerpoint/2010/main" val="760615654"/>
+      </p:ext>
+    </p:extLst>
+  </p:cSld>
+  <p:clrMapOvr>
+    <a:masterClrMapping/>
+  </p:clrMapOvr>
+</p:sld>
+</file>
+
+<file path=ppt/slides/slide7.xml><?xml version="1.0" encoding="utf-8"?>
+<p:sld xmlns:a="http://schemas.openxmlformats.org/drawingml/2006/main" xmlns:r="http://schemas.openxmlformats.org/officeDocument/2006/relationships" xmlns:p="http://schemas.openxmlformats.org/presentationml/2006/main">
+  <p:cSld>
+    <p:spTree>
+      <p:nvGrpSpPr>
+        <p:cNvPr id="1" name=""/>
+        <p:cNvGrpSpPr/>
+        <p:nvPr/>
+      </p:nvGrpSpPr>
+      <p:grpSpPr>
+        <a:xfrm>
+          <a:off x="0" y="0"/>
+          <a:ext cx="0" cy="0"/>
+          <a:chOff x="0" y="0"/>
+          <a:chExt cx="0" cy="0"/>
+        </a:xfrm>
+      </p:grpSpPr>
+      <p:sp>
+        <p:nvSpPr>
+          <p:cNvPr id="2" name="Title 1"/>
+          <p:cNvSpPr>
+            <a:spLocks noGrp="1"/>
+          </p:cNvSpPr>
+          <p:nvPr>
+            <p:ph type="title"/>
+          </p:nvPr>
+        </p:nvSpPr>
+        <p:spPr/>
+        <p:txBody>
+          <a:bodyPr/>
+          <a:lstStyle/>
+          <a:p>
+            <a:r>
+              <a:rPr lang="en-PH" dirty="0"/>
+              <a:t>Scope and Limitations</a:t>
+            </a:r>
+          </a:p>
+        </p:txBody>
+      </p:sp>
+      <p:sp>
+        <p:nvSpPr>
+          <p:cNvPr id="3" name="Content Placeholder 2"/>
+          <p:cNvSpPr>
+            <a:spLocks noGrp="1"/>
+          </p:cNvSpPr>
+          <p:nvPr>
+            <p:ph idx="1"/>
+          </p:nvPr>
+        </p:nvSpPr>
+        <p:spPr/>
+        <p:txBody>
+          <a:bodyPr/>
+          <a:lstStyle/>
+          <a:p>
+            <a:r>
+              <a:rPr lang="en-PH" dirty="0"/>
+              <a:t>Scope would only include issues and possible solutions</a:t>
+            </a:r>
+          </a:p>
+          <a:p>
+            <a:r>
+              <a:rPr lang="en-PH" dirty="0"/>
+              <a:t>For the security of the transmission of the election returns</a:t>
+            </a:r>
+          </a:p>
+          <a:p>
+            <a:r>
+              <a:rPr lang="en-PH" dirty="0"/>
+              <a:t>Issues prior and subsequent the transmission will not be covered</a:t>
+            </a:r>
+          </a:p>
+          <a:p>
+            <a:r>
+              <a:rPr lang="en-PH" dirty="0"/>
+              <a:t>Focus is on elimination of the transmission to unofficial servers</a:t>
+            </a:r>
+          </a:p>
+          <a:p>
+            <a:r>
+              <a:rPr lang="en-PH" dirty="0"/>
+              <a:t>As well as, validity of election returns being received</a:t>
+            </a:r>
+          </a:p>
+          <a:p>
+            <a:r>
+              <a:rPr lang="en-PH" dirty="0"/>
+              <a:t>Addressing confidentiality and integrity issue</a:t>
+            </a:r>
+          </a:p>
+          <a:p>
+            <a:endParaRPr lang="en-PH" dirty="0"/>
+          </a:p>
+        </p:txBody>
+      </p:sp>
+      <p:pic>
+        <p:nvPicPr>
+          <p:cNvPr id="4" name="Picture 3"/>
+          <p:cNvPicPr>
+            <a:picLocks noChangeAspect="1"/>
+          </p:cNvPicPr>
+          <p:nvPr/>
+        </p:nvPicPr>
+        <p:blipFill>
+          <a:blip r:embed="rId3">
+            <a:extLst>
+              <a:ext uri="{28A0092B-C50C-407E-A947-70E740481C1C}">
+                <a14:useLocalDpi xmlns:a14="http://schemas.microsoft.com/office/drawing/2010/main" val="0"/>
+              </a:ext>
+            </a:extLst>
+          </a:blip>
+          <a:stretch>
+            <a:fillRect/>
+          </a:stretch>
+        </p:blipFill>
+        <p:spPr>
+          <a:xfrm>
+            <a:off x="10595595" y="4723195"/>
+            <a:ext cx="2435221" cy="2435221"/>
+          </a:xfrm>
+          <a:prstGeom prst="rect">
+            <a:avLst/>
+          </a:prstGeom>
+        </p:spPr>
+      </p:pic>
+      <p:pic>
+        <p:nvPicPr>
+          <p:cNvPr id="5" name="Picture 4"/>
+          <p:cNvPicPr>
+            <a:picLocks noChangeAspect="1"/>
+          </p:cNvPicPr>
+          <p:nvPr/>
+        </p:nvPicPr>
+        <p:blipFill>
+          <a:blip r:embed="rId4" cstate="hqprint">
+            <a:extLst>
+              <a:ext uri="{28A0092B-C50C-407E-A947-70E740481C1C}">
+                <a14:useLocalDpi xmlns:a14="http://schemas.microsoft.com/office/drawing/2010/main" val="0"/>
+              </a:ext>
+            </a:extLst>
+          </a:blip>
+          <a:stretch>
+            <a:fillRect/>
+          </a:stretch>
+        </p:blipFill>
+        <p:spPr>
+          <a:xfrm>
+            <a:off x="10045148" y="3917853"/>
+            <a:ext cx="1610683" cy="1610683"/>
+          </a:xfrm>
+          <a:prstGeom prst="rect">
+            <a:avLst/>
+          </a:prstGeom>
+        </p:spPr>
+      </p:pic>
+    </p:spTree>
+    <p:extLst>
+      <p:ext uri="{BB962C8B-B14F-4D97-AF65-F5344CB8AC3E}">
+        <p14:creationId xmlns:p14="http://schemas.microsoft.com/office/powerpoint/2010/main" val="1282033266"/>
+      </p:ext>
+    </p:extLst>
+  </p:cSld>
+  <p:clrMapOvr>
+    <a:masterClrMapping/>
+  </p:clrMapOvr>
+</p:sld>
+</file>
+
+<file path=ppt/slides/slide8.xml><?xml version="1.0" encoding="utf-8"?>
+<p:sld xmlns:a="http://schemas.openxmlformats.org/drawingml/2006/main" xmlns:r="http://schemas.openxmlformats.org/officeDocument/2006/relationships" xmlns:p="http://schemas.openxmlformats.org/presentationml/2006/main">
+  <p:cSld>
+    <p:spTree>
+      <p:nvGrpSpPr>
+        <p:cNvPr id="1" name=""/>
+        <p:cNvGrpSpPr/>
+        <p:nvPr/>
+      </p:nvGrpSpPr>
+      <p:grpSpPr>
+        <a:xfrm>
+          <a:off x="0" y="0"/>
+          <a:ext cx="0" cy="0"/>
+          <a:chOff x="0" y="0"/>
+          <a:chExt cx="0" cy="0"/>
+        </a:xfrm>
+      </p:grpSpPr>
+      <p:sp>
+        <p:nvSpPr>
+          <p:cNvPr id="2" name="Title 1"/>
+          <p:cNvSpPr>
+            <a:spLocks noGrp="1"/>
+          </p:cNvSpPr>
+          <p:nvPr>
+            <p:ph type="title"/>
+          </p:nvPr>
+        </p:nvSpPr>
+        <p:spPr/>
+        <p:txBody>
+          <a:bodyPr/>
+          <a:lstStyle/>
+          <a:p>
+            <a:r>
+              <a:rPr lang="en-PH" dirty="0"/>
+              <a:t>Related Literature</a:t>
+            </a:r>
+          </a:p>
+        </p:txBody>
+      </p:sp>
+      <p:sp>
+        <p:nvSpPr>
+          <p:cNvPr id="3" name="Content Placeholder 2"/>
+          <p:cNvSpPr>
+            <a:spLocks noGrp="1"/>
+          </p:cNvSpPr>
+          <p:nvPr>
+            <p:ph idx="1"/>
+          </p:nvPr>
+        </p:nvSpPr>
+        <p:spPr/>
+        <p:txBody>
+          <a:bodyPr/>
+          <a:lstStyle/>
+          <a:p>
+            <a:endParaRPr lang="en-PH" dirty="0"/>
+          </a:p>
+        </p:txBody>
+      </p:sp>
+      <p:pic>
+        <p:nvPicPr>
+          <p:cNvPr id="4" name="Picture 3"/>
+          <p:cNvPicPr>
+            <a:picLocks noChangeAspect="1"/>
+          </p:cNvPicPr>
+          <p:nvPr/>
+        </p:nvPicPr>
+        <p:blipFill>
+          <a:blip r:embed="rId3">
+            <a:extLst>
+              <a:ext uri="{28A0092B-C50C-407E-A947-70E740481C1C}">
+                <a14:useLocalDpi xmlns:a14="http://schemas.microsoft.com/office/drawing/2010/main" val="0"/>
+              </a:ext>
+            </a:extLst>
+          </a:blip>
+          <a:stretch>
+            <a:fillRect/>
+          </a:stretch>
+        </p:blipFill>
+        <p:spPr>
+          <a:xfrm>
+            <a:off x="10595595" y="4723195"/>
+            <a:ext cx="2435221" cy="2435221"/>
+          </a:xfrm>
+          <a:prstGeom prst="rect">
+            <a:avLst/>
+          </a:prstGeom>
+        </p:spPr>
+      </p:pic>
+      <p:pic>
+        <p:nvPicPr>
+          <p:cNvPr id="5" name="Picture 4"/>
+          <p:cNvPicPr>
+            <a:picLocks noChangeAspect="1"/>
+          </p:cNvPicPr>
+          <p:nvPr/>
+        </p:nvPicPr>
+        <p:blipFill>
+          <a:blip r:embed="rId4" cstate="hqprint">
+            <a:extLst>
+              <a:ext uri="{28A0092B-C50C-407E-A947-70E740481C1C}">
+                <a14:useLocalDpi xmlns:a14="http://schemas.microsoft.com/office/drawing/2010/main" val="0"/>
+              </a:ext>
+            </a:extLst>
+          </a:blip>
+          <a:stretch>
+            <a:fillRect/>
+          </a:stretch>
+        </p:blipFill>
+        <p:spPr>
+          <a:xfrm>
+            <a:off x="10045148" y="3917853"/>
+            <a:ext cx="1610683" cy="1610683"/>
+          </a:xfrm>
+          <a:prstGeom prst="rect">
+            <a:avLst/>
+          </a:prstGeom>
+        </p:spPr>
+      </p:pic>
+    </p:spTree>
+    <p:extLst>
+      <p:ext uri="{BB962C8B-B14F-4D97-AF65-F5344CB8AC3E}">
+        <p14:creationId xmlns:p14="http://schemas.microsoft.com/office/powerpoint/2010/main" val="3941628008"/>
+      </p:ext>
+    </p:extLst>
+  </p:cSld>
+  <p:clrMapOvr>
+    <a:masterClrMapping/>
+  </p:clrMapOvr>
+</p:sld>
+</file>
+
+<file path=ppt/slides/slide9.xml><?xml version="1.0" encoding="utf-8"?>
+<p:sld xmlns:a="http://schemas.openxmlformats.org/drawingml/2006/main" xmlns:r="http://schemas.openxmlformats.org/officeDocument/2006/relationships" xmlns:p="http://schemas.openxmlformats.org/presentationml/2006/main">
+  <p:cSld>
+    <p:spTree>
+      <p:nvGrpSpPr>
+        <p:cNvPr id="1" name=""/>
+        <p:cNvGrpSpPr/>
+        <p:nvPr/>
+      </p:nvGrpSpPr>
+      <p:grpSpPr>
+        <a:xfrm>
+          <a:off x="0" y="0"/>
+          <a:ext cx="0" cy="0"/>
+          <a:chOff x="0" y="0"/>
+          <a:chExt cx="0" cy="0"/>
+        </a:xfrm>
+      </p:grpSpPr>
+      <p:sp>
+        <p:nvSpPr>
+          <p:cNvPr id="2" name="Title 1"/>
+          <p:cNvSpPr>
+            <a:spLocks noGrp="1"/>
+          </p:cNvSpPr>
+          <p:nvPr>
+            <p:ph type="title"/>
+          </p:nvPr>
+        </p:nvSpPr>
+        <p:spPr/>
+        <p:txBody>
+          <a:bodyPr/>
+          <a:lstStyle/>
+          <a:p>
+            <a:r>
+              <a:rPr lang="en-PH" dirty="0"/>
+              <a:t>Related Study</a:t>
+            </a:r>
+          </a:p>
+        </p:txBody>
+      </p:sp>
+      <p:sp>
+        <p:nvSpPr>
+          <p:cNvPr id="3" name="Content Placeholder 2"/>
+          <p:cNvSpPr>
+            <a:spLocks noGrp="1"/>
+          </p:cNvSpPr>
+          <p:nvPr>
+            <p:ph idx="1"/>
+          </p:nvPr>
+        </p:nvSpPr>
+        <p:spPr/>
+        <p:txBody>
+          <a:bodyPr/>
+          <a:lstStyle/>
+          <a:p>
+            <a:endParaRPr lang="en-PH" dirty="0"/>
+          </a:p>
+        </p:txBody>
+      </p:sp>
+      <p:pic>
+        <p:nvPicPr>
+          <p:cNvPr id="4" name="Picture 3"/>
+          <p:cNvPicPr>
+            <a:picLocks noChangeAspect="1"/>
+          </p:cNvPicPr>
+          <p:nvPr/>
+        </p:nvPicPr>
+        <p:blipFill>
+          <a:blip r:embed="rId3">
+            <a:extLst>
+              <a:ext uri="{28A0092B-C50C-407E-A947-70E740481C1C}">
+                <a14:useLocalDpi xmlns:a14="http://schemas.microsoft.com/office/drawing/2010/main" val="0"/>
+              </a:ext>
+            </a:extLst>
+          </a:blip>
+          <a:stretch>
+            <a:fillRect/>
+          </a:stretch>
+        </p:blipFill>
+        <p:spPr>
+          <a:xfrm>
+            <a:off x="10595595" y="4723195"/>
+            <a:ext cx="2435221" cy="2435221"/>
+          </a:xfrm>
+          <a:prstGeom prst="rect">
+            <a:avLst/>
+          </a:prstGeom>
+        </p:spPr>
+      </p:pic>
+      <p:pic>
+        <p:nvPicPr>
+          <p:cNvPr id="5" name="Picture 4"/>
+          <p:cNvPicPr>
+            <a:picLocks noChangeAspect="1"/>
+          </p:cNvPicPr>
+          <p:nvPr/>
+        </p:nvPicPr>
+        <p:blipFill>
+          <a:blip r:embed="rId4" cstate="hqprint">
+            <a:extLst>
+              <a:ext uri="{28A0092B-C50C-407E-A947-70E740481C1C}">
+                <a14:useLocalDpi xmlns:a14="http://schemas.microsoft.com/office/drawing/2010/main" val="0"/>
+              </a:ext>
+            </a:extLst>
+          </a:blip>
+          <a:stretch>
+            <a:fillRect/>
+          </a:stretch>
+        </p:blipFill>
+        <p:spPr>
+          <a:xfrm>
+            <a:off x="10045148" y="3917853"/>
+            <a:ext cx="1610683" cy="1610683"/>
+          </a:xfrm>
+          <a:prstGeom prst="rect">
+            <a:avLst/>
+          </a:prstGeom>
+        </p:spPr>
+      </p:pic>
+    </p:spTree>
+    <p:extLst>
+      <p:ext uri="{BB962C8B-B14F-4D97-AF65-F5344CB8AC3E}">
+        <p14:creationId xmlns:p14="http://schemas.microsoft.com/office/powerpoint/2010/main" val="2339671285"/>
       </p:ext>
     </p:extLst>
   </p:cSld>

</xml_diff>

<commit_message>
Edited the csproj ppt
</commit_message>
<xml_diff>
--- a/Documentation/Research Paper/CSPROJ Presentation.pptx
+++ b/Documentation/Research Paper/CSPROJ Presentation.pptx
@@ -5,7 +5,7 @@
     <p:sldMasterId id="2147483648" r:id="rId1"/>
   </p:sldMasterIdLst>
   <p:notesMasterIdLst>
-    <p:notesMasterId r:id="rId13"/>
+    <p:notesMasterId r:id="rId19"/>
   </p:notesMasterIdLst>
   <p:sldIdLst>
     <p:sldId id="257" r:id="rId2"/>
@@ -19,6 +19,12 @@
     <p:sldId id="266" r:id="rId10"/>
     <p:sldId id="267" r:id="rId11"/>
     <p:sldId id="259" r:id="rId12"/>
+    <p:sldId id="271" r:id="rId13"/>
+    <p:sldId id="272" r:id="rId14"/>
+    <p:sldId id="273" r:id="rId15"/>
+    <p:sldId id="270" r:id="rId16"/>
+    <p:sldId id="268" r:id="rId17"/>
+    <p:sldId id="269" r:id="rId18"/>
   </p:sldIdLst>
   <p:sldSz cx="12192000" cy="6858000"/>
   <p:notesSz cx="6858000" cy="9144000"/>
@@ -117,6 +123,11 @@
       </a:defRPr>
     </a:lvl9pPr>
   </p:defaultTextStyle>
+  <p:extLst>
+    <p:ext uri="{EFAFB233-063F-42B5-8137-9DF3F51BA10A}">
+      <p15:sldGuideLst xmlns:p15="http://schemas.microsoft.com/office/powerpoint/2012/main"/>
+    </p:ext>
+  </p:extLst>
 </p:presentation>
 </file>
 
@@ -202,7 +213,7 @@
           <a:p>
             <a:fld id="{4A59DF67-7CAE-436E-928A-21DC0B7D3C3D}" type="datetimeFigureOut">
               <a:rPr lang="en-PH" smtClean="0"/>
-              <a:t>09/12/2016</a:t>
+              <a:t>10/12/2016</a:t>
             </a:fld>
             <a:endParaRPr lang="en-PH"/>
           </a:p>
@@ -650,6 +661,124 @@
           <a:bodyPr/>
           <a:lstStyle/>
           <a:p>
+            <a:r>
+              <a:rPr lang="en-PH" sz="1200" kern="1200" dirty="0">
+                <a:solidFill>
+                  <a:schemeClr val="tx1"/>
+                </a:solidFill>
+                <a:effectLst/>
+                <a:latin typeface="+mn-lt"/>
+                <a:ea typeface="+mn-ea"/>
+                <a:cs typeface="+mn-cs"/>
+              </a:rPr>
+              <a:t>The current system only provides a hash value that would secure the integrity of the data. However, it lacks the security mechanism that would address confidentiality of the system which makes it possible for other servers aside from the official servers to exist in the transmission of the election returns.</a:t>
+            </a:r>
+          </a:p>
+          <a:p>
+            <a:r>
+              <a:rPr lang="en-PH" sz="1200" kern="1200" dirty="0">
+                <a:solidFill>
+                  <a:schemeClr val="tx1"/>
+                </a:solidFill>
+                <a:effectLst/>
+                <a:latin typeface="+mn-lt"/>
+                <a:ea typeface="+mn-ea"/>
+                <a:cs typeface="+mn-cs"/>
+              </a:rPr>
+              <a:t>As for the proposed solution to this issue, a public key infrastructure has to be implemented to not only authenticate the data being transmitted but to also allow the verification of the servers’ authenticity.</a:t>
+            </a:r>
+            <a:endParaRPr lang="en-PH" sz="1200" kern="1200" dirty="0">
+              <a:solidFill>
+                <a:schemeClr val="tx1"/>
+              </a:solidFill>
+              <a:effectLst/>
+              <a:latin typeface="+mn-lt"/>
+              <a:ea typeface="+mn-ea"/>
+              <a:cs typeface="+mn-cs"/>
+            </a:endParaRPr>
+          </a:p>
+        </p:txBody>
+      </p:sp>
+      <p:sp>
+        <p:nvSpPr>
+          <p:cNvPr id="4" name="Slide Number Placeholder 3"/>
+          <p:cNvSpPr>
+            <a:spLocks noGrp="1"/>
+          </p:cNvSpPr>
+          <p:nvPr>
+            <p:ph type="sldNum" sz="quarter" idx="10"/>
+          </p:nvPr>
+        </p:nvSpPr>
+        <p:spPr/>
+        <p:txBody>
+          <a:bodyPr/>
+          <a:lstStyle/>
+          <a:p>
+            <a:fld id="{213B05C4-94C7-4412-9CB1-C9F207621576}" type="slidenum">
+              <a:rPr lang="en-PH" smtClean="0"/>
+              <a:t>11</a:t>
+            </a:fld>
+            <a:endParaRPr lang="en-PH"/>
+          </a:p>
+        </p:txBody>
+      </p:sp>
+    </p:spTree>
+    <p:extLst>
+      <p:ext uri="{BB962C8B-B14F-4D97-AF65-F5344CB8AC3E}">
+        <p14:creationId xmlns:p14="http://schemas.microsoft.com/office/powerpoint/2010/main" val="1610382430"/>
+      </p:ext>
+    </p:extLst>
+  </p:cSld>
+  <p:clrMapOvr>
+    <a:masterClrMapping/>
+  </p:clrMapOvr>
+</p:notes>
+</file>
+
+<file path=ppt/notesSlides/notesSlide11.xml><?xml version="1.0" encoding="utf-8"?>
+<p:notes xmlns:a="http://schemas.openxmlformats.org/drawingml/2006/main" xmlns:r="http://schemas.openxmlformats.org/officeDocument/2006/relationships" xmlns:p="http://schemas.openxmlformats.org/presentationml/2006/main">
+  <p:cSld>
+    <p:spTree>
+      <p:nvGrpSpPr>
+        <p:cNvPr id="1" name=""/>
+        <p:cNvGrpSpPr/>
+        <p:nvPr/>
+      </p:nvGrpSpPr>
+      <p:grpSpPr>
+        <a:xfrm>
+          <a:off x="0" y="0"/>
+          <a:ext cx="0" cy="0"/>
+          <a:chOff x="0" y="0"/>
+          <a:chExt cx="0" cy="0"/>
+        </a:xfrm>
+      </p:grpSpPr>
+      <p:sp>
+        <p:nvSpPr>
+          <p:cNvPr id="2" name="Slide Image Placeholder 1"/>
+          <p:cNvSpPr>
+            <a:spLocks noGrp="1" noRot="1" noChangeAspect="1"/>
+          </p:cNvSpPr>
+          <p:nvPr>
+            <p:ph type="sldImg"/>
+          </p:nvPr>
+        </p:nvSpPr>
+        <p:spPr/>
+      </p:sp>
+      <p:sp>
+        <p:nvSpPr>
+          <p:cNvPr id="3" name="Notes Placeholder 2"/>
+          <p:cNvSpPr>
+            <a:spLocks noGrp="1"/>
+          </p:cNvSpPr>
+          <p:nvPr>
+            <p:ph type="body" idx="1"/>
+          </p:nvPr>
+        </p:nvSpPr>
+        <p:spPr/>
+        <p:txBody>
+          <a:bodyPr/>
+          <a:lstStyle/>
+          <a:p>
             <a:pPr marL="0" marR="0" lvl="0" indent="0" algn="l" defTabSz="914400" rtl="0" eaLnBrk="1" fontAlgn="auto" latinLnBrk="0" hangingPunct="1">
               <a:lnSpc>
                 <a:spcPct val="100000"/>
@@ -696,7 +825,7 @@
           <a:p>
             <a:fld id="{213B05C4-94C7-4412-9CB1-C9F207621576}" type="slidenum">
               <a:rPr lang="en-PH" smtClean="0"/>
-              <a:t>11</a:t>
+              <a:t>12</a:t>
             </a:fld>
             <a:endParaRPr lang="en-PH"/>
           </a:p>
@@ -705,7 +834,672 @@
     </p:spTree>
     <p:extLst>
       <p:ext uri="{BB962C8B-B14F-4D97-AF65-F5344CB8AC3E}">
-        <p14:creationId xmlns:p14="http://schemas.microsoft.com/office/powerpoint/2010/main" val="1610382430"/>
+        <p14:creationId xmlns:p14="http://schemas.microsoft.com/office/powerpoint/2010/main" val="2146206143"/>
+      </p:ext>
+    </p:extLst>
+  </p:cSld>
+  <p:clrMapOvr>
+    <a:masterClrMapping/>
+  </p:clrMapOvr>
+</p:notes>
+</file>
+
+<file path=ppt/notesSlides/notesSlide12.xml><?xml version="1.0" encoding="utf-8"?>
+<p:notes xmlns:a="http://schemas.openxmlformats.org/drawingml/2006/main" xmlns:r="http://schemas.openxmlformats.org/officeDocument/2006/relationships" xmlns:p="http://schemas.openxmlformats.org/presentationml/2006/main">
+  <p:cSld>
+    <p:spTree>
+      <p:nvGrpSpPr>
+        <p:cNvPr id="1" name=""/>
+        <p:cNvGrpSpPr/>
+        <p:nvPr/>
+      </p:nvGrpSpPr>
+      <p:grpSpPr>
+        <a:xfrm>
+          <a:off x="0" y="0"/>
+          <a:ext cx="0" cy="0"/>
+          <a:chOff x="0" y="0"/>
+          <a:chExt cx="0" cy="0"/>
+        </a:xfrm>
+      </p:grpSpPr>
+      <p:sp>
+        <p:nvSpPr>
+          <p:cNvPr id="2" name="Slide Image Placeholder 1"/>
+          <p:cNvSpPr>
+            <a:spLocks noGrp="1" noRot="1" noChangeAspect="1"/>
+          </p:cNvSpPr>
+          <p:nvPr>
+            <p:ph type="sldImg"/>
+          </p:nvPr>
+        </p:nvSpPr>
+        <p:spPr/>
+      </p:sp>
+      <p:sp>
+        <p:nvSpPr>
+          <p:cNvPr id="3" name="Notes Placeholder 2"/>
+          <p:cNvSpPr>
+            <a:spLocks noGrp="1"/>
+          </p:cNvSpPr>
+          <p:nvPr>
+            <p:ph type="body" idx="1"/>
+          </p:nvPr>
+        </p:nvSpPr>
+        <p:spPr/>
+        <p:txBody>
+          <a:bodyPr/>
+          <a:lstStyle/>
+          <a:p>
+            <a:pPr marL="0" marR="0" lvl="0" indent="0" algn="l" defTabSz="914400" rtl="0" eaLnBrk="1" fontAlgn="auto" latinLnBrk="0" hangingPunct="1">
+              <a:lnSpc>
+                <a:spcPct val="100000"/>
+              </a:lnSpc>
+              <a:spcBef>
+                <a:spcPts val="0"/>
+              </a:spcBef>
+              <a:spcAft>
+                <a:spcPts val="0"/>
+              </a:spcAft>
+              <a:buClrTx/>
+              <a:buSzTx/>
+              <a:buFontTx/>
+              <a:buNone/>
+              <a:tabLst/>
+              <a:defRPr/>
+            </a:pPr>
+            <a:r>
+              <a:rPr lang="en-PH" sz="1200" kern="1200" dirty="0">
+                <a:solidFill>
+                  <a:schemeClr val="tx1"/>
+                </a:solidFill>
+                <a:effectLst/>
+                <a:latin typeface="+mn-lt"/>
+                <a:ea typeface="+mn-ea"/>
+                <a:cs typeface="+mn-cs"/>
+              </a:rPr>
+              <a:t>The process will start once the voting period ends at 5:00pm of the election day. In the proposed system, a server key will collect all the public keys of the voting counting machine (VCM). Assuming that the BEI have already digitally signed the election returns (ERs), the VCM will then send the ERs to the official servers. After doing so, the server will validate the authenticity of the VCM through the </a:t>
+            </a:r>
+            <a:r>
+              <a:rPr lang="en-PH" sz="1200" kern="1200" dirty="0" err="1">
+                <a:solidFill>
+                  <a:schemeClr val="tx1"/>
+                </a:solidFill>
+                <a:effectLst/>
+                <a:latin typeface="+mn-lt"/>
+                <a:ea typeface="+mn-ea"/>
+                <a:cs typeface="+mn-cs"/>
+              </a:rPr>
+              <a:t>Diffie</a:t>
+            </a:r>
+            <a:r>
+              <a:rPr lang="en-PH" sz="1200" kern="1200" dirty="0">
+                <a:solidFill>
+                  <a:schemeClr val="tx1"/>
+                </a:solidFill>
+                <a:effectLst/>
+                <a:latin typeface="+mn-lt"/>
+                <a:ea typeface="+mn-ea"/>
+                <a:cs typeface="+mn-cs"/>
+              </a:rPr>
+              <a:t>-Hellman algorithm. With the said algorithm, the VCM and server will generate a new key that uses their own public and private keys to verify that the client and server are transmitting data to an authenticated client/server</a:t>
+            </a:r>
+            <a:endParaRPr lang="en-PH" sz="1200" kern="1200" dirty="0">
+              <a:solidFill>
+                <a:schemeClr val="tx1"/>
+              </a:solidFill>
+              <a:effectLst/>
+              <a:latin typeface="+mn-lt"/>
+              <a:ea typeface="+mn-ea"/>
+              <a:cs typeface="+mn-cs"/>
+            </a:endParaRPr>
+          </a:p>
+        </p:txBody>
+      </p:sp>
+      <p:sp>
+        <p:nvSpPr>
+          <p:cNvPr id="4" name="Slide Number Placeholder 3"/>
+          <p:cNvSpPr>
+            <a:spLocks noGrp="1"/>
+          </p:cNvSpPr>
+          <p:nvPr>
+            <p:ph type="sldNum" sz="quarter" idx="10"/>
+          </p:nvPr>
+        </p:nvSpPr>
+        <p:spPr/>
+        <p:txBody>
+          <a:bodyPr/>
+          <a:lstStyle/>
+          <a:p>
+            <a:fld id="{213B05C4-94C7-4412-9CB1-C9F207621576}" type="slidenum">
+              <a:rPr lang="en-PH" smtClean="0"/>
+              <a:t>13</a:t>
+            </a:fld>
+            <a:endParaRPr lang="en-PH"/>
+          </a:p>
+        </p:txBody>
+      </p:sp>
+    </p:spTree>
+    <p:extLst>
+      <p:ext uri="{BB962C8B-B14F-4D97-AF65-F5344CB8AC3E}">
+        <p14:creationId xmlns:p14="http://schemas.microsoft.com/office/powerpoint/2010/main" val="3735920242"/>
+      </p:ext>
+    </p:extLst>
+  </p:cSld>
+  <p:clrMapOvr>
+    <a:masterClrMapping/>
+  </p:clrMapOvr>
+</p:notes>
+</file>
+
+<file path=ppt/notesSlides/notesSlide13.xml><?xml version="1.0" encoding="utf-8"?>
+<p:notes xmlns:a="http://schemas.openxmlformats.org/drawingml/2006/main" xmlns:r="http://schemas.openxmlformats.org/officeDocument/2006/relationships" xmlns:p="http://schemas.openxmlformats.org/presentationml/2006/main">
+  <p:cSld>
+    <p:spTree>
+      <p:nvGrpSpPr>
+        <p:cNvPr id="1" name=""/>
+        <p:cNvGrpSpPr/>
+        <p:nvPr/>
+      </p:nvGrpSpPr>
+      <p:grpSpPr>
+        <a:xfrm>
+          <a:off x="0" y="0"/>
+          <a:ext cx="0" cy="0"/>
+          <a:chOff x="0" y="0"/>
+          <a:chExt cx="0" cy="0"/>
+        </a:xfrm>
+      </p:grpSpPr>
+      <p:sp>
+        <p:nvSpPr>
+          <p:cNvPr id="2" name="Slide Image Placeholder 1"/>
+          <p:cNvSpPr>
+            <a:spLocks noGrp="1" noRot="1" noChangeAspect="1"/>
+          </p:cNvSpPr>
+          <p:nvPr>
+            <p:ph type="sldImg"/>
+          </p:nvPr>
+        </p:nvSpPr>
+        <p:spPr/>
+      </p:sp>
+      <p:sp>
+        <p:nvSpPr>
+          <p:cNvPr id="3" name="Notes Placeholder 2"/>
+          <p:cNvSpPr>
+            <a:spLocks noGrp="1"/>
+          </p:cNvSpPr>
+          <p:nvPr>
+            <p:ph type="body" idx="1"/>
+          </p:nvPr>
+        </p:nvSpPr>
+        <p:spPr/>
+        <p:txBody>
+          <a:bodyPr/>
+          <a:lstStyle/>
+          <a:p>
+            <a:pPr marL="0" marR="0" lvl="0" indent="0" algn="l" defTabSz="914400" rtl="0" eaLnBrk="1" fontAlgn="auto" latinLnBrk="0" hangingPunct="1">
+              <a:lnSpc>
+                <a:spcPct val="100000"/>
+              </a:lnSpc>
+              <a:spcBef>
+                <a:spcPts val="0"/>
+              </a:spcBef>
+              <a:spcAft>
+                <a:spcPts val="0"/>
+              </a:spcAft>
+              <a:buClrTx/>
+              <a:buSzTx/>
+              <a:buFontTx/>
+              <a:buNone/>
+              <a:tabLst/>
+              <a:defRPr/>
+            </a:pPr>
+            <a:r>
+              <a:rPr lang="en-PH" sz="1200" kern="1200" dirty="0">
+                <a:solidFill>
+                  <a:schemeClr val="tx1"/>
+                </a:solidFill>
+                <a:effectLst/>
+                <a:latin typeface="+mn-lt"/>
+                <a:ea typeface="+mn-ea"/>
+                <a:cs typeface="+mn-cs"/>
+              </a:rPr>
+              <a:t>Once there is a generated key and the key players are verified, it is the only time when the VCM will encrypt file (ERs) using its private key. After that, VCM will get the hash value of the file using the MD5, SHA, and </a:t>
+            </a:r>
+            <a:r>
+              <a:rPr lang="en-PH" sz="1200" kern="1200" dirty="0" err="1">
+                <a:solidFill>
+                  <a:schemeClr val="tx1"/>
+                </a:solidFill>
+                <a:effectLst/>
+                <a:latin typeface="+mn-lt"/>
+                <a:ea typeface="+mn-ea"/>
+                <a:cs typeface="+mn-cs"/>
+              </a:rPr>
+              <a:t>Bcrypt</a:t>
+            </a:r>
+            <a:r>
+              <a:rPr lang="en-PH" sz="1200" kern="1200" dirty="0">
+                <a:solidFill>
+                  <a:schemeClr val="tx1"/>
+                </a:solidFill>
+                <a:effectLst/>
+                <a:latin typeface="+mn-lt"/>
+                <a:ea typeface="+mn-ea"/>
+                <a:cs typeface="+mn-cs"/>
+              </a:rPr>
+              <a:t> hashing algorithms. Then the VCM will once again encrypt the file using the </a:t>
+            </a:r>
+            <a:r>
+              <a:rPr lang="en-PH" sz="1200" kern="1200" dirty="0" err="1">
+                <a:solidFill>
+                  <a:schemeClr val="tx1"/>
+                </a:solidFill>
+                <a:effectLst/>
+                <a:latin typeface="+mn-lt"/>
+                <a:ea typeface="+mn-ea"/>
+                <a:cs typeface="+mn-cs"/>
+              </a:rPr>
+              <a:t>Diffie</a:t>
+            </a:r>
+            <a:r>
+              <a:rPr lang="en-PH" sz="1200" kern="1200" dirty="0">
+                <a:solidFill>
+                  <a:schemeClr val="tx1"/>
+                </a:solidFill>
+                <a:effectLst/>
+                <a:latin typeface="+mn-lt"/>
+                <a:ea typeface="+mn-ea"/>
+                <a:cs typeface="+mn-cs"/>
+              </a:rPr>
+              <a:t>-Hellman generated key, as well as its hash values. Only then the VCM will send the encrypted file and hash values to the server key. The server key will decrypt the encrypted file and hash function using the </a:t>
+            </a:r>
+            <a:r>
+              <a:rPr lang="en-PH" sz="1200" kern="1200" dirty="0" err="1">
+                <a:solidFill>
+                  <a:schemeClr val="tx1"/>
+                </a:solidFill>
+                <a:effectLst/>
+                <a:latin typeface="+mn-lt"/>
+                <a:ea typeface="+mn-ea"/>
+                <a:cs typeface="+mn-cs"/>
+              </a:rPr>
+              <a:t>Diffie</a:t>
+            </a:r>
+            <a:r>
+              <a:rPr lang="en-PH" sz="1200" kern="1200" dirty="0">
+                <a:solidFill>
+                  <a:schemeClr val="tx1"/>
+                </a:solidFill>
+                <a:effectLst/>
+                <a:latin typeface="+mn-lt"/>
+                <a:ea typeface="+mn-ea"/>
+                <a:cs typeface="+mn-cs"/>
+              </a:rPr>
+              <a:t>-Hellman generated key and the public key of the VCM. Server key will then get the hash value of the file to check if the hash values are the same key. </a:t>
+            </a:r>
+            <a:endParaRPr lang="en-PH" sz="1200" kern="1200" dirty="0">
+              <a:solidFill>
+                <a:schemeClr val="tx1"/>
+              </a:solidFill>
+              <a:effectLst/>
+              <a:latin typeface="+mn-lt"/>
+              <a:ea typeface="+mn-ea"/>
+              <a:cs typeface="+mn-cs"/>
+            </a:endParaRPr>
+          </a:p>
+        </p:txBody>
+      </p:sp>
+      <p:sp>
+        <p:nvSpPr>
+          <p:cNvPr id="4" name="Slide Number Placeholder 3"/>
+          <p:cNvSpPr>
+            <a:spLocks noGrp="1"/>
+          </p:cNvSpPr>
+          <p:nvPr>
+            <p:ph type="sldNum" sz="quarter" idx="10"/>
+          </p:nvPr>
+        </p:nvSpPr>
+        <p:spPr/>
+        <p:txBody>
+          <a:bodyPr/>
+          <a:lstStyle/>
+          <a:p>
+            <a:fld id="{213B05C4-94C7-4412-9CB1-C9F207621576}" type="slidenum">
+              <a:rPr lang="en-PH" smtClean="0"/>
+              <a:t>14</a:t>
+            </a:fld>
+            <a:endParaRPr lang="en-PH"/>
+          </a:p>
+        </p:txBody>
+      </p:sp>
+    </p:spTree>
+    <p:extLst>
+      <p:ext uri="{BB962C8B-B14F-4D97-AF65-F5344CB8AC3E}">
+        <p14:creationId xmlns:p14="http://schemas.microsoft.com/office/powerpoint/2010/main" val="2966215870"/>
+      </p:ext>
+    </p:extLst>
+  </p:cSld>
+  <p:clrMapOvr>
+    <a:masterClrMapping/>
+  </p:clrMapOvr>
+</p:notes>
+</file>
+
+<file path=ppt/notesSlides/notesSlide14.xml><?xml version="1.0" encoding="utf-8"?>
+<p:notes xmlns:a="http://schemas.openxmlformats.org/drawingml/2006/main" xmlns:r="http://schemas.openxmlformats.org/officeDocument/2006/relationships" xmlns:p="http://schemas.openxmlformats.org/presentationml/2006/main">
+  <p:cSld>
+    <p:spTree>
+      <p:nvGrpSpPr>
+        <p:cNvPr id="1" name=""/>
+        <p:cNvGrpSpPr/>
+        <p:nvPr/>
+      </p:nvGrpSpPr>
+      <p:grpSpPr>
+        <a:xfrm>
+          <a:off x="0" y="0"/>
+          <a:ext cx="0" cy="0"/>
+          <a:chOff x="0" y="0"/>
+          <a:chExt cx="0" cy="0"/>
+        </a:xfrm>
+      </p:grpSpPr>
+      <p:sp>
+        <p:nvSpPr>
+          <p:cNvPr id="2" name="Slide Image Placeholder 1"/>
+          <p:cNvSpPr>
+            <a:spLocks noGrp="1" noRot="1" noChangeAspect="1"/>
+          </p:cNvSpPr>
+          <p:nvPr>
+            <p:ph type="sldImg"/>
+          </p:nvPr>
+        </p:nvSpPr>
+        <p:spPr/>
+      </p:sp>
+      <p:sp>
+        <p:nvSpPr>
+          <p:cNvPr id="3" name="Notes Placeholder 2"/>
+          <p:cNvSpPr>
+            <a:spLocks noGrp="1"/>
+          </p:cNvSpPr>
+          <p:nvPr>
+            <p:ph type="body" idx="1"/>
+          </p:nvPr>
+        </p:nvSpPr>
+        <p:spPr/>
+        <p:txBody>
+          <a:bodyPr/>
+          <a:lstStyle/>
+          <a:p>
+            <a:pPr marL="0" marR="0" lvl="0" indent="0" algn="l" defTabSz="914400" rtl="0" eaLnBrk="1" fontAlgn="auto" latinLnBrk="0" hangingPunct="1">
+              <a:lnSpc>
+                <a:spcPct val="100000"/>
+              </a:lnSpc>
+              <a:spcBef>
+                <a:spcPts val="0"/>
+              </a:spcBef>
+              <a:spcAft>
+                <a:spcPts val="0"/>
+              </a:spcAft>
+              <a:buClrTx/>
+              <a:buSzTx/>
+              <a:buFontTx/>
+              <a:buNone/>
+              <a:tabLst/>
+              <a:defRPr/>
+            </a:pPr>
+            <a:endParaRPr lang="en-PH" sz="1200" kern="1200" dirty="0">
+              <a:solidFill>
+                <a:schemeClr val="tx1"/>
+              </a:solidFill>
+              <a:effectLst/>
+              <a:latin typeface="+mn-lt"/>
+              <a:ea typeface="+mn-ea"/>
+              <a:cs typeface="+mn-cs"/>
+            </a:endParaRPr>
+          </a:p>
+        </p:txBody>
+      </p:sp>
+      <p:sp>
+        <p:nvSpPr>
+          <p:cNvPr id="4" name="Slide Number Placeholder 3"/>
+          <p:cNvSpPr>
+            <a:spLocks noGrp="1"/>
+          </p:cNvSpPr>
+          <p:nvPr>
+            <p:ph type="sldNum" sz="quarter" idx="10"/>
+          </p:nvPr>
+        </p:nvSpPr>
+        <p:spPr/>
+        <p:txBody>
+          <a:bodyPr/>
+          <a:lstStyle/>
+          <a:p>
+            <a:fld id="{213B05C4-94C7-4412-9CB1-C9F207621576}" type="slidenum">
+              <a:rPr lang="en-PH" smtClean="0"/>
+              <a:t>15</a:t>
+            </a:fld>
+            <a:endParaRPr lang="en-PH"/>
+          </a:p>
+        </p:txBody>
+      </p:sp>
+    </p:spTree>
+    <p:extLst>
+      <p:ext uri="{BB962C8B-B14F-4D97-AF65-F5344CB8AC3E}">
+        <p14:creationId xmlns:p14="http://schemas.microsoft.com/office/powerpoint/2010/main" val="3902562114"/>
+      </p:ext>
+    </p:extLst>
+  </p:cSld>
+  <p:clrMapOvr>
+    <a:masterClrMapping/>
+  </p:clrMapOvr>
+</p:notes>
+</file>
+
+<file path=ppt/notesSlides/notesSlide15.xml><?xml version="1.0" encoding="utf-8"?>
+<p:notes xmlns:a="http://schemas.openxmlformats.org/drawingml/2006/main" xmlns:r="http://schemas.openxmlformats.org/officeDocument/2006/relationships" xmlns:p="http://schemas.openxmlformats.org/presentationml/2006/main">
+  <p:cSld>
+    <p:spTree>
+      <p:nvGrpSpPr>
+        <p:cNvPr id="1" name=""/>
+        <p:cNvGrpSpPr/>
+        <p:nvPr/>
+      </p:nvGrpSpPr>
+      <p:grpSpPr>
+        <a:xfrm>
+          <a:off x="0" y="0"/>
+          <a:ext cx="0" cy="0"/>
+          <a:chOff x="0" y="0"/>
+          <a:chExt cx="0" cy="0"/>
+        </a:xfrm>
+      </p:grpSpPr>
+      <p:sp>
+        <p:nvSpPr>
+          <p:cNvPr id="2" name="Slide Image Placeholder 1"/>
+          <p:cNvSpPr>
+            <a:spLocks noGrp="1" noRot="1" noChangeAspect="1"/>
+          </p:cNvSpPr>
+          <p:nvPr>
+            <p:ph type="sldImg"/>
+          </p:nvPr>
+        </p:nvSpPr>
+        <p:spPr/>
+      </p:sp>
+      <p:sp>
+        <p:nvSpPr>
+          <p:cNvPr id="3" name="Notes Placeholder 2"/>
+          <p:cNvSpPr>
+            <a:spLocks noGrp="1"/>
+          </p:cNvSpPr>
+          <p:nvPr>
+            <p:ph type="body" idx="1"/>
+          </p:nvPr>
+        </p:nvSpPr>
+        <p:spPr/>
+        <p:txBody>
+          <a:bodyPr/>
+          <a:lstStyle/>
+          <a:p>
+            <a:pPr marL="0" marR="0" lvl="0" indent="0" algn="l" defTabSz="914400" rtl="0" eaLnBrk="1" fontAlgn="auto" latinLnBrk="0" hangingPunct="1">
+              <a:lnSpc>
+                <a:spcPct val="100000"/>
+              </a:lnSpc>
+              <a:spcBef>
+                <a:spcPts val="0"/>
+              </a:spcBef>
+              <a:spcAft>
+                <a:spcPts val="0"/>
+              </a:spcAft>
+              <a:buClrTx/>
+              <a:buSzTx/>
+              <a:buFontTx/>
+              <a:buNone/>
+              <a:tabLst/>
+              <a:defRPr/>
+            </a:pPr>
+            <a:endParaRPr lang="en-PH" sz="1200" kern="1200" dirty="0">
+              <a:solidFill>
+                <a:schemeClr val="tx1"/>
+              </a:solidFill>
+              <a:effectLst/>
+              <a:latin typeface="+mn-lt"/>
+              <a:ea typeface="+mn-ea"/>
+              <a:cs typeface="+mn-cs"/>
+            </a:endParaRPr>
+          </a:p>
+        </p:txBody>
+      </p:sp>
+      <p:sp>
+        <p:nvSpPr>
+          <p:cNvPr id="4" name="Slide Number Placeholder 3"/>
+          <p:cNvSpPr>
+            <a:spLocks noGrp="1"/>
+          </p:cNvSpPr>
+          <p:nvPr>
+            <p:ph type="sldNum" sz="quarter" idx="10"/>
+          </p:nvPr>
+        </p:nvSpPr>
+        <p:spPr/>
+        <p:txBody>
+          <a:bodyPr/>
+          <a:lstStyle/>
+          <a:p>
+            <a:fld id="{213B05C4-94C7-4412-9CB1-C9F207621576}" type="slidenum">
+              <a:rPr lang="en-PH" smtClean="0"/>
+              <a:t>16</a:t>
+            </a:fld>
+            <a:endParaRPr lang="en-PH"/>
+          </a:p>
+        </p:txBody>
+      </p:sp>
+    </p:spTree>
+    <p:extLst>
+      <p:ext uri="{BB962C8B-B14F-4D97-AF65-F5344CB8AC3E}">
+        <p14:creationId xmlns:p14="http://schemas.microsoft.com/office/powerpoint/2010/main" val="425038557"/>
+      </p:ext>
+    </p:extLst>
+  </p:cSld>
+  <p:clrMapOvr>
+    <a:masterClrMapping/>
+  </p:clrMapOvr>
+</p:notes>
+</file>
+
+<file path=ppt/notesSlides/notesSlide16.xml><?xml version="1.0" encoding="utf-8"?>
+<p:notes xmlns:a="http://schemas.openxmlformats.org/drawingml/2006/main" xmlns:r="http://schemas.openxmlformats.org/officeDocument/2006/relationships" xmlns:p="http://schemas.openxmlformats.org/presentationml/2006/main">
+  <p:cSld>
+    <p:spTree>
+      <p:nvGrpSpPr>
+        <p:cNvPr id="1" name=""/>
+        <p:cNvGrpSpPr/>
+        <p:nvPr/>
+      </p:nvGrpSpPr>
+      <p:grpSpPr>
+        <a:xfrm>
+          <a:off x="0" y="0"/>
+          <a:ext cx="0" cy="0"/>
+          <a:chOff x="0" y="0"/>
+          <a:chExt cx="0" cy="0"/>
+        </a:xfrm>
+      </p:grpSpPr>
+      <p:sp>
+        <p:nvSpPr>
+          <p:cNvPr id="2" name="Slide Image Placeholder 1"/>
+          <p:cNvSpPr>
+            <a:spLocks noGrp="1" noRot="1" noChangeAspect="1"/>
+          </p:cNvSpPr>
+          <p:nvPr>
+            <p:ph type="sldImg"/>
+          </p:nvPr>
+        </p:nvSpPr>
+        <p:spPr/>
+      </p:sp>
+      <p:sp>
+        <p:nvSpPr>
+          <p:cNvPr id="3" name="Notes Placeholder 2"/>
+          <p:cNvSpPr>
+            <a:spLocks noGrp="1"/>
+          </p:cNvSpPr>
+          <p:nvPr>
+            <p:ph type="body" idx="1"/>
+          </p:nvPr>
+        </p:nvSpPr>
+        <p:spPr/>
+        <p:txBody>
+          <a:bodyPr/>
+          <a:lstStyle/>
+          <a:p>
+            <a:pPr marL="0" marR="0" lvl="0" indent="0" algn="l" defTabSz="914400" rtl="0" eaLnBrk="1" fontAlgn="auto" latinLnBrk="0" hangingPunct="1">
+              <a:lnSpc>
+                <a:spcPct val="100000"/>
+              </a:lnSpc>
+              <a:spcBef>
+                <a:spcPts val="0"/>
+              </a:spcBef>
+              <a:spcAft>
+                <a:spcPts val="0"/>
+              </a:spcAft>
+              <a:buClrTx/>
+              <a:buSzTx/>
+              <a:buFontTx/>
+              <a:buNone/>
+              <a:tabLst/>
+              <a:defRPr/>
+            </a:pPr>
+            <a:endParaRPr lang="en-PH" sz="1200" kern="1200" dirty="0">
+              <a:solidFill>
+                <a:schemeClr val="tx1"/>
+              </a:solidFill>
+              <a:effectLst/>
+              <a:latin typeface="+mn-lt"/>
+              <a:ea typeface="+mn-ea"/>
+              <a:cs typeface="+mn-cs"/>
+            </a:endParaRPr>
+          </a:p>
+        </p:txBody>
+      </p:sp>
+      <p:sp>
+        <p:nvSpPr>
+          <p:cNvPr id="4" name="Slide Number Placeholder 3"/>
+          <p:cNvSpPr>
+            <a:spLocks noGrp="1"/>
+          </p:cNvSpPr>
+          <p:nvPr>
+            <p:ph type="sldNum" sz="quarter" idx="10"/>
+          </p:nvPr>
+        </p:nvSpPr>
+        <p:spPr/>
+        <p:txBody>
+          <a:bodyPr/>
+          <a:lstStyle/>
+          <a:p>
+            <a:fld id="{213B05C4-94C7-4412-9CB1-C9F207621576}" type="slidenum">
+              <a:rPr lang="en-PH" smtClean="0"/>
+              <a:t>17</a:t>
+            </a:fld>
+            <a:endParaRPr lang="en-PH"/>
+          </a:p>
+        </p:txBody>
+      </p:sp>
+    </p:spTree>
+    <p:extLst>
+      <p:ext uri="{BB962C8B-B14F-4D97-AF65-F5344CB8AC3E}">
+        <p14:creationId xmlns:p14="http://schemas.microsoft.com/office/powerpoint/2010/main" val="3870766767"/>
       </p:ext>
     </p:extLst>
   </p:cSld>
@@ -851,6 +1645,15 @@
           <a:bodyPr/>
           <a:lstStyle/>
           <a:p>
+            <a:pPr marL="457200" lvl="1" indent="0" algn="ctr">
+              <a:buNone/>
+            </a:pPr>
+            <a:r>
+              <a:rPr lang="en-PH" sz="3200" dirty="0"/>
+              <a:t>How can the Philippine automated election system eliminate the possibility of unofficial servers to secure the transmission of election returns on the server-level?</a:t>
+            </a:r>
+          </a:p>
+          <a:p>
             <a:endParaRPr lang="en-PH" dirty="0"/>
           </a:p>
         </p:txBody>
@@ -935,6 +1738,47 @@
           <a:bodyPr/>
           <a:lstStyle/>
           <a:p>
+            <a:r>
+              <a:rPr lang="en-PH" dirty="0"/>
+              <a:t>General Objectives</a:t>
+            </a:r>
+          </a:p>
+          <a:p>
+            <a:pPr lvl="1"/>
+            <a:r>
+              <a:rPr lang="en-PH" dirty="0"/>
+              <a:t>To know the issues present in the transmission of the votes</a:t>
+            </a:r>
+          </a:p>
+          <a:p>
+            <a:pPr lvl="1"/>
+            <a:r>
+              <a:rPr lang="en-PH" dirty="0"/>
+              <a:t>To propose a system that would prevent electoral fraud in the transmission of votes in the automated election system</a:t>
+            </a:r>
+          </a:p>
+          <a:p>
+            <a:r>
+              <a:rPr lang="en-PH" dirty="0"/>
+              <a:t>Specific Objectives</a:t>
+            </a:r>
+          </a:p>
+          <a:p>
+            <a:pPr lvl="1"/>
+            <a:r>
+              <a:rPr lang="en-PH" dirty="0"/>
+              <a:t>To provide a technical solution that would verify the authenticity of the servers and VCMs through the use of a public key infrastructure and </a:t>
+            </a:r>
+            <a:r>
+              <a:rPr lang="en-PH" dirty="0" err="1"/>
+              <a:t>Diffie</a:t>
+            </a:r>
+            <a:r>
+              <a:rPr lang="en-PH" dirty="0"/>
+              <a:t>-Hellman algorithm as security mechanisms for the automated election system</a:t>
+            </a:r>
+          </a:p>
+          <a:p>
             <a:endParaRPr lang="en-PH" dirty="0"/>
           </a:p>
         </p:txBody>
@@ -1019,6 +1863,14 @@
           <a:bodyPr/>
           <a:lstStyle/>
           <a:p>
+            <a:r>
+              <a:rPr lang="en-PH" dirty="0"/>
+              <a:t>The study would benefit the</a:t>
+            </a:r>
+            <a:r>
+              <a:rPr lang="en-PH" baseline="0" dirty="0"/>
+              <a:t> citizens of the Philippines by protecting their democracy through ensuring the security of their casted votes. It would also benefit the COMELEC by helping achieve the goal of having a transparent and credible election in the country. And last but not the least, the future researchers who would want to pursue the prospect of automated election system. This study will serve as their guide to advance their studies as well.</a:t>
+            </a:r>
             <a:endParaRPr lang="en-PH" dirty="0"/>
           </a:p>
         </p:txBody>
@@ -1561,7 +2413,7 @@
           <a:p>
             <a:fld id="{2064DE69-BAB8-4242-9507-E5A28E78EBB7}" type="datetimeFigureOut">
               <a:rPr lang="en-PH" smtClean="0"/>
-              <a:t>09/12/2016</a:t>
+              <a:t>10/12/2016</a:t>
             </a:fld>
             <a:endParaRPr lang="en-PH"/>
           </a:p>
@@ -1731,7 +2583,7 @@
           <a:p>
             <a:fld id="{2064DE69-BAB8-4242-9507-E5A28E78EBB7}" type="datetimeFigureOut">
               <a:rPr lang="en-PH" smtClean="0"/>
-              <a:t>09/12/2016</a:t>
+              <a:t>10/12/2016</a:t>
             </a:fld>
             <a:endParaRPr lang="en-PH"/>
           </a:p>
@@ -1911,7 +2763,7 @@
           <a:p>
             <a:fld id="{2064DE69-BAB8-4242-9507-E5A28E78EBB7}" type="datetimeFigureOut">
               <a:rPr lang="en-PH" smtClean="0"/>
-              <a:t>09/12/2016</a:t>
+              <a:t>10/12/2016</a:t>
             </a:fld>
             <a:endParaRPr lang="en-PH"/>
           </a:p>
@@ -2081,7 +2933,7 @@
           <a:p>
             <a:fld id="{2064DE69-BAB8-4242-9507-E5A28E78EBB7}" type="datetimeFigureOut">
               <a:rPr lang="en-PH" smtClean="0"/>
-              <a:t>09/12/2016</a:t>
+              <a:t>10/12/2016</a:t>
             </a:fld>
             <a:endParaRPr lang="en-PH"/>
           </a:p>
@@ -2327,7 +3179,7 @@
           <a:p>
             <a:fld id="{2064DE69-BAB8-4242-9507-E5A28E78EBB7}" type="datetimeFigureOut">
               <a:rPr lang="en-PH" smtClean="0"/>
-              <a:t>09/12/2016</a:t>
+              <a:t>10/12/2016</a:t>
             </a:fld>
             <a:endParaRPr lang="en-PH"/>
           </a:p>
@@ -2559,7 +3411,7 @@
           <a:p>
             <a:fld id="{2064DE69-BAB8-4242-9507-E5A28E78EBB7}" type="datetimeFigureOut">
               <a:rPr lang="en-PH" smtClean="0"/>
-              <a:t>09/12/2016</a:t>
+              <a:t>10/12/2016</a:t>
             </a:fld>
             <a:endParaRPr lang="en-PH"/>
           </a:p>
@@ -2926,7 +3778,7 @@
           <a:p>
             <a:fld id="{2064DE69-BAB8-4242-9507-E5A28E78EBB7}" type="datetimeFigureOut">
               <a:rPr lang="en-PH" smtClean="0"/>
-              <a:t>09/12/2016</a:t>
+              <a:t>10/12/2016</a:t>
             </a:fld>
             <a:endParaRPr lang="en-PH"/>
           </a:p>
@@ -3044,7 +3896,7 @@
           <a:p>
             <a:fld id="{2064DE69-BAB8-4242-9507-E5A28E78EBB7}" type="datetimeFigureOut">
               <a:rPr lang="en-PH" smtClean="0"/>
-              <a:t>09/12/2016</a:t>
+              <a:t>10/12/2016</a:t>
             </a:fld>
             <a:endParaRPr lang="en-PH"/>
           </a:p>
@@ -3139,7 +3991,7 @@
           <a:p>
             <a:fld id="{2064DE69-BAB8-4242-9507-E5A28E78EBB7}" type="datetimeFigureOut">
               <a:rPr lang="en-PH" smtClean="0"/>
-              <a:t>09/12/2016</a:t>
+              <a:t>10/12/2016</a:t>
             </a:fld>
             <a:endParaRPr lang="en-PH"/>
           </a:p>
@@ -3416,7 +4268,7 @@
           <a:p>
             <a:fld id="{2064DE69-BAB8-4242-9507-E5A28E78EBB7}" type="datetimeFigureOut">
               <a:rPr lang="en-PH" smtClean="0"/>
-              <a:t>09/12/2016</a:t>
+              <a:t>10/12/2016</a:t>
             </a:fld>
             <a:endParaRPr lang="en-PH"/>
           </a:p>
@@ -3669,7 +4521,7 @@
           <a:p>
             <a:fld id="{2064DE69-BAB8-4242-9507-E5A28E78EBB7}" type="datetimeFigureOut">
               <a:rPr lang="en-PH" smtClean="0"/>
-              <a:t>09/12/2016</a:t>
+              <a:t>10/12/2016</a:t>
             </a:fld>
             <a:endParaRPr lang="en-PH"/>
           </a:p>
@@ -3882,7 +4734,7 @@
           <a:p>
             <a:fld id="{2064DE69-BAB8-4242-9507-E5A28E78EBB7}" type="datetimeFigureOut">
               <a:rPr lang="en-PH" smtClean="0"/>
-              <a:t>09/12/2016</a:t>
+              <a:t>10/12/2016</a:t>
             </a:fld>
             <a:endParaRPr lang="en-PH"/>
           </a:p>
@@ -4614,6 +5466,44 @@
           <a:bodyPr/>
           <a:lstStyle/>
           <a:p>
+            <a:r>
+              <a:rPr lang="en-PH" dirty="0"/>
+              <a:t>Current system only provides a hash value to secure data integrity</a:t>
+            </a:r>
+          </a:p>
+          <a:p>
+            <a:r>
+              <a:rPr lang="en-PH" dirty="0"/>
+              <a:t>It is possible for unofficial servers to be part of the transmission</a:t>
+            </a:r>
+          </a:p>
+          <a:p>
+            <a:r>
+              <a:rPr lang="en-PH" dirty="0"/>
+              <a:t>By using a public key infrastructure and </a:t>
+            </a:r>
+            <a:r>
+              <a:rPr lang="en-PH" dirty="0" err="1"/>
+              <a:t>Diffie</a:t>
+            </a:r>
+            <a:r>
+              <a:rPr lang="en-PH" dirty="0"/>
+              <a:t>-Hellman algorithm</a:t>
+            </a:r>
+          </a:p>
+          <a:p>
+            <a:r>
+              <a:rPr lang="en-PH" dirty="0"/>
+              <a:t>The authenticity of the servers and VCMs will be addressed</a:t>
+            </a:r>
+          </a:p>
+          <a:p>
+            <a:r>
+              <a:rPr lang="en-PH" dirty="0"/>
+              <a:t>But how?</a:t>
+            </a:r>
+          </a:p>
+          <a:p>
             <a:endParaRPr lang="en-PH" dirty="0"/>
           </a:p>
         </p:txBody>
@@ -4682,6 +5572,2160 @@
     <p:extLst>
       <p:ext uri="{BB962C8B-B14F-4D97-AF65-F5344CB8AC3E}">
         <p14:creationId xmlns:p14="http://schemas.microsoft.com/office/powerpoint/2010/main" val="3984246945"/>
+      </p:ext>
+    </p:extLst>
+  </p:cSld>
+  <p:clrMapOvr>
+    <a:masterClrMapping/>
+  </p:clrMapOvr>
+</p:sld>
+</file>
+
+<file path=ppt/slides/slide12.xml><?xml version="1.0" encoding="utf-8"?>
+<p:sld xmlns:a="http://schemas.openxmlformats.org/drawingml/2006/main" xmlns:r="http://schemas.openxmlformats.org/officeDocument/2006/relationships" xmlns:p="http://schemas.openxmlformats.org/presentationml/2006/main">
+  <p:cSld>
+    <p:spTree>
+      <p:nvGrpSpPr>
+        <p:cNvPr id="1" name=""/>
+        <p:cNvGrpSpPr/>
+        <p:nvPr/>
+      </p:nvGrpSpPr>
+      <p:grpSpPr>
+        <a:xfrm>
+          <a:off x="0" y="0"/>
+          <a:ext cx="0" cy="0"/>
+          <a:chOff x="0" y="0"/>
+          <a:chExt cx="0" cy="0"/>
+        </a:xfrm>
+      </p:grpSpPr>
+      <p:sp>
+        <p:nvSpPr>
+          <p:cNvPr id="2" name="Title 1"/>
+          <p:cNvSpPr>
+            <a:spLocks noGrp="1"/>
+          </p:cNvSpPr>
+          <p:nvPr>
+            <p:ph type="title"/>
+          </p:nvPr>
+        </p:nvSpPr>
+        <p:spPr/>
+        <p:txBody>
+          <a:bodyPr/>
+          <a:lstStyle/>
+          <a:p>
+            <a:r>
+              <a:rPr lang="en-PH" dirty="0"/>
+              <a:t>Proposed Solution to the Problem</a:t>
+            </a:r>
+          </a:p>
+        </p:txBody>
+      </p:sp>
+      <p:sp>
+        <p:nvSpPr>
+          <p:cNvPr id="3" name="Content Placeholder 2"/>
+          <p:cNvSpPr>
+            <a:spLocks noGrp="1"/>
+          </p:cNvSpPr>
+          <p:nvPr>
+            <p:ph idx="1"/>
+          </p:nvPr>
+        </p:nvSpPr>
+        <p:spPr/>
+        <p:txBody>
+          <a:bodyPr/>
+          <a:lstStyle/>
+          <a:p>
+            <a:r>
+              <a:rPr lang="en-PH" dirty="0"/>
+              <a:t>A server key will collect the public keys of VCMs</a:t>
+            </a:r>
+          </a:p>
+        </p:txBody>
+      </p:sp>
+      <p:pic>
+        <p:nvPicPr>
+          <p:cNvPr id="4" name="Picture 3"/>
+          <p:cNvPicPr>
+            <a:picLocks noChangeAspect="1"/>
+          </p:cNvPicPr>
+          <p:nvPr/>
+        </p:nvPicPr>
+        <p:blipFill>
+          <a:blip r:embed="rId3">
+            <a:extLst>
+              <a:ext uri="{28A0092B-C50C-407E-A947-70E740481C1C}">
+                <a14:useLocalDpi xmlns:a14="http://schemas.microsoft.com/office/drawing/2010/main" val="0"/>
+              </a:ext>
+            </a:extLst>
+          </a:blip>
+          <a:stretch>
+            <a:fillRect/>
+          </a:stretch>
+        </p:blipFill>
+        <p:spPr>
+          <a:xfrm>
+            <a:off x="10595595" y="4723195"/>
+            <a:ext cx="2435221" cy="2435221"/>
+          </a:xfrm>
+          <a:prstGeom prst="rect">
+            <a:avLst/>
+          </a:prstGeom>
+        </p:spPr>
+      </p:pic>
+      <p:pic>
+        <p:nvPicPr>
+          <p:cNvPr id="5" name="Picture 4"/>
+          <p:cNvPicPr>
+            <a:picLocks noChangeAspect="1"/>
+          </p:cNvPicPr>
+          <p:nvPr/>
+        </p:nvPicPr>
+        <p:blipFill>
+          <a:blip r:embed="rId4" cstate="hqprint">
+            <a:extLst>
+              <a:ext uri="{28A0092B-C50C-407E-A947-70E740481C1C}">
+                <a14:useLocalDpi xmlns:a14="http://schemas.microsoft.com/office/drawing/2010/main" val="0"/>
+              </a:ext>
+            </a:extLst>
+          </a:blip>
+          <a:stretch>
+            <a:fillRect/>
+          </a:stretch>
+        </p:blipFill>
+        <p:spPr>
+          <a:xfrm>
+            <a:off x="10045148" y="3917853"/>
+            <a:ext cx="1610683" cy="1610683"/>
+          </a:xfrm>
+          <a:prstGeom prst="rect">
+            <a:avLst/>
+          </a:prstGeom>
+        </p:spPr>
+      </p:pic>
+      <p:pic>
+        <p:nvPicPr>
+          <p:cNvPr id="6" name="Picture 5"/>
+          <p:cNvPicPr>
+            <a:picLocks noChangeAspect="1"/>
+          </p:cNvPicPr>
+          <p:nvPr/>
+        </p:nvPicPr>
+        <p:blipFill>
+          <a:blip r:embed="rId5">
+            <a:extLst>
+              <a:ext uri="{28A0092B-C50C-407E-A947-70E740481C1C}">
+                <a14:useLocalDpi xmlns:a14="http://schemas.microsoft.com/office/drawing/2010/main" val="0"/>
+              </a:ext>
+            </a:extLst>
+          </a:blip>
+          <a:stretch>
+            <a:fillRect/>
+          </a:stretch>
+        </p:blipFill>
+        <p:spPr>
+          <a:xfrm>
+            <a:off x="4484183" y="2696541"/>
+            <a:ext cx="1088221" cy="1088221"/>
+          </a:xfrm>
+          <a:prstGeom prst="rect">
+            <a:avLst/>
+          </a:prstGeom>
+        </p:spPr>
+      </p:pic>
+      <p:pic>
+        <p:nvPicPr>
+          <p:cNvPr id="7" name="Picture 2" descr="http://image.flaticon.com/icons/png/128/230/230312.png"/>
+          <p:cNvPicPr>
+            <a:picLocks noChangeAspect="1" noChangeArrowheads="1"/>
+          </p:cNvPicPr>
+          <p:nvPr/>
+        </p:nvPicPr>
+        <p:blipFill>
+          <a:blip r:embed="rId6">
+            <a:extLst>
+              <a:ext uri="{28A0092B-C50C-407E-A947-70E740481C1C}">
+                <a14:useLocalDpi xmlns:a14="http://schemas.microsoft.com/office/drawing/2010/main" val="0"/>
+              </a:ext>
+            </a:extLst>
+          </a:blip>
+          <a:srcRect/>
+          <a:stretch>
+            <a:fillRect/>
+          </a:stretch>
+        </p:blipFill>
+        <p:spPr bwMode="auto">
+          <a:xfrm>
+            <a:off x="2601471" y="4309336"/>
+            <a:ext cx="1219200" cy="1219200"/>
+          </a:xfrm>
+          <a:prstGeom prst="rect">
+            <a:avLst/>
+          </a:prstGeom>
+          <a:noFill/>
+          <a:extLst>
+            <a:ext uri="{909E8E84-426E-40DD-AFC4-6F175D3DCCD1}">
+              <a14:hiddenFill xmlns:a14="http://schemas.microsoft.com/office/drawing/2010/main">
+                <a:solidFill>
+                  <a:srgbClr val="FFFFFF"/>
+                </a:solidFill>
+              </a14:hiddenFill>
+            </a:ext>
+          </a:extLst>
+        </p:spPr>
+      </p:pic>
+      <p:pic>
+        <p:nvPicPr>
+          <p:cNvPr id="8" name="Picture 4" descr="http://image.flaticon.com/icons/png/128/230/230308.png"/>
+          <p:cNvPicPr>
+            <a:picLocks noChangeAspect="1" noChangeArrowheads="1"/>
+          </p:cNvPicPr>
+          <p:nvPr/>
+        </p:nvPicPr>
+        <p:blipFill>
+          <a:blip r:embed="rId7">
+            <a:extLst>
+              <a:ext uri="{28A0092B-C50C-407E-A947-70E740481C1C}">
+                <a14:useLocalDpi xmlns:a14="http://schemas.microsoft.com/office/drawing/2010/main" val="0"/>
+              </a:ext>
+            </a:extLst>
+          </a:blip>
+          <a:srcRect/>
+          <a:stretch>
+            <a:fillRect/>
+          </a:stretch>
+        </p:blipFill>
+        <p:spPr bwMode="auto">
+          <a:xfrm>
+            <a:off x="6161240" y="4309336"/>
+            <a:ext cx="1219200" cy="1219200"/>
+          </a:xfrm>
+          <a:prstGeom prst="rect">
+            <a:avLst/>
+          </a:prstGeom>
+          <a:noFill/>
+          <a:extLst>
+            <a:ext uri="{909E8E84-426E-40DD-AFC4-6F175D3DCCD1}">
+              <a14:hiddenFill xmlns:a14="http://schemas.microsoft.com/office/drawing/2010/main">
+                <a:solidFill>
+                  <a:srgbClr val="FFFFFF"/>
+                </a:solidFill>
+              </a14:hiddenFill>
+            </a:ext>
+          </a:extLst>
+        </p:spPr>
+      </p:pic>
+      <p:cxnSp>
+        <p:nvCxnSpPr>
+          <p:cNvPr id="10" name="Connector: Elbow 9"/>
+          <p:cNvCxnSpPr>
+            <a:stCxn id="6" idx="1"/>
+            <a:endCxn id="7" idx="0"/>
+          </p:cNvCxnSpPr>
+          <p:nvPr/>
+        </p:nvCxnSpPr>
+        <p:spPr>
+          <a:xfrm rot="10800000" flipV="1">
+            <a:off x="3211071" y="3240652"/>
+            <a:ext cx="1273112" cy="1068684"/>
+          </a:xfrm>
+          <a:prstGeom prst="bentConnector2">
+            <a:avLst/>
+          </a:prstGeom>
+          <a:ln>
+            <a:tailEnd type="triangle"/>
+          </a:ln>
+        </p:spPr>
+        <p:style>
+          <a:lnRef idx="1">
+            <a:schemeClr val="accent1"/>
+          </a:lnRef>
+          <a:fillRef idx="0">
+            <a:schemeClr val="accent1"/>
+          </a:fillRef>
+          <a:effectRef idx="0">
+            <a:schemeClr val="accent1"/>
+          </a:effectRef>
+          <a:fontRef idx="minor">
+            <a:schemeClr val="tx1"/>
+          </a:fontRef>
+        </p:style>
+      </p:cxnSp>
+      <p:cxnSp>
+        <p:nvCxnSpPr>
+          <p:cNvPr id="13" name="Connector: Elbow 12"/>
+          <p:cNvCxnSpPr>
+            <a:stCxn id="6" idx="3"/>
+            <a:endCxn id="8" idx="0"/>
+          </p:cNvCxnSpPr>
+          <p:nvPr/>
+        </p:nvCxnSpPr>
+        <p:spPr>
+          <a:xfrm>
+            <a:off x="5572404" y="3240652"/>
+            <a:ext cx="1198436" cy="1068684"/>
+          </a:xfrm>
+          <a:prstGeom prst="bentConnector2">
+            <a:avLst/>
+          </a:prstGeom>
+          <a:ln>
+            <a:tailEnd type="triangle"/>
+          </a:ln>
+        </p:spPr>
+        <p:style>
+          <a:lnRef idx="1">
+            <a:schemeClr val="accent1"/>
+          </a:lnRef>
+          <a:fillRef idx="0">
+            <a:schemeClr val="accent1"/>
+          </a:fillRef>
+          <a:effectRef idx="0">
+            <a:schemeClr val="accent1"/>
+          </a:effectRef>
+          <a:fontRef idx="minor">
+            <a:schemeClr val="tx1"/>
+          </a:fontRef>
+        </p:style>
+      </p:cxnSp>
+    </p:spTree>
+    <p:extLst>
+      <p:ext uri="{BB962C8B-B14F-4D97-AF65-F5344CB8AC3E}">
+        <p14:creationId xmlns:p14="http://schemas.microsoft.com/office/powerpoint/2010/main" val="535746588"/>
+      </p:ext>
+    </p:extLst>
+  </p:cSld>
+  <p:clrMapOvr>
+    <a:masterClrMapping/>
+  </p:clrMapOvr>
+</p:sld>
+</file>
+
+<file path=ppt/slides/slide13.xml><?xml version="1.0" encoding="utf-8"?>
+<p:sld xmlns:a="http://schemas.openxmlformats.org/drawingml/2006/main" xmlns:r="http://schemas.openxmlformats.org/officeDocument/2006/relationships" xmlns:p="http://schemas.openxmlformats.org/presentationml/2006/main">
+  <p:cSld>
+    <p:spTree>
+      <p:nvGrpSpPr>
+        <p:cNvPr id="1" name=""/>
+        <p:cNvGrpSpPr/>
+        <p:nvPr/>
+      </p:nvGrpSpPr>
+      <p:grpSpPr>
+        <a:xfrm>
+          <a:off x="0" y="0"/>
+          <a:ext cx="0" cy="0"/>
+          <a:chOff x="0" y="0"/>
+          <a:chExt cx="0" cy="0"/>
+        </a:xfrm>
+      </p:grpSpPr>
+      <p:sp>
+        <p:nvSpPr>
+          <p:cNvPr id="2" name="Title 1"/>
+          <p:cNvSpPr>
+            <a:spLocks noGrp="1"/>
+          </p:cNvSpPr>
+          <p:nvPr>
+            <p:ph type="title"/>
+          </p:nvPr>
+        </p:nvSpPr>
+        <p:spPr/>
+        <p:txBody>
+          <a:bodyPr/>
+          <a:lstStyle/>
+          <a:p>
+            <a:r>
+              <a:rPr lang="en-PH" dirty="0"/>
+              <a:t>Proposed Solution to the Problem</a:t>
+            </a:r>
+          </a:p>
+        </p:txBody>
+      </p:sp>
+      <p:sp>
+        <p:nvSpPr>
+          <p:cNvPr id="3" name="Content Placeholder 2"/>
+          <p:cNvSpPr>
+            <a:spLocks noGrp="1"/>
+          </p:cNvSpPr>
+          <p:nvPr>
+            <p:ph idx="1"/>
+          </p:nvPr>
+        </p:nvSpPr>
+        <p:spPr/>
+        <p:txBody>
+          <a:bodyPr/>
+          <a:lstStyle/>
+          <a:p>
+            <a:r>
+              <a:rPr lang="en-PH" dirty="0"/>
+              <a:t>Once the poll closes on the election day</a:t>
+            </a:r>
+          </a:p>
+          <a:p>
+            <a:r>
+              <a:rPr lang="en-PH" dirty="0"/>
+              <a:t>VCM will send the election returns to the server key</a:t>
+            </a:r>
+          </a:p>
+          <a:p>
+            <a:r>
+              <a:rPr lang="en-PH" dirty="0"/>
+              <a:t>Before accepting the ERs, the server will validate the VCM.</a:t>
+            </a:r>
+          </a:p>
+          <a:p>
+            <a:r>
+              <a:rPr lang="en-PH" dirty="0"/>
+              <a:t>Through the use of </a:t>
+            </a:r>
+            <a:r>
+              <a:rPr lang="en-PH" dirty="0" err="1"/>
+              <a:t>Diffie</a:t>
+            </a:r>
+            <a:r>
+              <a:rPr lang="en-PH" dirty="0"/>
+              <a:t>-Hellman algorithm</a:t>
+            </a:r>
+          </a:p>
+          <a:p>
+            <a:r>
+              <a:rPr lang="en-PH" dirty="0"/>
+              <a:t>Generates a key that uses their own private and public key</a:t>
+            </a:r>
+          </a:p>
+          <a:p>
+            <a:r>
+              <a:rPr lang="en-PH" dirty="0"/>
+              <a:t>Will only occur if both private and public key are valid</a:t>
+            </a:r>
+          </a:p>
+          <a:p>
+            <a:r>
+              <a:rPr lang="en-PH" dirty="0"/>
+              <a:t>Which serves as a validation for both sides: VCMs and servers</a:t>
+            </a:r>
+          </a:p>
+        </p:txBody>
+      </p:sp>
+      <p:pic>
+        <p:nvPicPr>
+          <p:cNvPr id="4" name="Picture 3"/>
+          <p:cNvPicPr>
+            <a:picLocks noChangeAspect="1"/>
+          </p:cNvPicPr>
+          <p:nvPr/>
+        </p:nvPicPr>
+        <p:blipFill>
+          <a:blip r:embed="rId3">
+            <a:extLst>
+              <a:ext uri="{28A0092B-C50C-407E-A947-70E740481C1C}">
+                <a14:useLocalDpi xmlns:a14="http://schemas.microsoft.com/office/drawing/2010/main" val="0"/>
+              </a:ext>
+            </a:extLst>
+          </a:blip>
+          <a:stretch>
+            <a:fillRect/>
+          </a:stretch>
+        </p:blipFill>
+        <p:spPr>
+          <a:xfrm>
+            <a:off x="10595595" y="4723195"/>
+            <a:ext cx="2435221" cy="2435221"/>
+          </a:xfrm>
+          <a:prstGeom prst="rect">
+            <a:avLst/>
+          </a:prstGeom>
+        </p:spPr>
+      </p:pic>
+      <p:pic>
+        <p:nvPicPr>
+          <p:cNvPr id="5" name="Picture 4"/>
+          <p:cNvPicPr>
+            <a:picLocks noChangeAspect="1"/>
+          </p:cNvPicPr>
+          <p:nvPr/>
+        </p:nvPicPr>
+        <p:blipFill>
+          <a:blip r:embed="rId4" cstate="hqprint">
+            <a:extLst>
+              <a:ext uri="{28A0092B-C50C-407E-A947-70E740481C1C}">
+                <a14:useLocalDpi xmlns:a14="http://schemas.microsoft.com/office/drawing/2010/main" val="0"/>
+              </a:ext>
+            </a:extLst>
+          </a:blip>
+          <a:stretch>
+            <a:fillRect/>
+          </a:stretch>
+        </p:blipFill>
+        <p:spPr>
+          <a:xfrm>
+            <a:off x="10045148" y="3917853"/>
+            <a:ext cx="1610683" cy="1610683"/>
+          </a:xfrm>
+          <a:prstGeom prst="rect">
+            <a:avLst/>
+          </a:prstGeom>
+        </p:spPr>
+      </p:pic>
+    </p:spTree>
+    <p:extLst>
+      <p:ext uri="{BB962C8B-B14F-4D97-AF65-F5344CB8AC3E}">
+        <p14:creationId xmlns:p14="http://schemas.microsoft.com/office/powerpoint/2010/main" val="432842192"/>
+      </p:ext>
+    </p:extLst>
+  </p:cSld>
+  <p:clrMapOvr>
+    <a:masterClrMapping/>
+  </p:clrMapOvr>
+</p:sld>
+</file>
+
+<file path=ppt/slides/slide14.xml><?xml version="1.0" encoding="utf-8"?>
+<p:sld xmlns:a="http://schemas.openxmlformats.org/drawingml/2006/main" xmlns:r="http://schemas.openxmlformats.org/officeDocument/2006/relationships" xmlns:p="http://schemas.openxmlformats.org/presentationml/2006/main">
+  <p:cSld>
+    <p:spTree>
+      <p:nvGrpSpPr>
+        <p:cNvPr id="1" name=""/>
+        <p:cNvGrpSpPr/>
+        <p:nvPr/>
+      </p:nvGrpSpPr>
+      <p:grpSpPr>
+        <a:xfrm>
+          <a:off x="0" y="0"/>
+          <a:ext cx="0" cy="0"/>
+          <a:chOff x="0" y="0"/>
+          <a:chExt cx="0" cy="0"/>
+        </a:xfrm>
+      </p:grpSpPr>
+      <p:sp>
+        <p:nvSpPr>
+          <p:cNvPr id="2" name="Title 1"/>
+          <p:cNvSpPr>
+            <a:spLocks noGrp="1"/>
+          </p:cNvSpPr>
+          <p:nvPr>
+            <p:ph type="title"/>
+          </p:nvPr>
+        </p:nvSpPr>
+        <p:spPr/>
+        <p:txBody>
+          <a:bodyPr/>
+          <a:lstStyle/>
+          <a:p>
+            <a:r>
+              <a:rPr lang="en-PH" dirty="0"/>
+              <a:t>Proposed Solution to the Problem</a:t>
+            </a:r>
+          </a:p>
+        </p:txBody>
+      </p:sp>
+      <p:sp>
+        <p:nvSpPr>
+          <p:cNvPr id="3" name="Content Placeholder 2"/>
+          <p:cNvSpPr>
+            <a:spLocks noGrp="1"/>
+          </p:cNvSpPr>
+          <p:nvPr>
+            <p:ph idx="1"/>
+          </p:nvPr>
+        </p:nvSpPr>
+        <p:spPr/>
+        <p:txBody>
+          <a:bodyPr/>
+          <a:lstStyle/>
+          <a:p>
+            <a:endParaRPr lang="en-PH" dirty="0"/>
+          </a:p>
+        </p:txBody>
+      </p:sp>
+      <p:pic>
+        <p:nvPicPr>
+          <p:cNvPr id="4" name="Picture 3"/>
+          <p:cNvPicPr>
+            <a:picLocks noChangeAspect="1"/>
+          </p:cNvPicPr>
+          <p:nvPr/>
+        </p:nvPicPr>
+        <p:blipFill>
+          <a:blip r:embed="rId3">
+            <a:extLst>
+              <a:ext uri="{28A0092B-C50C-407E-A947-70E740481C1C}">
+                <a14:useLocalDpi xmlns:a14="http://schemas.microsoft.com/office/drawing/2010/main" val="0"/>
+              </a:ext>
+            </a:extLst>
+          </a:blip>
+          <a:stretch>
+            <a:fillRect/>
+          </a:stretch>
+        </p:blipFill>
+        <p:spPr>
+          <a:xfrm>
+            <a:off x="10595595" y="4723195"/>
+            <a:ext cx="2435221" cy="2435221"/>
+          </a:xfrm>
+          <a:prstGeom prst="rect">
+            <a:avLst/>
+          </a:prstGeom>
+        </p:spPr>
+      </p:pic>
+      <p:pic>
+        <p:nvPicPr>
+          <p:cNvPr id="5" name="Picture 4"/>
+          <p:cNvPicPr>
+            <a:picLocks noChangeAspect="1"/>
+          </p:cNvPicPr>
+          <p:nvPr/>
+        </p:nvPicPr>
+        <p:blipFill>
+          <a:blip r:embed="rId4" cstate="hqprint">
+            <a:extLst>
+              <a:ext uri="{28A0092B-C50C-407E-A947-70E740481C1C}">
+                <a14:useLocalDpi xmlns:a14="http://schemas.microsoft.com/office/drawing/2010/main" val="0"/>
+              </a:ext>
+            </a:extLst>
+          </a:blip>
+          <a:stretch>
+            <a:fillRect/>
+          </a:stretch>
+        </p:blipFill>
+        <p:spPr>
+          <a:xfrm>
+            <a:off x="10045148" y="3917853"/>
+            <a:ext cx="1610683" cy="1610683"/>
+          </a:xfrm>
+          <a:prstGeom prst="rect">
+            <a:avLst/>
+          </a:prstGeom>
+        </p:spPr>
+      </p:pic>
+    </p:spTree>
+    <p:extLst>
+      <p:ext uri="{BB962C8B-B14F-4D97-AF65-F5344CB8AC3E}">
+        <p14:creationId xmlns:p14="http://schemas.microsoft.com/office/powerpoint/2010/main" val="3324807651"/>
+      </p:ext>
+    </p:extLst>
+  </p:cSld>
+  <p:clrMapOvr>
+    <a:masterClrMapping/>
+  </p:clrMapOvr>
+</p:sld>
+</file>
+
+<file path=ppt/slides/slide15.xml><?xml version="1.0" encoding="utf-8"?>
+<p:sld xmlns:a="http://schemas.openxmlformats.org/drawingml/2006/main" xmlns:r="http://schemas.openxmlformats.org/officeDocument/2006/relationships" xmlns:p="http://schemas.openxmlformats.org/presentationml/2006/main">
+  <p:cSld>
+    <p:spTree>
+      <p:nvGrpSpPr>
+        <p:cNvPr id="1" name=""/>
+        <p:cNvGrpSpPr/>
+        <p:nvPr/>
+      </p:nvGrpSpPr>
+      <p:grpSpPr>
+        <a:xfrm>
+          <a:off x="0" y="0"/>
+          <a:ext cx="0" cy="0"/>
+          <a:chOff x="0" y="0"/>
+          <a:chExt cx="0" cy="0"/>
+        </a:xfrm>
+      </p:grpSpPr>
+      <p:sp>
+        <p:nvSpPr>
+          <p:cNvPr id="2" name="Title 1"/>
+          <p:cNvSpPr>
+            <a:spLocks noGrp="1"/>
+          </p:cNvSpPr>
+          <p:nvPr>
+            <p:ph type="title"/>
+          </p:nvPr>
+        </p:nvSpPr>
+        <p:spPr/>
+        <p:txBody>
+          <a:bodyPr/>
+          <a:lstStyle/>
+          <a:p>
+            <a:r>
+              <a:rPr lang="en-PH" dirty="0"/>
+              <a:t>Results and Discussion</a:t>
+            </a:r>
+          </a:p>
+        </p:txBody>
+      </p:sp>
+      <p:sp>
+        <p:nvSpPr>
+          <p:cNvPr id="3" name="Content Placeholder 2"/>
+          <p:cNvSpPr>
+            <a:spLocks noGrp="1"/>
+          </p:cNvSpPr>
+          <p:nvPr>
+            <p:ph idx="1"/>
+          </p:nvPr>
+        </p:nvSpPr>
+        <p:spPr/>
+        <p:txBody>
+          <a:bodyPr/>
+          <a:lstStyle/>
+          <a:p>
+            <a:endParaRPr lang="en-PH" dirty="0"/>
+          </a:p>
+        </p:txBody>
+      </p:sp>
+      <p:pic>
+        <p:nvPicPr>
+          <p:cNvPr id="4" name="Picture 3"/>
+          <p:cNvPicPr>
+            <a:picLocks noChangeAspect="1"/>
+          </p:cNvPicPr>
+          <p:nvPr/>
+        </p:nvPicPr>
+        <p:blipFill>
+          <a:blip r:embed="rId3">
+            <a:extLst>
+              <a:ext uri="{28A0092B-C50C-407E-A947-70E740481C1C}">
+                <a14:useLocalDpi xmlns:a14="http://schemas.microsoft.com/office/drawing/2010/main" val="0"/>
+              </a:ext>
+            </a:extLst>
+          </a:blip>
+          <a:stretch>
+            <a:fillRect/>
+          </a:stretch>
+        </p:blipFill>
+        <p:spPr>
+          <a:xfrm>
+            <a:off x="10595595" y="4723195"/>
+            <a:ext cx="2435221" cy="2435221"/>
+          </a:xfrm>
+          <a:prstGeom prst="rect">
+            <a:avLst/>
+          </a:prstGeom>
+        </p:spPr>
+      </p:pic>
+      <p:pic>
+        <p:nvPicPr>
+          <p:cNvPr id="5" name="Picture 4"/>
+          <p:cNvPicPr>
+            <a:picLocks noChangeAspect="1"/>
+          </p:cNvPicPr>
+          <p:nvPr/>
+        </p:nvPicPr>
+        <p:blipFill>
+          <a:blip r:embed="rId4" cstate="hqprint">
+            <a:extLst>
+              <a:ext uri="{28A0092B-C50C-407E-A947-70E740481C1C}">
+                <a14:useLocalDpi xmlns:a14="http://schemas.microsoft.com/office/drawing/2010/main" val="0"/>
+              </a:ext>
+            </a:extLst>
+          </a:blip>
+          <a:stretch>
+            <a:fillRect/>
+          </a:stretch>
+        </p:blipFill>
+        <p:spPr>
+          <a:xfrm>
+            <a:off x="10045148" y="3917853"/>
+            <a:ext cx="1610683" cy="1610683"/>
+          </a:xfrm>
+          <a:prstGeom prst="rect">
+            <a:avLst/>
+          </a:prstGeom>
+        </p:spPr>
+      </p:pic>
+    </p:spTree>
+    <p:extLst>
+      <p:ext uri="{BB962C8B-B14F-4D97-AF65-F5344CB8AC3E}">
+        <p14:creationId xmlns:p14="http://schemas.microsoft.com/office/powerpoint/2010/main" val="1993748265"/>
+      </p:ext>
+    </p:extLst>
+  </p:cSld>
+  <p:clrMapOvr>
+    <a:masterClrMapping/>
+  </p:clrMapOvr>
+</p:sld>
+</file>
+
+<file path=ppt/slides/slide16.xml><?xml version="1.0" encoding="utf-8"?>
+<p:sld xmlns:a="http://schemas.openxmlformats.org/drawingml/2006/main" xmlns:r="http://schemas.openxmlformats.org/officeDocument/2006/relationships" xmlns:p="http://schemas.openxmlformats.org/presentationml/2006/main">
+  <p:cSld>
+    <p:spTree>
+      <p:nvGrpSpPr>
+        <p:cNvPr id="1" name=""/>
+        <p:cNvGrpSpPr/>
+        <p:nvPr/>
+      </p:nvGrpSpPr>
+      <p:grpSpPr>
+        <a:xfrm>
+          <a:off x="0" y="0"/>
+          <a:ext cx="0" cy="0"/>
+          <a:chOff x="0" y="0"/>
+          <a:chExt cx="0" cy="0"/>
+        </a:xfrm>
+      </p:grpSpPr>
+      <p:sp>
+        <p:nvSpPr>
+          <p:cNvPr id="2" name="Title 1"/>
+          <p:cNvSpPr>
+            <a:spLocks noGrp="1"/>
+          </p:cNvSpPr>
+          <p:nvPr>
+            <p:ph type="title"/>
+          </p:nvPr>
+        </p:nvSpPr>
+        <p:spPr/>
+        <p:txBody>
+          <a:bodyPr/>
+          <a:lstStyle/>
+          <a:p>
+            <a:r>
+              <a:rPr lang="en-PH" dirty="0"/>
+              <a:t>Results and Discussions</a:t>
+            </a:r>
+          </a:p>
+        </p:txBody>
+      </p:sp>
+      <p:pic>
+        <p:nvPicPr>
+          <p:cNvPr id="4" name="Picture 3"/>
+          <p:cNvPicPr>
+            <a:picLocks noChangeAspect="1"/>
+          </p:cNvPicPr>
+          <p:nvPr/>
+        </p:nvPicPr>
+        <p:blipFill>
+          <a:blip r:embed="rId3">
+            <a:extLst>
+              <a:ext uri="{28A0092B-C50C-407E-A947-70E740481C1C}">
+                <a14:useLocalDpi xmlns:a14="http://schemas.microsoft.com/office/drawing/2010/main" val="0"/>
+              </a:ext>
+            </a:extLst>
+          </a:blip>
+          <a:stretch>
+            <a:fillRect/>
+          </a:stretch>
+        </p:blipFill>
+        <p:spPr>
+          <a:xfrm>
+            <a:off x="10595595" y="4723195"/>
+            <a:ext cx="2435221" cy="2435221"/>
+          </a:xfrm>
+          <a:prstGeom prst="rect">
+            <a:avLst/>
+          </a:prstGeom>
+        </p:spPr>
+      </p:pic>
+      <p:pic>
+        <p:nvPicPr>
+          <p:cNvPr id="5" name="Picture 4"/>
+          <p:cNvPicPr>
+            <a:picLocks noChangeAspect="1"/>
+          </p:cNvPicPr>
+          <p:nvPr/>
+        </p:nvPicPr>
+        <p:blipFill>
+          <a:blip r:embed="rId4" cstate="hqprint">
+            <a:extLst>
+              <a:ext uri="{28A0092B-C50C-407E-A947-70E740481C1C}">
+                <a14:useLocalDpi xmlns:a14="http://schemas.microsoft.com/office/drawing/2010/main" val="0"/>
+              </a:ext>
+            </a:extLst>
+          </a:blip>
+          <a:stretch>
+            <a:fillRect/>
+          </a:stretch>
+        </p:blipFill>
+        <p:spPr>
+          <a:xfrm>
+            <a:off x="10045148" y="3917853"/>
+            <a:ext cx="1610683" cy="1610683"/>
+          </a:xfrm>
+          <a:prstGeom prst="rect">
+            <a:avLst/>
+          </a:prstGeom>
+        </p:spPr>
+      </p:pic>
+      <p:sp>
+        <p:nvSpPr>
+          <p:cNvPr id="6" name="Content Placeholder 2"/>
+          <p:cNvSpPr txBox="1">
+            <a:spLocks/>
+          </p:cNvSpPr>
+          <p:nvPr/>
+        </p:nvSpPr>
+        <p:spPr>
+          <a:xfrm>
+            <a:off x="661183" y="1806989"/>
+            <a:ext cx="9974604" cy="4679467"/>
+          </a:xfrm>
+          <a:prstGeom prst="rect">
+            <a:avLst/>
+          </a:prstGeom>
+        </p:spPr>
+        <p:txBody>
+          <a:bodyPr vert="horz" lIns="91440" tIns="45720" rIns="91440" bIns="45720" rtlCol="0">
+            <a:normAutofit/>
+          </a:bodyPr>
+          <a:lstStyle>
+            <a:lvl1pPr marL="228600" indent="-228600" algn="l" defTabSz="914400" rtl="0" eaLnBrk="1" latinLnBrk="0" hangingPunct="1">
+              <a:lnSpc>
+                <a:spcPct val="90000"/>
+              </a:lnSpc>
+              <a:spcBef>
+                <a:spcPts val="1000"/>
+              </a:spcBef>
+              <a:buFont typeface="Arial" panose="020B0604020202020204" pitchFamily="34" charset="0"/>
+              <a:buChar char="•"/>
+              <a:defRPr sz="2800" kern="1200">
+                <a:solidFill>
+                  <a:schemeClr val="tx1"/>
+                </a:solidFill>
+                <a:latin typeface="+mn-lt"/>
+                <a:ea typeface="+mn-ea"/>
+                <a:cs typeface="+mn-cs"/>
+              </a:defRPr>
+            </a:lvl1pPr>
+            <a:lvl2pPr marL="685800" indent="-228600" algn="l" defTabSz="914400" rtl="0" eaLnBrk="1" latinLnBrk="0" hangingPunct="1">
+              <a:lnSpc>
+                <a:spcPct val="90000"/>
+              </a:lnSpc>
+              <a:spcBef>
+                <a:spcPts val="500"/>
+              </a:spcBef>
+              <a:buFont typeface="Arial" panose="020B0604020202020204" pitchFamily="34" charset="0"/>
+              <a:buChar char="•"/>
+              <a:defRPr sz="2400" kern="1200">
+                <a:solidFill>
+                  <a:schemeClr val="tx1"/>
+                </a:solidFill>
+                <a:latin typeface="+mn-lt"/>
+                <a:ea typeface="+mn-ea"/>
+                <a:cs typeface="+mn-cs"/>
+              </a:defRPr>
+            </a:lvl2pPr>
+            <a:lvl3pPr marL="1143000" indent="-228600" algn="l" defTabSz="914400" rtl="0" eaLnBrk="1" latinLnBrk="0" hangingPunct="1">
+              <a:lnSpc>
+                <a:spcPct val="90000"/>
+              </a:lnSpc>
+              <a:spcBef>
+                <a:spcPts val="500"/>
+              </a:spcBef>
+              <a:buFont typeface="Arial" panose="020B0604020202020204" pitchFamily="34" charset="0"/>
+              <a:buChar char="•"/>
+              <a:defRPr sz="2000" kern="1200">
+                <a:solidFill>
+                  <a:schemeClr val="tx1"/>
+                </a:solidFill>
+                <a:latin typeface="+mn-lt"/>
+                <a:ea typeface="+mn-ea"/>
+                <a:cs typeface="+mn-cs"/>
+              </a:defRPr>
+            </a:lvl3pPr>
+            <a:lvl4pPr marL="1600200" indent="-228600" algn="l" defTabSz="914400" rtl="0" eaLnBrk="1" latinLnBrk="0" hangingPunct="1">
+              <a:lnSpc>
+                <a:spcPct val="90000"/>
+              </a:lnSpc>
+              <a:spcBef>
+                <a:spcPts val="500"/>
+              </a:spcBef>
+              <a:buFont typeface="Arial" panose="020B0604020202020204" pitchFamily="34" charset="0"/>
+              <a:buChar char="•"/>
+              <a:defRPr sz="1800" kern="1200">
+                <a:solidFill>
+                  <a:schemeClr val="tx1"/>
+                </a:solidFill>
+                <a:latin typeface="+mn-lt"/>
+                <a:ea typeface="+mn-ea"/>
+                <a:cs typeface="+mn-cs"/>
+              </a:defRPr>
+            </a:lvl4pPr>
+            <a:lvl5pPr marL="2057400" indent="-228600" algn="l" defTabSz="914400" rtl="0" eaLnBrk="1" latinLnBrk="0" hangingPunct="1">
+              <a:lnSpc>
+                <a:spcPct val="90000"/>
+              </a:lnSpc>
+              <a:spcBef>
+                <a:spcPts val="500"/>
+              </a:spcBef>
+              <a:buFont typeface="Arial" panose="020B0604020202020204" pitchFamily="34" charset="0"/>
+              <a:buChar char="•"/>
+              <a:defRPr sz="1800" kern="1200">
+                <a:solidFill>
+                  <a:schemeClr val="tx1"/>
+                </a:solidFill>
+                <a:latin typeface="+mn-lt"/>
+                <a:ea typeface="+mn-ea"/>
+                <a:cs typeface="+mn-cs"/>
+              </a:defRPr>
+            </a:lvl5pPr>
+            <a:lvl6pPr marL="2514600" indent="-228600" algn="l" defTabSz="914400" rtl="0" eaLnBrk="1" latinLnBrk="0" hangingPunct="1">
+              <a:lnSpc>
+                <a:spcPct val="90000"/>
+              </a:lnSpc>
+              <a:spcBef>
+                <a:spcPts val="500"/>
+              </a:spcBef>
+              <a:buFont typeface="Arial" panose="020B0604020202020204" pitchFamily="34" charset="0"/>
+              <a:buChar char="•"/>
+              <a:defRPr sz="1800" kern="1200">
+                <a:solidFill>
+                  <a:schemeClr val="tx1"/>
+                </a:solidFill>
+                <a:latin typeface="+mn-lt"/>
+                <a:ea typeface="+mn-ea"/>
+                <a:cs typeface="+mn-cs"/>
+              </a:defRPr>
+            </a:lvl6pPr>
+            <a:lvl7pPr marL="2971800" indent="-228600" algn="l" defTabSz="914400" rtl="0" eaLnBrk="1" latinLnBrk="0" hangingPunct="1">
+              <a:lnSpc>
+                <a:spcPct val="90000"/>
+              </a:lnSpc>
+              <a:spcBef>
+                <a:spcPts val="500"/>
+              </a:spcBef>
+              <a:buFont typeface="Arial" panose="020B0604020202020204" pitchFamily="34" charset="0"/>
+              <a:buChar char="•"/>
+              <a:defRPr sz="1800" kern="1200">
+                <a:solidFill>
+                  <a:schemeClr val="tx1"/>
+                </a:solidFill>
+                <a:latin typeface="+mn-lt"/>
+                <a:ea typeface="+mn-ea"/>
+                <a:cs typeface="+mn-cs"/>
+              </a:defRPr>
+            </a:lvl7pPr>
+            <a:lvl8pPr marL="3429000" indent="-228600" algn="l" defTabSz="914400" rtl="0" eaLnBrk="1" latinLnBrk="0" hangingPunct="1">
+              <a:lnSpc>
+                <a:spcPct val="90000"/>
+              </a:lnSpc>
+              <a:spcBef>
+                <a:spcPts val="500"/>
+              </a:spcBef>
+              <a:buFont typeface="Arial" panose="020B0604020202020204" pitchFamily="34" charset="0"/>
+              <a:buChar char="•"/>
+              <a:defRPr sz="1800" kern="1200">
+                <a:solidFill>
+                  <a:schemeClr val="tx1"/>
+                </a:solidFill>
+                <a:latin typeface="+mn-lt"/>
+                <a:ea typeface="+mn-ea"/>
+                <a:cs typeface="+mn-cs"/>
+              </a:defRPr>
+            </a:lvl8pPr>
+            <a:lvl9pPr marL="3886200" indent="-228600" algn="l" defTabSz="914400" rtl="0" eaLnBrk="1" latinLnBrk="0" hangingPunct="1">
+              <a:lnSpc>
+                <a:spcPct val="90000"/>
+              </a:lnSpc>
+              <a:spcBef>
+                <a:spcPts val="500"/>
+              </a:spcBef>
+              <a:buFont typeface="Arial" panose="020B0604020202020204" pitchFamily="34" charset="0"/>
+              <a:buChar char="•"/>
+              <a:defRPr sz="1800" kern="1200">
+                <a:solidFill>
+                  <a:schemeClr val="tx1"/>
+                </a:solidFill>
+                <a:latin typeface="+mn-lt"/>
+                <a:ea typeface="+mn-ea"/>
+                <a:cs typeface="+mn-cs"/>
+              </a:defRPr>
+            </a:lvl9pPr>
+          </a:lstStyle>
+          <a:p>
+            <a:pPr marL="0" indent="0" algn="just">
+              <a:buFont typeface="Arial" panose="020B0604020202020204" pitchFamily="34" charset="0"/>
+              <a:buNone/>
+            </a:pPr>
+            <a:r>
+              <a:rPr lang="en-PH"/>
+              <a:t>Prototype design:</a:t>
+            </a:r>
+            <a:endParaRPr lang="en-PH" dirty="0"/>
+          </a:p>
+        </p:txBody>
+      </p:sp>
+      <p:pic>
+        <p:nvPicPr>
+          <p:cNvPr id="7" name="Picture 2" descr="http://image.flaticon.com/icons/png/128/230/230312.png"/>
+          <p:cNvPicPr>
+            <a:picLocks noChangeAspect="1" noChangeArrowheads="1"/>
+          </p:cNvPicPr>
+          <p:nvPr/>
+        </p:nvPicPr>
+        <p:blipFill>
+          <a:blip r:embed="rId5">
+            <a:extLst>
+              <a:ext uri="{28A0092B-C50C-407E-A947-70E740481C1C}">
+                <a14:useLocalDpi xmlns:a14="http://schemas.microsoft.com/office/drawing/2010/main" val="0"/>
+              </a:ext>
+            </a:extLst>
+          </a:blip>
+          <a:srcRect/>
+          <a:stretch>
+            <a:fillRect/>
+          </a:stretch>
+        </p:blipFill>
+        <p:spPr bwMode="auto">
+          <a:xfrm>
+            <a:off x="3880645" y="2486757"/>
+            <a:ext cx="1219200" cy="1219200"/>
+          </a:xfrm>
+          <a:prstGeom prst="rect">
+            <a:avLst/>
+          </a:prstGeom>
+          <a:noFill/>
+          <a:extLst>
+            <a:ext uri="{909E8E84-426E-40DD-AFC4-6F175D3DCCD1}">
+              <a14:hiddenFill xmlns:a14="http://schemas.microsoft.com/office/drawing/2010/main">
+                <a:solidFill>
+                  <a:srgbClr val="FFFFFF"/>
+                </a:solidFill>
+              </a14:hiddenFill>
+            </a:ext>
+          </a:extLst>
+        </p:spPr>
+      </p:pic>
+      <p:pic>
+        <p:nvPicPr>
+          <p:cNvPr id="8" name="Picture 4" descr="http://image.flaticon.com/icons/png/128/230/230308.png"/>
+          <p:cNvPicPr>
+            <a:picLocks noChangeAspect="1" noChangeArrowheads="1"/>
+          </p:cNvPicPr>
+          <p:nvPr/>
+        </p:nvPicPr>
+        <p:blipFill>
+          <a:blip r:embed="rId6">
+            <a:extLst>
+              <a:ext uri="{28A0092B-C50C-407E-A947-70E740481C1C}">
+                <a14:useLocalDpi xmlns:a14="http://schemas.microsoft.com/office/drawing/2010/main" val="0"/>
+              </a:ext>
+            </a:extLst>
+          </a:blip>
+          <a:srcRect/>
+          <a:stretch>
+            <a:fillRect/>
+          </a:stretch>
+        </p:blipFill>
+        <p:spPr bwMode="auto">
+          <a:xfrm>
+            <a:off x="7100107" y="2486757"/>
+            <a:ext cx="1219200" cy="1219200"/>
+          </a:xfrm>
+          <a:prstGeom prst="rect">
+            <a:avLst/>
+          </a:prstGeom>
+          <a:noFill/>
+          <a:extLst>
+            <a:ext uri="{909E8E84-426E-40DD-AFC4-6F175D3DCCD1}">
+              <a14:hiddenFill xmlns:a14="http://schemas.microsoft.com/office/drawing/2010/main">
+                <a:solidFill>
+                  <a:srgbClr val="FFFFFF"/>
+                </a:solidFill>
+              </a14:hiddenFill>
+            </a:ext>
+          </a:extLst>
+        </p:spPr>
+      </p:pic>
+      <p:pic>
+        <p:nvPicPr>
+          <p:cNvPr id="9" name="Picture 8" descr="http://image.flaticon.com/icons/png/128/186/186239.png"/>
+          <p:cNvPicPr>
+            <a:picLocks noChangeAspect="1" noChangeArrowheads="1"/>
+          </p:cNvPicPr>
+          <p:nvPr/>
+        </p:nvPicPr>
+        <p:blipFill>
+          <a:blip r:embed="rId7">
+            <a:extLst>
+              <a:ext uri="{28A0092B-C50C-407E-A947-70E740481C1C}">
+                <a14:useLocalDpi xmlns:a14="http://schemas.microsoft.com/office/drawing/2010/main" val="0"/>
+              </a:ext>
+            </a:extLst>
+          </a:blip>
+          <a:srcRect/>
+          <a:stretch>
+            <a:fillRect/>
+          </a:stretch>
+        </p:blipFill>
+        <p:spPr bwMode="auto">
+          <a:xfrm>
+            <a:off x="5486400" y="4447903"/>
+            <a:ext cx="1219200" cy="1219200"/>
+          </a:xfrm>
+          <a:prstGeom prst="rect">
+            <a:avLst/>
+          </a:prstGeom>
+          <a:noFill/>
+          <a:extLst>
+            <a:ext uri="{909E8E84-426E-40DD-AFC4-6F175D3DCCD1}">
+              <a14:hiddenFill xmlns:a14="http://schemas.microsoft.com/office/drawing/2010/main">
+                <a:solidFill>
+                  <a:srgbClr val="FFFFFF"/>
+                </a:solidFill>
+              </a14:hiddenFill>
+            </a:ext>
+          </a:extLst>
+        </p:spPr>
+      </p:pic>
+      <p:pic>
+        <p:nvPicPr>
+          <p:cNvPr id="10" name="Picture 2" descr="http://image.flaticon.com/icons/png/128/148/148998.png"/>
+          <p:cNvPicPr>
+            <a:picLocks noChangeAspect="1" noChangeArrowheads="1"/>
+          </p:cNvPicPr>
+          <p:nvPr/>
+        </p:nvPicPr>
+        <p:blipFill>
+          <a:blip r:embed="rId8">
+            <a:extLst>
+              <a:ext uri="{28A0092B-C50C-407E-A947-70E740481C1C}">
+                <a14:useLocalDpi xmlns:a14="http://schemas.microsoft.com/office/drawing/2010/main" val="0"/>
+              </a:ext>
+            </a:extLst>
+          </a:blip>
+          <a:srcRect/>
+          <a:stretch>
+            <a:fillRect/>
+          </a:stretch>
+        </p:blipFill>
+        <p:spPr bwMode="auto">
+          <a:xfrm>
+            <a:off x="2393438" y="4447903"/>
+            <a:ext cx="1219200" cy="1219200"/>
+          </a:xfrm>
+          <a:prstGeom prst="rect">
+            <a:avLst/>
+          </a:prstGeom>
+          <a:noFill/>
+          <a:extLst>
+            <a:ext uri="{909E8E84-426E-40DD-AFC4-6F175D3DCCD1}">
+              <a14:hiddenFill xmlns:a14="http://schemas.microsoft.com/office/drawing/2010/main">
+                <a:solidFill>
+                  <a:srgbClr val="FFFFFF"/>
+                </a:solidFill>
+              </a14:hiddenFill>
+            </a:ext>
+          </a:extLst>
+        </p:spPr>
+      </p:pic>
+      <p:pic>
+        <p:nvPicPr>
+          <p:cNvPr id="11" name="Picture 10"/>
+          <p:cNvPicPr>
+            <a:picLocks noChangeAspect="1"/>
+          </p:cNvPicPr>
+          <p:nvPr/>
+        </p:nvPicPr>
+        <p:blipFill>
+          <a:blip r:embed="rId9">
+            <a:extLst>
+              <a:ext uri="{28A0092B-C50C-407E-A947-70E740481C1C}">
+                <a14:useLocalDpi xmlns:a14="http://schemas.microsoft.com/office/drawing/2010/main" val="0"/>
+              </a:ext>
+            </a:extLst>
+          </a:blip>
+          <a:stretch>
+            <a:fillRect/>
+          </a:stretch>
+        </p:blipFill>
+        <p:spPr>
+          <a:xfrm>
+            <a:off x="8579362" y="4447903"/>
+            <a:ext cx="1219200" cy="1219200"/>
+          </a:xfrm>
+          <a:prstGeom prst="rect">
+            <a:avLst/>
+          </a:prstGeom>
+        </p:spPr>
+      </p:pic>
+      <p:sp>
+        <p:nvSpPr>
+          <p:cNvPr id="12" name="TextBox 11"/>
+          <p:cNvSpPr txBox="1"/>
+          <p:nvPr/>
+        </p:nvSpPr>
+        <p:spPr>
+          <a:xfrm>
+            <a:off x="3185314" y="3637592"/>
+            <a:ext cx="2609862" cy="369332"/>
+          </a:xfrm>
+          <a:prstGeom prst="rect">
+            <a:avLst/>
+          </a:prstGeom>
+          <a:noFill/>
+        </p:spPr>
+        <p:txBody>
+          <a:bodyPr wrap="square" rtlCol="0">
+            <a:spAutoFit/>
+          </a:bodyPr>
+          <a:lstStyle/>
+          <a:p>
+            <a:pPr algn="ctr"/>
+            <a:r>
+              <a:rPr lang="en-PH" dirty="0"/>
+              <a:t>Not authenticated server</a:t>
+            </a:r>
+          </a:p>
+        </p:txBody>
+      </p:sp>
+      <p:sp>
+        <p:nvSpPr>
+          <p:cNvPr id="13" name="TextBox 12"/>
+          <p:cNvSpPr txBox="1"/>
+          <p:nvPr/>
+        </p:nvSpPr>
+        <p:spPr>
+          <a:xfrm>
+            <a:off x="6404776" y="3672605"/>
+            <a:ext cx="2609862" cy="369332"/>
+          </a:xfrm>
+          <a:prstGeom prst="rect">
+            <a:avLst/>
+          </a:prstGeom>
+          <a:noFill/>
+        </p:spPr>
+        <p:txBody>
+          <a:bodyPr wrap="square" rtlCol="0">
+            <a:spAutoFit/>
+          </a:bodyPr>
+          <a:lstStyle/>
+          <a:p>
+            <a:pPr algn="ctr"/>
+            <a:r>
+              <a:rPr lang="en-PH" dirty="0"/>
+              <a:t>Authenticated server</a:t>
+            </a:r>
+          </a:p>
+        </p:txBody>
+      </p:sp>
+      <p:cxnSp>
+        <p:nvCxnSpPr>
+          <p:cNvPr id="14" name="Connector: Elbow 13"/>
+          <p:cNvCxnSpPr>
+            <a:stCxn id="10" idx="3"/>
+            <a:endCxn id="12" idx="2"/>
+          </p:cNvCxnSpPr>
+          <p:nvPr/>
+        </p:nvCxnSpPr>
+        <p:spPr>
+          <a:xfrm flipV="1">
+            <a:off x="3612638" y="4006924"/>
+            <a:ext cx="877607" cy="1050579"/>
+          </a:xfrm>
+          <a:prstGeom prst="bentConnector2">
+            <a:avLst/>
+          </a:prstGeom>
+          <a:ln>
+            <a:solidFill>
+              <a:srgbClr val="FF0000"/>
+            </a:solidFill>
+            <a:tailEnd type="triangle"/>
+          </a:ln>
+        </p:spPr>
+        <p:style>
+          <a:lnRef idx="1">
+            <a:schemeClr val="accent2"/>
+          </a:lnRef>
+          <a:fillRef idx="0">
+            <a:schemeClr val="accent2"/>
+          </a:fillRef>
+          <a:effectRef idx="0">
+            <a:schemeClr val="accent2"/>
+          </a:effectRef>
+          <a:fontRef idx="minor">
+            <a:schemeClr val="tx1"/>
+          </a:fontRef>
+        </p:style>
+      </p:cxnSp>
+      <p:cxnSp>
+        <p:nvCxnSpPr>
+          <p:cNvPr id="15" name="Connector: Elbow 14"/>
+          <p:cNvCxnSpPr>
+            <a:stCxn id="9" idx="1"/>
+          </p:cNvCxnSpPr>
+          <p:nvPr/>
+        </p:nvCxnSpPr>
+        <p:spPr>
+          <a:xfrm rot="10800000">
+            <a:off x="4831838" y="4006925"/>
+            <a:ext cx="654562" cy="1050579"/>
+          </a:xfrm>
+          <a:prstGeom prst="bentConnector2">
+            <a:avLst/>
+          </a:prstGeom>
+          <a:ln>
+            <a:solidFill>
+              <a:srgbClr val="FF0000"/>
+            </a:solidFill>
+            <a:tailEnd type="triangle"/>
+          </a:ln>
+        </p:spPr>
+        <p:style>
+          <a:lnRef idx="1">
+            <a:schemeClr val="accent2"/>
+          </a:lnRef>
+          <a:fillRef idx="0">
+            <a:schemeClr val="accent2"/>
+          </a:fillRef>
+          <a:effectRef idx="0">
+            <a:schemeClr val="accent2"/>
+          </a:effectRef>
+          <a:fontRef idx="minor">
+            <a:schemeClr val="tx1"/>
+          </a:fontRef>
+        </p:style>
+      </p:cxnSp>
+      <p:cxnSp>
+        <p:nvCxnSpPr>
+          <p:cNvPr id="16" name="Connector: Elbow 15"/>
+          <p:cNvCxnSpPr/>
+          <p:nvPr/>
+        </p:nvCxnSpPr>
+        <p:spPr>
+          <a:xfrm rot="5400000" flipH="1">
+            <a:off x="6184286" y="2487655"/>
+            <a:ext cx="1660179" cy="4698717"/>
+          </a:xfrm>
+          <a:prstGeom prst="bentConnector3">
+            <a:avLst>
+              <a:gd name="adj1" fmla="val -13770"/>
+            </a:avLst>
+          </a:prstGeom>
+          <a:ln>
+            <a:solidFill>
+              <a:srgbClr val="FF0000"/>
+            </a:solidFill>
+            <a:tailEnd type="triangle"/>
+          </a:ln>
+        </p:spPr>
+        <p:style>
+          <a:lnRef idx="1">
+            <a:schemeClr val="accent2"/>
+          </a:lnRef>
+          <a:fillRef idx="0">
+            <a:schemeClr val="accent2"/>
+          </a:fillRef>
+          <a:effectRef idx="0">
+            <a:schemeClr val="accent2"/>
+          </a:effectRef>
+          <a:fontRef idx="minor">
+            <a:schemeClr val="tx1"/>
+          </a:fontRef>
+        </p:style>
+      </p:cxnSp>
+      <p:cxnSp>
+        <p:nvCxnSpPr>
+          <p:cNvPr id="17" name="Connector: Elbow 16"/>
+          <p:cNvCxnSpPr>
+            <a:stCxn id="10" idx="2"/>
+            <a:endCxn id="8" idx="3"/>
+          </p:cNvCxnSpPr>
+          <p:nvPr/>
+        </p:nvCxnSpPr>
+        <p:spPr>
+          <a:xfrm rot="5400000" flipH="1" flipV="1">
+            <a:off x="4375799" y="1723595"/>
+            <a:ext cx="2570746" cy="5316269"/>
+          </a:xfrm>
+          <a:prstGeom prst="bentConnector4">
+            <a:avLst>
+              <a:gd name="adj1" fmla="val -35159"/>
+              <a:gd name="adj2" fmla="val 137112"/>
+            </a:avLst>
+          </a:prstGeom>
+          <a:ln>
+            <a:tailEnd type="triangle"/>
+          </a:ln>
+        </p:spPr>
+        <p:style>
+          <a:lnRef idx="1">
+            <a:schemeClr val="accent4"/>
+          </a:lnRef>
+          <a:fillRef idx="0">
+            <a:schemeClr val="accent4"/>
+          </a:fillRef>
+          <a:effectRef idx="0">
+            <a:schemeClr val="accent4"/>
+          </a:effectRef>
+          <a:fontRef idx="minor">
+            <a:schemeClr val="tx1"/>
+          </a:fontRef>
+        </p:style>
+      </p:cxnSp>
+      <p:cxnSp>
+        <p:nvCxnSpPr>
+          <p:cNvPr id="18" name="Connector: Elbow 17"/>
+          <p:cNvCxnSpPr>
+            <a:stCxn id="9" idx="3"/>
+            <a:endCxn id="13" idx="2"/>
+          </p:cNvCxnSpPr>
+          <p:nvPr/>
+        </p:nvCxnSpPr>
+        <p:spPr>
+          <a:xfrm flipV="1">
+            <a:off x="6705600" y="4041937"/>
+            <a:ext cx="1004107" cy="1015566"/>
+          </a:xfrm>
+          <a:prstGeom prst="bentConnector2">
+            <a:avLst/>
+          </a:prstGeom>
+          <a:ln>
+            <a:tailEnd type="triangle"/>
+          </a:ln>
+        </p:spPr>
+        <p:style>
+          <a:lnRef idx="1">
+            <a:schemeClr val="accent4"/>
+          </a:lnRef>
+          <a:fillRef idx="0">
+            <a:schemeClr val="accent4"/>
+          </a:fillRef>
+          <a:effectRef idx="0">
+            <a:schemeClr val="accent4"/>
+          </a:effectRef>
+          <a:fontRef idx="minor">
+            <a:schemeClr val="tx1"/>
+          </a:fontRef>
+        </p:style>
+      </p:cxnSp>
+      <p:cxnSp>
+        <p:nvCxnSpPr>
+          <p:cNvPr id="19" name="Connector: Elbow 18"/>
+          <p:cNvCxnSpPr>
+            <a:stCxn id="11" idx="1"/>
+          </p:cNvCxnSpPr>
+          <p:nvPr/>
+        </p:nvCxnSpPr>
+        <p:spPr>
+          <a:xfrm rot="10800000">
+            <a:off x="8079522" y="4041937"/>
+            <a:ext cx="499841" cy="1015566"/>
+          </a:xfrm>
+          <a:prstGeom prst="bentConnector2">
+            <a:avLst/>
+          </a:prstGeom>
+          <a:ln>
+            <a:tailEnd type="triangle"/>
+          </a:ln>
+        </p:spPr>
+        <p:style>
+          <a:lnRef idx="1">
+            <a:schemeClr val="accent4"/>
+          </a:lnRef>
+          <a:fillRef idx="0">
+            <a:schemeClr val="accent4"/>
+          </a:fillRef>
+          <a:effectRef idx="0">
+            <a:schemeClr val="accent4"/>
+          </a:effectRef>
+          <a:fontRef idx="minor">
+            <a:schemeClr val="tx1"/>
+          </a:fontRef>
+        </p:style>
+      </p:cxnSp>
+      <p:cxnSp>
+        <p:nvCxnSpPr>
+          <p:cNvPr id="20" name="Connector: Elbow 19"/>
+          <p:cNvCxnSpPr/>
+          <p:nvPr/>
+        </p:nvCxnSpPr>
+        <p:spPr>
+          <a:xfrm rot="5400000" flipH="1" flipV="1">
+            <a:off x="4375800" y="1723595"/>
+            <a:ext cx="2570746" cy="5316269"/>
+          </a:xfrm>
+          <a:prstGeom prst="bentConnector4">
+            <a:avLst>
+              <a:gd name="adj1" fmla="val -35159"/>
+              <a:gd name="adj2" fmla="val 137112"/>
+            </a:avLst>
+          </a:prstGeom>
+          <a:ln>
+            <a:solidFill>
+              <a:srgbClr val="00B050"/>
+            </a:solidFill>
+            <a:tailEnd type="triangle"/>
+          </a:ln>
+        </p:spPr>
+        <p:style>
+          <a:lnRef idx="1">
+            <a:schemeClr val="accent6"/>
+          </a:lnRef>
+          <a:fillRef idx="0">
+            <a:schemeClr val="accent6"/>
+          </a:fillRef>
+          <a:effectRef idx="0">
+            <a:schemeClr val="accent6"/>
+          </a:effectRef>
+          <a:fontRef idx="minor">
+            <a:schemeClr val="tx1"/>
+          </a:fontRef>
+        </p:style>
+      </p:cxnSp>
+      <p:cxnSp>
+        <p:nvCxnSpPr>
+          <p:cNvPr id="21" name="Connector: Elbow 20"/>
+          <p:cNvCxnSpPr/>
+          <p:nvPr/>
+        </p:nvCxnSpPr>
+        <p:spPr>
+          <a:xfrm flipV="1">
+            <a:off x="6705601" y="4041937"/>
+            <a:ext cx="1004107" cy="1015566"/>
+          </a:xfrm>
+          <a:prstGeom prst="bentConnector2">
+            <a:avLst/>
+          </a:prstGeom>
+          <a:ln>
+            <a:solidFill>
+              <a:srgbClr val="00B050"/>
+            </a:solidFill>
+            <a:tailEnd type="triangle"/>
+          </a:ln>
+        </p:spPr>
+        <p:style>
+          <a:lnRef idx="1">
+            <a:schemeClr val="accent6"/>
+          </a:lnRef>
+          <a:fillRef idx="0">
+            <a:schemeClr val="accent6"/>
+          </a:fillRef>
+          <a:effectRef idx="0">
+            <a:schemeClr val="accent6"/>
+          </a:effectRef>
+          <a:fontRef idx="minor">
+            <a:schemeClr val="tx1"/>
+          </a:fontRef>
+        </p:style>
+      </p:cxnSp>
+      <p:cxnSp>
+        <p:nvCxnSpPr>
+          <p:cNvPr id="22" name="Connector: Elbow 21"/>
+          <p:cNvCxnSpPr/>
+          <p:nvPr/>
+        </p:nvCxnSpPr>
+        <p:spPr>
+          <a:xfrm rot="10800000">
+            <a:off x="8079523" y="4041937"/>
+            <a:ext cx="499841" cy="1015566"/>
+          </a:xfrm>
+          <a:prstGeom prst="bentConnector2">
+            <a:avLst/>
+          </a:prstGeom>
+          <a:ln>
+            <a:solidFill>
+              <a:srgbClr val="00B050"/>
+            </a:solidFill>
+            <a:tailEnd type="triangle"/>
+          </a:ln>
+        </p:spPr>
+        <p:style>
+          <a:lnRef idx="1">
+            <a:schemeClr val="accent6"/>
+          </a:lnRef>
+          <a:fillRef idx="0">
+            <a:schemeClr val="accent6"/>
+          </a:fillRef>
+          <a:effectRef idx="0">
+            <a:schemeClr val="accent6"/>
+          </a:effectRef>
+          <a:fontRef idx="minor">
+            <a:schemeClr val="tx1"/>
+          </a:fontRef>
+        </p:style>
+      </p:cxnSp>
+      <p:pic>
+        <p:nvPicPr>
+          <p:cNvPr id="23" name="Picture 22"/>
+          <p:cNvPicPr>
+            <a:picLocks noChangeAspect="1"/>
+          </p:cNvPicPr>
+          <p:nvPr/>
+        </p:nvPicPr>
+        <p:blipFill>
+          <a:blip r:embed="rId10">
+            <a:extLst>
+              <a:ext uri="{28A0092B-C50C-407E-A947-70E740481C1C}">
+                <a14:useLocalDpi xmlns:a14="http://schemas.microsoft.com/office/drawing/2010/main" val="0"/>
+              </a:ext>
+            </a:extLst>
+          </a:blip>
+          <a:stretch>
+            <a:fillRect/>
+          </a:stretch>
+        </p:blipFill>
+        <p:spPr>
+          <a:xfrm>
+            <a:off x="5815499" y="2801717"/>
+            <a:ext cx="589277" cy="589277"/>
+          </a:xfrm>
+          <a:prstGeom prst="rect">
+            <a:avLst/>
+          </a:prstGeom>
+        </p:spPr>
+      </p:pic>
+      <p:cxnSp>
+        <p:nvCxnSpPr>
+          <p:cNvPr id="24" name="Straight Arrow Connector 23"/>
+          <p:cNvCxnSpPr>
+            <a:stCxn id="7" idx="3"/>
+            <a:endCxn id="23" idx="1"/>
+          </p:cNvCxnSpPr>
+          <p:nvPr/>
+        </p:nvCxnSpPr>
+        <p:spPr>
+          <a:xfrm flipV="1">
+            <a:off x="5099845" y="3096356"/>
+            <a:ext cx="715654" cy="1"/>
+          </a:xfrm>
+          <a:prstGeom prst="straightConnector1">
+            <a:avLst/>
+          </a:prstGeom>
+          <a:ln>
+            <a:prstDash val="lgDash"/>
+            <a:headEnd type="triangle"/>
+            <a:tailEnd type="triangle"/>
+          </a:ln>
+        </p:spPr>
+        <p:style>
+          <a:lnRef idx="2">
+            <a:schemeClr val="accent3"/>
+          </a:lnRef>
+          <a:fillRef idx="0">
+            <a:schemeClr val="accent3"/>
+          </a:fillRef>
+          <a:effectRef idx="1">
+            <a:schemeClr val="accent3"/>
+          </a:effectRef>
+          <a:fontRef idx="minor">
+            <a:schemeClr val="tx1"/>
+          </a:fontRef>
+        </p:style>
+      </p:cxnSp>
+      <p:cxnSp>
+        <p:nvCxnSpPr>
+          <p:cNvPr id="25" name="Straight Arrow Connector 24"/>
+          <p:cNvCxnSpPr/>
+          <p:nvPr/>
+        </p:nvCxnSpPr>
+        <p:spPr>
+          <a:xfrm flipV="1">
+            <a:off x="6347773" y="3096355"/>
+            <a:ext cx="715654" cy="1"/>
+          </a:xfrm>
+          <a:prstGeom prst="straightConnector1">
+            <a:avLst/>
+          </a:prstGeom>
+          <a:ln>
+            <a:prstDash val="lgDash"/>
+            <a:headEnd type="triangle"/>
+            <a:tailEnd type="triangle"/>
+          </a:ln>
+        </p:spPr>
+        <p:style>
+          <a:lnRef idx="2">
+            <a:schemeClr val="accent3"/>
+          </a:lnRef>
+          <a:fillRef idx="0">
+            <a:schemeClr val="accent3"/>
+          </a:fillRef>
+          <a:effectRef idx="1">
+            <a:schemeClr val="accent3"/>
+          </a:effectRef>
+          <a:fontRef idx="minor">
+            <a:schemeClr val="tx1"/>
+          </a:fontRef>
+        </p:style>
+      </p:cxnSp>
+      <p:cxnSp>
+        <p:nvCxnSpPr>
+          <p:cNvPr id="26" name="Connector: Elbow 25"/>
+          <p:cNvCxnSpPr>
+            <a:stCxn id="23" idx="0"/>
+            <a:endCxn id="10" idx="0"/>
+          </p:cNvCxnSpPr>
+          <p:nvPr/>
+        </p:nvCxnSpPr>
+        <p:spPr>
+          <a:xfrm rot="16200000" flipH="1" flipV="1">
+            <a:off x="3733495" y="2071260"/>
+            <a:ext cx="1646186" cy="3107100"/>
+          </a:xfrm>
+          <a:prstGeom prst="bentConnector3">
+            <a:avLst>
+              <a:gd name="adj1" fmla="val -25851"/>
+            </a:avLst>
+          </a:prstGeom>
+          <a:ln>
+            <a:prstDash val="lgDash"/>
+            <a:headEnd type="triangle"/>
+            <a:tailEnd type="triangle"/>
+          </a:ln>
+        </p:spPr>
+        <p:style>
+          <a:lnRef idx="2">
+            <a:schemeClr val="accent3"/>
+          </a:lnRef>
+          <a:fillRef idx="0">
+            <a:schemeClr val="accent3"/>
+          </a:fillRef>
+          <a:effectRef idx="1">
+            <a:schemeClr val="accent3"/>
+          </a:effectRef>
+          <a:fontRef idx="minor">
+            <a:schemeClr val="tx1"/>
+          </a:fontRef>
+        </p:style>
+      </p:cxnSp>
+      <p:cxnSp>
+        <p:nvCxnSpPr>
+          <p:cNvPr id="27" name="Straight Arrow Connector 26"/>
+          <p:cNvCxnSpPr>
+            <a:stCxn id="23" idx="2"/>
+            <a:endCxn id="9" idx="0"/>
+          </p:cNvCxnSpPr>
+          <p:nvPr/>
+        </p:nvCxnSpPr>
+        <p:spPr>
+          <a:xfrm flipH="1">
+            <a:off x="6096000" y="3390994"/>
+            <a:ext cx="14138" cy="1056909"/>
+          </a:xfrm>
+          <a:prstGeom prst="straightConnector1">
+            <a:avLst/>
+          </a:prstGeom>
+          <a:ln>
+            <a:prstDash val="lgDash"/>
+            <a:headEnd type="triangle"/>
+            <a:tailEnd type="triangle"/>
+          </a:ln>
+        </p:spPr>
+        <p:style>
+          <a:lnRef idx="2">
+            <a:schemeClr val="accent3"/>
+          </a:lnRef>
+          <a:fillRef idx="0">
+            <a:schemeClr val="accent3"/>
+          </a:fillRef>
+          <a:effectRef idx="1">
+            <a:schemeClr val="accent3"/>
+          </a:effectRef>
+          <a:fontRef idx="minor">
+            <a:schemeClr val="tx1"/>
+          </a:fontRef>
+        </p:style>
+      </p:cxnSp>
+      <p:cxnSp>
+        <p:nvCxnSpPr>
+          <p:cNvPr id="28" name="Connector: Elbow 27"/>
+          <p:cNvCxnSpPr>
+            <a:stCxn id="23" idx="0"/>
+            <a:endCxn id="11" idx="0"/>
+          </p:cNvCxnSpPr>
+          <p:nvPr/>
+        </p:nvCxnSpPr>
+        <p:spPr>
+          <a:xfrm rot="16200000" flipH="1">
+            <a:off x="6826457" y="2085398"/>
+            <a:ext cx="1646186" cy="3078824"/>
+          </a:xfrm>
+          <a:prstGeom prst="bentConnector3">
+            <a:avLst>
+              <a:gd name="adj1" fmla="val -25851"/>
+            </a:avLst>
+          </a:prstGeom>
+          <a:ln>
+            <a:prstDash val="lgDash"/>
+            <a:headEnd type="triangle"/>
+            <a:tailEnd type="triangle"/>
+          </a:ln>
+        </p:spPr>
+        <p:style>
+          <a:lnRef idx="2">
+            <a:schemeClr val="accent3"/>
+          </a:lnRef>
+          <a:fillRef idx="0">
+            <a:schemeClr val="accent3"/>
+          </a:fillRef>
+          <a:effectRef idx="1">
+            <a:schemeClr val="accent3"/>
+          </a:effectRef>
+          <a:fontRef idx="minor">
+            <a:schemeClr val="tx1"/>
+          </a:fontRef>
+        </p:style>
+      </p:cxnSp>
+      <p:cxnSp>
+        <p:nvCxnSpPr>
+          <p:cNvPr id="29" name="Straight Arrow Connector 28"/>
+          <p:cNvCxnSpPr/>
+          <p:nvPr/>
+        </p:nvCxnSpPr>
+        <p:spPr>
+          <a:xfrm flipV="1">
+            <a:off x="5099845" y="3096355"/>
+            <a:ext cx="715654" cy="1"/>
+          </a:xfrm>
+          <a:prstGeom prst="straightConnector1">
+            <a:avLst/>
+          </a:prstGeom>
+          <a:ln>
+            <a:prstDash val="lgDash"/>
+            <a:headEnd type="triangle"/>
+            <a:tailEnd type="triangle"/>
+          </a:ln>
+        </p:spPr>
+        <p:style>
+          <a:lnRef idx="2">
+            <a:schemeClr val="accent3"/>
+          </a:lnRef>
+          <a:fillRef idx="0">
+            <a:schemeClr val="accent3"/>
+          </a:fillRef>
+          <a:effectRef idx="1">
+            <a:schemeClr val="accent3"/>
+          </a:effectRef>
+          <a:fontRef idx="minor">
+            <a:schemeClr val="tx1"/>
+          </a:fontRef>
+        </p:style>
+      </p:cxnSp>
+      <p:cxnSp>
+        <p:nvCxnSpPr>
+          <p:cNvPr id="30" name="Connector: Elbow 29"/>
+          <p:cNvCxnSpPr/>
+          <p:nvPr/>
+        </p:nvCxnSpPr>
+        <p:spPr>
+          <a:xfrm rot="16200000" flipH="1" flipV="1">
+            <a:off x="3733495" y="2071259"/>
+            <a:ext cx="1646186" cy="3107100"/>
+          </a:xfrm>
+          <a:prstGeom prst="bentConnector3">
+            <a:avLst>
+              <a:gd name="adj1" fmla="val -25851"/>
+            </a:avLst>
+          </a:prstGeom>
+          <a:ln>
+            <a:prstDash val="lgDash"/>
+            <a:headEnd type="triangle"/>
+            <a:tailEnd type="triangle"/>
+          </a:ln>
+        </p:spPr>
+        <p:style>
+          <a:lnRef idx="2">
+            <a:schemeClr val="accent3"/>
+          </a:lnRef>
+          <a:fillRef idx="0">
+            <a:schemeClr val="accent3"/>
+          </a:fillRef>
+          <a:effectRef idx="1">
+            <a:schemeClr val="accent3"/>
+          </a:effectRef>
+          <a:fontRef idx="minor">
+            <a:schemeClr val="tx1"/>
+          </a:fontRef>
+        </p:style>
+      </p:cxnSp>
+      <p:pic>
+        <p:nvPicPr>
+          <p:cNvPr id="31" name="Picture 30"/>
+          <p:cNvPicPr>
+            <a:picLocks noChangeAspect="1"/>
+          </p:cNvPicPr>
+          <p:nvPr/>
+        </p:nvPicPr>
+        <p:blipFill>
+          <a:blip r:embed="rId10">
+            <a:extLst>
+              <a:ext uri="{28A0092B-C50C-407E-A947-70E740481C1C}">
+                <a14:useLocalDpi xmlns:a14="http://schemas.microsoft.com/office/drawing/2010/main" val="0"/>
+              </a:ext>
+            </a:extLst>
+          </a:blip>
+          <a:stretch>
+            <a:fillRect/>
+          </a:stretch>
+        </p:blipFill>
+        <p:spPr>
+          <a:xfrm>
+            <a:off x="6488403" y="2431999"/>
+            <a:ext cx="379874" cy="379874"/>
+          </a:xfrm>
+          <a:prstGeom prst="rect">
+            <a:avLst/>
+          </a:prstGeom>
+        </p:spPr>
+      </p:pic>
+      <p:cxnSp>
+        <p:nvCxnSpPr>
+          <p:cNvPr id="32" name="Connector: Elbow 31"/>
+          <p:cNvCxnSpPr/>
+          <p:nvPr/>
+        </p:nvCxnSpPr>
+        <p:spPr>
+          <a:xfrm flipV="1">
+            <a:off x="6277433" y="2593385"/>
+            <a:ext cx="222204" cy="208333"/>
+          </a:xfrm>
+          <a:prstGeom prst="bentConnector3">
+            <a:avLst>
+              <a:gd name="adj1" fmla="val -648"/>
+            </a:avLst>
+          </a:prstGeom>
+          <a:ln>
+            <a:solidFill>
+              <a:schemeClr val="accent4">
+                <a:lumMod val="60000"/>
+                <a:lumOff val="40000"/>
+              </a:schemeClr>
+            </a:solidFill>
+            <a:headEnd type="triangle"/>
+            <a:tailEnd type="triangle"/>
+          </a:ln>
+        </p:spPr>
+        <p:style>
+          <a:lnRef idx="1">
+            <a:schemeClr val="accent1"/>
+          </a:lnRef>
+          <a:fillRef idx="0">
+            <a:schemeClr val="accent1"/>
+          </a:fillRef>
+          <a:effectRef idx="0">
+            <a:schemeClr val="accent1"/>
+          </a:effectRef>
+          <a:fontRef idx="minor">
+            <a:schemeClr val="tx1"/>
+          </a:fontRef>
+        </p:style>
+      </p:cxnSp>
+    </p:spTree>
+    <p:extLst>
+      <p:ext uri="{BB962C8B-B14F-4D97-AF65-F5344CB8AC3E}">
+        <p14:creationId xmlns:p14="http://schemas.microsoft.com/office/powerpoint/2010/main" val="3485932585"/>
+      </p:ext>
+    </p:extLst>
+  </p:cSld>
+  <p:clrMapOvr>
+    <a:masterClrMapping/>
+  </p:clrMapOvr>
+</p:sld>
+</file>
+
+<file path=ppt/slides/slide17.xml><?xml version="1.0" encoding="utf-8"?>
+<p:sld xmlns:a="http://schemas.openxmlformats.org/drawingml/2006/main" xmlns:r="http://schemas.openxmlformats.org/officeDocument/2006/relationships" xmlns:p="http://schemas.openxmlformats.org/presentationml/2006/main">
+  <p:cSld>
+    <p:spTree>
+      <p:nvGrpSpPr>
+        <p:cNvPr id="1" name=""/>
+        <p:cNvGrpSpPr/>
+        <p:nvPr/>
+      </p:nvGrpSpPr>
+      <p:grpSpPr>
+        <a:xfrm>
+          <a:off x="0" y="0"/>
+          <a:ext cx="0" cy="0"/>
+          <a:chOff x="0" y="0"/>
+          <a:chExt cx="0" cy="0"/>
+        </a:xfrm>
+      </p:grpSpPr>
+      <p:sp>
+        <p:nvSpPr>
+          <p:cNvPr id="2" name="Title 1"/>
+          <p:cNvSpPr>
+            <a:spLocks noGrp="1"/>
+          </p:cNvSpPr>
+          <p:nvPr>
+            <p:ph type="title"/>
+          </p:nvPr>
+        </p:nvSpPr>
+        <p:spPr/>
+        <p:txBody>
+          <a:bodyPr/>
+          <a:lstStyle/>
+          <a:p>
+            <a:r>
+              <a:rPr lang="en-PH" dirty="0"/>
+              <a:t>Conclusions and Recommendations</a:t>
+            </a:r>
+          </a:p>
+        </p:txBody>
+      </p:sp>
+      <p:sp>
+        <p:nvSpPr>
+          <p:cNvPr id="3" name="Content Placeholder 2"/>
+          <p:cNvSpPr>
+            <a:spLocks noGrp="1"/>
+          </p:cNvSpPr>
+          <p:nvPr>
+            <p:ph idx="1"/>
+          </p:nvPr>
+        </p:nvSpPr>
+        <p:spPr/>
+        <p:txBody>
+          <a:bodyPr/>
+          <a:lstStyle/>
+          <a:p>
+            <a:endParaRPr lang="en-PH" dirty="0"/>
+          </a:p>
+        </p:txBody>
+      </p:sp>
+      <p:pic>
+        <p:nvPicPr>
+          <p:cNvPr id="4" name="Picture 3"/>
+          <p:cNvPicPr>
+            <a:picLocks noChangeAspect="1"/>
+          </p:cNvPicPr>
+          <p:nvPr/>
+        </p:nvPicPr>
+        <p:blipFill>
+          <a:blip r:embed="rId3">
+            <a:extLst>
+              <a:ext uri="{28A0092B-C50C-407E-A947-70E740481C1C}">
+                <a14:useLocalDpi xmlns:a14="http://schemas.microsoft.com/office/drawing/2010/main" val="0"/>
+              </a:ext>
+            </a:extLst>
+          </a:blip>
+          <a:stretch>
+            <a:fillRect/>
+          </a:stretch>
+        </p:blipFill>
+        <p:spPr>
+          <a:xfrm>
+            <a:off x="10595595" y="4723195"/>
+            <a:ext cx="2435221" cy="2435221"/>
+          </a:xfrm>
+          <a:prstGeom prst="rect">
+            <a:avLst/>
+          </a:prstGeom>
+        </p:spPr>
+      </p:pic>
+      <p:pic>
+        <p:nvPicPr>
+          <p:cNvPr id="5" name="Picture 4"/>
+          <p:cNvPicPr>
+            <a:picLocks noChangeAspect="1"/>
+          </p:cNvPicPr>
+          <p:nvPr/>
+        </p:nvPicPr>
+        <p:blipFill>
+          <a:blip r:embed="rId4" cstate="hqprint">
+            <a:extLst>
+              <a:ext uri="{28A0092B-C50C-407E-A947-70E740481C1C}">
+                <a14:useLocalDpi xmlns:a14="http://schemas.microsoft.com/office/drawing/2010/main" val="0"/>
+              </a:ext>
+            </a:extLst>
+          </a:blip>
+          <a:stretch>
+            <a:fillRect/>
+          </a:stretch>
+        </p:blipFill>
+        <p:spPr>
+          <a:xfrm>
+            <a:off x="10045148" y="3917853"/>
+            <a:ext cx="1610683" cy="1610683"/>
+          </a:xfrm>
+          <a:prstGeom prst="rect">
+            <a:avLst/>
+          </a:prstGeom>
+        </p:spPr>
+      </p:pic>
+    </p:spTree>
+    <p:extLst>
+      <p:ext uri="{BB962C8B-B14F-4D97-AF65-F5344CB8AC3E}">
+        <p14:creationId xmlns:p14="http://schemas.microsoft.com/office/powerpoint/2010/main" val="2117801375"/>
       </p:ext>
     </p:extLst>
   </p:cSld>
@@ -5211,7 +8255,7 @@
             <a:pPr lvl="1"/>
             <a:r>
               <a:rPr lang="en-PH" dirty="0"/>
-              <a:t>To know the vital issues currently present in the transmission of the votes</a:t>
+              <a:t>To know the issues present in the transmission of the votes</a:t>
             </a:r>
           </a:p>
           <a:p>
@@ -5231,7 +8275,15 @@
             <a:pPr lvl="1"/>
             <a:r>
               <a:rPr lang="en-PH" dirty="0"/>
-              <a:t>To provide a technical solution that allows the verification of  the servers’ authenticity through the use of a public key infrastructure as a security mechanism</a:t>
+              <a:t>To provide a technical solution that would verify the authenticity of the servers and VCMs through the use of a public key infrastructure and </a:t>
+            </a:r>
+            <a:r>
+              <a:rPr lang="en-PH" dirty="0" err="1"/>
+              <a:t>Diffie</a:t>
+            </a:r>
+            <a:r>
+              <a:rPr lang="en-PH" dirty="0"/>
+              <a:t>-Hellman algorithm as security mechanisms for the automated election system</a:t>
             </a:r>
           </a:p>
         </p:txBody>

</xml_diff>

<commit_message>
Edited statement of the prob
</commit_message>
<xml_diff>
--- a/Documentation/Research Paper/CSPROJ Presentation.pptx
+++ b/Documentation/Research Paper/CSPROJ Presentation.pptx
@@ -213,7 +213,7 @@
           <a:p>
             <a:fld id="{4A59DF67-7CAE-436E-928A-21DC0B7D3C3D}" type="datetimeFigureOut">
               <a:rPr lang="en-PH" smtClean="0"/>
-              <a:t>10/12/2016</a:t>
+              <a:t>11/12/2016</a:t>
             </a:fld>
             <a:endParaRPr lang="en-PH"/>
           </a:p>
@@ -687,15 +687,6 @@
               </a:rPr>
               <a:t>As for the proposed solution to this issue, a public key infrastructure has to be implemented to not only authenticate the data being transmitted but to also allow the verification of the servers’ authenticity.</a:t>
             </a:r>
-            <a:endParaRPr lang="en-PH" sz="1200" kern="1200" dirty="0">
-              <a:solidFill>
-                <a:schemeClr val="tx1"/>
-              </a:solidFill>
-              <a:effectLst/>
-              <a:latin typeface="+mn-lt"/>
-              <a:ea typeface="+mn-ea"/>
-              <a:cs typeface="+mn-cs"/>
-            </a:endParaRPr>
           </a:p>
         </p:txBody>
       </p:sp>
@@ -941,15 +932,6 @@
               </a:rPr>
               <a:t>-Hellman algorithm. With the said algorithm, the VCM and server will generate a new key that uses their own public and private keys to verify that the client and server are transmitting data to an authenticated client/server</a:t>
             </a:r>
-            <a:endParaRPr lang="en-PH" sz="1200" kern="1200" dirty="0">
-              <a:solidFill>
-                <a:schemeClr val="tx1"/>
-              </a:solidFill>
-              <a:effectLst/>
-              <a:latin typeface="+mn-lt"/>
-              <a:ea typeface="+mn-ea"/>
-              <a:cs typeface="+mn-cs"/>
-            </a:endParaRPr>
           </a:p>
         </p:txBody>
       </p:sp>
@@ -1134,15 +1116,6 @@
               </a:rPr>
               <a:t>-Hellman generated key and the public key of the VCM. Server key will then get the hash value of the file to check if the hash values are the same key. </a:t>
             </a:r>
-            <a:endParaRPr lang="en-PH" sz="1200" kern="1200" dirty="0">
-              <a:solidFill>
-                <a:schemeClr val="tx1"/>
-              </a:solidFill>
-              <a:effectLst/>
-              <a:latin typeface="+mn-lt"/>
-              <a:ea typeface="+mn-ea"/>
-              <a:cs typeface="+mn-cs"/>
-            </a:endParaRPr>
           </a:p>
         </p:txBody>
       </p:sp>
@@ -2413,7 +2386,7 @@
           <a:p>
             <a:fld id="{2064DE69-BAB8-4242-9507-E5A28E78EBB7}" type="datetimeFigureOut">
               <a:rPr lang="en-PH" smtClean="0"/>
-              <a:t>10/12/2016</a:t>
+              <a:t>11/12/2016</a:t>
             </a:fld>
             <a:endParaRPr lang="en-PH"/>
           </a:p>
@@ -2583,7 +2556,7 @@
           <a:p>
             <a:fld id="{2064DE69-BAB8-4242-9507-E5A28E78EBB7}" type="datetimeFigureOut">
               <a:rPr lang="en-PH" smtClean="0"/>
-              <a:t>10/12/2016</a:t>
+              <a:t>11/12/2016</a:t>
             </a:fld>
             <a:endParaRPr lang="en-PH"/>
           </a:p>
@@ -2763,7 +2736,7 @@
           <a:p>
             <a:fld id="{2064DE69-BAB8-4242-9507-E5A28E78EBB7}" type="datetimeFigureOut">
               <a:rPr lang="en-PH" smtClean="0"/>
-              <a:t>10/12/2016</a:t>
+              <a:t>11/12/2016</a:t>
             </a:fld>
             <a:endParaRPr lang="en-PH"/>
           </a:p>
@@ -2933,7 +2906,7 @@
           <a:p>
             <a:fld id="{2064DE69-BAB8-4242-9507-E5A28E78EBB7}" type="datetimeFigureOut">
               <a:rPr lang="en-PH" smtClean="0"/>
-              <a:t>10/12/2016</a:t>
+              <a:t>11/12/2016</a:t>
             </a:fld>
             <a:endParaRPr lang="en-PH"/>
           </a:p>
@@ -3179,7 +3152,7 @@
           <a:p>
             <a:fld id="{2064DE69-BAB8-4242-9507-E5A28E78EBB7}" type="datetimeFigureOut">
               <a:rPr lang="en-PH" smtClean="0"/>
-              <a:t>10/12/2016</a:t>
+              <a:t>11/12/2016</a:t>
             </a:fld>
             <a:endParaRPr lang="en-PH"/>
           </a:p>
@@ -3411,7 +3384,7 @@
           <a:p>
             <a:fld id="{2064DE69-BAB8-4242-9507-E5A28E78EBB7}" type="datetimeFigureOut">
               <a:rPr lang="en-PH" smtClean="0"/>
-              <a:t>10/12/2016</a:t>
+              <a:t>11/12/2016</a:t>
             </a:fld>
             <a:endParaRPr lang="en-PH"/>
           </a:p>
@@ -3778,7 +3751,7 @@
           <a:p>
             <a:fld id="{2064DE69-BAB8-4242-9507-E5A28E78EBB7}" type="datetimeFigureOut">
               <a:rPr lang="en-PH" smtClean="0"/>
-              <a:t>10/12/2016</a:t>
+              <a:t>11/12/2016</a:t>
             </a:fld>
             <a:endParaRPr lang="en-PH"/>
           </a:p>
@@ -3896,7 +3869,7 @@
           <a:p>
             <a:fld id="{2064DE69-BAB8-4242-9507-E5A28E78EBB7}" type="datetimeFigureOut">
               <a:rPr lang="en-PH" smtClean="0"/>
-              <a:t>10/12/2016</a:t>
+              <a:t>11/12/2016</a:t>
             </a:fld>
             <a:endParaRPr lang="en-PH"/>
           </a:p>
@@ -3991,7 +3964,7 @@
           <a:p>
             <a:fld id="{2064DE69-BAB8-4242-9507-E5A28E78EBB7}" type="datetimeFigureOut">
               <a:rPr lang="en-PH" smtClean="0"/>
-              <a:t>10/12/2016</a:t>
+              <a:t>11/12/2016</a:t>
             </a:fld>
             <a:endParaRPr lang="en-PH"/>
           </a:p>
@@ -4268,7 +4241,7 @@
           <a:p>
             <a:fld id="{2064DE69-BAB8-4242-9507-E5A28E78EBB7}" type="datetimeFigureOut">
               <a:rPr lang="en-PH" smtClean="0"/>
-              <a:t>10/12/2016</a:t>
+              <a:t>11/12/2016</a:t>
             </a:fld>
             <a:endParaRPr lang="en-PH"/>
           </a:p>
@@ -4521,7 +4494,7 @@
           <a:p>
             <a:fld id="{2064DE69-BAB8-4242-9507-E5A28E78EBB7}" type="datetimeFigureOut">
               <a:rPr lang="en-PH" smtClean="0"/>
-              <a:t>10/12/2016</a:t>
+              <a:t>11/12/2016</a:t>
             </a:fld>
             <a:endParaRPr lang="en-PH"/>
           </a:p>
@@ -4734,7 +4707,7 @@
           <a:p>
             <a:fld id="{2064DE69-BAB8-4242-9507-E5A28E78EBB7}" type="datetimeFigureOut">
               <a:rPr lang="en-PH" smtClean="0"/>
-              <a:t>10/12/2016</a:t>
+              <a:t>11/12/2016</a:t>
             </a:fld>
             <a:endParaRPr lang="en-PH"/>
           </a:p>
@@ -8283,8 +8256,13 @@
             </a:r>
             <a:r>
               <a:rPr lang="en-PH" dirty="0"/>
-              <a:t>-Hellman algorithm as security mechanisms for the automated election system</a:t>
-            </a:r>
+              <a:t>-Hellman algorithm as security mechanisms for </a:t>
+            </a:r>
+            <a:r>
+              <a:rPr lang="en-PH"/>
+              <a:t>the AES</a:t>
+            </a:r>
+            <a:endParaRPr lang="en-PH" dirty="0"/>
           </a:p>
         </p:txBody>
       </p:sp>

</xml_diff>

<commit_message>
Added bg commentary, edited ppts
</commit_message>
<xml_diff>
--- a/Documentation/Research Paper/CSPROJ Presentation.pptx
+++ b/Documentation/Research Paper/CSPROJ Presentation.pptx
@@ -5,26 +5,28 @@
     <p:sldMasterId id="2147483648" r:id="rId1"/>
   </p:sldMasterIdLst>
   <p:notesMasterIdLst>
-    <p:notesMasterId r:id="rId19"/>
+    <p:notesMasterId r:id="rId21"/>
   </p:notesMasterIdLst>
   <p:sldIdLst>
     <p:sldId id="257" r:id="rId2"/>
     <p:sldId id="258" r:id="rId3"/>
     <p:sldId id="264" r:id="rId4"/>
-    <p:sldId id="261" r:id="rId5"/>
-    <p:sldId id="262" r:id="rId6"/>
-    <p:sldId id="263" r:id="rId7"/>
-    <p:sldId id="260" r:id="rId8"/>
-    <p:sldId id="265" r:id="rId9"/>
-    <p:sldId id="266" r:id="rId10"/>
-    <p:sldId id="267" r:id="rId11"/>
-    <p:sldId id="259" r:id="rId12"/>
-    <p:sldId id="271" r:id="rId13"/>
-    <p:sldId id="272" r:id="rId14"/>
-    <p:sldId id="273" r:id="rId15"/>
-    <p:sldId id="270" r:id="rId16"/>
-    <p:sldId id="268" r:id="rId17"/>
-    <p:sldId id="269" r:id="rId18"/>
+    <p:sldId id="274" r:id="rId5"/>
+    <p:sldId id="275" r:id="rId6"/>
+    <p:sldId id="261" r:id="rId7"/>
+    <p:sldId id="262" r:id="rId8"/>
+    <p:sldId id="263" r:id="rId9"/>
+    <p:sldId id="260" r:id="rId10"/>
+    <p:sldId id="265" r:id="rId11"/>
+    <p:sldId id="266" r:id="rId12"/>
+    <p:sldId id="267" r:id="rId13"/>
+    <p:sldId id="259" r:id="rId14"/>
+    <p:sldId id="271" r:id="rId15"/>
+    <p:sldId id="272" r:id="rId16"/>
+    <p:sldId id="273" r:id="rId17"/>
+    <p:sldId id="270" r:id="rId18"/>
+    <p:sldId id="268" r:id="rId19"/>
+    <p:sldId id="269" r:id="rId20"/>
   </p:sldIdLst>
   <p:sldSz cx="12192000" cy="6858000"/>
   <p:notesSz cx="6858000" cy="9144000"/>
@@ -661,32 +663,15 @@
           <a:bodyPr/>
           <a:lstStyle/>
           <a:p>
-            <a:r>
-              <a:rPr lang="en-PH" sz="1200" kern="1200" dirty="0">
-                <a:solidFill>
-                  <a:schemeClr val="tx1"/>
-                </a:solidFill>
-                <a:effectLst/>
-                <a:latin typeface="+mn-lt"/>
-                <a:ea typeface="+mn-ea"/>
-                <a:cs typeface="+mn-cs"/>
-              </a:rPr>
-              <a:t>The current system only provides a hash value that would secure the integrity of the data. However, it lacks the security mechanism that would address confidentiality of the system which makes it possible for other servers aside from the official servers to exist in the transmission of the election returns.</a:t>
-            </a:r>
-          </a:p>
-          <a:p>
-            <a:r>
-              <a:rPr lang="en-PH" sz="1200" kern="1200" dirty="0">
-                <a:solidFill>
-                  <a:schemeClr val="tx1"/>
-                </a:solidFill>
-                <a:effectLst/>
-                <a:latin typeface="+mn-lt"/>
-                <a:ea typeface="+mn-ea"/>
-                <a:cs typeface="+mn-cs"/>
-              </a:rPr>
-              <a:t>As for the proposed solution to this issue, a public key infrastructure has to be implemented to not only authenticate the data being transmitted but to also allow the verification of the servers’ authenticity.</a:t>
-            </a:r>
+            <a:endParaRPr lang="en-PH" sz="1200" kern="1200" dirty="0">
+              <a:solidFill>
+                <a:schemeClr val="tx1"/>
+              </a:solidFill>
+              <a:effectLst/>
+              <a:latin typeface="+mn-lt"/>
+              <a:ea typeface="+mn-ea"/>
+              <a:cs typeface="+mn-cs"/>
+            </a:endParaRPr>
           </a:p>
         </p:txBody>
       </p:sp>
@@ -716,7 +701,7 @@
     </p:spTree>
     <p:extLst>
       <p:ext uri="{BB962C8B-B14F-4D97-AF65-F5344CB8AC3E}">
-        <p14:creationId xmlns:p14="http://schemas.microsoft.com/office/powerpoint/2010/main" val="1610382430"/>
+        <p14:creationId xmlns:p14="http://schemas.microsoft.com/office/powerpoint/2010/main" val="1197368536"/>
       </p:ext>
     </p:extLst>
   </p:cSld>
@@ -770,6 +755,207 @@
           <a:bodyPr/>
           <a:lstStyle/>
           <a:p>
+            <a:endParaRPr lang="en-PH" sz="1200" kern="1200" dirty="0">
+              <a:solidFill>
+                <a:schemeClr val="tx1"/>
+              </a:solidFill>
+              <a:effectLst/>
+              <a:latin typeface="+mn-lt"/>
+              <a:ea typeface="+mn-ea"/>
+              <a:cs typeface="+mn-cs"/>
+            </a:endParaRPr>
+          </a:p>
+        </p:txBody>
+      </p:sp>
+      <p:sp>
+        <p:nvSpPr>
+          <p:cNvPr id="4" name="Slide Number Placeholder 3"/>
+          <p:cNvSpPr>
+            <a:spLocks noGrp="1"/>
+          </p:cNvSpPr>
+          <p:nvPr>
+            <p:ph type="sldNum" sz="quarter" idx="10"/>
+          </p:nvPr>
+        </p:nvSpPr>
+        <p:spPr/>
+        <p:txBody>
+          <a:bodyPr/>
+          <a:lstStyle/>
+          <a:p>
+            <a:fld id="{213B05C4-94C7-4412-9CB1-C9F207621576}" type="slidenum">
+              <a:rPr lang="en-PH" smtClean="0"/>
+              <a:t>12</a:t>
+            </a:fld>
+            <a:endParaRPr lang="en-PH"/>
+          </a:p>
+        </p:txBody>
+      </p:sp>
+    </p:spTree>
+    <p:extLst>
+      <p:ext uri="{BB962C8B-B14F-4D97-AF65-F5344CB8AC3E}">
+        <p14:creationId xmlns:p14="http://schemas.microsoft.com/office/powerpoint/2010/main" val="1153255828"/>
+      </p:ext>
+    </p:extLst>
+  </p:cSld>
+  <p:clrMapOvr>
+    <a:masterClrMapping/>
+  </p:clrMapOvr>
+</p:notes>
+</file>
+
+<file path=ppt/notesSlides/notesSlide12.xml><?xml version="1.0" encoding="utf-8"?>
+<p:notes xmlns:a="http://schemas.openxmlformats.org/drawingml/2006/main" xmlns:r="http://schemas.openxmlformats.org/officeDocument/2006/relationships" xmlns:p="http://schemas.openxmlformats.org/presentationml/2006/main">
+  <p:cSld>
+    <p:spTree>
+      <p:nvGrpSpPr>
+        <p:cNvPr id="1" name=""/>
+        <p:cNvGrpSpPr/>
+        <p:nvPr/>
+      </p:nvGrpSpPr>
+      <p:grpSpPr>
+        <a:xfrm>
+          <a:off x="0" y="0"/>
+          <a:ext cx="0" cy="0"/>
+          <a:chOff x="0" y="0"/>
+          <a:chExt cx="0" cy="0"/>
+        </a:xfrm>
+      </p:grpSpPr>
+      <p:sp>
+        <p:nvSpPr>
+          <p:cNvPr id="2" name="Slide Image Placeholder 1"/>
+          <p:cNvSpPr>
+            <a:spLocks noGrp="1" noRot="1" noChangeAspect="1"/>
+          </p:cNvSpPr>
+          <p:nvPr>
+            <p:ph type="sldImg"/>
+          </p:nvPr>
+        </p:nvSpPr>
+        <p:spPr/>
+      </p:sp>
+      <p:sp>
+        <p:nvSpPr>
+          <p:cNvPr id="3" name="Notes Placeholder 2"/>
+          <p:cNvSpPr>
+            <a:spLocks noGrp="1"/>
+          </p:cNvSpPr>
+          <p:nvPr>
+            <p:ph type="body" idx="1"/>
+          </p:nvPr>
+        </p:nvSpPr>
+        <p:spPr/>
+        <p:txBody>
+          <a:bodyPr/>
+          <a:lstStyle/>
+          <a:p>
+            <a:r>
+              <a:rPr lang="en-PH" sz="1200" kern="1200" dirty="0">
+                <a:solidFill>
+                  <a:schemeClr val="tx1"/>
+                </a:solidFill>
+                <a:effectLst/>
+                <a:latin typeface="+mn-lt"/>
+                <a:ea typeface="+mn-ea"/>
+                <a:cs typeface="+mn-cs"/>
+              </a:rPr>
+              <a:t>The current system only provides a hash value that would secure the integrity of the data. However, it lacks the security mechanism that would address confidentiality of the system which makes it possible for other servers aside from the official servers to exist in the transmission of the election returns.</a:t>
+            </a:r>
+          </a:p>
+          <a:p>
+            <a:r>
+              <a:rPr lang="en-PH" sz="1200" kern="1200" dirty="0">
+                <a:solidFill>
+                  <a:schemeClr val="tx1"/>
+                </a:solidFill>
+                <a:effectLst/>
+                <a:latin typeface="+mn-lt"/>
+                <a:ea typeface="+mn-ea"/>
+                <a:cs typeface="+mn-cs"/>
+              </a:rPr>
+              <a:t>As for the proposed solution to this issue, a public key infrastructure has to be implemented to not only authenticate the data being transmitted but to also allow the verification of the servers’ authenticity.</a:t>
+            </a:r>
+          </a:p>
+        </p:txBody>
+      </p:sp>
+      <p:sp>
+        <p:nvSpPr>
+          <p:cNvPr id="4" name="Slide Number Placeholder 3"/>
+          <p:cNvSpPr>
+            <a:spLocks noGrp="1"/>
+          </p:cNvSpPr>
+          <p:nvPr>
+            <p:ph type="sldNum" sz="quarter" idx="10"/>
+          </p:nvPr>
+        </p:nvSpPr>
+        <p:spPr/>
+        <p:txBody>
+          <a:bodyPr/>
+          <a:lstStyle/>
+          <a:p>
+            <a:fld id="{213B05C4-94C7-4412-9CB1-C9F207621576}" type="slidenum">
+              <a:rPr lang="en-PH" smtClean="0"/>
+              <a:t>13</a:t>
+            </a:fld>
+            <a:endParaRPr lang="en-PH"/>
+          </a:p>
+        </p:txBody>
+      </p:sp>
+    </p:spTree>
+    <p:extLst>
+      <p:ext uri="{BB962C8B-B14F-4D97-AF65-F5344CB8AC3E}">
+        <p14:creationId xmlns:p14="http://schemas.microsoft.com/office/powerpoint/2010/main" val="1610382430"/>
+      </p:ext>
+    </p:extLst>
+  </p:cSld>
+  <p:clrMapOvr>
+    <a:masterClrMapping/>
+  </p:clrMapOvr>
+</p:notes>
+</file>
+
+<file path=ppt/notesSlides/notesSlide13.xml><?xml version="1.0" encoding="utf-8"?>
+<p:notes xmlns:a="http://schemas.openxmlformats.org/drawingml/2006/main" xmlns:r="http://schemas.openxmlformats.org/officeDocument/2006/relationships" xmlns:p="http://schemas.openxmlformats.org/presentationml/2006/main">
+  <p:cSld>
+    <p:spTree>
+      <p:nvGrpSpPr>
+        <p:cNvPr id="1" name=""/>
+        <p:cNvGrpSpPr/>
+        <p:nvPr/>
+      </p:nvGrpSpPr>
+      <p:grpSpPr>
+        <a:xfrm>
+          <a:off x="0" y="0"/>
+          <a:ext cx="0" cy="0"/>
+          <a:chOff x="0" y="0"/>
+          <a:chExt cx="0" cy="0"/>
+        </a:xfrm>
+      </p:grpSpPr>
+      <p:sp>
+        <p:nvSpPr>
+          <p:cNvPr id="2" name="Slide Image Placeholder 1"/>
+          <p:cNvSpPr>
+            <a:spLocks noGrp="1" noRot="1" noChangeAspect="1"/>
+          </p:cNvSpPr>
+          <p:nvPr>
+            <p:ph type="sldImg"/>
+          </p:nvPr>
+        </p:nvSpPr>
+        <p:spPr/>
+      </p:sp>
+      <p:sp>
+        <p:nvSpPr>
+          <p:cNvPr id="3" name="Notes Placeholder 2"/>
+          <p:cNvSpPr>
+            <a:spLocks noGrp="1"/>
+          </p:cNvSpPr>
+          <p:nvPr>
+            <p:ph type="body" idx="1"/>
+          </p:nvPr>
+        </p:nvSpPr>
+        <p:spPr/>
+        <p:txBody>
+          <a:bodyPr/>
+          <a:lstStyle/>
+          <a:p>
             <a:pPr marL="0" marR="0" lvl="0" indent="0" algn="l" defTabSz="914400" rtl="0" eaLnBrk="1" fontAlgn="auto" latinLnBrk="0" hangingPunct="1">
               <a:lnSpc>
                 <a:spcPct val="100000"/>
@@ -816,7 +1002,7 @@
           <a:p>
             <a:fld id="{213B05C4-94C7-4412-9CB1-C9F207621576}" type="slidenum">
               <a:rPr lang="en-PH" smtClean="0"/>
-              <a:t>12</a:t>
+              <a:t>14</a:t>
             </a:fld>
             <a:endParaRPr lang="en-PH"/>
           </a:p>
@@ -826,326 +1012,6 @@
     <p:extLst>
       <p:ext uri="{BB962C8B-B14F-4D97-AF65-F5344CB8AC3E}">
         <p14:creationId xmlns:p14="http://schemas.microsoft.com/office/powerpoint/2010/main" val="2146206143"/>
-      </p:ext>
-    </p:extLst>
-  </p:cSld>
-  <p:clrMapOvr>
-    <a:masterClrMapping/>
-  </p:clrMapOvr>
-</p:notes>
-</file>
-
-<file path=ppt/notesSlides/notesSlide12.xml><?xml version="1.0" encoding="utf-8"?>
-<p:notes xmlns:a="http://schemas.openxmlformats.org/drawingml/2006/main" xmlns:r="http://schemas.openxmlformats.org/officeDocument/2006/relationships" xmlns:p="http://schemas.openxmlformats.org/presentationml/2006/main">
-  <p:cSld>
-    <p:spTree>
-      <p:nvGrpSpPr>
-        <p:cNvPr id="1" name=""/>
-        <p:cNvGrpSpPr/>
-        <p:nvPr/>
-      </p:nvGrpSpPr>
-      <p:grpSpPr>
-        <a:xfrm>
-          <a:off x="0" y="0"/>
-          <a:ext cx="0" cy="0"/>
-          <a:chOff x="0" y="0"/>
-          <a:chExt cx="0" cy="0"/>
-        </a:xfrm>
-      </p:grpSpPr>
-      <p:sp>
-        <p:nvSpPr>
-          <p:cNvPr id="2" name="Slide Image Placeholder 1"/>
-          <p:cNvSpPr>
-            <a:spLocks noGrp="1" noRot="1" noChangeAspect="1"/>
-          </p:cNvSpPr>
-          <p:nvPr>
-            <p:ph type="sldImg"/>
-          </p:nvPr>
-        </p:nvSpPr>
-        <p:spPr/>
-      </p:sp>
-      <p:sp>
-        <p:nvSpPr>
-          <p:cNvPr id="3" name="Notes Placeholder 2"/>
-          <p:cNvSpPr>
-            <a:spLocks noGrp="1"/>
-          </p:cNvSpPr>
-          <p:nvPr>
-            <p:ph type="body" idx="1"/>
-          </p:nvPr>
-        </p:nvSpPr>
-        <p:spPr/>
-        <p:txBody>
-          <a:bodyPr/>
-          <a:lstStyle/>
-          <a:p>
-            <a:pPr marL="0" marR="0" lvl="0" indent="0" algn="l" defTabSz="914400" rtl="0" eaLnBrk="1" fontAlgn="auto" latinLnBrk="0" hangingPunct="1">
-              <a:lnSpc>
-                <a:spcPct val="100000"/>
-              </a:lnSpc>
-              <a:spcBef>
-                <a:spcPts val="0"/>
-              </a:spcBef>
-              <a:spcAft>
-                <a:spcPts val="0"/>
-              </a:spcAft>
-              <a:buClrTx/>
-              <a:buSzTx/>
-              <a:buFontTx/>
-              <a:buNone/>
-              <a:tabLst/>
-              <a:defRPr/>
-            </a:pPr>
-            <a:r>
-              <a:rPr lang="en-PH" sz="1200" kern="1200" dirty="0">
-                <a:solidFill>
-                  <a:schemeClr val="tx1"/>
-                </a:solidFill>
-                <a:effectLst/>
-                <a:latin typeface="+mn-lt"/>
-                <a:ea typeface="+mn-ea"/>
-                <a:cs typeface="+mn-cs"/>
-              </a:rPr>
-              <a:t>The process will start once the voting period ends at 5:00pm of the election day. In the proposed system, a server key will collect all the public keys of the voting counting machine (VCM). Assuming that the BEI have already digitally signed the election returns (ERs), the VCM will then send the ERs to the official servers. After doing so, the server will validate the authenticity of the VCM through the </a:t>
-            </a:r>
-            <a:r>
-              <a:rPr lang="en-PH" sz="1200" kern="1200" dirty="0" err="1">
-                <a:solidFill>
-                  <a:schemeClr val="tx1"/>
-                </a:solidFill>
-                <a:effectLst/>
-                <a:latin typeface="+mn-lt"/>
-                <a:ea typeface="+mn-ea"/>
-                <a:cs typeface="+mn-cs"/>
-              </a:rPr>
-              <a:t>Diffie</a:t>
-            </a:r>
-            <a:r>
-              <a:rPr lang="en-PH" sz="1200" kern="1200" dirty="0">
-                <a:solidFill>
-                  <a:schemeClr val="tx1"/>
-                </a:solidFill>
-                <a:effectLst/>
-                <a:latin typeface="+mn-lt"/>
-                <a:ea typeface="+mn-ea"/>
-                <a:cs typeface="+mn-cs"/>
-              </a:rPr>
-              <a:t>-Hellman algorithm. With the said algorithm, the VCM and server will generate a new key that uses their own public and private keys to verify that the client and server are transmitting data to an authenticated client/server</a:t>
-            </a:r>
-          </a:p>
-        </p:txBody>
-      </p:sp>
-      <p:sp>
-        <p:nvSpPr>
-          <p:cNvPr id="4" name="Slide Number Placeholder 3"/>
-          <p:cNvSpPr>
-            <a:spLocks noGrp="1"/>
-          </p:cNvSpPr>
-          <p:nvPr>
-            <p:ph type="sldNum" sz="quarter" idx="10"/>
-          </p:nvPr>
-        </p:nvSpPr>
-        <p:spPr/>
-        <p:txBody>
-          <a:bodyPr/>
-          <a:lstStyle/>
-          <a:p>
-            <a:fld id="{213B05C4-94C7-4412-9CB1-C9F207621576}" type="slidenum">
-              <a:rPr lang="en-PH" smtClean="0"/>
-              <a:t>13</a:t>
-            </a:fld>
-            <a:endParaRPr lang="en-PH"/>
-          </a:p>
-        </p:txBody>
-      </p:sp>
-    </p:spTree>
-    <p:extLst>
-      <p:ext uri="{BB962C8B-B14F-4D97-AF65-F5344CB8AC3E}">
-        <p14:creationId xmlns:p14="http://schemas.microsoft.com/office/powerpoint/2010/main" val="3735920242"/>
-      </p:ext>
-    </p:extLst>
-  </p:cSld>
-  <p:clrMapOvr>
-    <a:masterClrMapping/>
-  </p:clrMapOvr>
-</p:notes>
-</file>
-
-<file path=ppt/notesSlides/notesSlide13.xml><?xml version="1.0" encoding="utf-8"?>
-<p:notes xmlns:a="http://schemas.openxmlformats.org/drawingml/2006/main" xmlns:r="http://schemas.openxmlformats.org/officeDocument/2006/relationships" xmlns:p="http://schemas.openxmlformats.org/presentationml/2006/main">
-  <p:cSld>
-    <p:spTree>
-      <p:nvGrpSpPr>
-        <p:cNvPr id="1" name=""/>
-        <p:cNvGrpSpPr/>
-        <p:nvPr/>
-      </p:nvGrpSpPr>
-      <p:grpSpPr>
-        <a:xfrm>
-          <a:off x="0" y="0"/>
-          <a:ext cx="0" cy="0"/>
-          <a:chOff x="0" y="0"/>
-          <a:chExt cx="0" cy="0"/>
-        </a:xfrm>
-      </p:grpSpPr>
-      <p:sp>
-        <p:nvSpPr>
-          <p:cNvPr id="2" name="Slide Image Placeholder 1"/>
-          <p:cNvSpPr>
-            <a:spLocks noGrp="1" noRot="1" noChangeAspect="1"/>
-          </p:cNvSpPr>
-          <p:nvPr>
-            <p:ph type="sldImg"/>
-          </p:nvPr>
-        </p:nvSpPr>
-        <p:spPr/>
-      </p:sp>
-      <p:sp>
-        <p:nvSpPr>
-          <p:cNvPr id="3" name="Notes Placeholder 2"/>
-          <p:cNvSpPr>
-            <a:spLocks noGrp="1"/>
-          </p:cNvSpPr>
-          <p:nvPr>
-            <p:ph type="body" idx="1"/>
-          </p:nvPr>
-        </p:nvSpPr>
-        <p:spPr/>
-        <p:txBody>
-          <a:bodyPr/>
-          <a:lstStyle/>
-          <a:p>
-            <a:pPr marL="0" marR="0" lvl="0" indent="0" algn="l" defTabSz="914400" rtl="0" eaLnBrk="1" fontAlgn="auto" latinLnBrk="0" hangingPunct="1">
-              <a:lnSpc>
-                <a:spcPct val="100000"/>
-              </a:lnSpc>
-              <a:spcBef>
-                <a:spcPts val="0"/>
-              </a:spcBef>
-              <a:spcAft>
-                <a:spcPts val="0"/>
-              </a:spcAft>
-              <a:buClrTx/>
-              <a:buSzTx/>
-              <a:buFontTx/>
-              <a:buNone/>
-              <a:tabLst/>
-              <a:defRPr/>
-            </a:pPr>
-            <a:r>
-              <a:rPr lang="en-PH" sz="1200" kern="1200" dirty="0">
-                <a:solidFill>
-                  <a:schemeClr val="tx1"/>
-                </a:solidFill>
-                <a:effectLst/>
-                <a:latin typeface="+mn-lt"/>
-                <a:ea typeface="+mn-ea"/>
-                <a:cs typeface="+mn-cs"/>
-              </a:rPr>
-              <a:t>Once there is a generated key and the key players are verified, it is the only time when the VCM will encrypt file (ERs) using its private key. After that, VCM will get the hash value of the file using the MD5, SHA, and </a:t>
-            </a:r>
-            <a:r>
-              <a:rPr lang="en-PH" sz="1200" kern="1200" dirty="0" err="1">
-                <a:solidFill>
-                  <a:schemeClr val="tx1"/>
-                </a:solidFill>
-                <a:effectLst/>
-                <a:latin typeface="+mn-lt"/>
-                <a:ea typeface="+mn-ea"/>
-                <a:cs typeface="+mn-cs"/>
-              </a:rPr>
-              <a:t>Bcrypt</a:t>
-            </a:r>
-            <a:r>
-              <a:rPr lang="en-PH" sz="1200" kern="1200" dirty="0">
-                <a:solidFill>
-                  <a:schemeClr val="tx1"/>
-                </a:solidFill>
-                <a:effectLst/>
-                <a:latin typeface="+mn-lt"/>
-                <a:ea typeface="+mn-ea"/>
-                <a:cs typeface="+mn-cs"/>
-              </a:rPr>
-              <a:t> hashing algorithms. Then the VCM will once again encrypt the file using the </a:t>
-            </a:r>
-            <a:r>
-              <a:rPr lang="en-PH" sz="1200" kern="1200" dirty="0" err="1">
-                <a:solidFill>
-                  <a:schemeClr val="tx1"/>
-                </a:solidFill>
-                <a:effectLst/>
-                <a:latin typeface="+mn-lt"/>
-                <a:ea typeface="+mn-ea"/>
-                <a:cs typeface="+mn-cs"/>
-              </a:rPr>
-              <a:t>Diffie</a:t>
-            </a:r>
-            <a:r>
-              <a:rPr lang="en-PH" sz="1200" kern="1200" dirty="0">
-                <a:solidFill>
-                  <a:schemeClr val="tx1"/>
-                </a:solidFill>
-                <a:effectLst/>
-                <a:latin typeface="+mn-lt"/>
-                <a:ea typeface="+mn-ea"/>
-                <a:cs typeface="+mn-cs"/>
-              </a:rPr>
-              <a:t>-Hellman generated key, as well as its hash values. Only then the VCM will send the encrypted file and hash values to the server key. The server key will decrypt the encrypted file and hash function using the </a:t>
-            </a:r>
-            <a:r>
-              <a:rPr lang="en-PH" sz="1200" kern="1200" dirty="0" err="1">
-                <a:solidFill>
-                  <a:schemeClr val="tx1"/>
-                </a:solidFill>
-                <a:effectLst/>
-                <a:latin typeface="+mn-lt"/>
-                <a:ea typeface="+mn-ea"/>
-                <a:cs typeface="+mn-cs"/>
-              </a:rPr>
-              <a:t>Diffie</a:t>
-            </a:r>
-            <a:r>
-              <a:rPr lang="en-PH" sz="1200" kern="1200" dirty="0">
-                <a:solidFill>
-                  <a:schemeClr val="tx1"/>
-                </a:solidFill>
-                <a:effectLst/>
-                <a:latin typeface="+mn-lt"/>
-                <a:ea typeface="+mn-ea"/>
-                <a:cs typeface="+mn-cs"/>
-              </a:rPr>
-              <a:t>-Hellman generated key and the public key of the VCM. Server key will then get the hash value of the file to check if the hash values are the same key. </a:t>
-            </a:r>
-          </a:p>
-        </p:txBody>
-      </p:sp>
-      <p:sp>
-        <p:nvSpPr>
-          <p:cNvPr id="4" name="Slide Number Placeholder 3"/>
-          <p:cNvSpPr>
-            <a:spLocks noGrp="1"/>
-          </p:cNvSpPr>
-          <p:nvPr>
-            <p:ph type="sldNum" sz="quarter" idx="10"/>
-          </p:nvPr>
-        </p:nvSpPr>
-        <p:spPr/>
-        <p:txBody>
-          <a:bodyPr/>
-          <a:lstStyle/>
-          <a:p>
-            <a:fld id="{213B05C4-94C7-4412-9CB1-C9F207621576}" type="slidenum">
-              <a:rPr lang="en-PH" smtClean="0"/>
-              <a:t>14</a:t>
-            </a:fld>
-            <a:endParaRPr lang="en-PH"/>
-          </a:p>
-        </p:txBody>
-      </p:sp>
-    </p:spTree>
-    <p:extLst>
-      <p:ext uri="{BB962C8B-B14F-4D97-AF65-F5344CB8AC3E}">
-        <p14:creationId xmlns:p14="http://schemas.microsoft.com/office/powerpoint/2010/main" val="2966215870"/>
       </p:ext>
     </p:extLst>
   </p:cSld>
@@ -1216,15 +1082,42 @@
               <a:tabLst/>
               <a:defRPr/>
             </a:pPr>
-            <a:endParaRPr lang="en-PH" sz="1200" kern="1200" dirty="0">
-              <a:solidFill>
-                <a:schemeClr val="tx1"/>
-              </a:solidFill>
-              <a:effectLst/>
-              <a:latin typeface="+mn-lt"/>
-              <a:ea typeface="+mn-ea"/>
-              <a:cs typeface="+mn-cs"/>
-            </a:endParaRPr>
+            <a:r>
+              <a:rPr lang="en-PH" sz="1200" kern="1200" dirty="0">
+                <a:solidFill>
+                  <a:schemeClr val="tx1"/>
+                </a:solidFill>
+                <a:effectLst/>
+                <a:latin typeface="+mn-lt"/>
+                <a:ea typeface="+mn-ea"/>
+                <a:cs typeface="+mn-cs"/>
+              </a:rPr>
+              <a:t>The process will start once the voting period ends at 5:00pm of the election day. In the proposed system, a server key will collect all the public keys of the voting counting machine (VCM). Assuming that the BEI have already digitally signed the election returns (ERs), the VCM will then send the ERs to the official servers. After doing so, the server will validate the authenticity of the VCM through the </a:t>
+            </a:r>
+            <a:r>
+              <a:rPr lang="en-PH" sz="1200" kern="1200" dirty="0" err="1">
+                <a:solidFill>
+                  <a:schemeClr val="tx1"/>
+                </a:solidFill>
+                <a:effectLst/>
+                <a:latin typeface="+mn-lt"/>
+                <a:ea typeface="+mn-ea"/>
+                <a:cs typeface="+mn-cs"/>
+              </a:rPr>
+              <a:t>Diffie</a:t>
+            </a:r>
+            <a:r>
+              <a:rPr lang="en-PH" sz="1200" kern="1200" dirty="0">
+                <a:solidFill>
+                  <a:schemeClr val="tx1"/>
+                </a:solidFill>
+                <a:effectLst/>
+                <a:latin typeface="+mn-lt"/>
+                <a:ea typeface="+mn-ea"/>
+                <a:cs typeface="+mn-cs"/>
+              </a:rPr>
+              <a:t>-Hellman algorithm. With the said algorithm, the VCM and server will generate a new key that uses their own public and private keys to verify that the client and server are transmitting data to an authenticated client/server</a:t>
+            </a:r>
           </a:p>
         </p:txBody>
       </p:sp>
@@ -1254,7 +1147,7 @@
     </p:spTree>
     <p:extLst>
       <p:ext uri="{BB962C8B-B14F-4D97-AF65-F5344CB8AC3E}">
-        <p14:creationId xmlns:p14="http://schemas.microsoft.com/office/powerpoint/2010/main" val="3902562114"/>
+        <p14:creationId xmlns:p14="http://schemas.microsoft.com/office/powerpoint/2010/main" val="3735920242"/>
       </p:ext>
     </p:extLst>
   </p:cSld>
@@ -1325,15 +1218,90 @@
               <a:tabLst/>
               <a:defRPr/>
             </a:pPr>
-            <a:endParaRPr lang="en-PH" sz="1200" kern="1200" dirty="0">
-              <a:solidFill>
-                <a:schemeClr val="tx1"/>
-              </a:solidFill>
-              <a:effectLst/>
-              <a:latin typeface="+mn-lt"/>
-              <a:ea typeface="+mn-ea"/>
-              <a:cs typeface="+mn-cs"/>
-            </a:endParaRPr>
+            <a:r>
+              <a:rPr lang="en-PH" sz="1200" kern="1200" dirty="0">
+                <a:solidFill>
+                  <a:schemeClr val="tx1"/>
+                </a:solidFill>
+                <a:effectLst/>
+                <a:latin typeface="+mn-lt"/>
+                <a:ea typeface="+mn-ea"/>
+                <a:cs typeface="+mn-cs"/>
+              </a:rPr>
+              <a:t>Once there is a generated key and the key players are verified, it is the only time when the VCM will encrypt file (ERs) using its private key. After that, VCM will get the hash value of the file using the MD5, SHA, and </a:t>
+            </a:r>
+            <a:r>
+              <a:rPr lang="en-PH" sz="1200" kern="1200" dirty="0" err="1">
+                <a:solidFill>
+                  <a:schemeClr val="tx1"/>
+                </a:solidFill>
+                <a:effectLst/>
+                <a:latin typeface="+mn-lt"/>
+                <a:ea typeface="+mn-ea"/>
+                <a:cs typeface="+mn-cs"/>
+              </a:rPr>
+              <a:t>Bcrypt</a:t>
+            </a:r>
+            <a:r>
+              <a:rPr lang="en-PH" sz="1200" kern="1200" dirty="0">
+                <a:solidFill>
+                  <a:schemeClr val="tx1"/>
+                </a:solidFill>
+                <a:effectLst/>
+                <a:latin typeface="+mn-lt"/>
+                <a:ea typeface="+mn-ea"/>
+                <a:cs typeface="+mn-cs"/>
+              </a:rPr>
+              <a:t> hashing algorithms. Then the VCM will once again encrypt the file using the </a:t>
+            </a:r>
+            <a:r>
+              <a:rPr lang="en-PH" sz="1200" kern="1200" dirty="0" err="1">
+                <a:solidFill>
+                  <a:schemeClr val="tx1"/>
+                </a:solidFill>
+                <a:effectLst/>
+                <a:latin typeface="+mn-lt"/>
+                <a:ea typeface="+mn-ea"/>
+                <a:cs typeface="+mn-cs"/>
+              </a:rPr>
+              <a:t>Diffie</a:t>
+            </a:r>
+            <a:r>
+              <a:rPr lang="en-PH" sz="1200" kern="1200" dirty="0">
+                <a:solidFill>
+                  <a:schemeClr val="tx1"/>
+                </a:solidFill>
+                <a:effectLst/>
+                <a:latin typeface="+mn-lt"/>
+                <a:ea typeface="+mn-ea"/>
+                <a:cs typeface="+mn-cs"/>
+              </a:rPr>
+              <a:t>-Hellman generated key, as well as its hash values. Only then the VCM will send the encrypted file and hash values to the server key. The server key will decrypt the encrypted file and hash function using the </a:t>
+            </a:r>
+            <a:r>
+              <a:rPr lang="en-PH" sz="1200" kern="1200" dirty="0" err="1">
+                <a:solidFill>
+                  <a:schemeClr val="tx1"/>
+                </a:solidFill>
+                <a:effectLst/>
+                <a:latin typeface="+mn-lt"/>
+                <a:ea typeface="+mn-ea"/>
+                <a:cs typeface="+mn-cs"/>
+              </a:rPr>
+              <a:t>Diffie</a:t>
+            </a:r>
+            <a:r>
+              <a:rPr lang="en-PH" sz="1200" kern="1200" dirty="0">
+                <a:solidFill>
+                  <a:schemeClr val="tx1"/>
+                </a:solidFill>
+                <a:effectLst/>
+                <a:latin typeface="+mn-lt"/>
+                <a:ea typeface="+mn-ea"/>
+                <a:cs typeface="+mn-cs"/>
+              </a:rPr>
+              <a:t>-Hellman generated key and the public key of the VCM. Server key will then get the hash value of the file to check if the hash values are the same key. </a:t>
+            </a:r>
           </a:p>
         </p:txBody>
       </p:sp>
@@ -1363,7 +1331,7 @@
     </p:spTree>
     <p:extLst>
       <p:ext uri="{BB962C8B-B14F-4D97-AF65-F5344CB8AC3E}">
-        <p14:creationId xmlns:p14="http://schemas.microsoft.com/office/powerpoint/2010/main" val="425038557"/>
+        <p14:creationId xmlns:p14="http://schemas.microsoft.com/office/powerpoint/2010/main" val="2966215870"/>
       </p:ext>
     </p:extLst>
   </p:cSld>
@@ -1464,6 +1432,224 @@
             <a:fld id="{213B05C4-94C7-4412-9CB1-C9F207621576}" type="slidenum">
               <a:rPr lang="en-PH" smtClean="0"/>
               <a:t>17</a:t>
+            </a:fld>
+            <a:endParaRPr lang="en-PH"/>
+          </a:p>
+        </p:txBody>
+      </p:sp>
+    </p:spTree>
+    <p:extLst>
+      <p:ext uri="{BB962C8B-B14F-4D97-AF65-F5344CB8AC3E}">
+        <p14:creationId xmlns:p14="http://schemas.microsoft.com/office/powerpoint/2010/main" val="3902562114"/>
+      </p:ext>
+    </p:extLst>
+  </p:cSld>
+  <p:clrMapOvr>
+    <a:masterClrMapping/>
+  </p:clrMapOvr>
+</p:notes>
+</file>
+
+<file path=ppt/notesSlides/notesSlide17.xml><?xml version="1.0" encoding="utf-8"?>
+<p:notes xmlns:a="http://schemas.openxmlformats.org/drawingml/2006/main" xmlns:r="http://schemas.openxmlformats.org/officeDocument/2006/relationships" xmlns:p="http://schemas.openxmlformats.org/presentationml/2006/main">
+  <p:cSld>
+    <p:spTree>
+      <p:nvGrpSpPr>
+        <p:cNvPr id="1" name=""/>
+        <p:cNvGrpSpPr/>
+        <p:nvPr/>
+      </p:nvGrpSpPr>
+      <p:grpSpPr>
+        <a:xfrm>
+          <a:off x="0" y="0"/>
+          <a:ext cx="0" cy="0"/>
+          <a:chOff x="0" y="0"/>
+          <a:chExt cx="0" cy="0"/>
+        </a:xfrm>
+      </p:grpSpPr>
+      <p:sp>
+        <p:nvSpPr>
+          <p:cNvPr id="2" name="Slide Image Placeholder 1"/>
+          <p:cNvSpPr>
+            <a:spLocks noGrp="1" noRot="1" noChangeAspect="1"/>
+          </p:cNvSpPr>
+          <p:nvPr>
+            <p:ph type="sldImg"/>
+          </p:nvPr>
+        </p:nvSpPr>
+        <p:spPr/>
+      </p:sp>
+      <p:sp>
+        <p:nvSpPr>
+          <p:cNvPr id="3" name="Notes Placeholder 2"/>
+          <p:cNvSpPr>
+            <a:spLocks noGrp="1"/>
+          </p:cNvSpPr>
+          <p:nvPr>
+            <p:ph type="body" idx="1"/>
+          </p:nvPr>
+        </p:nvSpPr>
+        <p:spPr/>
+        <p:txBody>
+          <a:bodyPr/>
+          <a:lstStyle/>
+          <a:p>
+            <a:pPr marL="0" marR="0" lvl="0" indent="0" algn="l" defTabSz="914400" rtl="0" eaLnBrk="1" fontAlgn="auto" latinLnBrk="0" hangingPunct="1">
+              <a:lnSpc>
+                <a:spcPct val="100000"/>
+              </a:lnSpc>
+              <a:spcBef>
+                <a:spcPts val="0"/>
+              </a:spcBef>
+              <a:spcAft>
+                <a:spcPts val="0"/>
+              </a:spcAft>
+              <a:buClrTx/>
+              <a:buSzTx/>
+              <a:buFontTx/>
+              <a:buNone/>
+              <a:tabLst/>
+              <a:defRPr/>
+            </a:pPr>
+            <a:endParaRPr lang="en-PH" sz="1200" kern="1200" dirty="0">
+              <a:solidFill>
+                <a:schemeClr val="tx1"/>
+              </a:solidFill>
+              <a:effectLst/>
+              <a:latin typeface="+mn-lt"/>
+              <a:ea typeface="+mn-ea"/>
+              <a:cs typeface="+mn-cs"/>
+            </a:endParaRPr>
+          </a:p>
+        </p:txBody>
+      </p:sp>
+      <p:sp>
+        <p:nvSpPr>
+          <p:cNvPr id="4" name="Slide Number Placeholder 3"/>
+          <p:cNvSpPr>
+            <a:spLocks noGrp="1"/>
+          </p:cNvSpPr>
+          <p:nvPr>
+            <p:ph type="sldNum" sz="quarter" idx="10"/>
+          </p:nvPr>
+        </p:nvSpPr>
+        <p:spPr/>
+        <p:txBody>
+          <a:bodyPr/>
+          <a:lstStyle/>
+          <a:p>
+            <a:fld id="{213B05C4-94C7-4412-9CB1-C9F207621576}" type="slidenum">
+              <a:rPr lang="en-PH" smtClean="0"/>
+              <a:t>18</a:t>
+            </a:fld>
+            <a:endParaRPr lang="en-PH"/>
+          </a:p>
+        </p:txBody>
+      </p:sp>
+    </p:spTree>
+    <p:extLst>
+      <p:ext uri="{BB962C8B-B14F-4D97-AF65-F5344CB8AC3E}">
+        <p14:creationId xmlns:p14="http://schemas.microsoft.com/office/powerpoint/2010/main" val="425038557"/>
+      </p:ext>
+    </p:extLst>
+  </p:cSld>
+  <p:clrMapOvr>
+    <a:masterClrMapping/>
+  </p:clrMapOvr>
+</p:notes>
+</file>
+
+<file path=ppt/notesSlides/notesSlide18.xml><?xml version="1.0" encoding="utf-8"?>
+<p:notes xmlns:a="http://schemas.openxmlformats.org/drawingml/2006/main" xmlns:r="http://schemas.openxmlformats.org/officeDocument/2006/relationships" xmlns:p="http://schemas.openxmlformats.org/presentationml/2006/main">
+  <p:cSld>
+    <p:spTree>
+      <p:nvGrpSpPr>
+        <p:cNvPr id="1" name=""/>
+        <p:cNvGrpSpPr/>
+        <p:nvPr/>
+      </p:nvGrpSpPr>
+      <p:grpSpPr>
+        <a:xfrm>
+          <a:off x="0" y="0"/>
+          <a:ext cx="0" cy="0"/>
+          <a:chOff x="0" y="0"/>
+          <a:chExt cx="0" cy="0"/>
+        </a:xfrm>
+      </p:grpSpPr>
+      <p:sp>
+        <p:nvSpPr>
+          <p:cNvPr id="2" name="Slide Image Placeholder 1"/>
+          <p:cNvSpPr>
+            <a:spLocks noGrp="1" noRot="1" noChangeAspect="1"/>
+          </p:cNvSpPr>
+          <p:nvPr>
+            <p:ph type="sldImg"/>
+          </p:nvPr>
+        </p:nvSpPr>
+        <p:spPr/>
+      </p:sp>
+      <p:sp>
+        <p:nvSpPr>
+          <p:cNvPr id="3" name="Notes Placeholder 2"/>
+          <p:cNvSpPr>
+            <a:spLocks noGrp="1"/>
+          </p:cNvSpPr>
+          <p:nvPr>
+            <p:ph type="body" idx="1"/>
+          </p:nvPr>
+        </p:nvSpPr>
+        <p:spPr/>
+        <p:txBody>
+          <a:bodyPr/>
+          <a:lstStyle/>
+          <a:p>
+            <a:pPr marL="0" marR="0" lvl="0" indent="0" algn="l" defTabSz="914400" rtl="0" eaLnBrk="1" fontAlgn="auto" latinLnBrk="0" hangingPunct="1">
+              <a:lnSpc>
+                <a:spcPct val="100000"/>
+              </a:lnSpc>
+              <a:spcBef>
+                <a:spcPts val="0"/>
+              </a:spcBef>
+              <a:spcAft>
+                <a:spcPts val="0"/>
+              </a:spcAft>
+              <a:buClrTx/>
+              <a:buSzTx/>
+              <a:buFontTx/>
+              <a:buNone/>
+              <a:tabLst/>
+              <a:defRPr/>
+            </a:pPr>
+            <a:endParaRPr lang="en-PH" sz="1200" kern="1200" dirty="0">
+              <a:solidFill>
+                <a:schemeClr val="tx1"/>
+              </a:solidFill>
+              <a:effectLst/>
+              <a:latin typeface="+mn-lt"/>
+              <a:ea typeface="+mn-ea"/>
+              <a:cs typeface="+mn-cs"/>
+            </a:endParaRPr>
+          </a:p>
+        </p:txBody>
+      </p:sp>
+      <p:sp>
+        <p:nvSpPr>
+          <p:cNvPr id="4" name="Slide Number Placeholder 3"/>
+          <p:cNvSpPr>
+            <a:spLocks noGrp="1"/>
+          </p:cNvSpPr>
+          <p:nvPr>
+            <p:ph type="sldNum" sz="quarter" idx="10"/>
+          </p:nvPr>
+        </p:nvSpPr>
+        <p:spPr/>
+        <p:txBody>
+          <a:bodyPr/>
+          <a:lstStyle/>
+          <a:p>
+            <a:fld id="{213B05C4-94C7-4412-9CB1-C9F207621576}" type="slidenum">
+              <a:rPr lang="en-PH" smtClean="0"/>
+              <a:t>19</a:t>
             </a:fld>
             <a:endParaRPr lang="en-PH"/>
           </a:p>
@@ -1618,16 +1804,10 @@
           <a:bodyPr/>
           <a:lstStyle/>
           <a:p>
-            <a:pPr marL="457200" lvl="1" indent="0" algn="ctr">
-              <a:buNone/>
-            </a:pPr>
-            <a:r>
-              <a:rPr lang="en-PH" sz="3200" dirty="0"/>
-              <a:t>How can the Philippine automated election system eliminate the possibility of unofficial servers to secure the transmission of election returns on the server-level?</a:t>
-            </a:r>
-          </a:p>
-          <a:p>
-            <a:endParaRPr lang="en-PH" dirty="0"/>
+            <a:r>
+              <a:rPr lang="en-PH" dirty="0"/>
+              <a:t>Joanna</a:t>
+            </a:r>
           </a:p>
         </p:txBody>
       </p:sp>
@@ -1657,7 +1837,7 @@
     </p:spTree>
     <p:extLst>
       <p:ext uri="{BB962C8B-B14F-4D97-AF65-F5344CB8AC3E}">
-        <p14:creationId xmlns:p14="http://schemas.microsoft.com/office/powerpoint/2010/main" val="2527699601"/>
+        <p14:creationId xmlns:p14="http://schemas.microsoft.com/office/powerpoint/2010/main" val="4045068045"/>
       </p:ext>
     </p:extLst>
   </p:cSld>
@@ -1712,46 +1892,9 @@
           <a:lstStyle/>
           <a:p>
             <a:r>
-              <a:rPr lang="en-PH" dirty="0"/>
-              <a:t>General Objectives</a:t>
-            </a:r>
-          </a:p>
-          <a:p>
-            <a:pPr lvl="1"/>
-            <a:r>
-              <a:rPr lang="en-PH" dirty="0"/>
-              <a:t>To know the issues present in the transmission of the votes</a:t>
-            </a:r>
-          </a:p>
-          <a:p>
-            <a:pPr lvl="1"/>
-            <a:r>
-              <a:rPr lang="en-PH" dirty="0"/>
-              <a:t>To propose a system that would prevent electoral fraud in the transmission of votes in the automated election system</a:t>
-            </a:r>
-          </a:p>
-          <a:p>
-            <a:r>
-              <a:rPr lang="en-PH" dirty="0"/>
-              <a:t>Specific Objectives</a:t>
-            </a:r>
-          </a:p>
-          <a:p>
-            <a:pPr lvl="1"/>
-            <a:r>
-              <a:rPr lang="en-PH" dirty="0"/>
-              <a:t>To provide a technical solution that would verify the authenticity of the servers and VCMs through the use of a public key infrastructure and </a:t>
-            </a:r>
-            <a:r>
               <a:rPr lang="en-PH" dirty="0" err="1"/>
-              <a:t>Diffie</a:t>
-            </a:r>
-            <a:r>
-              <a:rPr lang="en-PH" dirty="0"/>
-              <a:t>-Hellman algorithm as security mechanisms for the automated election system</a:t>
-            </a:r>
-          </a:p>
-          <a:p>
+              <a:t>Mikha</a:t>
+            </a:r>
             <a:endParaRPr lang="en-PH" dirty="0"/>
           </a:p>
         </p:txBody>
@@ -1782,7 +1925,7 @@
     </p:spTree>
     <p:extLst>
       <p:ext uri="{BB962C8B-B14F-4D97-AF65-F5344CB8AC3E}">
-        <p14:creationId xmlns:p14="http://schemas.microsoft.com/office/powerpoint/2010/main" val="2292345644"/>
+        <p14:creationId xmlns:p14="http://schemas.microsoft.com/office/powerpoint/2010/main" val="3616176005"/>
       </p:ext>
     </p:extLst>
   </p:cSld>
@@ -1836,14 +1979,15 @@
           <a:bodyPr/>
           <a:lstStyle/>
           <a:p>
-            <a:r>
-              <a:rPr lang="en-PH" dirty="0"/>
-              <a:t>The study would benefit the</a:t>
-            </a:r>
-            <a:r>
-              <a:rPr lang="en-PH" baseline="0" dirty="0"/>
-              <a:t> citizens of the Philippines by protecting their democracy through ensuring the security of their casted votes. It would also benefit the COMELEC by helping achieve the goal of having a transparent and credible election in the country. And last but not the least, the future researchers who would want to pursue the prospect of automated election system. This study will serve as their guide to advance their studies as well.</a:t>
-            </a:r>
+            <a:pPr marL="457200" lvl="1" indent="0" algn="ctr">
+              <a:buNone/>
+            </a:pPr>
+            <a:r>
+              <a:rPr lang="en-PH" sz="3200" dirty="0"/>
+              <a:t>How can the Philippine automated election system eliminate the possibility of unofficial servers to secure the transmission of election returns on the server-level?</a:t>
+            </a:r>
+          </a:p>
+          <a:p>
             <a:endParaRPr lang="en-PH" dirty="0"/>
           </a:p>
         </p:txBody>
@@ -1874,7 +2018,7 @@
     </p:spTree>
     <p:extLst>
       <p:ext uri="{BB962C8B-B14F-4D97-AF65-F5344CB8AC3E}">
-        <p14:creationId xmlns:p14="http://schemas.microsoft.com/office/powerpoint/2010/main" val="3921709507"/>
+        <p14:creationId xmlns:p14="http://schemas.microsoft.com/office/powerpoint/2010/main" val="2527699601"/>
       </p:ext>
     </p:extLst>
   </p:cSld>
@@ -1929,17 +2073,47 @@
           <a:lstStyle/>
           <a:p>
             <a:r>
-              <a:rPr lang="en-PH" sz="1200" kern="1200" dirty="0">
-                <a:solidFill>
-                  <a:schemeClr val="tx1"/>
-                </a:solidFill>
-                <a:effectLst/>
-                <a:latin typeface="+mn-lt"/>
-                <a:ea typeface="+mn-ea"/>
-                <a:cs typeface="+mn-cs"/>
-              </a:rPr>
-              <a:t>The scope of the study would only include the issues and possible solutions for the security of the transmission of election returns on the server-level of the automated election system in the Philippines. Solutions for the issues present prior and subsequent the transmission of the election returns will not be provided in this study. The focus of the research will only be upon the elimination of transmission of election returns to unofficial servers as well as the validity of election returns being received. Further study on the other parts of the automated election system will no longer be covered.</a:t>
-            </a:r>
+              <a:rPr lang="en-PH" dirty="0"/>
+              <a:t>General Objectives</a:t>
+            </a:r>
+          </a:p>
+          <a:p>
+            <a:pPr lvl="1"/>
+            <a:r>
+              <a:rPr lang="en-PH" dirty="0"/>
+              <a:t>To know the issues present in the transmission of the votes</a:t>
+            </a:r>
+          </a:p>
+          <a:p>
+            <a:pPr lvl="1"/>
+            <a:r>
+              <a:rPr lang="en-PH" dirty="0"/>
+              <a:t>To propose a system that would prevent electoral fraud in the transmission of votes in the automated election system</a:t>
+            </a:r>
+          </a:p>
+          <a:p>
+            <a:r>
+              <a:rPr lang="en-PH" dirty="0"/>
+              <a:t>Specific Objectives</a:t>
+            </a:r>
+          </a:p>
+          <a:p>
+            <a:pPr lvl="1"/>
+            <a:r>
+              <a:rPr lang="en-PH" dirty="0"/>
+              <a:t>To provide a technical solution that would verify the authenticity of the servers and VCMs through the use of a public key infrastructure and </a:t>
+            </a:r>
+            <a:r>
+              <a:rPr lang="en-PH" dirty="0" err="1"/>
+              <a:t>Diffie</a:t>
+            </a:r>
+            <a:r>
+              <a:rPr lang="en-PH" dirty="0"/>
+              <a:t>-Hellman algorithm as security mechanisms for the automated election system</a:t>
+            </a:r>
+          </a:p>
+          <a:p>
+            <a:endParaRPr lang="en-PH" dirty="0"/>
           </a:p>
         </p:txBody>
       </p:sp>
@@ -1958,7 +2132,7 @@
           <a:bodyPr/>
           <a:lstStyle/>
           <a:p>
-            <a:fld id="{213B05C4-94C7-4412-9CB1-C9F207621576}" type="slidenum">
+            <a:fld id="{86FFBDB5-9589-48C5-8577-C15F048505D7}" type="slidenum">
               <a:rPr lang="en-PH" smtClean="0"/>
               <a:t>7</a:t>
             </a:fld>
@@ -1969,7 +2143,7 @@
     </p:spTree>
     <p:extLst>
       <p:ext uri="{BB962C8B-B14F-4D97-AF65-F5344CB8AC3E}">
-        <p14:creationId xmlns:p14="http://schemas.microsoft.com/office/powerpoint/2010/main" val="1262949092"/>
+        <p14:creationId xmlns:p14="http://schemas.microsoft.com/office/powerpoint/2010/main" val="2292345644"/>
       </p:ext>
     </p:extLst>
   </p:cSld>
@@ -2023,15 +2197,15 @@
           <a:bodyPr/>
           <a:lstStyle/>
           <a:p>
-            <a:endParaRPr lang="en-PH" sz="1200" kern="1200" dirty="0">
-              <a:solidFill>
-                <a:schemeClr val="tx1"/>
-              </a:solidFill>
-              <a:effectLst/>
-              <a:latin typeface="+mn-lt"/>
-              <a:ea typeface="+mn-ea"/>
-              <a:cs typeface="+mn-cs"/>
-            </a:endParaRPr>
+            <a:r>
+              <a:rPr lang="en-PH" dirty="0"/>
+              <a:t>The study would benefit the</a:t>
+            </a:r>
+            <a:r>
+              <a:rPr lang="en-PH" baseline="0" dirty="0"/>
+              <a:t> citizens of the Philippines by protecting their democracy through ensuring the security of their casted votes. It would also benefit the COMELEC by helping achieve the goal of having a transparent and credible election in the country. And last but not the least, the future researchers who would want to pursue the prospect of automated election system. This study will serve as their guide to advance their studies as well.</a:t>
+            </a:r>
+            <a:endParaRPr lang="en-PH" dirty="0"/>
           </a:p>
         </p:txBody>
       </p:sp>
@@ -2050,7 +2224,7 @@
           <a:bodyPr/>
           <a:lstStyle/>
           <a:p>
-            <a:fld id="{213B05C4-94C7-4412-9CB1-C9F207621576}" type="slidenum">
+            <a:fld id="{86FFBDB5-9589-48C5-8577-C15F048505D7}" type="slidenum">
               <a:rPr lang="en-PH" smtClean="0"/>
               <a:t>8</a:t>
             </a:fld>
@@ -2061,7 +2235,7 @@
     </p:spTree>
     <p:extLst>
       <p:ext uri="{BB962C8B-B14F-4D97-AF65-F5344CB8AC3E}">
-        <p14:creationId xmlns:p14="http://schemas.microsoft.com/office/powerpoint/2010/main" val="1602568077"/>
+        <p14:creationId xmlns:p14="http://schemas.microsoft.com/office/powerpoint/2010/main" val="3921709507"/>
       </p:ext>
     </p:extLst>
   </p:cSld>
@@ -2115,15 +2289,18 @@
           <a:bodyPr/>
           <a:lstStyle/>
           <a:p>
-            <a:endParaRPr lang="en-PH" sz="1200" kern="1200" dirty="0">
-              <a:solidFill>
-                <a:schemeClr val="tx1"/>
-              </a:solidFill>
-              <a:effectLst/>
-              <a:latin typeface="+mn-lt"/>
-              <a:ea typeface="+mn-ea"/>
-              <a:cs typeface="+mn-cs"/>
-            </a:endParaRPr>
+            <a:r>
+              <a:rPr lang="en-PH" sz="1200" kern="1200" dirty="0">
+                <a:solidFill>
+                  <a:schemeClr val="tx1"/>
+                </a:solidFill>
+                <a:effectLst/>
+                <a:latin typeface="+mn-lt"/>
+                <a:ea typeface="+mn-ea"/>
+                <a:cs typeface="+mn-cs"/>
+              </a:rPr>
+              <a:t>The scope of the study would only include the issues and possible solutions for the security of the transmission of election returns on the server-level of the automated election system in the Philippines. Solutions for the issues present prior and subsequent the transmission of the election returns will not be provided in this study. The focus of the research will only be upon the elimination of transmission of election returns to unofficial servers as well as the validity of election returns being received. Further study on the other parts of the automated election system will no longer be covered.</a:t>
+            </a:r>
           </a:p>
         </p:txBody>
       </p:sp>
@@ -2153,7 +2330,7 @@
     </p:spTree>
     <p:extLst>
       <p:ext uri="{BB962C8B-B14F-4D97-AF65-F5344CB8AC3E}">
-        <p14:creationId xmlns:p14="http://schemas.microsoft.com/office/powerpoint/2010/main" val="1197368536"/>
+        <p14:creationId xmlns:p14="http://schemas.microsoft.com/office/powerpoint/2010/main" val="1262949092"/>
       </p:ext>
     </p:extLst>
   </p:cSld>
@@ -2245,7 +2422,7 @@
     </p:spTree>
     <p:extLst>
       <p:ext uri="{BB962C8B-B14F-4D97-AF65-F5344CB8AC3E}">
-        <p14:creationId xmlns:p14="http://schemas.microsoft.com/office/powerpoint/2010/main" val="1153255828"/>
+        <p14:creationId xmlns:p14="http://schemas.microsoft.com/office/powerpoint/2010/main" val="1602568077"/>
       </p:ext>
     </p:extLst>
   </p:cSld>
@@ -5288,7 +5465,7 @@
           <a:p>
             <a:r>
               <a:rPr lang="en-PH" dirty="0"/>
-              <a:t>Theoretical Background</a:t>
+              <a:t>Related Literature</a:t>
             </a:r>
           </a:p>
         </p:txBody>
@@ -5375,7 +5552,7 @@
     </p:spTree>
     <p:extLst>
       <p:ext uri="{BB962C8B-B14F-4D97-AF65-F5344CB8AC3E}">
-        <p14:creationId xmlns:p14="http://schemas.microsoft.com/office/powerpoint/2010/main" val="3420978495"/>
+        <p14:creationId xmlns:p14="http://schemas.microsoft.com/office/powerpoint/2010/main" val="3941628008"/>
       </p:ext>
     </p:extLst>
   </p:cSld>
@@ -5419,7 +5596,7 @@
           <a:p>
             <a:r>
               <a:rPr lang="en-PH" dirty="0"/>
-              <a:t>Proposed Solution to the Problem</a:t>
+              <a:t>Related Study</a:t>
             </a:r>
           </a:p>
         </p:txBody>
@@ -5438,44 +5615,6 @@
         <p:txBody>
           <a:bodyPr/>
           <a:lstStyle/>
-          <a:p>
-            <a:r>
-              <a:rPr lang="en-PH" dirty="0"/>
-              <a:t>Current system only provides a hash value to secure data integrity</a:t>
-            </a:r>
-          </a:p>
-          <a:p>
-            <a:r>
-              <a:rPr lang="en-PH" dirty="0"/>
-              <a:t>It is possible for unofficial servers to be part of the transmission</a:t>
-            </a:r>
-          </a:p>
-          <a:p>
-            <a:r>
-              <a:rPr lang="en-PH" dirty="0"/>
-              <a:t>By using a public key infrastructure and </a:t>
-            </a:r>
-            <a:r>
-              <a:rPr lang="en-PH" dirty="0" err="1"/>
-              <a:t>Diffie</a:t>
-            </a:r>
-            <a:r>
-              <a:rPr lang="en-PH" dirty="0"/>
-              <a:t>-Hellman algorithm</a:t>
-            </a:r>
-          </a:p>
-          <a:p>
-            <a:r>
-              <a:rPr lang="en-PH" dirty="0"/>
-              <a:t>The authenticity of the servers and VCMs will be addressed</a:t>
-            </a:r>
-          </a:p>
-          <a:p>
-            <a:r>
-              <a:rPr lang="en-PH" dirty="0"/>
-              <a:t>But how?</a:t>
-            </a:r>
-          </a:p>
           <a:p>
             <a:endParaRPr lang="en-PH" dirty="0"/>
           </a:p>
@@ -5544,6 +5683,306 @@
     </p:spTree>
     <p:extLst>
       <p:ext uri="{BB962C8B-B14F-4D97-AF65-F5344CB8AC3E}">
+        <p14:creationId xmlns:p14="http://schemas.microsoft.com/office/powerpoint/2010/main" val="2339671285"/>
+      </p:ext>
+    </p:extLst>
+  </p:cSld>
+  <p:clrMapOvr>
+    <a:masterClrMapping/>
+  </p:clrMapOvr>
+</p:sld>
+</file>
+
+<file path=ppt/slides/slide12.xml><?xml version="1.0" encoding="utf-8"?>
+<p:sld xmlns:a="http://schemas.openxmlformats.org/drawingml/2006/main" xmlns:r="http://schemas.openxmlformats.org/officeDocument/2006/relationships" xmlns:p="http://schemas.openxmlformats.org/presentationml/2006/main">
+  <p:cSld>
+    <p:spTree>
+      <p:nvGrpSpPr>
+        <p:cNvPr id="1" name=""/>
+        <p:cNvGrpSpPr/>
+        <p:nvPr/>
+      </p:nvGrpSpPr>
+      <p:grpSpPr>
+        <a:xfrm>
+          <a:off x="0" y="0"/>
+          <a:ext cx="0" cy="0"/>
+          <a:chOff x="0" y="0"/>
+          <a:chExt cx="0" cy="0"/>
+        </a:xfrm>
+      </p:grpSpPr>
+      <p:sp>
+        <p:nvSpPr>
+          <p:cNvPr id="2" name="Title 1"/>
+          <p:cNvSpPr>
+            <a:spLocks noGrp="1"/>
+          </p:cNvSpPr>
+          <p:nvPr>
+            <p:ph type="title"/>
+          </p:nvPr>
+        </p:nvSpPr>
+        <p:spPr/>
+        <p:txBody>
+          <a:bodyPr/>
+          <a:lstStyle/>
+          <a:p>
+            <a:r>
+              <a:rPr lang="en-PH" dirty="0"/>
+              <a:t>Theoretical Background</a:t>
+            </a:r>
+          </a:p>
+        </p:txBody>
+      </p:sp>
+      <p:sp>
+        <p:nvSpPr>
+          <p:cNvPr id="3" name="Content Placeholder 2"/>
+          <p:cNvSpPr>
+            <a:spLocks noGrp="1"/>
+          </p:cNvSpPr>
+          <p:nvPr>
+            <p:ph idx="1"/>
+          </p:nvPr>
+        </p:nvSpPr>
+        <p:spPr/>
+        <p:txBody>
+          <a:bodyPr/>
+          <a:lstStyle/>
+          <a:p>
+            <a:endParaRPr lang="en-PH" dirty="0"/>
+          </a:p>
+        </p:txBody>
+      </p:sp>
+      <p:pic>
+        <p:nvPicPr>
+          <p:cNvPr id="4" name="Picture 3"/>
+          <p:cNvPicPr>
+            <a:picLocks noChangeAspect="1"/>
+          </p:cNvPicPr>
+          <p:nvPr/>
+        </p:nvPicPr>
+        <p:blipFill>
+          <a:blip r:embed="rId3">
+            <a:extLst>
+              <a:ext uri="{28A0092B-C50C-407E-A947-70E740481C1C}">
+                <a14:useLocalDpi xmlns:a14="http://schemas.microsoft.com/office/drawing/2010/main" val="0"/>
+              </a:ext>
+            </a:extLst>
+          </a:blip>
+          <a:stretch>
+            <a:fillRect/>
+          </a:stretch>
+        </p:blipFill>
+        <p:spPr>
+          <a:xfrm>
+            <a:off x="10595595" y="4723195"/>
+            <a:ext cx="2435221" cy="2435221"/>
+          </a:xfrm>
+          <a:prstGeom prst="rect">
+            <a:avLst/>
+          </a:prstGeom>
+        </p:spPr>
+      </p:pic>
+      <p:pic>
+        <p:nvPicPr>
+          <p:cNvPr id="5" name="Picture 4"/>
+          <p:cNvPicPr>
+            <a:picLocks noChangeAspect="1"/>
+          </p:cNvPicPr>
+          <p:nvPr/>
+        </p:nvPicPr>
+        <p:blipFill>
+          <a:blip r:embed="rId4" cstate="hqprint">
+            <a:extLst>
+              <a:ext uri="{28A0092B-C50C-407E-A947-70E740481C1C}">
+                <a14:useLocalDpi xmlns:a14="http://schemas.microsoft.com/office/drawing/2010/main" val="0"/>
+              </a:ext>
+            </a:extLst>
+          </a:blip>
+          <a:stretch>
+            <a:fillRect/>
+          </a:stretch>
+        </p:blipFill>
+        <p:spPr>
+          <a:xfrm>
+            <a:off x="10045148" y="3917853"/>
+            <a:ext cx="1610683" cy="1610683"/>
+          </a:xfrm>
+          <a:prstGeom prst="rect">
+            <a:avLst/>
+          </a:prstGeom>
+        </p:spPr>
+      </p:pic>
+    </p:spTree>
+    <p:extLst>
+      <p:ext uri="{BB962C8B-B14F-4D97-AF65-F5344CB8AC3E}">
+        <p14:creationId xmlns:p14="http://schemas.microsoft.com/office/powerpoint/2010/main" val="3420978495"/>
+      </p:ext>
+    </p:extLst>
+  </p:cSld>
+  <p:clrMapOvr>
+    <a:masterClrMapping/>
+  </p:clrMapOvr>
+</p:sld>
+</file>
+
+<file path=ppt/slides/slide13.xml><?xml version="1.0" encoding="utf-8"?>
+<p:sld xmlns:a="http://schemas.openxmlformats.org/drawingml/2006/main" xmlns:r="http://schemas.openxmlformats.org/officeDocument/2006/relationships" xmlns:p="http://schemas.openxmlformats.org/presentationml/2006/main">
+  <p:cSld>
+    <p:spTree>
+      <p:nvGrpSpPr>
+        <p:cNvPr id="1" name=""/>
+        <p:cNvGrpSpPr/>
+        <p:nvPr/>
+      </p:nvGrpSpPr>
+      <p:grpSpPr>
+        <a:xfrm>
+          <a:off x="0" y="0"/>
+          <a:ext cx="0" cy="0"/>
+          <a:chOff x="0" y="0"/>
+          <a:chExt cx="0" cy="0"/>
+        </a:xfrm>
+      </p:grpSpPr>
+      <p:sp>
+        <p:nvSpPr>
+          <p:cNvPr id="2" name="Title 1"/>
+          <p:cNvSpPr>
+            <a:spLocks noGrp="1"/>
+          </p:cNvSpPr>
+          <p:nvPr>
+            <p:ph type="title"/>
+          </p:nvPr>
+        </p:nvSpPr>
+        <p:spPr/>
+        <p:txBody>
+          <a:bodyPr/>
+          <a:lstStyle/>
+          <a:p>
+            <a:r>
+              <a:rPr lang="en-PH" dirty="0"/>
+              <a:t>Proposed Solution to the Problem</a:t>
+            </a:r>
+          </a:p>
+        </p:txBody>
+      </p:sp>
+      <p:sp>
+        <p:nvSpPr>
+          <p:cNvPr id="3" name="Content Placeholder 2"/>
+          <p:cNvSpPr>
+            <a:spLocks noGrp="1"/>
+          </p:cNvSpPr>
+          <p:nvPr>
+            <p:ph idx="1"/>
+          </p:nvPr>
+        </p:nvSpPr>
+        <p:spPr/>
+        <p:txBody>
+          <a:bodyPr/>
+          <a:lstStyle/>
+          <a:p>
+            <a:r>
+              <a:rPr lang="en-PH" dirty="0"/>
+              <a:t>Current system only provides a hash value to secure data integrity</a:t>
+            </a:r>
+          </a:p>
+          <a:p>
+            <a:r>
+              <a:rPr lang="en-PH" dirty="0"/>
+              <a:t>It is possible for unofficial servers to be part of the transmission</a:t>
+            </a:r>
+          </a:p>
+          <a:p>
+            <a:r>
+              <a:rPr lang="en-PH" dirty="0"/>
+              <a:t>By using a public key infrastructure and </a:t>
+            </a:r>
+            <a:r>
+              <a:rPr lang="en-PH" dirty="0" err="1"/>
+              <a:t>Diffie</a:t>
+            </a:r>
+            <a:r>
+              <a:rPr lang="en-PH" dirty="0"/>
+              <a:t>-Hellman algorithm</a:t>
+            </a:r>
+          </a:p>
+          <a:p>
+            <a:r>
+              <a:rPr lang="en-PH" dirty="0"/>
+              <a:t>The authenticity of the servers and VCMs will be addressed</a:t>
+            </a:r>
+          </a:p>
+          <a:p>
+            <a:r>
+              <a:rPr lang="en-PH" dirty="0"/>
+              <a:t>But how?</a:t>
+            </a:r>
+          </a:p>
+          <a:p>
+            <a:endParaRPr lang="en-PH" dirty="0"/>
+          </a:p>
+        </p:txBody>
+      </p:sp>
+      <p:pic>
+        <p:nvPicPr>
+          <p:cNvPr id="4" name="Picture 3"/>
+          <p:cNvPicPr>
+            <a:picLocks noChangeAspect="1"/>
+          </p:cNvPicPr>
+          <p:nvPr/>
+        </p:nvPicPr>
+        <p:blipFill>
+          <a:blip r:embed="rId3">
+            <a:extLst>
+              <a:ext uri="{28A0092B-C50C-407E-A947-70E740481C1C}">
+                <a14:useLocalDpi xmlns:a14="http://schemas.microsoft.com/office/drawing/2010/main" val="0"/>
+              </a:ext>
+            </a:extLst>
+          </a:blip>
+          <a:stretch>
+            <a:fillRect/>
+          </a:stretch>
+        </p:blipFill>
+        <p:spPr>
+          <a:xfrm>
+            <a:off x="10595595" y="4723195"/>
+            <a:ext cx="2435221" cy="2435221"/>
+          </a:xfrm>
+          <a:prstGeom prst="rect">
+            <a:avLst/>
+          </a:prstGeom>
+        </p:spPr>
+      </p:pic>
+      <p:pic>
+        <p:nvPicPr>
+          <p:cNvPr id="5" name="Picture 4"/>
+          <p:cNvPicPr>
+            <a:picLocks noChangeAspect="1"/>
+          </p:cNvPicPr>
+          <p:nvPr/>
+        </p:nvPicPr>
+        <p:blipFill>
+          <a:blip r:embed="rId4" cstate="hqprint">
+            <a:extLst>
+              <a:ext uri="{28A0092B-C50C-407E-A947-70E740481C1C}">
+                <a14:useLocalDpi xmlns:a14="http://schemas.microsoft.com/office/drawing/2010/main" val="0"/>
+              </a:ext>
+            </a:extLst>
+          </a:blip>
+          <a:stretch>
+            <a:fillRect/>
+          </a:stretch>
+        </p:blipFill>
+        <p:spPr>
+          <a:xfrm>
+            <a:off x="10045148" y="3917853"/>
+            <a:ext cx="1610683" cy="1610683"/>
+          </a:xfrm>
+          <a:prstGeom prst="rect">
+            <a:avLst/>
+          </a:prstGeom>
+        </p:spPr>
+      </p:pic>
+    </p:spTree>
+    <p:extLst>
+      <p:ext uri="{BB962C8B-B14F-4D97-AF65-F5344CB8AC3E}">
         <p14:creationId xmlns:p14="http://schemas.microsoft.com/office/powerpoint/2010/main" val="3984246945"/>
       </p:ext>
     </p:extLst>
@@ -5554,7 +5993,7 @@
 </p:sld>
 </file>
 
-<file path=ppt/slides/slide12.xml><?xml version="1.0" encoding="utf-8"?>
+<file path=ppt/slides/slide14.xml><?xml version="1.0" encoding="utf-8"?>
 <p:sld xmlns:a="http://schemas.openxmlformats.org/drawingml/2006/main" xmlns:r="http://schemas.openxmlformats.org/officeDocument/2006/relationships" xmlns:p="http://schemas.openxmlformats.org/presentationml/2006/main">
   <p:cSld>
     <p:spTree>
@@ -5872,7 +6311,7 @@
 </p:sld>
 </file>
 
-<file path=ppt/slides/slide13.xml><?xml version="1.0" encoding="utf-8"?>
+<file path=ppt/slides/slide15.xml><?xml version="1.0" encoding="utf-8"?>
 <p:sld xmlns:a="http://schemas.openxmlformats.org/drawingml/2006/main" xmlns:r="http://schemas.openxmlformats.org/officeDocument/2006/relationships" xmlns:p="http://schemas.openxmlformats.org/presentationml/2006/main">
   <p:cSld>
     <p:spTree>
@@ -6050,7 +6489,7 @@
 </p:sld>
 </file>
 
-<file path=ppt/slides/slide14.xml><?xml version="1.0" encoding="utf-8"?>
+<file path=ppt/slides/slide16.xml><?xml version="1.0" encoding="utf-8"?>
 <p:sld xmlns:a="http://schemas.openxmlformats.org/drawingml/2006/main" xmlns:r="http://schemas.openxmlformats.org/officeDocument/2006/relationships" xmlns:p="http://schemas.openxmlformats.org/presentationml/2006/main">
   <p:cSld>
     <p:spTree>
@@ -6181,7 +6620,7 @@
 </p:sld>
 </file>
 
-<file path=ppt/slides/slide15.xml><?xml version="1.0" encoding="utf-8"?>
+<file path=ppt/slides/slide17.xml><?xml version="1.0" encoding="utf-8"?>
 <p:sld xmlns:a="http://schemas.openxmlformats.org/drawingml/2006/main" xmlns:r="http://schemas.openxmlformats.org/officeDocument/2006/relationships" xmlns:p="http://schemas.openxmlformats.org/presentationml/2006/main">
   <p:cSld>
     <p:spTree>
@@ -6312,7 +6751,7 @@
 </p:sld>
 </file>
 
-<file path=ppt/slides/slide16.xml><?xml version="1.0" encoding="utf-8"?>
+<file path=ppt/slides/slide18.xml><?xml version="1.0" encoding="utf-8"?>
 <p:sld xmlns:a="http://schemas.openxmlformats.org/drawingml/2006/main" xmlns:r="http://schemas.openxmlformats.org/officeDocument/2006/relationships" xmlns:p="http://schemas.openxmlformats.org/presentationml/2006/main">
   <p:cSld>
     <p:spTree>
@@ -7577,7 +8016,7 @@
 </p:sld>
 </file>
 
-<file path=ppt/slides/slide17.xml><?xml version="1.0" encoding="utf-8"?>
+<file path=ppt/slides/slide19.xml><?xml version="1.0" encoding="utf-8"?>
 <p:sld xmlns:a="http://schemas.openxmlformats.org/drawingml/2006/main" xmlns:r="http://schemas.openxmlformats.org/officeDocument/2006/relationships" xmlns:p="http://schemas.openxmlformats.org/presentationml/2006/main">
   <p:cSld>
     <p:spTree>
@@ -7938,6 +8377,56 @@
           <a:bodyPr/>
           <a:lstStyle/>
           <a:p>
+            <a:r>
+              <a:rPr lang="en-PH" dirty="0"/>
+              <a:t>Once the poll closes, VCM sends ERs to three official servers:</a:t>
+            </a:r>
+          </a:p>
+          <a:p>
+            <a:r>
+              <a:rPr lang="en-PH" dirty="0"/>
+              <a:t>However, in the 2016 Presidential Election, there was a fourth.</a:t>
+            </a:r>
+          </a:p>
+          <a:p>
+            <a:r>
+              <a:rPr lang="en-PH" dirty="0"/>
+              <a:t>It was unofficial and had not undergone source code review.</a:t>
+            </a:r>
+          </a:p>
+          <a:p>
+            <a:r>
+              <a:rPr lang="en-PH" dirty="0"/>
+              <a:t>Moreover, there had also been an issue on the ERs’ integrity.</a:t>
+            </a:r>
+          </a:p>
+          <a:p>
+            <a:r>
+              <a:rPr lang="en-PH" dirty="0"/>
+              <a:t>MD5 was used by the </a:t>
+            </a:r>
+            <a:r>
+              <a:rPr lang="en-PH" dirty="0" err="1"/>
+              <a:t>Smartmatic</a:t>
+            </a:r>
+            <a:r>
+              <a:rPr lang="en-PH" dirty="0"/>
+              <a:t> last election.</a:t>
+            </a:r>
+          </a:p>
+          <a:p>
+            <a:r>
+              <a:rPr lang="en-PH" dirty="0"/>
+              <a:t>IT experts claim that </a:t>
+            </a:r>
+            <a:r>
+              <a:rPr lang="en-PH"/>
+              <a:t>MD5 is </a:t>
+            </a:r>
+            <a:r>
+              <a:rPr lang="en-PH" dirty="0"/>
+              <a:t>questionable on securing the data</a:t>
+            </a:r>
             <a:endParaRPr lang="en-PH" dirty="0"/>
           </a:p>
         </p:txBody>
@@ -8034,6 +8523,44 @@
       </p:grpSpPr>
       <p:sp>
         <p:nvSpPr>
+          <p:cNvPr id="15" name="Oval 14"/>
+          <p:cNvSpPr/>
+          <p:nvPr/>
+        </p:nvSpPr>
+        <p:spPr>
+          <a:xfrm>
+            <a:off x="6612115" y="-124434"/>
+            <a:ext cx="5066657" cy="5066657"/>
+          </a:xfrm>
+          <a:prstGeom prst="ellipse">
+            <a:avLst/>
+          </a:prstGeom>
+        </p:spPr>
+        <p:style>
+          <a:lnRef idx="1">
+            <a:schemeClr val="accent3"/>
+          </a:lnRef>
+          <a:fillRef idx="3">
+            <a:schemeClr val="accent3"/>
+          </a:fillRef>
+          <a:effectRef idx="2">
+            <a:schemeClr val="accent3"/>
+          </a:effectRef>
+          <a:fontRef idx="minor">
+            <a:schemeClr val="lt1"/>
+          </a:fontRef>
+        </p:style>
+        <p:txBody>
+          <a:bodyPr rtlCol="0" anchor="ctr"/>
+          <a:lstStyle/>
+          <a:p>
+            <a:pPr algn="ctr"/>
+            <a:endParaRPr lang="en-PH"/>
+          </a:p>
+        </p:txBody>
+      </p:sp>
+      <p:sp>
+        <p:nvSpPr>
           <p:cNvPr id="2" name="Title 1"/>
           <p:cNvSpPr>
             <a:spLocks noGrp="1"/>
@@ -8049,47 +8576,14 @@
           <a:p>
             <a:r>
               <a:rPr lang="en-PH" dirty="0"/>
-              <a:t>Statement of the Problem</a:t>
-            </a:r>
-          </a:p>
-        </p:txBody>
-      </p:sp>
-      <p:sp>
-        <p:nvSpPr>
-          <p:cNvPr id="3" name="Content Placeholder 2"/>
-          <p:cNvSpPr>
-            <a:spLocks noGrp="1"/>
-          </p:cNvSpPr>
-          <p:nvPr>
-            <p:ph idx="1"/>
-          </p:nvPr>
-        </p:nvSpPr>
-        <p:spPr/>
-        <p:txBody>
-          <a:bodyPr>
-            <a:normAutofit/>
-          </a:bodyPr>
-          <a:lstStyle/>
-          <a:p>
-            <a:pPr marL="457200" lvl="1" indent="0" algn="ctr">
-              <a:buNone/>
-            </a:pPr>
-            <a:endParaRPr lang="en-PH" sz="3200" dirty="0"/>
-          </a:p>
-          <a:p>
-            <a:pPr marL="457200" lvl="1" indent="0" algn="ctr">
-              <a:buNone/>
-            </a:pPr>
-            <a:r>
-              <a:rPr lang="en-PH" sz="3200" dirty="0"/>
-              <a:t>How can the Philippine automated election system eliminate the possibility of unofficial servers to secure the transmission of election returns on the server-level?</a:t>
+              <a:t>Current System</a:t>
             </a:r>
           </a:p>
         </p:txBody>
       </p:sp>
       <p:pic>
         <p:nvPicPr>
-          <p:cNvPr id="6" name="Picture 5"/>
+          <p:cNvPr id="4" name="Picture 3"/>
           <p:cNvPicPr>
             <a:picLocks noChangeAspect="1"/>
           </p:cNvPicPr>
@@ -8109,7 +8603,7 @@
         </p:blipFill>
         <p:spPr>
           <a:xfrm>
-            <a:off x="10595595" y="4723195"/>
+            <a:off x="10343804" y="4696690"/>
             <a:ext cx="2435221" cy="2435221"/>
           </a:xfrm>
           <a:prstGeom prst="rect">
@@ -8119,7 +8613,7 @@
       </p:pic>
       <p:pic>
         <p:nvPicPr>
-          <p:cNvPr id="7" name="Picture 6"/>
+          <p:cNvPr id="5" name="Picture 4"/>
           <p:cNvPicPr>
             <a:picLocks noChangeAspect="1"/>
           </p:cNvPicPr>
@@ -8139,18 +8633,569 @@
         </p:blipFill>
         <p:spPr>
           <a:xfrm>
-            <a:off x="10045148" y="3917853"/>
-            <a:ext cx="1610683" cy="1610683"/>
+            <a:off x="9882312" y="4197927"/>
+            <a:ext cx="1391006" cy="1391006"/>
           </a:xfrm>
           <a:prstGeom prst="rect">
             <a:avLst/>
           </a:prstGeom>
         </p:spPr>
       </p:pic>
+      <p:pic>
+        <p:nvPicPr>
+          <p:cNvPr id="12" name="Picture 11"/>
+          <p:cNvPicPr>
+            <a:picLocks noChangeAspect="1"/>
+          </p:cNvPicPr>
+          <p:nvPr/>
+        </p:nvPicPr>
+        <p:blipFill>
+          <a:blip r:embed="rId5">
+            <a:extLst>
+              <a:ext uri="{28A0092B-C50C-407E-A947-70E740481C1C}">
+                <a14:useLocalDpi xmlns:a14="http://schemas.microsoft.com/office/drawing/2010/main" val="0"/>
+              </a:ext>
+            </a:extLst>
+          </a:blip>
+          <a:stretch>
+            <a:fillRect/>
+          </a:stretch>
+        </p:blipFill>
+        <p:spPr>
+          <a:xfrm>
+            <a:off x="5027528" y="2656795"/>
+            <a:ext cx="948637" cy="948637"/>
+          </a:xfrm>
+          <a:prstGeom prst="rect">
+            <a:avLst/>
+          </a:prstGeom>
+        </p:spPr>
+      </p:pic>
+      <p:cxnSp>
+        <p:nvCxnSpPr>
+          <p:cNvPr id="14" name="Straight Arrow Connector 13"/>
+          <p:cNvCxnSpPr>
+            <a:endCxn id="8" idx="2"/>
+          </p:cNvCxnSpPr>
+          <p:nvPr/>
+        </p:nvCxnSpPr>
+        <p:spPr>
+          <a:xfrm flipV="1">
+            <a:off x="3630741" y="3605432"/>
+            <a:ext cx="0" cy="1471586"/>
+          </a:xfrm>
+          <a:prstGeom prst="straightConnector1">
+            <a:avLst/>
+          </a:prstGeom>
+          <a:ln>
+            <a:tailEnd type="triangle"/>
+          </a:ln>
+        </p:spPr>
+        <p:style>
+          <a:lnRef idx="1">
+            <a:schemeClr val="accent1"/>
+          </a:lnRef>
+          <a:fillRef idx="0">
+            <a:schemeClr val="accent1"/>
+          </a:fillRef>
+          <a:effectRef idx="0">
+            <a:schemeClr val="accent1"/>
+          </a:effectRef>
+          <a:fontRef idx="minor">
+            <a:schemeClr val="tx1"/>
+          </a:fontRef>
+        </p:style>
+      </p:cxnSp>
+      <p:sp>
+        <p:nvSpPr>
+          <p:cNvPr id="26" name="TextBox 25"/>
+          <p:cNvSpPr txBox="1"/>
+          <p:nvPr/>
+        </p:nvSpPr>
+        <p:spPr>
+          <a:xfrm>
+            <a:off x="2855171" y="5714846"/>
+            <a:ext cx="1539240" cy="369332"/>
+          </a:xfrm>
+          <a:prstGeom prst="rect">
+            <a:avLst/>
+          </a:prstGeom>
+          <a:noFill/>
+        </p:spPr>
+        <p:txBody>
+          <a:bodyPr wrap="square" rtlCol="0">
+            <a:spAutoFit/>
+          </a:bodyPr>
+          <a:lstStyle/>
+          <a:p>
+            <a:pPr algn="ctr"/>
+            <a:r>
+              <a:rPr lang="en-PH" dirty="0"/>
+              <a:t>VCM</a:t>
+            </a:r>
+          </a:p>
+        </p:txBody>
+      </p:sp>
+      <p:sp>
+        <p:nvSpPr>
+          <p:cNvPr id="30" name="TextBox 29"/>
+          <p:cNvSpPr txBox="1"/>
+          <p:nvPr/>
+        </p:nvSpPr>
+        <p:spPr>
+          <a:xfrm>
+            <a:off x="2709306" y="2011428"/>
+            <a:ext cx="1842868" cy="369332"/>
+          </a:xfrm>
+          <a:prstGeom prst="rect">
+            <a:avLst/>
+          </a:prstGeom>
+          <a:noFill/>
+        </p:spPr>
+        <p:txBody>
+          <a:bodyPr wrap="square" rtlCol="0">
+            <a:spAutoFit/>
+          </a:bodyPr>
+          <a:lstStyle/>
+          <a:p>
+            <a:pPr algn="ctr"/>
+            <a:r>
+              <a:rPr lang="en-PH" dirty="0"/>
+              <a:t>Central Server</a:t>
+            </a:r>
+          </a:p>
+        </p:txBody>
+      </p:sp>
+      <p:sp>
+        <p:nvSpPr>
+          <p:cNvPr id="31" name="TextBox 30"/>
+          <p:cNvSpPr txBox="1"/>
+          <p:nvPr/>
+        </p:nvSpPr>
+        <p:spPr>
+          <a:xfrm>
+            <a:off x="4580412" y="1762564"/>
+            <a:ext cx="1842868" cy="646331"/>
+          </a:xfrm>
+          <a:prstGeom prst="rect">
+            <a:avLst/>
+          </a:prstGeom>
+          <a:noFill/>
+        </p:spPr>
+        <p:txBody>
+          <a:bodyPr wrap="square" rtlCol="0">
+            <a:spAutoFit/>
+          </a:bodyPr>
+          <a:lstStyle/>
+          <a:p>
+            <a:pPr algn="ctr"/>
+            <a:r>
+              <a:rPr lang="en-PH" dirty="0"/>
+              <a:t>Transparency Server</a:t>
+            </a:r>
+          </a:p>
+        </p:txBody>
+      </p:sp>
+      <p:sp>
+        <p:nvSpPr>
+          <p:cNvPr id="32" name="TextBox 31"/>
+          <p:cNvSpPr txBox="1"/>
+          <p:nvPr/>
+        </p:nvSpPr>
+        <p:spPr>
+          <a:xfrm>
+            <a:off x="2709306" y="2315285"/>
+            <a:ext cx="1842868" cy="276999"/>
+          </a:xfrm>
+          <a:prstGeom prst="rect">
+            <a:avLst/>
+          </a:prstGeom>
+          <a:noFill/>
+        </p:spPr>
+        <p:txBody>
+          <a:bodyPr wrap="square" rtlCol="0">
+            <a:spAutoFit/>
+          </a:bodyPr>
+          <a:lstStyle/>
+          <a:p>
+            <a:pPr algn="ctr"/>
+            <a:r>
+              <a:rPr lang="en-PH" sz="1200" dirty="0"/>
+              <a:t>Handled by COMELEC</a:t>
+            </a:r>
+          </a:p>
+        </p:txBody>
+      </p:sp>
+      <p:sp>
+        <p:nvSpPr>
+          <p:cNvPr id="33" name="TextBox 32"/>
+          <p:cNvSpPr txBox="1"/>
+          <p:nvPr/>
+        </p:nvSpPr>
+        <p:spPr>
+          <a:xfrm>
+            <a:off x="4580412" y="2315281"/>
+            <a:ext cx="1842868" cy="276999"/>
+          </a:xfrm>
+          <a:prstGeom prst="rect">
+            <a:avLst/>
+          </a:prstGeom>
+          <a:noFill/>
+        </p:spPr>
+        <p:txBody>
+          <a:bodyPr wrap="square" rtlCol="0">
+            <a:spAutoFit/>
+          </a:bodyPr>
+          <a:lstStyle/>
+          <a:p>
+            <a:pPr algn="ctr"/>
+            <a:r>
+              <a:rPr lang="en-PH" sz="1200" dirty="0"/>
+              <a:t>Handled by PPCRV</a:t>
+            </a:r>
+          </a:p>
+        </p:txBody>
+      </p:sp>
+      <p:pic>
+        <p:nvPicPr>
+          <p:cNvPr id="8" name="Picture 7"/>
+          <p:cNvPicPr>
+            <a:picLocks noChangeAspect="1"/>
+          </p:cNvPicPr>
+          <p:nvPr/>
+        </p:nvPicPr>
+        <p:blipFill>
+          <a:blip r:embed="rId5">
+            <a:extLst>
+              <a:ext uri="{28A0092B-C50C-407E-A947-70E740481C1C}">
+                <a14:useLocalDpi xmlns:a14="http://schemas.microsoft.com/office/drawing/2010/main" val="0"/>
+              </a:ext>
+            </a:extLst>
+          </a:blip>
+          <a:stretch>
+            <a:fillRect/>
+          </a:stretch>
+        </p:blipFill>
+        <p:spPr>
+          <a:xfrm>
+            <a:off x="3156422" y="2656795"/>
+            <a:ext cx="948637" cy="948637"/>
+          </a:xfrm>
+          <a:prstGeom prst="rect">
+            <a:avLst/>
+          </a:prstGeom>
+        </p:spPr>
+      </p:pic>
+      <p:pic>
+        <p:nvPicPr>
+          <p:cNvPr id="39" name="Picture 38"/>
+          <p:cNvPicPr>
+            <a:picLocks noChangeAspect="1"/>
+          </p:cNvPicPr>
+          <p:nvPr/>
+        </p:nvPicPr>
+        <p:blipFill>
+          <a:blip r:embed="rId5">
+            <a:extLst>
+              <a:ext uri="{28A0092B-C50C-407E-A947-70E740481C1C}">
+                <a14:useLocalDpi xmlns:a14="http://schemas.microsoft.com/office/drawing/2010/main" val="0"/>
+              </a:ext>
+            </a:extLst>
+          </a:blip>
+          <a:stretch>
+            <a:fillRect/>
+          </a:stretch>
+        </p:blipFill>
+        <p:spPr>
+          <a:xfrm>
+            <a:off x="1285317" y="2656794"/>
+            <a:ext cx="948637" cy="948637"/>
+          </a:xfrm>
+          <a:prstGeom prst="rect">
+            <a:avLst/>
+          </a:prstGeom>
+        </p:spPr>
+      </p:pic>
+      <p:sp>
+        <p:nvSpPr>
+          <p:cNvPr id="42" name="TextBox 41"/>
+          <p:cNvSpPr txBox="1"/>
+          <p:nvPr/>
+        </p:nvSpPr>
+        <p:spPr>
+          <a:xfrm>
+            <a:off x="838200" y="1945949"/>
+            <a:ext cx="1842868" cy="584775"/>
+          </a:xfrm>
+          <a:prstGeom prst="rect">
+            <a:avLst/>
+          </a:prstGeom>
+          <a:noFill/>
+        </p:spPr>
+        <p:txBody>
+          <a:bodyPr wrap="square" rtlCol="0">
+            <a:spAutoFit/>
+          </a:bodyPr>
+          <a:lstStyle/>
+          <a:p>
+            <a:pPr algn="ctr"/>
+            <a:r>
+              <a:rPr lang="en-PH" sz="1600" dirty="0"/>
+              <a:t>Consolidation and Canvassing Server</a:t>
+            </a:r>
+          </a:p>
+        </p:txBody>
+      </p:sp>
+      <p:cxnSp>
+        <p:nvCxnSpPr>
+          <p:cNvPr id="52" name="Connector: Elbow 51"/>
+          <p:cNvCxnSpPr>
+            <a:endCxn id="39" idx="2"/>
+          </p:cNvCxnSpPr>
+          <p:nvPr/>
+        </p:nvCxnSpPr>
+        <p:spPr>
+          <a:xfrm rot="16200000" flipV="1">
+            <a:off x="1478380" y="3886687"/>
+            <a:ext cx="1983502" cy="1420990"/>
+          </a:xfrm>
+          <a:prstGeom prst="bentConnector3">
+            <a:avLst>
+              <a:gd name="adj1" fmla="val 10283"/>
+            </a:avLst>
+          </a:prstGeom>
+          <a:ln>
+            <a:tailEnd type="triangle"/>
+          </a:ln>
+        </p:spPr>
+        <p:style>
+          <a:lnRef idx="1">
+            <a:schemeClr val="accent1"/>
+          </a:lnRef>
+          <a:fillRef idx="0">
+            <a:schemeClr val="accent1"/>
+          </a:fillRef>
+          <a:effectRef idx="0">
+            <a:schemeClr val="accent1"/>
+          </a:effectRef>
+          <a:fontRef idx="minor">
+            <a:schemeClr val="tx1"/>
+          </a:fontRef>
+        </p:style>
+      </p:cxnSp>
+      <p:cxnSp>
+        <p:nvCxnSpPr>
+          <p:cNvPr id="58" name="Connector: Elbow 57"/>
+          <p:cNvCxnSpPr>
+            <a:endCxn id="12" idx="2"/>
+          </p:cNvCxnSpPr>
+          <p:nvPr/>
+        </p:nvCxnSpPr>
+        <p:spPr>
+          <a:xfrm rot="5400000" flipH="1" flipV="1">
+            <a:off x="3793984" y="3750403"/>
+            <a:ext cx="1852833" cy="1562893"/>
+          </a:xfrm>
+          <a:prstGeom prst="bentConnector3">
+            <a:avLst>
+              <a:gd name="adj1" fmla="val 3686"/>
+            </a:avLst>
+          </a:prstGeom>
+          <a:ln>
+            <a:tailEnd type="triangle"/>
+          </a:ln>
+        </p:spPr>
+        <p:style>
+          <a:lnRef idx="1">
+            <a:schemeClr val="accent1"/>
+          </a:lnRef>
+          <a:fillRef idx="0">
+            <a:schemeClr val="accent1"/>
+          </a:fillRef>
+          <a:effectRef idx="0">
+            <a:schemeClr val="accent1"/>
+          </a:effectRef>
+          <a:fontRef idx="minor">
+            <a:schemeClr val="tx1"/>
+          </a:fontRef>
+        </p:style>
+      </p:cxnSp>
+      <p:pic>
+        <p:nvPicPr>
+          <p:cNvPr id="6" name="Content Placeholder 5"/>
+          <p:cNvPicPr>
+            <a:picLocks noGrp="1" noChangeAspect="1"/>
+          </p:cNvPicPr>
+          <p:nvPr>
+            <p:ph idx="1"/>
+          </p:nvPr>
+        </p:nvPicPr>
+        <p:blipFill>
+          <a:blip r:embed="rId6">
+            <a:extLst>
+              <a:ext uri="{28A0092B-C50C-407E-A947-70E740481C1C}">
+                <a14:useLocalDpi xmlns:a14="http://schemas.microsoft.com/office/drawing/2010/main" val="0"/>
+              </a:ext>
+            </a:extLst>
+          </a:blip>
+          <a:stretch>
+            <a:fillRect/>
+          </a:stretch>
+        </p:blipFill>
+        <p:spPr>
+          <a:xfrm>
+            <a:off x="2999673" y="4705281"/>
+            <a:ext cx="1262135" cy="1262135"/>
+          </a:xfrm>
+        </p:spPr>
+      </p:pic>
+      <p:sp>
+        <p:nvSpPr>
+          <p:cNvPr id="63" name="TextBox 62"/>
+          <p:cNvSpPr txBox="1"/>
+          <p:nvPr/>
+        </p:nvSpPr>
+        <p:spPr>
+          <a:xfrm>
+            <a:off x="3612864" y="3981344"/>
+            <a:ext cx="1618037" cy="461665"/>
+          </a:xfrm>
+          <a:prstGeom prst="rect">
+            <a:avLst/>
+          </a:prstGeom>
+          <a:noFill/>
+        </p:spPr>
+        <p:txBody>
+          <a:bodyPr wrap="square" rtlCol="0">
+            <a:spAutoFit/>
+          </a:bodyPr>
+          <a:lstStyle/>
+          <a:p>
+            <a:pPr algn="ctr"/>
+            <a:r>
+              <a:rPr lang="en-PH" sz="1200" dirty="0"/>
+              <a:t>Votes are sent along with its hash code</a:t>
+            </a:r>
+          </a:p>
+        </p:txBody>
+      </p:sp>
+      <p:sp>
+        <p:nvSpPr>
+          <p:cNvPr id="64" name="TextBox 63"/>
+          <p:cNvSpPr txBox="1"/>
+          <p:nvPr/>
+        </p:nvSpPr>
+        <p:spPr>
+          <a:xfrm>
+            <a:off x="7291240" y="762290"/>
+            <a:ext cx="3708406" cy="3293209"/>
+          </a:xfrm>
+          <a:prstGeom prst="rect">
+            <a:avLst/>
+          </a:prstGeom>
+          <a:noFill/>
+        </p:spPr>
+        <p:txBody>
+          <a:bodyPr wrap="square" rtlCol="0">
+            <a:spAutoFit/>
+          </a:bodyPr>
+          <a:lstStyle/>
+          <a:p>
+            <a:pPr algn="ctr"/>
+            <a:r>
+              <a:rPr lang="en-PH" sz="2400" dirty="0">
+                <a:solidFill>
+                  <a:schemeClr val="bg1"/>
+                </a:solidFill>
+              </a:rPr>
+              <a:t>Hash code serves as the file’s digital fingerprint and is “a security measure used to ensure that the integrity of an electronic document, data file, or a program has not been compromised.”</a:t>
+            </a:r>
+          </a:p>
+          <a:p>
+            <a:pPr algn="ctr"/>
+            <a:endParaRPr lang="en-PH" sz="2000" dirty="0">
+              <a:solidFill>
+                <a:schemeClr val="bg1"/>
+              </a:solidFill>
+            </a:endParaRPr>
+          </a:p>
+          <a:p>
+            <a:pPr algn="ctr"/>
+            <a:r>
+              <a:rPr lang="en-PH" sz="2000" dirty="0">
+                <a:solidFill>
+                  <a:schemeClr val="bg1"/>
+                </a:solidFill>
+              </a:rPr>
+              <a:t>CNN Philippines, 2016</a:t>
+            </a:r>
+          </a:p>
+        </p:txBody>
+      </p:sp>
+      <p:sp>
+        <p:nvSpPr>
+          <p:cNvPr id="37" name="TextBox 36"/>
+          <p:cNvSpPr txBox="1"/>
+          <p:nvPr/>
+        </p:nvSpPr>
+        <p:spPr>
+          <a:xfrm>
+            <a:off x="1740843" y="4748398"/>
+            <a:ext cx="1618037" cy="461665"/>
+          </a:xfrm>
+          <a:prstGeom prst="rect">
+            <a:avLst/>
+          </a:prstGeom>
+          <a:noFill/>
+        </p:spPr>
+        <p:txBody>
+          <a:bodyPr wrap="square" rtlCol="0">
+            <a:spAutoFit/>
+          </a:bodyPr>
+          <a:lstStyle/>
+          <a:p>
+            <a:pPr algn="ctr"/>
+            <a:r>
+              <a:rPr lang="en-PH" sz="1200" dirty="0"/>
+              <a:t>Votes are sent along with its hash code</a:t>
+            </a:r>
+          </a:p>
+        </p:txBody>
+      </p:sp>
+      <p:sp>
+        <p:nvSpPr>
+          <p:cNvPr id="38" name="TextBox 37"/>
+          <p:cNvSpPr txBox="1"/>
+          <p:nvPr/>
+        </p:nvSpPr>
+        <p:spPr>
+          <a:xfrm>
+            <a:off x="3931991" y="4748398"/>
+            <a:ext cx="1618037" cy="461665"/>
+          </a:xfrm>
+          <a:prstGeom prst="rect">
+            <a:avLst/>
+          </a:prstGeom>
+          <a:noFill/>
+        </p:spPr>
+        <p:txBody>
+          <a:bodyPr wrap="square" rtlCol="0">
+            <a:spAutoFit/>
+          </a:bodyPr>
+          <a:lstStyle/>
+          <a:p>
+            <a:pPr algn="ctr"/>
+            <a:r>
+              <a:rPr lang="en-PH" sz="1200" dirty="0"/>
+              <a:t>Votes are sent along with its hash code</a:t>
+            </a:r>
+          </a:p>
+        </p:txBody>
+      </p:sp>
     </p:spTree>
     <p:extLst>
       <p:ext uri="{BB962C8B-B14F-4D97-AF65-F5344CB8AC3E}">
-        <p14:creationId xmlns:p14="http://schemas.microsoft.com/office/powerpoint/2010/main" val="1509484594"/>
+        <p14:creationId xmlns:p14="http://schemas.microsoft.com/office/powerpoint/2010/main" val="4016139381"/>
       </p:ext>
     </p:extLst>
   </p:cSld>
@@ -8194,81 +9239,14 @@
           <a:p>
             <a:r>
               <a:rPr lang="en-PH" dirty="0"/>
-              <a:t>Objectives</a:t>
-            </a:r>
-          </a:p>
-        </p:txBody>
-      </p:sp>
-      <p:sp>
-        <p:nvSpPr>
-          <p:cNvPr id="3" name="Content Placeholder 2"/>
-          <p:cNvSpPr>
-            <a:spLocks noGrp="1"/>
-          </p:cNvSpPr>
-          <p:nvPr>
-            <p:ph idx="1"/>
-          </p:nvPr>
-        </p:nvSpPr>
-        <p:spPr>
-          <a:xfrm>
-            <a:off x="838200" y="1825625"/>
-            <a:ext cx="8623300" cy="4351338"/>
-          </a:xfrm>
-        </p:spPr>
-        <p:txBody>
-          <a:bodyPr/>
-          <a:lstStyle/>
-          <a:p>
-            <a:r>
-              <a:rPr lang="en-PH" dirty="0"/>
-              <a:t>General Objectives</a:t>
-            </a:r>
-          </a:p>
-          <a:p>
-            <a:pPr lvl="1"/>
-            <a:r>
-              <a:rPr lang="en-PH" dirty="0"/>
-              <a:t>To know the issues present in the transmission of the votes</a:t>
-            </a:r>
-          </a:p>
-          <a:p>
-            <a:pPr lvl="1"/>
-            <a:r>
-              <a:rPr lang="en-PH" dirty="0"/>
-              <a:t>To propose a system that would prevent electoral fraud in the transmission of votes in the automated election system</a:t>
-            </a:r>
-          </a:p>
-          <a:p>
-            <a:r>
-              <a:rPr lang="en-PH" dirty="0"/>
-              <a:t>Specific Objectives</a:t>
-            </a:r>
-          </a:p>
-          <a:p>
-            <a:pPr lvl="1"/>
-            <a:r>
-              <a:rPr lang="en-PH" dirty="0"/>
-              <a:t>To provide a technical solution that would verify the authenticity of the servers and VCMs through the use of a public key infrastructure and </a:t>
-            </a:r>
-            <a:r>
-              <a:rPr lang="en-PH" dirty="0" err="1"/>
-              <a:t>Diffie</a:t>
-            </a:r>
-            <a:r>
-              <a:rPr lang="en-PH" dirty="0"/>
-              <a:t>-Hellman algorithm as security mechanisms for </a:t>
-            </a:r>
-            <a:r>
-              <a:rPr lang="en-PH"/>
-              <a:t>the AES</a:t>
-            </a:r>
-            <a:endParaRPr lang="en-PH" dirty="0"/>
+              <a:t>Current System with Secret Server</a:t>
+            </a:r>
           </a:p>
         </p:txBody>
       </p:sp>
       <p:pic>
         <p:nvPicPr>
-          <p:cNvPr id="6" name="Picture 5"/>
+          <p:cNvPr id="4" name="Picture 3"/>
           <p:cNvPicPr>
             <a:picLocks noChangeAspect="1"/>
           </p:cNvPicPr>
@@ -8288,7 +9266,7 @@
         </p:blipFill>
         <p:spPr>
           <a:xfrm>
-            <a:off x="10595595" y="4723195"/>
+            <a:off x="10343804" y="4696690"/>
             <a:ext cx="2435221" cy="2435221"/>
           </a:xfrm>
           <a:prstGeom prst="rect">
@@ -8298,7 +9276,7 @@
       </p:pic>
       <p:pic>
         <p:nvPicPr>
-          <p:cNvPr id="7" name="Picture 6"/>
+          <p:cNvPr id="5" name="Picture 4"/>
           <p:cNvPicPr>
             <a:picLocks noChangeAspect="1"/>
           </p:cNvPicPr>
@@ -8318,18 +9296,512 @@
         </p:blipFill>
         <p:spPr>
           <a:xfrm>
-            <a:off x="10045148" y="3917853"/>
-            <a:ext cx="1610683" cy="1610683"/>
+            <a:off x="9882312" y="4197927"/>
+            <a:ext cx="1391006" cy="1391006"/>
           </a:xfrm>
           <a:prstGeom prst="rect">
             <a:avLst/>
           </a:prstGeom>
         </p:spPr>
       </p:pic>
+      <p:pic>
+        <p:nvPicPr>
+          <p:cNvPr id="12" name="Picture 11"/>
+          <p:cNvPicPr>
+            <a:picLocks noChangeAspect="1"/>
+          </p:cNvPicPr>
+          <p:nvPr/>
+        </p:nvPicPr>
+        <p:blipFill>
+          <a:blip r:embed="rId5">
+            <a:extLst>
+              <a:ext uri="{28A0092B-C50C-407E-A947-70E740481C1C}">
+                <a14:useLocalDpi xmlns:a14="http://schemas.microsoft.com/office/drawing/2010/main" val="0"/>
+              </a:ext>
+            </a:extLst>
+          </a:blip>
+          <a:stretch>
+            <a:fillRect/>
+          </a:stretch>
+        </p:blipFill>
+        <p:spPr>
+          <a:xfrm>
+            <a:off x="7193953" y="2416105"/>
+            <a:ext cx="948637" cy="948637"/>
+          </a:xfrm>
+          <a:prstGeom prst="rect">
+            <a:avLst/>
+          </a:prstGeom>
+        </p:spPr>
+      </p:pic>
+      <p:cxnSp>
+        <p:nvCxnSpPr>
+          <p:cNvPr id="14" name="Straight Arrow Connector 13"/>
+          <p:cNvCxnSpPr>
+            <a:endCxn id="8" idx="2"/>
+          </p:cNvCxnSpPr>
+          <p:nvPr/>
+        </p:nvCxnSpPr>
+        <p:spPr>
+          <a:xfrm flipV="1">
+            <a:off x="5797166" y="3364742"/>
+            <a:ext cx="0" cy="2234198"/>
+          </a:xfrm>
+          <a:prstGeom prst="straightConnector1">
+            <a:avLst/>
+          </a:prstGeom>
+          <a:ln>
+            <a:tailEnd type="triangle"/>
+          </a:ln>
+        </p:spPr>
+        <p:style>
+          <a:lnRef idx="1">
+            <a:schemeClr val="accent1"/>
+          </a:lnRef>
+          <a:fillRef idx="0">
+            <a:schemeClr val="accent1"/>
+          </a:fillRef>
+          <a:effectRef idx="0">
+            <a:schemeClr val="accent1"/>
+          </a:effectRef>
+          <a:fontRef idx="minor">
+            <a:schemeClr val="tx1"/>
+          </a:fontRef>
+        </p:style>
+      </p:cxnSp>
+      <p:sp>
+        <p:nvSpPr>
+          <p:cNvPr id="26" name="TextBox 25"/>
+          <p:cNvSpPr txBox="1"/>
+          <p:nvPr/>
+        </p:nvSpPr>
+        <p:spPr>
+          <a:xfrm>
+            <a:off x="5021596" y="6205673"/>
+            <a:ext cx="1539240" cy="369332"/>
+          </a:xfrm>
+          <a:prstGeom prst="rect">
+            <a:avLst/>
+          </a:prstGeom>
+          <a:noFill/>
+        </p:spPr>
+        <p:txBody>
+          <a:bodyPr wrap="square" rtlCol="0">
+            <a:spAutoFit/>
+          </a:bodyPr>
+          <a:lstStyle/>
+          <a:p>
+            <a:pPr algn="ctr"/>
+            <a:r>
+              <a:rPr lang="en-PH" dirty="0"/>
+              <a:t>VCM</a:t>
+            </a:r>
+          </a:p>
+        </p:txBody>
+      </p:sp>
+      <p:sp>
+        <p:nvSpPr>
+          <p:cNvPr id="30" name="TextBox 29"/>
+          <p:cNvSpPr txBox="1"/>
+          <p:nvPr/>
+        </p:nvSpPr>
+        <p:spPr>
+          <a:xfrm>
+            <a:off x="4875731" y="1770738"/>
+            <a:ext cx="1842868" cy="369332"/>
+          </a:xfrm>
+          <a:prstGeom prst="rect">
+            <a:avLst/>
+          </a:prstGeom>
+          <a:noFill/>
+        </p:spPr>
+        <p:txBody>
+          <a:bodyPr wrap="square" rtlCol="0">
+            <a:spAutoFit/>
+          </a:bodyPr>
+          <a:lstStyle/>
+          <a:p>
+            <a:pPr algn="ctr"/>
+            <a:r>
+              <a:rPr lang="en-PH" dirty="0"/>
+              <a:t>Central Server</a:t>
+            </a:r>
+          </a:p>
+        </p:txBody>
+      </p:sp>
+      <p:sp>
+        <p:nvSpPr>
+          <p:cNvPr id="31" name="TextBox 30"/>
+          <p:cNvSpPr txBox="1"/>
+          <p:nvPr/>
+        </p:nvSpPr>
+        <p:spPr>
+          <a:xfrm>
+            <a:off x="6746837" y="1521874"/>
+            <a:ext cx="1842868" cy="646331"/>
+          </a:xfrm>
+          <a:prstGeom prst="rect">
+            <a:avLst/>
+          </a:prstGeom>
+          <a:noFill/>
+        </p:spPr>
+        <p:txBody>
+          <a:bodyPr wrap="square" rtlCol="0">
+            <a:spAutoFit/>
+          </a:bodyPr>
+          <a:lstStyle/>
+          <a:p>
+            <a:pPr algn="ctr"/>
+            <a:r>
+              <a:rPr lang="en-PH" dirty="0"/>
+              <a:t>Transparency Server</a:t>
+            </a:r>
+          </a:p>
+        </p:txBody>
+      </p:sp>
+      <p:sp>
+        <p:nvSpPr>
+          <p:cNvPr id="32" name="TextBox 31"/>
+          <p:cNvSpPr txBox="1"/>
+          <p:nvPr/>
+        </p:nvSpPr>
+        <p:spPr>
+          <a:xfrm>
+            <a:off x="4875731" y="2074595"/>
+            <a:ext cx="1842868" cy="276999"/>
+          </a:xfrm>
+          <a:prstGeom prst="rect">
+            <a:avLst/>
+          </a:prstGeom>
+          <a:noFill/>
+        </p:spPr>
+        <p:txBody>
+          <a:bodyPr wrap="square" rtlCol="0">
+            <a:spAutoFit/>
+          </a:bodyPr>
+          <a:lstStyle/>
+          <a:p>
+            <a:pPr algn="ctr"/>
+            <a:r>
+              <a:rPr lang="en-PH" sz="1200" dirty="0"/>
+              <a:t>Handled by COMELEC</a:t>
+            </a:r>
+          </a:p>
+        </p:txBody>
+      </p:sp>
+      <p:sp>
+        <p:nvSpPr>
+          <p:cNvPr id="33" name="TextBox 32"/>
+          <p:cNvSpPr txBox="1"/>
+          <p:nvPr/>
+        </p:nvSpPr>
+        <p:spPr>
+          <a:xfrm>
+            <a:off x="6746837" y="2074591"/>
+            <a:ext cx="1842868" cy="276999"/>
+          </a:xfrm>
+          <a:prstGeom prst="rect">
+            <a:avLst/>
+          </a:prstGeom>
+          <a:noFill/>
+        </p:spPr>
+        <p:txBody>
+          <a:bodyPr wrap="square" rtlCol="0">
+            <a:spAutoFit/>
+          </a:bodyPr>
+          <a:lstStyle/>
+          <a:p>
+            <a:pPr algn="ctr"/>
+            <a:r>
+              <a:rPr lang="en-PH" sz="1200" dirty="0"/>
+              <a:t>Handled by PPCRV</a:t>
+            </a:r>
+          </a:p>
+        </p:txBody>
+      </p:sp>
+      <p:pic>
+        <p:nvPicPr>
+          <p:cNvPr id="8" name="Picture 7"/>
+          <p:cNvPicPr>
+            <a:picLocks noChangeAspect="1"/>
+          </p:cNvPicPr>
+          <p:nvPr/>
+        </p:nvPicPr>
+        <p:blipFill>
+          <a:blip r:embed="rId5">
+            <a:extLst>
+              <a:ext uri="{28A0092B-C50C-407E-A947-70E740481C1C}">
+                <a14:useLocalDpi xmlns:a14="http://schemas.microsoft.com/office/drawing/2010/main" val="0"/>
+              </a:ext>
+            </a:extLst>
+          </a:blip>
+          <a:stretch>
+            <a:fillRect/>
+          </a:stretch>
+        </p:blipFill>
+        <p:spPr>
+          <a:xfrm>
+            <a:off x="5322847" y="2416105"/>
+            <a:ext cx="948637" cy="948637"/>
+          </a:xfrm>
+          <a:prstGeom prst="rect">
+            <a:avLst/>
+          </a:prstGeom>
+        </p:spPr>
+      </p:pic>
+      <p:pic>
+        <p:nvPicPr>
+          <p:cNvPr id="39" name="Picture 38"/>
+          <p:cNvPicPr>
+            <a:picLocks noChangeAspect="1"/>
+          </p:cNvPicPr>
+          <p:nvPr/>
+        </p:nvPicPr>
+        <p:blipFill>
+          <a:blip r:embed="rId5">
+            <a:extLst>
+              <a:ext uri="{28A0092B-C50C-407E-A947-70E740481C1C}">
+                <a14:useLocalDpi xmlns:a14="http://schemas.microsoft.com/office/drawing/2010/main" val="0"/>
+              </a:ext>
+            </a:extLst>
+          </a:blip>
+          <a:stretch>
+            <a:fillRect/>
+          </a:stretch>
+        </p:blipFill>
+        <p:spPr>
+          <a:xfrm>
+            <a:off x="3451742" y="2416104"/>
+            <a:ext cx="948637" cy="948637"/>
+          </a:xfrm>
+          <a:prstGeom prst="rect">
+            <a:avLst/>
+          </a:prstGeom>
+        </p:spPr>
+      </p:pic>
+      <p:sp>
+        <p:nvSpPr>
+          <p:cNvPr id="42" name="TextBox 41"/>
+          <p:cNvSpPr txBox="1"/>
+          <p:nvPr/>
+        </p:nvSpPr>
+        <p:spPr>
+          <a:xfrm>
+            <a:off x="3004625" y="1705259"/>
+            <a:ext cx="1842868" cy="584775"/>
+          </a:xfrm>
+          <a:prstGeom prst="rect">
+            <a:avLst/>
+          </a:prstGeom>
+          <a:noFill/>
+        </p:spPr>
+        <p:txBody>
+          <a:bodyPr wrap="square" rtlCol="0">
+            <a:spAutoFit/>
+          </a:bodyPr>
+          <a:lstStyle/>
+          <a:p>
+            <a:pPr algn="ctr"/>
+            <a:r>
+              <a:rPr lang="en-PH" sz="1600" dirty="0"/>
+              <a:t>Consolidation and Canvassing Server</a:t>
+            </a:r>
+          </a:p>
+        </p:txBody>
+      </p:sp>
+      <p:cxnSp>
+        <p:nvCxnSpPr>
+          <p:cNvPr id="52" name="Connector: Elbow 51"/>
+          <p:cNvCxnSpPr>
+            <a:endCxn id="39" idx="2"/>
+          </p:cNvCxnSpPr>
+          <p:nvPr/>
+        </p:nvCxnSpPr>
+        <p:spPr>
+          <a:xfrm rot="10800000">
+            <a:off x="3926062" y="3364741"/>
+            <a:ext cx="1871105" cy="813362"/>
+          </a:xfrm>
+          <a:prstGeom prst="bentConnector2">
+            <a:avLst/>
+          </a:prstGeom>
+          <a:ln>
+            <a:tailEnd type="triangle"/>
+          </a:ln>
+        </p:spPr>
+        <p:style>
+          <a:lnRef idx="1">
+            <a:schemeClr val="accent1"/>
+          </a:lnRef>
+          <a:fillRef idx="0">
+            <a:schemeClr val="accent1"/>
+          </a:fillRef>
+          <a:effectRef idx="0">
+            <a:schemeClr val="accent1"/>
+          </a:effectRef>
+          <a:fontRef idx="minor">
+            <a:schemeClr val="tx1"/>
+          </a:fontRef>
+        </p:style>
+      </p:cxnSp>
+      <p:cxnSp>
+        <p:nvCxnSpPr>
+          <p:cNvPr id="58" name="Connector: Elbow 57"/>
+          <p:cNvCxnSpPr>
+            <a:endCxn id="12" idx="2"/>
+          </p:cNvCxnSpPr>
+          <p:nvPr/>
+        </p:nvCxnSpPr>
+        <p:spPr>
+          <a:xfrm flipV="1">
+            <a:off x="5797166" y="3364742"/>
+            <a:ext cx="1871106" cy="813362"/>
+          </a:xfrm>
+          <a:prstGeom prst="bentConnector2">
+            <a:avLst/>
+          </a:prstGeom>
+          <a:ln>
+            <a:tailEnd type="triangle"/>
+          </a:ln>
+        </p:spPr>
+        <p:style>
+          <a:lnRef idx="1">
+            <a:schemeClr val="accent1"/>
+          </a:lnRef>
+          <a:fillRef idx="0">
+            <a:schemeClr val="accent1"/>
+          </a:fillRef>
+          <a:effectRef idx="0">
+            <a:schemeClr val="accent1"/>
+          </a:effectRef>
+          <a:fontRef idx="minor">
+            <a:schemeClr val="tx1"/>
+          </a:fontRef>
+        </p:style>
+      </p:cxnSp>
+      <p:pic>
+        <p:nvPicPr>
+          <p:cNvPr id="6" name="Content Placeholder 5"/>
+          <p:cNvPicPr>
+            <a:picLocks noGrp="1" noChangeAspect="1"/>
+          </p:cNvPicPr>
+          <p:nvPr>
+            <p:ph idx="1"/>
+          </p:nvPr>
+        </p:nvPicPr>
+        <p:blipFill>
+          <a:blip r:embed="rId6">
+            <a:extLst>
+              <a:ext uri="{28A0092B-C50C-407E-A947-70E740481C1C}">
+                <a14:useLocalDpi xmlns:a14="http://schemas.microsoft.com/office/drawing/2010/main" val="0"/>
+              </a:ext>
+            </a:extLst>
+          </a:blip>
+          <a:stretch>
+            <a:fillRect/>
+          </a:stretch>
+        </p:blipFill>
+        <p:spPr>
+          <a:xfrm>
+            <a:off x="5166098" y="5196108"/>
+            <a:ext cx="1262135" cy="1204687"/>
+          </a:xfrm>
+        </p:spPr>
+      </p:pic>
+      <p:sp>
+        <p:nvSpPr>
+          <p:cNvPr id="37" name="TextBox 36"/>
+          <p:cNvSpPr txBox="1"/>
+          <p:nvPr/>
+        </p:nvSpPr>
+        <p:spPr>
+          <a:xfrm>
+            <a:off x="4299481" y="4664340"/>
+            <a:ext cx="1618037" cy="461665"/>
+          </a:xfrm>
+          <a:prstGeom prst="rect">
+            <a:avLst/>
+          </a:prstGeom>
+          <a:noFill/>
+        </p:spPr>
+        <p:txBody>
+          <a:bodyPr wrap="square" rtlCol="0">
+            <a:spAutoFit/>
+          </a:bodyPr>
+          <a:lstStyle/>
+          <a:p>
+            <a:pPr algn="ctr"/>
+            <a:r>
+              <a:rPr lang="en-PH" sz="1200" dirty="0"/>
+              <a:t>Votes are sent along with its hash code</a:t>
+            </a:r>
+          </a:p>
+        </p:txBody>
+      </p:sp>
+      <p:pic>
+        <p:nvPicPr>
+          <p:cNvPr id="29" name="Picture 28"/>
+          <p:cNvPicPr>
+            <a:picLocks noChangeAspect="1"/>
+          </p:cNvPicPr>
+          <p:nvPr/>
+        </p:nvPicPr>
+        <p:blipFill>
+          <a:blip r:embed="rId5">
+            <a:extLst>
+              <a:ext uri="{28A0092B-C50C-407E-A947-70E740481C1C}">
+                <a14:useLocalDpi xmlns:a14="http://schemas.microsoft.com/office/drawing/2010/main" val="0"/>
+              </a:ext>
+            </a:extLst>
+          </a:blip>
+          <a:stretch>
+            <a:fillRect/>
+          </a:stretch>
+        </p:blipFill>
+        <p:spPr>
+          <a:xfrm>
+            <a:off x="5521136" y="3894037"/>
+            <a:ext cx="540160" cy="540160"/>
+          </a:xfrm>
+          <a:prstGeom prst="rect">
+            <a:avLst/>
+          </a:prstGeom>
+        </p:spPr>
+      </p:pic>
+      <p:sp>
+        <p:nvSpPr>
+          <p:cNvPr id="34" name="TextBox 33"/>
+          <p:cNvSpPr txBox="1"/>
+          <p:nvPr/>
+        </p:nvSpPr>
+        <p:spPr>
+          <a:xfrm>
+            <a:off x="5372940" y="3632923"/>
+            <a:ext cx="1842868" cy="276999"/>
+          </a:xfrm>
+          <a:prstGeom prst="rect">
+            <a:avLst/>
+          </a:prstGeom>
+          <a:noFill/>
+        </p:spPr>
+        <p:txBody>
+          <a:bodyPr wrap="square" rtlCol="0">
+            <a:spAutoFit/>
+          </a:bodyPr>
+          <a:lstStyle/>
+          <a:p>
+            <a:pPr algn="ctr"/>
+            <a:r>
+              <a:rPr lang="en-PH" sz="1200" dirty="0"/>
+              <a:t>Secret Server</a:t>
+            </a:r>
+          </a:p>
+        </p:txBody>
+      </p:sp>
     </p:spTree>
     <p:extLst>
       <p:ext uri="{BB962C8B-B14F-4D97-AF65-F5344CB8AC3E}">
-        <p14:creationId xmlns:p14="http://schemas.microsoft.com/office/powerpoint/2010/main" val="62891387"/>
+        <p14:creationId xmlns:p14="http://schemas.microsoft.com/office/powerpoint/2010/main" val="1679730262"/>
       </p:ext>
     </p:extLst>
   </p:cSld>
@@ -8373,7 +9845,7 @@
           <a:p>
             <a:r>
               <a:rPr lang="en-PH" dirty="0"/>
-              <a:t>Significance of the Study</a:t>
+              <a:t>Statement of the Problem</a:t>
             </a:r>
           </a:p>
         </p:txBody>
@@ -8388,70 +9860,26 @@
             <p:ph idx="1"/>
           </p:nvPr>
         </p:nvSpPr>
-        <p:spPr>
-          <a:xfrm>
-            <a:off x="838200" y="1825625"/>
-            <a:ext cx="9044112" cy="4351338"/>
-          </a:xfrm>
-        </p:spPr>
-        <p:txBody>
-          <a:bodyPr/>
-          <a:lstStyle/>
-          <a:p>
-            <a:r>
-              <a:rPr lang="en-US" sz="2400" dirty="0"/>
-              <a:t>To the Filipino Citizens</a:t>
-            </a:r>
-          </a:p>
-          <a:p>
-            <a:pPr lvl="1"/>
-            <a:r>
-              <a:rPr lang="en-US" dirty="0"/>
-              <a:t>Ensure the security of the casted votes</a:t>
-            </a:r>
-          </a:p>
-          <a:p>
-            <a:pPr lvl="1"/>
-            <a:r>
-              <a:rPr lang="en-US" dirty="0"/>
-              <a:t>Prevent malicious individuals from manipulating the results 	</a:t>
-            </a:r>
-          </a:p>
-          <a:p>
-            <a:r>
-              <a:rPr lang="en-US" sz="2400" dirty="0"/>
-              <a:t>To the COMELEC</a:t>
-            </a:r>
-          </a:p>
-          <a:p>
-            <a:pPr lvl="1"/>
-            <a:r>
-              <a:rPr lang="en-US" dirty="0"/>
-              <a:t>Contribute to the goal of conducting a transparent election</a:t>
-            </a:r>
-          </a:p>
-          <a:p>
-            <a:r>
-              <a:rPr lang="en-US" sz="2400" dirty="0"/>
-              <a:t>To the Future Researchers</a:t>
-            </a:r>
-          </a:p>
-          <a:p>
-            <a:pPr lvl="1"/>
-            <a:r>
-              <a:rPr lang="en-US" dirty="0"/>
-              <a:t>Serve as a guide and inspiration for other developers</a:t>
-            </a:r>
-          </a:p>
-          <a:p>
-            <a:pPr lvl="1"/>
-            <a:r>
-              <a:rPr lang="en-US" dirty="0"/>
-              <a:t>Those who want to pursue the prospect of AES</a:t>
-            </a:r>
-          </a:p>
-          <a:p>
-            <a:endParaRPr lang="en-PH" dirty="0"/>
+        <p:spPr/>
+        <p:txBody>
+          <a:bodyPr>
+            <a:normAutofit/>
+          </a:bodyPr>
+          <a:lstStyle/>
+          <a:p>
+            <a:pPr marL="457200" lvl="1" indent="0" algn="ctr">
+              <a:buNone/>
+            </a:pPr>
+            <a:endParaRPr lang="en-PH" sz="3200" dirty="0"/>
+          </a:p>
+          <a:p>
+            <a:pPr marL="457200" lvl="1" indent="0" algn="ctr">
+              <a:buNone/>
+            </a:pPr>
+            <a:r>
+              <a:rPr lang="en-PH" sz="3200" dirty="0"/>
+              <a:t>How can the Philippine automated election system eliminate the possibility of unofficial servers to secure the transmission of election returns on the server-level?</a:t>
+            </a:r>
           </a:p>
         </p:txBody>
       </p:sp>
@@ -8518,7 +9946,7 @@
     </p:spTree>
     <p:extLst>
       <p:ext uri="{BB962C8B-B14F-4D97-AF65-F5344CB8AC3E}">
-        <p14:creationId xmlns:p14="http://schemas.microsoft.com/office/powerpoint/2010/main" val="760615654"/>
+        <p14:creationId xmlns:p14="http://schemas.microsoft.com/office/powerpoint/2010/main" val="1509484594"/>
       </p:ext>
     </p:extLst>
   </p:cSld>
@@ -8562,7 +9990,7 @@
           <a:p>
             <a:r>
               <a:rPr lang="en-PH" dirty="0"/>
-              <a:t>Scope and Limitations</a:t>
+              <a:t>Objectives</a:t>
             </a:r>
           </a:p>
         </p:txBody>
@@ -8577,54 +10005,61 @@
             <p:ph idx="1"/>
           </p:nvPr>
         </p:nvSpPr>
-        <p:spPr/>
+        <p:spPr>
+          <a:xfrm>
+            <a:off x="838200" y="1825625"/>
+            <a:ext cx="8623300" cy="4351338"/>
+          </a:xfrm>
+        </p:spPr>
         <p:txBody>
           <a:bodyPr/>
           <a:lstStyle/>
           <a:p>
             <a:r>
               <a:rPr lang="en-PH" dirty="0"/>
-              <a:t>Scope would only include issues and possible solutions</a:t>
-            </a:r>
-          </a:p>
-          <a:p>
+              <a:t>General Objectives</a:t>
+            </a:r>
+          </a:p>
+          <a:p>
+            <a:pPr lvl="1"/>
             <a:r>
               <a:rPr lang="en-PH" dirty="0"/>
-              <a:t>For the security of the transmission of the election returns</a:t>
-            </a:r>
-          </a:p>
-          <a:p>
+              <a:t>To know the issues present in the transmission of the votes</a:t>
+            </a:r>
+          </a:p>
+          <a:p>
+            <a:pPr lvl="1"/>
             <a:r>
               <a:rPr lang="en-PH" dirty="0"/>
-              <a:t>Issues prior and subsequent the transmission will not be covered</a:t>
+              <a:t>To propose a system that would prevent electoral fraud in the transmission of votes in the automated election system</a:t>
             </a:r>
           </a:p>
           <a:p>
             <a:r>
               <a:rPr lang="en-PH" dirty="0"/>
-              <a:t>Focus is on elimination of the transmission to unofficial servers</a:t>
-            </a:r>
-          </a:p>
-          <a:p>
+              <a:t>Specific Objectives</a:t>
+            </a:r>
+          </a:p>
+          <a:p>
+            <a:pPr lvl="1"/>
             <a:r>
               <a:rPr lang="en-PH" dirty="0"/>
-              <a:t>As well as, validity of election returns being received</a:t>
-            </a:r>
-          </a:p>
-          <a:p>
+              <a:t>To provide a technical solution that would verify the authenticity of the servers and VCMs through the use of a public key infrastructure and </a:t>
+            </a:r>
+            <a:r>
+              <a:rPr lang="en-PH" dirty="0" err="1"/>
+              <a:t>Diffie</a:t>
+            </a:r>
             <a:r>
               <a:rPr lang="en-PH" dirty="0"/>
-              <a:t>Addressing confidentiality and integrity issue</a:t>
-            </a:r>
-          </a:p>
-          <a:p>
-            <a:endParaRPr lang="en-PH" dirty="0"/>
+              <a:t>-Hellman algorithm as security mechanisms for the AES</a:t>
+            </a:r>
           </a:p>
         </p:txBody>
       </p:sp>
       <p:pic>
         <p:nvPicPr>
-          <p:cNvPr id="4" name="Picture 3"/>
+          <p:cNvPr id="6" name="Picture 5"/>
           <p:cNvPicPr>
             <a:picLocks noChangeAspect="1"/>
           </p:cNvPicPr>
@@ -8654,7 +10089,7 @@
       </p:pic>
       <p:pic>
         <p:nvPicPr>
-          <p:cNvPr id="5" name="Picture 4"/>
+          <p:cNvPr id="7" name="Picture 6"/>
           <p:cNvPicPr>
             <a:picLocks noChangeAspect="1"/>
           </p:cNvPicPr>
@@ -8685,7 +10120,7 @@
     </p:spTree>
     <p:extLst>
       <p:ext uri="{BB962C8B-B14F-4D97-AF65-F5344CB8AC3E}">
-        <p14:creationId xmlns:p14="http://schemas.microsoft.com/office/powerpoint/2010/main" val="1282033266"/>
+        <p14:creationId xmlns:p14="http://schemas.microsoft.com/office/powerpoint/2010/main" val="62891387"/>
       </p:ext>
     </p:extLst>
   </p:cSld>
@@ -8729,7 +10164,7 @@
           <a:p>
             <a:r>
               <a:rPr lang="en-PH" dirty="0"/>
-              <a:t>Related Literature</a:t>
+              <a:t>Significance of the Study</a:t>
             </a:r>
           </a:p>
         </p:txBody>
@@ -8744,10 +10179,68 @@
             <p:ph idx="1"/>
           </p:nvPr>
         </p:nvSpPr>
-        <p:spPr/>
-        <p:txBody>
-          <a:bodyPr/>
-          <a:lstStyle/>
+        <p:spPr>
+          <a:xfrm>
+            <a:off x="838200" y="1825625"/>
+            <a:ext cx="9044112" cy="4351338"/>
+          </a:xfrm>
+        </p:spPr>
+        <p:txBody>
+          <a:bodyPr/>
+          <a:lstStyle/>
+          <a:p>
+            <a:r>
+              <a:rPr lang="en-US" sz="2400" dirty="0"/>
+              <a:t>To the Filipino Citizens</a:t>
+            </a:r>
+          </a:p>
+          <a:p>
+            <a:pPr lvl="1"/>
+            <a:r>
+              <a:rPr lang="en-US" dirty="0"/>
+              <a:t>Ensure the security of the casted votes</a:t>
+            </a:r>
+          </a:p>
+          <a:p>
+            <a:pPr lvl="1"/>
+            <a:r>
+              <a:rPr lang="en-US" dirty="0"/>
+              <a:t>Prevent malicious individuals from manipulating the results 	</a:t>
+            </a:r>
+          </a:p>
+          <a:p>
+            <a:r>
+              <a:rPr lang="en-US" sz="2400" dirty="0"/>
+              <a:t>To the COMELEC</a:t>
+            </a:r>
+          </a:p>
+          <a:p>
+            <a:pPr lvl="1"/>
+            <a:r>
+              <a:rPr lang="en-US" dirty="0"/>
+              <a:t>Contribute to the goal of conducting a transparent election</a:t>
+            </a:r>
+          </a:p>
+          <a:p>
+            <a:r>
+              <a:rPr lang="en-US" sz="2400" dirty="0"/>
+              <a:t>To the Future Researchers</a:t>
+            </a:r>
+          </a:p>
+          <a:p>
+            <a:pPr lvl="1"/>
+            <a:r>
+              <a:rPr lang="en-US" dirty="0"/>
+              <a:t>Serve as a guide and inspiration for other developers</a:t>
+            </a:r>
+          </a:p>
+          <a:p>
+            <a:pPr lvl="1"/>
+            <a:r>
+              <a:rPr lang="en-US" dirty="0"/>
+              <a:t>Those who want to pursue the prospect of AES</a:t>
+            </a:r>
+          </a:p>
           <a:p>
             <a:endParaRPr lang="en-PH" dirty="0"/>
           </a:p>
@@ -8755,7 +10248,7 @@
       </p:sp>
       <p:pic>
         <p:nvPicPr>
-          <p:cNvPr id="4" name="Picture 3"/>
+          <p:cNvPr id="6" name="Picture 5"/>
           <p:cNvPicPr>
             <a:picLocks noChangeAspect="1"/>
           </p:cNvPicPr>
@@ -8785,7 +10278,7 @@
       </p:pic>
       <p:pic>
         <p:nvPicPr>
-          <p:cNvPr id="5" name="Picture 4"/>
+          <p:cNvPr id="7" name="Picture 6"/>
           <p:cNvPicPr>
             <a:picLocks noChangeAspect="1"/>
           </p:cNvPicPr>
@@ -8816,7 +10309,7 @@
     </p:spTree>
     <p:extLst>
       <p:ext uri="{BB962C8B-B14F-4D97-AF65-F5344CB8AC3E}">
-        <p14:creationId xmlns:p14="http://schemas.microsoft.com/office/powerpoint/2010/main" val="3941628008"/>
+        <p14:creationId xmlns:p14="http://schemas.microsoft.com/office/powerpoint/2010/main" val="760615654"/>
       </p:ext>
     </p:extLst>
   </p:cSld>
@@ -8860,7 +10353,7 @@
           <a:p>
             <a:r>
               <a:rPr lang="en-PH" dirty="0"/>
-              <a:t>Related Study</a:t>
+              <a:t>Scope and Limitations</a:t>
             </a:r>
           </a:p>
         </p:txBody>
@@ -8879,6 +10372,42 @@
         <p:txBody>
           <a:bodyPr/>
           <a:lstStyle/>
+          <a:p>
+            <a:r>
+              <a:rPr lang="en-PH" dirty="0"/>
+              <a:t>Scope would only include issues and possible solutions</a:t>
+            </a:r>
+          </a:p>
+          <a:p>
+            <a:r>
+              <a:rPr lang="en-PH" dirty="0"/>
+              <a:t>For the security of the transmission of the election returns</a:t>
+            </a:r>
+          </a:p>
+          <a:p>
+            <a:r>
+              <a:rPr lang="en-PH" dirty="0"/>
+              <a:t>Issues prior and subsequent the transmission will not be covered</a:t>
+            </a:r>
+          </a:p>
+          <a:p>
+            <a:r>
+              <a:rPr lang="en-PH" dirty="0"/>
+              <a:t>Focus is on elimination of the transmission to unofficial servers</a:t>
+            </a:r>
+          </a:p>
+          <a:p>
+            <a:r>
+              <a:rPr lang="en-PH" dirty="0"/>
+              <a:t>As well as, validity of election returns being received</a:t>
+            </a:r>
+          </a:p>
+          <a:p>
+            <a:r>
+              <a:rPr lang="en-PH" dirty="0"/>
+              <a:t>Addressing confidentiality and integrity issue</a:t>
+            </a:r>
+          </a:p>
           <a:p>
             <a:endParaRPr lang="en-PH" dirty="0"/>
           </a:p>
@@ -8947,7 +10476,7 @@
     </p:spTree>
     <p:extLst>
       <p:ext uri="{BB962C8B-B14F-4D97-AF65-F5344CB8AC3E}">
-        <p14:creationId xmlns:p14="http://schemas.microsoft.com/office/powerpoint/2010/main" val="2339671285"/>
+        <p14:creationId xmlns:p14="http://schemas.microsoft.com/office/powerpoint/2010/main" val="1282033266"/>
       </p:ext>
     </p:extLst>
   </p:cSld>

</xml_diff>

<commit_message>
Edited paper and ppt
</commit_message>
<xml_diff>
--- a/Documentation/Research Paper/CSPROJ Presentation.pptx
+++ b/Documentation/Research Paper/CSPROJ Presentation.pptx
@@ -5,7 +5,7 @@
     <p:sldMasterId id="2147483648" r:id="rId1"/>
   </p:sldMasterIdLst>
   <p:notesMasterIdLst>
-    <p:notesMasterId r:id="rId21"/>
+    <p:notesMasterId r:id="rId22"/>
   </p:notesMasterIdLst>
   <p:sldIdLst>
     <p:sldId id="257" r:id="rId2"/>
@@ -24,9 +24,10 @@
     <p:sldId id="271" r:id="rId15"/>
     <p:sldId id="272" r:id="rId16"/>
     <p:sldId id="273" r:id="rId17"/>
-    <p:sldId id="270" r:id="rId18"/>
-    <p:sldId id="268" r:id="rId19"/>
-    <p:sldId id="269" r:id="rId20"/>
+    <p:sldId id="276" r:id="rId18"/>
+    <p:sldId id="270" r:id="rId19"/>
+    <p:sldId id="268" r:id="rId20"/>
+    <p:sldId id="269" r:id="rId21"/>
   </p:sldIdLst>
   <p:sldSz cx="12192000" cy="6858000"/>
   <p:notesSz cx="6858000" cy="9144000"/>
@@ -1402,15 +1403,90 @@
               <a:tabLst/>
               <a:defRPr/>
             </a:pPr>
-            <a:endParaRPr lang="en-PH" sz="1200" kern="1200" dirty="0">
-              <a:solidFill>
-                <a:schemeClr val="tx1"/>
-              </a:solidFill>
-              <a:effectLst/>
-              <a:latin typeface="+mn-lt"/>
-              <a:ea typeface="+mn-ea"/>
-              <a:cs typeface="+mn-cs"/>
-            </a:endParaRPr>
+            <a:r>
+              <a:rPr lang="en-PH" sz="1200" kern="1200" dirty="0">
+                <a:solidFill>
+                  <a:schemeClr val="tx1"/>
+                </a:solidFill>
+                <a:effectLst/>
+                <a:latin typeface="+mn-lt"/>
+                <a:ea typeface="+mn-ea"/>
+                <a:cs typeface="+mn-cs"/>
+              </a:rPr>
+              <a:t>Once there is a generated key and the key players are verified, it is the only time when the VCM will encrypt file (ERs) using its private key. After that, VCM will get the hash value of the file using the MD5, SHA, and </a:t>
+            </a:r>
+            <a:r>
+              <a:rPr lang="en-PH" sz="1200" kern="1200" dirty="0" err="1">
+                <a:solidFill>
+                  <a:schemeClr val="tx1"/>
+                </a:solidFill>
+                <a:effectLst/>
+                <a:latin typeface="+mn-lt"/>
+                <a:ea typeface="+mn-ea"/>
+                <a:cs typeface="+mn-cs"/>
+              </a:rPr>
+              <a:t>Bcrypt</a:t>
+            </a:r>
+            <a:r>
+              <a:rPr lang="en-PH" sz="1200" kern="1200" dirty="0">
+                <a:solidFill>
+                  <a:schemeClr val="tx1"/>
+                </a:solidFill>
+                <a:effectLst/>
+                <a:latin typeface="+mn-lt"/>
+                <a:ea typeface="+mn-ea"/>
+                <a:cs typeface="+mn-cs"/>
+              </a:rPr>
+              <a:t> hashing algorithms. Then the VCM will once again encrypt the file using the </a:t>
+            </a:r>
+            <a:r>
+              <a:rPr lang="en-PH" sz="1200" kern="1200" dirty="0" err="1">
+                <a:solidFill>
+                  <a:schemeClr val="tx1"/>
+                </a:solidFill>
+                <a:effectLst/>
+                <a:latin typeface="+mn-lt"/>
+                <a:ea typeface="+mn-ea"/>
+                <a:cs typeface="+mn-cs"/>
+              </a:rPr>
+              <a:t>Diffie</a:t>
+            </a:r>
+            <a:r>
+              <a:rPr lang="en-PH" sz="1200" kern="1200" dirty="0">
+                <a:solidFill>
+                  <a:schemeClr val="tx1"/>
+                </a:solidFill>
+                <a:effectLst/>
+                <a:latin typeface="+mn-lt"/>
+                <a:ea typeface="+mn-ea"/>
+                <a:cs typeface="+mn-cs"/>
+              </a:rPr>
+              <a:t>-Hellman generated key, as well as its hash values. Only then the VCM will send the encrypted file and hash values to the server key. The server key will decrypt the encrypted file and hash function using the </a:t>
+            </a:r>
+            <a:r>
+              <a:rPr lang="en-PH" sz="1200" kern="1200" dirty="0" err="1">
+                <a:solidFill>
+                  <a:schemeClr val="tx1"/>
+                </a:solidFill>
+                <a:effectLst/>
+                <a:latin typeface="+mn-lt"/>
+                <a:ea typeface="+mn-ea"/>
+                <a:cs typeface="+mn-cs"/>
+              </a:rPr>
+              <a:t>Diffie</a:t>
+            </a:r>
+            <a:r>
+              <a:rPr lang="en-PH" sz="1200" kern="1200" dirty="0">
+                <a:solidFill>
+                  <a:schemeClr val="tx1"/>
+                </a:solidFill>
+                <a:effectLst/>
+                <a:latin typeface="+mn-lt"/>
+                <a:ea typeface="+mn-ea"/>
+                <a:cs typeface="+mn-cs"/>
+              </a:rPr>
+              <a:t>-Hellman generated key and the public key of the VCM. Server key will then get the hash value of the file to check if the hash values are the same key. </a:t>
+            </a:r>
           </a:p>
         </p:txBody>
       </p:sp>
@@ -1440,7 +1516,7 @@
     </p:spTree>
     <p:extLst>
       <p:ext uri="{BB962C8B-B14F-4D97-AF65-F5344CB8AC3E}">
-        <p14:creationId xmlns:p14="http://schemas.microsoft.com/office/powerpoint/2010/main" val="3902562114"/>
+        <p14:creationId xmlns:p14="http://schemas.microsoft.com/office/powerpoint/2010/main" val="1455062575"/>
       </p:ext>
     </p:extLst>
   </p:cSld>
@@ -1549,7 +1625,7 @@
     </p:spTree>
     <p:extLst>
       <p:ext uri="{BB962C8B-B14F-4D97-AF65-F5344CB8AC3E}">
-        <p14:creationId xmlns:p14="http://schemas.microsoft.com/office/powerpoint/2010/main" val="425038557"/>
+        <p14:creationId xmlns:p14="http://schemas.microsoft.com/office/powerpoint/2010/main" val="3902562114"/>
       </p:ext>
     </p:extLst>
   </p:cSld>
@@ -1650,6 +1726,115 @@
             <a:fld id="{213B05C4-94C7-4412-9CB1-C9F207621576}" type="slidenum">
               <a:rPr lang="en-PH" smtClean="0"/>
               <a:t>19</a:t>
+            </a:fld>
+            <a:endParaRPr lang="en-PH"/>
+          </a:p>
+        </p:txBody>
+      </p:sp>
+    </p:spTree>
+    <p:extLst>
+      <p:ext uri="{BB962C8B-B14F-4D97-AF65-F5344CB8AC3E}">
+        <p14:creationId xmlns:p14="http://schemas.microsoft.com/office/powerpoint/2010/main" val="425038557"/>
+      </p:ext>
+    </p:extLst>
+  </p:cSld>
+  <p:clrMapOvr>
+    <a:masterClrMapping/>
+  </p:clrMapOvr>
+</p:notes>
+</file>
+
+<file path=ppt/notesSlides/notesSlide19.xml><?xml version="1.0" encoding="utf-8"?>
+<p:notes xmlns:a="http://schemas.openxmlformats.org/drawingml/2006/main" xmlns:r="http://schemas.openxmlformats.org/officeDocument/2006/relationships" xmlns:p="http://schemas.openxmlformats.org/presentationml/2006/main">
+  <p:cSld>
+    <p:spTree>
+      <p:nvGrpSpPr>
+        <p:cNvPr id="1" name=""/>
+        <p:cNvGrpSpPr/>
+        <p:nvPr/>
+      </p:nvGrpSpPr>
+      <p:grpSpPr>
+        <a:xfrm>
+          <a:off x="0" y="0"/>
+          <a:ext cx="0" cy="0"/>
+          <a:chOff x="0" y="0"/>
+          <a:chExt cx="0" cy="0"/>
+        </a:xfrm>
+      </p:grpSpPr>
+      <p:sp>
+        <p:nvSpPr>
+          <p:cNvPr id="2" name="Slide Image Placeholder 1"/>
+          <p:cNvSpPr>
+            <a:spLocks noGrp="1" noRot="1" noChangeAspect="1"/>
+          </p:cNvSpPr>
+          <p:nvPr>
+            <p:ph type="sldImg"/>
+          </p:nvPr>
+        </p:nvSpPr>
+        <p:spPr/>
+      </p:sp>
+      <p:sp>
+        <p:nvSpPr>
+          <p:cNvPr id="3" name="Notes Placeholder 2"/>
+          <p:cNvSpPr>
+            <a:spLocks noGrp="1"/>
+          </p:cNvSpPr>
+          <p:nvPr>
+            <p:ph type="body" idx="1"/>
+          </p:nvPr>
+        </p:nvSpPr>
+        <p:spPr/>
+        <p:txBody>
+          <a:bodyPr/>
+          <a:lstStyle/>
+          <a:p>
+            <a:pPr marL="0" marR="0" lvl="0" indent="0" algn="l" defTabSz="914400" rtl="0" eaLnBrk="1" fontAlgn="auto" latinLnBrk="0" hangingPunct="1">
+              <a:lnSpc>
+                <a:spcPct val="100000"/>
+              </a:lnSpc>
+              <a:spcBef>
+                <a:spcPts val="0"/>
+              </a:spcBef>
+              <a:spcAft>
+                <a:spcPts val="0"/>
+              </a:spcAft>
+              <a:buClrTx/>
+              <a:buSzTx/>
+              <a:buFontTx/>
+              <a:buNone/>
+              <a:tabLst/>
+              <a:defRPr/>
+            </a:pPr>
+            <a:endParaRPr lang="en-PH" sz="1200" kern="1200" dirty="0">
+              <a:solidFill>
+                <a:schemeClr val="tx1"/>
+              </a:solidFill>
+              <a:effectLst/>
+              <a:latin typeface="+mn-lt"/>
+              <a:ea typeface="+mn-ea"/>
+              <a:cs typeface="+mn-cs"/>
+            </a:endParaRPr>
+          </a:p>
+        </p:txBody>
+      </p:sp>
+      <p:sp>
+        <p:nvSpPr>
+          <p:cNvPr id="4" name="Slide Number Placeholder 3"/>
+          <p:cNvSpPr>
+            <a:spLocks noGrp="1"/>
+          </p:cNvSpPr>
+          <p:nvPr>
+            <p:ph type="sldNum" sz="quarter" idx="10"/>
+          </p:nvPr>
+        </p:nvSpPr>
+        <p:spPr/>
+        <p:txBody>
+          <a:bodyPr/>
+          <a:lstStyle/>
+          <a:p>
+            <a:fld id="{213B05C4-94C7-4412-9CB1-C9F207621576}" type="slidenum">
+              <a:rPr lang="en-PH" smtClean="0"/>
+              <a:t>20</a:t>
             </a:fld>
             <a:endParaRPr lang="en-PH"/>
           </a:p>
@@ -6379,7 +6564,15 @@
           <a:p>
             <a:r>
               <a:rPr lang="en-PH" dirty="0"/>
-              <a:t>Before accepting the ERs, the server will validate the VCM.</a:t>
+              <a:t>Before accepting the ERs, the </a:t>
+            </a:r>
+            <a:r>
+              <a:rPr lang="en-PH"/>
+              <a:t>server key </a:t>
+            </a:r>
+            <a:r>
+              <a:rPr lang="en-PH" dirty="0"/>
+              <a:t>will validate the VCM.</a:t>
             </a:r>
           </a:p>
           <a:p>
@@ -6528,32 +6721,15 @@
           </a:p>
         </p:txBody>
       </p:sp>
-      <p:sp>
-        <p:nvSpPr>
-          <p:cNvPr id="3" name="Content Placeholder 2"/>
-          <p:cNvSpPr>
-            <a:spLocks noGrp="1"/>
-          </p:cNvSpPr>
-          <p:nvPr>
-            <p:ph idx="1"/>
-          </p:nvPr>
-        </p:nvSpPr>
-        <p:spPr/>
-        <p:txBody>
-          <a:bodyPr/>
-          <a:lstStyle/>
-          <a:p>
-            <a:endParaRPr lang="en-PH" dirty="0"/>
-          </a:p>
-        </p:txBody>
-      </p:sp>
       <p:pic>
         <p:nvPicPr>
-          <p:cNvPr id="4" name="Picture 3"/>
+          <p:cNvPr id="8" name="Content Placeholder 7"/>
           <p:cNvPicPr>
-            <a:picLocks noChangeAspect="1"/>
+            <a:picLocks noGrp="1" noChangeAspect="1"/>
           </p:cNvPicPr>
-          <p:nvPr/>
+          <p:nvPr>
+            <p:ph idx="1"/>
+          </p:nvPr>
         </p:nvPicPr>
         <p:blipFill>
           <a:blip r:embed="rId3">
@@ -6569,6 +6745,33 @@
         </p:blipFill>
         <p:spPr>
           <a:xfrm>
+            <a:off x="5833189" y="3738483"/>
+            <a:ext cx="525622" cy="525622"/>
+          </a:xfrm>
+        </p:spPr>
+      </p:pic>
+      <p:pic>
+        <p:nvPicPr>
+          <p:cNvPr id="4" name="Picture 3"/>
+          <p:cNvPicPr>
+            <a:picLocks noChangeAspect="1"/>
+          </p:cNvPicPr>
+          <p:nvPr/>
+        </p:nvPicPr>
+        <p:blipFill>
+          <a:blip r:embed="rId4">
+            <a:extLst>
+              <a:ext uri="{28A0092B-C50C-407E-A947-70E740481C1C}">
+                <a14:useLocalDpi xmlns:a14="http://schemas.microsoft.com/office/drawing/2010/main" val="0"/>
+              </a:ext>
+            </a:extLst>
+          </a:blip>
+          <a:stretch>
+            <a:fillRect/>
+          </a:stretch>
+        </p:blipFill>
+        <p:spPr>
+          <a:xfrm>
             <a:off x="10595595" y="4723195"/>
             <a:ext cx="2435221" cy="2435221"/>
           </a:xfrm>
@@ -6586,7 +6789,7 @@
           <p:nvPr/>
         </p:nvPicPr>
         <p:blipFill>
-          <a:blip r:embed="rId4" cstate="hqprint">
+          <a:blip r:embed="rId5" cstate="hqprint">
             <a:extLst>
               <a:ext uri="{28A0092B-C50C-407E-A947-70E740481C1C}">
                 <a14:useLocalDpi xmlns:a14="http://schemas.microsoft.com/office/drawing/2010/main" val="0"/>
@@ -6605,6 +6808,77 @@
           <a:prstGeom prst="rect">
             <a:avLst/>
           </a:prstGeom>
+        </p:spPr>
+      </p:pic>
+      <p:pic>
+        <p:nvPicPr>
+          <p:cNvPr id="6" name="Picture 5"/>
+          <p:cNvPicPr>
+            <a:picLocks noChangeAspect="1"/>
+          </p:cNvPicPr>
+          <p:nvPr/>
+        </p:nvPicPr>
+        <p:blipFill>
+          <a:blip r:embed="rId6">
+            <a:extLst>
+              <a:ext uri="{28A0092B-C50C-407E-A947-70E740481C1C}">
+                <a14:useLocalDpi xmlns:a14="http://schemas.microsoft.com/office/drawing/2010/main" val="0"/>
+              </a:ext>
+            </a:extLst>
+          </a:blip>
+          <a:stretch>
+            <a:fillRect/>
+          </a:stretch>
+        </p:blipFill>
+        <p:spPr>
+          <a:xfrm>
+            <a:off x="4484183" y="2696541"/>
+            <a:ext cx="1088221" cy="1088221"/>
+          </a:xfrm>
+          <a:prstGeom prst="rect">
+            <a:avLst/>
+          </a:prstGeom>
+        </p:spPr>
+      </p:pic>
+      <p:pic>
+        <p:nvPicPr>
+          <p:cNvPr id="7" name="Picture 2" descr="http://image.flaticon.com/icons/png/128/230/230312.png"/>
+          <p:cNvPicPr>
+            <a:picLocks noChangeAspect="1" noChangeArrowheads="1"/>
+          </p:cNvPicPr>
+          <p:nvPr/>
+        </p:nvPicPr>
+        <p:blipFill>
+          <a:blip r:embed="rId7">
+            <a:extLst>
+              <a:ext uri="{28A0092B-C50C-407E-A947-70E740481C1C}">
+                <a14:useLocalDpi xmlns:a14="http://schemas.microsoft.com/office/drawing/2010/main" val="0"/>
+              </a:ext>
+            </a:extLst>
+          </a:blip>
+          <a:srcRect/>
+          <a:stretch>
+            <a:fillRect/>
+          </a:stretch>
+        </p:blipFill>
+        <p:spPr bwMode="auto">
+          <a:xfrm>
+            <a:off x="2601471" y="4309336"/>
+            <a:ext cx="1219200" cy="1219200"/>
+          </a:xfrm>
+          <a:prstGeom prst="rect">
+            <a:avLst/>
+          </a:prstGeom>
+          <a:noFill/>
+          <a:extLst>
+            <a:ext uri="{909E8E84-426E-40DD-AFC4-6F175D3DCCD1}">
+              <a14:hiddenFill xmlns:a14="http://schemas.microsoft.com/office/drawing/2010/main">
+                <a:solidFill>
+                  <a:srgbClr val="FFFFFF"/>
+                </a:solidFill>
+              </a14:hiddenFill>
+            </a:ext>
+          </a:extLst>
         </p:spPr>
       </p:pic>
     </p:spTree>
@@ -6654,7 +6928,7 @@
           <a:p>
             <a:r>
               <a:rPr lang="en-PH" dirty="0"/>
-              <a:t>Results and Discussion</a:t>
+              <a:t>Proposed Solution to the Problem</a:t>
             </a:r>
           </a:p>
         </p:txBody>
@@ -6741,6 +7015,137 @@
     </p:spTree>
     <p:extLst>
       <p:ext uri="{BB962C8B-B14F-4D97-AF65-F5344CB8AC3E}">
+        <p14:creationId xmlns:p14="http://schemas.microsoft.com/office/powerpoint/2010/main" val="4042930087"/>
+      </p:ext>
+    </p:extLst>
+  </p:cSld>
+  <p:clrMapOvr>
+    <a:masterClrMapping/>
+  </p:clrMapOvr>
+</p:sld>
+</file>
+
+<file path=ppt/slides/slide18.xml><?xml version="1.0" encoding="utf-8"?>
+<p:sld xmlns:a="http://schemas.openxmlformats.org/drawingml/2006/main" xmlns:r="http://schemas.openxmlformats.org/officeDocument/2006/relationships" xmlns:p="http://schemas.openxmlformats.org/presentationml/2006/main">
+  <p:cSld>
+    <p:spTree>
+      <p:nvGrpSpPr>
+        <p:cNvPr id="1" name=""/>
+        <p:cNvGrpSpPr/>
+        <p:nvPr/>
+      </p:nvGrpSpPr>
+      <p:grpSpPr>
+        <a:xfrm>
+          <a:off x="0" y="0"/>
+          <a:ext cx="0" cy="0"/>
+          <a:chOff x="0" y="0"/>
+          <a:chExt cx="0" cy="0"/>
+        </a:xfrm>
+      </p:grpSpPr>
+      <p:sp>
+        <p:nvSpPr>
+          <p:cNvPr id="2" name="Title 1"/>
+          <p:cNvSpPr>
+            <a:spLocks noGrp="1"/>
+          </p:cNvSpPr>
+          <p:nvPr>
+            <p:ph type="title"/>
+          </p:nvPr>
+        </p:nvSpPr>
+        <p:spPr/>
+        <p:txBody>
+          <a:bodyPr/>
+          <a:lstStyle/>
+          <a:p>
+            <a:r>
+              <a:rPr lang="en-PH" dirty="0"/>
+              <a:t>Results and Discussion</a:t>
+            </a:r>
+          </a:p>
+        </p:txBody>
+      </p:sp>
+      <p:sp>
+        <p:nvSpPr>
+          <p:cNvPr id="3" name="Content Placeholder 2"/>
+          <p:cNvSpPr>
+            <a:spLocks noGrp="1"/>
+          </p:cNvSpPr>
+          <p:nvPr>
+            <p:ph idx="1"/>
+          </p:nvPr>
+        </p:nvSpPr>
+        <p:spPr/>
+        <p:txBody>
+          <a:bodyPr/>
+          <a:lstStyle/>
+          <a:p>
+            <a:endParaRPr lang="en-PH" dirty="0"/>
+          </a:p>
+        </p:txBody>
+      </p:sp>
+      <p:pic>
+        <p:nvPicPr>
+          <p:cNvPr id="4" name="Picture 3"/>
+          <p:cNvPicPr>
+            <a:picLocks noChangeAspect="1"/>
+          </p:cNvPicPr>
+          <p:nvPr/>
+        </p:nvPicPr>
+        <p:blipFill>
+          <a:blip r:embed="rId3">
+            <a:extLst>
+              <a:ext uri="{28A0092B-C50C-407E-A947-70E740481C1C}">
+                <a14:useLocalDpi xmlns:a14="http://schemas.microsoft.com/office/drawing/2010/main" val="0"/>
+              </a:ext>
+            </a:extLst>
+          </a:blip>
+          <a:stretch>
+            <a:fillRect/>
+          </a:stretch>
+        </p:blipFill>
+        <p:spPr>
+          <a:xfrm>
+            <a:off x="10595595" y="4723195"/>
+            <a:ext cx="2435221" cy="2435221"/>
+          </a:xfrm>
+          <a:prstGeom prst="rect">
+            <a:avLst/>
+          </a:prstGeom>
+        </p:spPr>
+      </p:pic>
+      <p:pic>
+        <p:nvPicPr>
+          <p:cNvPr id="5" name="Picture 4"/>
+          <p:cNvPicPr>
+            <a:picLocks noChangeAspect="1"/>
+          </p:cNvPicPr>
+          <p:nvPr/>
+        </p:nvPicPr>
+        <p:blipFill>
+          <a:blip r:embed="rId4" cstate="hqprint">
+            <a:extLst>
+              <a:ext uri="{28A0092B-C50C-407E-A947-70E740481C1C}">
+                <a14:useLocalDpi xmlns:a14="http://schemas.microsoft.com/office/drawing/2010/main" val="0"/>
+              </a:ext>
+            </a:extLst>
+          </a:blip>
+          <a:stretch>
+            <a:fillRect/>
+          </a:stretch>
+        </p:blipFill>
+        <p:spPr>
+          <a:xfrm>
+            <a:off x="10045148" y="3917853"/>
+            <a:ext cx="1610683" cy="1610683"/>
+          </a:xfrm>
+          <a:prstGeom prst="rect">
+            <a:avLst/>
+          </a:prstGeom>
+        </p:spPr>
+      </p:pic>
+    </p:spTree>
+    <p:extLst>
+      <p:ext uri="{BB962C8B-B14F-4D97-AF65-F5344CB8AC3E}">
         <p14:creationId xmlns:p14="http://schemas.microsoft.com/office/powerpoint/2010/main" val="1993748265"/>
       </p:ext>
     </p:extLst>
@@ -6751,7 +7156,7 @@
 </p:sld>
 </file>
 
-<file path=ppt/slides/slide18.xml><?xml version="1.0" encoding="utf-8"?>
+<file path=ppt/slides/slide19.xml><?xml version="1.0" encoding="utf-8"?>
 <p:sld xmlns:a="http://schemas.openxmlformats.org/drawingml/2006/main" xmlns:r="http://schemas.openxmlformats.org/officeDocument/2006/relationships" xmlns:p="http://schemas.openxmlformats.org/presentationml/2006/main">
   <p:cSld>
     <p:spTree>
@@ -8016,7 +8421,7 @@
 </p:sld>
 </file>
 
-<file path=ppt/slides/slide19.xml><?xml version="1.0" encoding="utf-8"?>
+<file path=ppt/slides/slide2.xml><?xml version="1.0" encoding="utf-8"?>
 <p:sld xmlns:a="http://schemas.openxmlformats.org/drawingml/2006/main" xmlns:r="http://schemas.openxmlformats.org/officeDocument/2006/relationships" xmlns:p="http://schemas.openxmlformats.org/presentationml/2006/main">
   <p:cSld>
     <p:spTree>
@@ -8050,7 +8455,7 @@
           <a:p>
             <a:r>
               <a:rPr lang="en-PH" dirty="0"/>
-              <a:t>Conclusions and Recommendations</a:t>
+              <a:t>Abstract</a:t>
             </a:r>
           </a:p>
         </p:txBody>
@@ -8070,7 +8475,52 @@
           <a:bodyPr/>
           <a:lstStyle/>
           <a:p>
-            <a:endParaRPr lang="en-PH" dirty="0"/>
+            <a:r>
+              <a:rPr lang="en-PH" dirty="0"/>
+              <a:t>The Philippines adopted the automated election system in 2010.</a:t>
+            </a:r>
+          </a:p>
+          <a:p>
+            <a:r>
+              <a:rPr lang="en-PH" dirty="0"/>
+              <a:t>It should be transparent and credible according to R.A. 9369.</a:t>
+            </a:r>
+          </a:p>
+          <a:p>
+            <a:r>
+              <a:rPr lang="en-PH" dirty="0"/>
+              <a:t>In 2016 Presidential Election, there was a “secret server.”</a:t>
+            </a:r>
+          </a:p>
+          <a:p>
+            <a:r>
+              <a:rPr lang="en-PH" dirty="0"/>
+              <a:t>The hashing function used was said to be </a:t>
+            </a:r>
+            <a:r>
+              <a:rPr lang="en-PH" i="1" dirty="0"/>
+              <a:t>obsolete.</a:t>
+            </a:r>
+          </a:p>
+          <a:p>
+            <a:r>
+              <a:rPr lang="en-PH" dirty="0"/>
+              <a:t>The study aims to propose a technical solution.</a:t>
+            </a:r>
+          </a:p>
+          <a:p>
+            <a:r>
+              <a:rPr lang="en-PH" dirty="0"/>
+              <a:t>Through PKI and </a:t>
+            </a:r>
+            <a:r>
+              <a:rPr lang="en-PH" dirty="0" err="1"/>
+              <a:t>Diffie</a:t>
+            </a:r>
+            <a:r>
+              <a:rPr lang="en-PH" dirty="0"/>
+              <a:t>-Hellman algorithm.</a:t>
+            </a:r>
           </a:p>
         </p:txBody>
       </p:sp>
@@ -8137,7 +8587,7 @@
     </p:spTree>
     <p:extLst>
       <p:ext uri="{BB962C8B-B14F-4D97-AF65-F5344CB8AC3E}">
-        <p14:creationId xmlns:p14="http://schemas.microsoft.com/office/powerpoint/2010/main" val="2117801375"/>
+        <p14:creationId xmlns:p14="http://schemas.microsoft.com/office/powerpoint/2010/main" val="2299325555"/>
       </p:ext>
     </p:extLst>
   </p:cSld>
@@ -8147,7 +8597,7 @@
 </p:sld>
 </file>
 
-<file path=ppt/slides/slide2.xml><?xml version="1.0" encoding="utf-8"?>
+<file path=ppt/slides/slide20.xml><?xml version="1.0" encoding="utf-8"?>
 <p:sld xmlns:a="http://schemas.openxmlformats.org/drawingml/2006/main" xmlns:r="http://schemas.openxmlformats.org/officeDocument/2006/relationships" xmlns:p="http://schemas.openxmlformats.org/presentationml/2006/main">
   <p:cSld>
     <p:spTree>
@@ -8181,7 +8631,7 @@
           <a:p>
             <a:r>
               <a:rPr lang="en-PH" dirty="0"/>
-              <a:t>Abstract</a:t>
+              <a:t>Conclusions and Recommendations</a:t>
             </a:r>
           </a:p>
         </p:txBody>
@@ -8201,52 +8651,7 @@
           <a:bodyPr/>
           <a:lstStyle/>
           <a:p>
-            <a:r>
-              <a:rPr lang="en-PH" dirty="0"/>
-              <a:t>The Philippines adopted the automated election system in 2010.</a:t>
-            </a:r>
-          </a:p>
-          <a:p>
-            <a:r>
-              <a:rPr lang="en-PH" dirty="0"/>
-              <a:t>It should be transparent and credible according to R.A. 9369.</a:t>
-            </a:r>
-          </a:p>
-          <a:p>
-            <a:r>
-              <a:rPr lang="en-PH" dirty="0"/>
-              <a:t>In 2016 Presidential Election, there was a “secret server.”</a:t>
-            </a:r>
-          </a:p>
-          <a:p>
-            <a:r>
-              <a:rPr lang="en-PH" dirty="0"/>
-              <a:t>The hashing function used was said to be </a:t>
-            </a:r>
-            <a:r>
-              <a:rPr lang="en-PH" i="1" dirty="0"/>
-              <a:t>obsolete.</a:t>
-            </a:r>
-          </a:p>
-          <a:p>
-            <a:r>
-              <a:rPr lang="en-PH" dirty="0"/>
-              <a:t>The study aims to propose a technical solution.</a:t>
-            </a:r>
-          </a:p>
-          <a:p>
-            <a:r>
-              <a:rPr lang="en-PH" dirty="0"/>
-              <a:t>Through PKI and </a:t>
-            </a:r>
-            <a:r>
-              <a:rPr lang="en-PH" dirty="0" err="1"/>
-              <a:t>Diffie</a:t>
-            </a:r>
-            <a:r>
-              <a:rPr lang="en-PH" dirty="0"/>
-              <a:t>-Hellman algorithm.</a:t>
-            </a:r>
+            <a:endParaRPr lang="en-PH" dirty="0"/>
           </a:p>
         </p:txBody>
       </p:sp>
@@ -8313,7 +8718,7 @@
     </p:spTree>
     <p:extLst>
       <p:ext uri="{BB962C8B-B14F-4D97-AF65-F5344CB8AC3E}">
-        <p14:creationId xmlns:p14="http://schemas.microsoft.com/office/powerpoint/2010/main" val="2299325555"/>
+        <p14:creationId xmlns:p14="http://schemas.microsoft.com/office/powerpoint/2010/main" val="2117801375"/>
       </p:ext>
     </p:extLst>
   </p:cSld>

</xml_diff>

<commit_message>
Added proposed system diagram in ppt
</commit_message>
<xml_diff>
--- a/Documentation/Research Paper/CSPROJ Presentation.pptx
+++ b/Documentation/Research Paper/CSPROJ Presentation.pptx
@@ -5,7 +5,7 @@
     <p:sldMasterId id="2147483648" r:id="rId1"/>
   </p:sldMasterIdLst>
   <p:notesMasterIdLst>
-    <p:notesMasterId r:id="rId22"/>
+    <p:notesMasterId r:id="rId23"/>
   </p:notesMasterIdLst>
   <p:sldIdLst>
     <p:sldId id="257" r:id="rId2"/>
@@ -22,12 +22,13 @@
     <p:sldId id="267" r:id="rId13"/>
     <p:sldId id="259" r:id="rId14"/>
     <p:sldId id="271" r:id="rId15"/>
-    <p:sldId id="272" r:id="rId16"/>
-    <p:sldId id="273" r:id="rId17"/>
-    <p:sldId id="276" r:id="rId18"/>
-    <p:sldId id="270" r:id="rId19"/>
-    <p:sldId id="268" r:id="rId20"/>
-    <p:sldId id="269" r:id="rId21"/>
+    <p:sldId id="277" r:id="rId16"/>
+    <p:sldId id="272" r:id="rId17"/>
+    <p:sldId id="278" r:id="rId18"/>
+    <p:sldId id="276" r:id="rId19"/>
+    <p:sldId id="270" r:id="rId20"/>
+    <p:sldId id="273" r:id="rId21"/>
+    <p:sldId id="269" r:id="rId22"/>
   </p:sldIdLst>
   <p:sldSz cx="12192000" cy="6858000"/>
   <p:notesSz cx="6858000" cy="9144000"/>
@@ -1083,42 +1084,15 @@
               <a:tabLst/>
               <a:defRPr/>
             </a:pPr>
-            <a:r>
-              <a:rPr lang="en-PH" sz="1200" kern="1200" dirty="0">
-                <a:solidFill>
-                  <a:schemeClr val="tx1"/>
-                </a:solidFill>
-                <a:effectLst/>
-                <a:latin typeface="+mn-lt"/>
-                <a:ea typeface="+mn-ea"/>
-                <a:cs typeface="+mn-cs"/>
-              </a:rPr>
-              <a:t>The process will start once the voting period ends at 5:00pm of the election day. In the proposed system, a server key will collect all the public keys of the voting counting machine (VCM). Assuming that the BEI have already digitally signed the election returns (ERs), the VCM will then send the ERs to the official servers. After doing so, the server will validate the authenticity of the VCM through the </a:t>
-            </a:r>
-            <a:r>
-              <a:rPr lang="en-PH" sz="1200" kern="1200" dirty="0" err="1">
-                <a:solidFill>
-                  <a:schemeClr val="tx1"/>
-                </a:solidFill>
-                <a:effectLst/>
-                <a:latin typeface="+mn-lt"/>
-                <a:ea typeface="+mn-ea"/>
-                <a:cs typeface="+mn-cs"/>
-              </a:rPr>
-              <a:t>Diffie</a:t>
-            </a:r>
-            <a:r>
-              <a:rPr lang="en-PH" sz="1200" kern="1200" dirty="0">
-                <a:solidFill>
-                  <a:schemeClr val="tx1"/>
-                </a:solidFill>
-                <a:effectLst/>
-                <a:latin typeface="+mn-lt"/>
-                <a:ea typeface="+mn-ea"/>
-                <a:cs typeface="+mn-cs"/>
-              </a:rPr>
-              <a:t>-Hellman algorithm. With the said algorithm, the VCM and server will generate a new key that uses their own public and private keys to verify that the client and server are transmitting data to an authenticated client/server</a:t>
-            </a:r>
+            <a:endParaRPr lang="en-PH" sz="1200" kern="1200" dirty="0">
+              <a:solidFill>
+                <a:schemeClr val="tx1"/>
+              </a:solidFill>
+              <a:effectLst/>
+              <a:latin typeface="+mn-lt"/>
+              <a:ea typeface="+mn-ea"/>
+              <a:cs typeface="+mn-cs"/>
+            </a:endParaRPr>
           </a:p>
         </p:txBody>
       </p:sp>
@@ -1148,7 +1122,7 @@
     </p:spTree>
     <p:extLst>
       <p:ext uri="{BB962C8B-B14F-4D97-AF65-F5344CB8AC3E}">
-        <p14:creationId xmlns:p14="http://schemas.microsoft.com/office/powerpoint/2010/main" val="3735920242"/>
+        <p14:creationId xmlns:p14="http://schemas.microsoft.com/office/powerpoint/2010/main" val="1776505885"/>
       </p:ext>
     </p:extLst>
   </p:cSld>
@@ -1229,31 +1203,7 @@
                 <a:ea typeface="+mn-ea"/>
                 <a:cs typeface="+mn-cs"/>
               </a:rPr>
-              <a:t>Once there is a generated key and the key players are verified, it is the only time when the VCM will encrypt file (ERs) using its private key. After that, VCM will get the hash value of the file using the MD5, SHA, and </a:t>
-            </a:r>
-            <a:r>
-              <a:rPr lang="en-PH" sz="1200" kern="1200" dirty="0" err="1">
-                <a:solidFill>
-                  <a:schemeClr val="tx1"/>
-                </a:solidFill>
-                <a:effectLst/>
-                <a:latin typeface="+mn-lt"/>
-                <a:ea typeface="+mn-ea"/>
-                <a:cs typeface="+mn-cs"/>
-              </a:rPr>
-              <a:t>Bcrypt</a:t>
-            </a:r>
-            <a:r>
-              <a:rPr lang="en-PH" sz="1200" kern="1200" dirty="0">
-                <a:solidFill>
-                  <a:schemeClr val="tx1"/>
-                </a:solidFill>
-                <a:effectLst/>
-                <a:latin typeface="+mn-lt"/>
-                <a:ea typeface="+mn-ea"/>
-                <a:cs typeface="+mn-cs"/>
-              </a:rPr>
-              <a:t> hashing algorithms. Then the VCM will once again encrypt the file using the </a:t>
+              <a:t>The process will start once the voting period ends at 5:00pm of the election day. In the proposed system, a server key will collect all the public keys of the voting counting machine (VCM). Assuming that the BEI have already digitally signed the election returns (ERs), the VCM will then send the ERs to the official servers. After doing so, the server will validate the authenticity of the VCM through the </a:t>
             </a:r>
             <a:r>
               <a:rPr lang="en-PH" sz="1200" kern="1200" dirty="0" err="1">
@@ -1277,31 +1227,7 @@
                 <a:ea typeface="+mn-ea"/>
                 <a:cs typeface="+mn-cs"/>
               </a:rPr>
-              <a:t>-Hellman generated key, as well as its hash values. Only then the VCM will send the encrypted file and hash values to the server key. The server key will decrypt the encrypted file and hash function using the </a:t>
-            </a:r>
-            <a:r>
-              <a:rPr lang="en-PH" sz="1200" kern="1200" dirty="0" err="1">
-                <a:solidFill>
-                  <a:schemeClr val="tx1"/>
-                </a:solidFill>
-                <a:effectLst/>
-                <a:latin typeface="+mn-lt"/>
-                <a:ea typeface="+mn-ea"/>
-                <a:cs typeface="+mn-cs"/>
-              </a:rPr>
-              <a:t>Diffie</a:t>
-            </a:r>
-            <a:r>
-              <a:rPr lang="en-PH" sz="1200" kern="1200" dirty="0">
-                <a:solidFill>
-                  <a:schemeClr val="tx1"/>
-                </a:solidFill>
-                <a:effectLst/>
-                <a:latin typeface="+mn-lt"/>
-                <a:ea typeface="+mn-ea"/>
-                <a:cs typeface="+mn-cs"/>
-              </a:rPr>
-              <a:t>-Hellman generated key and the public key of the VCM. Server key will then get the hash value of the file to check if the hash values are the same key. </a:t>
+              <a:t>-Hellman algorithm. With the said algorithm, the VCM and server will generate a new key that uses their own public and private keys to verify that the client and server are transmitting data to an authenticated client/server</a:t>
             </a:r>
           </a:p>
         </p:txBody>
@@ -1332,7 +1258,7 @@
     </p:spTree>
     <p:extLst>
       <p:ext uri="{BB962C8B-B14F-4D97-AF65-F5344CB8AC3E}">
-        <p14:creationId xmlns:p14="http://schemas.microsoft.com/office/powerpoint/2010/main" val="2966215870"/>
+        <p14:creationId xmlns:p14="http://schemas.microsoft.com/office/powerpoint/2010/main" val="3735920242"/>
       </p:ext>
     </p:extLst>
   </p:cSld>
@@ -1437,7 +1363,31 @@
                 <a:ea typeface="+mn-ea"/>
                 <a:cs typeface="+mn-cs"/>
               </a:rPr>
-              <a:t> hashing algorithms. Then the VCM will once again encrypt the file using the </a:t>
+              <a:t> hashing algorithms. Then the VCM will once again encrypt the file and </a:t>
+            </a:r>
+            <a:r>
+              <a:rPr lang="en-PH" sz="1200" kern="1200" dirty="0">
+                <a:solidFill>
+                  <a:schemeClr val="tx1"/>
+                </a:solidFill>
+                <a:effectLst/>
+                <a:latin typeface="+mn-lt"/>
+                <a:ea typeface="+mn-ea"/>
+                <a:cs typeface="+mn-cs"/>
+              </a:rPr>
+              <a:t>its hash values</a:t>
+            </a:r>
+            <a:r>
+              <a:rPr lang="en-PH" sz="1200" kern="1200" dirty="0">
+                <a:solidFill>
+                  <a:schemeClr val="tx1"/>
+                </a:solidFill>
+                <a:effectLst/>
+                <a:latin typeface="+mn-lt"/>
+                <a:ea typeface="+mn-ea"/>
+                <a:cs typeface="+mn-cs"/>
+              </a:rPr>
+              <a:t> using the </a:t>
             </a:r>
             <a:r>
               <a:rPr lang="en-PH" sz="1200" kern="1200" dirty="0" err="1">
@@ -1461,7 +1411,7 @@
                 <a:ea typeface="+mn-ea"/>
                 <a:cs typeface="+mn-cs"/>
               </a:rPr>
-              <a:t>-Hellman generated key, as well as its hash values. Only then the VCM will send the encrypted file and hash values to the server key. The server key will decrypt the encrypted file and hash function using the </a:t>
+              <a:t>-Hellman generated key. Only then the VCM will send the encrypted file and hash values to the server key. The server key will decrypt the encrypted file and hash function using the </a:t>
             </a:r>
             <a:r>
               <a:rPr lang="en-PH" sz="1200" kern="1200" dirty="0" err="1">
@@ -1516,7 +1466,7 @@
     </p:spTree>
     <p:extLst>
       <p:ext uri="{BB962C8B-B14F-4D97-AF65-F5344CB8AC3E}">
-        <p14:creationId xmlns:p14="http://schemas.microsoft.com/office/powerpoint/2010/main" val="1455062575"/>
+        <p14:creationId xmlns:p14="http://schemas.microsoft.com/office/powerpoint/2010/main" val="871225638"/>
       </p:ext>
     </p:extLst>
   </p:cSld>
@@ -1587,15 +1537,90 @@
               <a:tabLst/>
               <a:defRPr/>
             </a:pPr>
-            <a:endParaRPr lang="en-PH" sz="1200" kern="1200" dirty="0">
-              <a:solidFill>
-                <a:schemeClr val="tx1"/>
-              </a:solidFill>
-              <a:effectLst/>
-              <a:latin typeface="+mn-lt"/>
-              <a:ea typeface="+mn-ea"/>
-              <a:cs typeface="+mn-cs"/>
-            </a:endParaRPr>
+            <a:r>
+              <a:rPr lang="en-PH" sz="1200" kern="1200" dirty="0">
+                <a:solidFill>
+                  <a:schemeClr val="tx1"/>
+                </a:solidFill>
+                <a:effectLst/>
+                <a:latin typeface="+mn-lt"/>
+                <a:ea typeface="+mn-ea"/>
+                <a:cs typeface="+mn-cs"/>
+              </a:rPr>
+              <a:t>Once there is a generated key and the key players are verified, it is the only time when the VCM will encrypt file (ERs) using its private key. After that, VCM will get the hash value of the file using the MD5, SHA, and </a:t>
+            </a:r>
+            <a:r>
+              <a:rPr lang="en-PH" sz="1200" kern="1200" dirty="0" err="1">
+                <a:solidFill>
+                  <a:schemeClr val="tx1"/>
+                </a:solidFill>
+                <a:effectLst/>
+                <a:latin typeface="+mn-lt"/>
+                <a:ea typeface="+mn-ea"/>
+                <a:cs typeface="+mn-cs"/>
+              </a:rPr>
+              <a:t>Bcrypt</a:t>
+            </a:r>
+            <a:r>
+              <a:rPr lang="en-PH" sz="1200" kern="1200" dirty="0">
+                <a:solidFill>
+                  <a:schemeClr val="tx1"/>
+                </a:solidFill>
+                <a:effectLst/>
+                <a:latin typeface="+mn-lt"/>
+                <a:ea typeface="+mn-ea"/>
+                <a:cs typeface="+mn-cs"/>
+              </a:rPr>
+              <a:t> hashing algorithms. Then the VCM will once again encrypt the file using the </a:t>
+            </a:r>
+            <a:r>
+              <a:rPr lang="en-PH" sz="1200" kern="1200" dirty="0" err="1">
+                <a:solidFill>
+                  <a:schemeClr val="tx1"/>
+                </a:solidFill>
+                <a:effectLst/>
+                <a:latin typeface="+mn-lt"/>
+                <a:ea typeface="+mn-ea"/>
+                <a:cs typeface="+mn-cs"/>
+              </a:rPr>
+              <a:t>Diffie</a:t>
+            </a:r>
+            <a:r>
+              <a:rPr lang="en-PH" sz="1200" kern="1200" dirty="0">
+                <a:solidFill>
+                  <a:schemeClr val="tx1"/>
+                </a:solidFill>
+                <a:effectLst/>
+                <a:latin typeface="+mn-lt"/>
+                <a:ea typeface="+mn-ea"/>
+                <a:cs typeface="+mn-cs"/>
+              </a:rPr>
+              <a:t>-Hellman generated key, as well as its hash values. Only then the VCM will send the encrypted file and hash values to the server key. The server key will decrypt the encrypted file and hash function using the </a:t>
+            </a:r>
+            <a:r>
+              <a:rPr lang="en-PH" sz="1200" kern="1200" dirty="0" err="1">
+                <a:solidFill>
+                  <a:schemeClr val="tx1"/>
+                </a:solidFill>
+                <a:effectLst/>
+                <a:latin typeface="+mn-lt"/>
+                <a:ea typeface="+mn-ea"/>
+                <a:cs typeface="+mn-cs"/>
+              </a:rPr>
+              <a:t>Diffie</a:t>
+            </a:r>
+            <a:r>
+              <a:rPr lang="en-PH" sz="1200" kern="1200" dirty="0">
+                <a:solidFill>
+                  <a:schemeClr val="tx1"/>
+                </a:solidFill>
+                <a:effectLst/>
+                <a:latin typeface="+mn-lt"/>
+                <a:ea typeface="+mn-ea"/>
+                <a:cs typeface="+mn-cs"/>
+              </a:rPr>
+              <a:t>-Hellman generated key and the public key of the VCM. Server key will then get the hash value of the file to check if the hash values are the same key. </a:t>
+            </a:r>
           </a:p>
         </p:txBody>
       </p:sp>
@@ -1625,7 +1650,7 @@
     </p:spTree>
     <p:extLst>
       <p:ext uri="{BB962C8B-B14F-4D97-AF65-F5344CB8AC3E}">
-        <p14:creationId xmlns:p14="http://schemas.microsoft.com/office/powerpoint/2010/main" val="3902562114"/>
+        <p14:creationId xmlns:p14="http://schemas.microsoft.com/office/powerpoint/2010/main" val="1455062575"/>
       </p:ext>
     </p:extLst>
   </p:cSld>
@@ -1734,7 +1759,7 @@
     </p:spTree>
     <p:extLst>
       <p:ext uri="{BB962C8B-B14F-4D97-AF65-F5344CB8AC3E}">
-        <p14:creationId xmlns:p14="http://schemas.microsoft.com/office/powerpoint/2010/main" val="425038557"/>
+        <p14:creationId xmlns:p14="http://schemas.microsoft.com/office/powerpoint/2010/main" val="3902562114"/>
       </p:ext>
     </p:extLst>
   </p:cSld>
@@ -1805,15 +1830,90 @@
               <a:tabLst/>
               <a:defRPr/>
             </a:pPr>
-            <a:endParaRPr lang="en-PH" sz="1200" kern="1200" dirty="0">
-              <a:solidFill>
-                <a:schemeClr val="tx1"/>
-              </a:solidFill>
-              <a:effectLst/>
-              <a:latin typeface="+mn-lt"/>
-              <a:ea typeface="+mn-ea"/>
-              <a:cs typeface="+mn-cs"/>
-            </a:endParaRPr>
+            <a:r>
+              <a:rPr lang="en-PH" sz="1200" kern="1200" dirty="0">
+                <a:solidFill>
+                  <a:schemeClr val="tx1"/>
+                </a:solidFill>
+                <a:effectLst/>
+                <a:latin typeface="+mn-lt"/>
+                <a:ea typeface="+mn-ea"/>
+                <a:cs typeface="+mn-cs"/>
+              </a:rPr>
+              <a:t>Once there is a generated key and the key players are verified, it is the only time when the VCM will encrypt file (ERs) using its private key. After that, VCM will get the hash value of the file using the MD5, SHA, and </a:t>
+            </a:r>
+            <a:r>
+              <a:rPr lang="en-PH" sz="1200" kern="1200" dirty="0" err="1">
+                <a:solidFill>
+                  <a:schemeClr val="tx1"/>
+                </a:solidFill>
+                <a:effectLst/>
+                <a:latin typeface="+mn-lt"/>
+                <a:ea typeface="+mn-ea"/>
+                <a:cs typeface="+mn-cs"/>
+              </a:rPr>
+              <a:t>Bcrypt</a:t>
+            </a:r>
+            <a:r>
+              <a:rPr lang="en-PH" sz="1200" kern="1200" dirty="0">
+                <a:solidFill>
+                  <a:schemeClr val="tx1"/>
+                </a:solidFill>
+                <a:effectLst/>
+                <a:latin typeface="+mn-lt"/>
+                <a:ea typeface="+mn-ea"/>
+                <a:cs typeface="+mn-cs"/>
+              </a:rPr>
+              <a:t> hashing algorithms. Then the VCM will once again encrypt the file using the </a:t>
+            </a:r>
+            <a:r>
+              <a:rPr lang="en-PH" sz="1200" kern="1200" dirty="0" err="1">
+                <a:solidFill>
+                  <a:schemeClr val="tx1"/>
+                </a:solidFill>
+                <a:effectLst/>
+                <a:latin typeface="+mn-lt"/>
+                <a:ea typeface="+mn-ea"/>
+                <a:cs typeface="+mn-cs"/>
+              </a:rPr>
+              <a:t>Diffie</a:t>
+            </a:r>
+            <a:r>
+              <a:rPr lang="en-PH" sz="1200" kern="1200" dirty="0">
+                <a:solidFill>
+                  <a:schemeClr val="tx1"/>
+                </a:solidFill>
+                <a:effectLst/>
+                <a:latin typeface="+mn-lt"/>
+                <a:ea typeface="+mn-ea"/>
+                <a:cs typeface="+mn-cs"/>
+              </a:rPr>
+              <a:t>-Hellman generated key, as well as its hash values. Only then the VCM will send the encrypted file and hash values to the server key. The server key will decrypt the encrypted file and hash function using the </a:t>
+            </a:r>
+            <a:r>
+              <a:rPr lang="en-PH" sz="1200" kern="1200" dirty="0" err="1">
+                <a:solidFill>
+                  <a:schemeClr val="tx1"/>
+                </a:solidFill>
+                <a:effectLst/>
+                <a:latin typeface="+mn-lt"/>
+                <a:ea typeface="+mn-ea"/>
+                <a:cs typeface="+mn-cs"/>
+              </a:rPr>
+              <a:t>Diffie</a:t>
+            </a:r>
+            <a:r>
+              <a:rPr lang="en-PH" sz="1200" kern="1200" dirty="0">
+                <a:solidFill>
+                  <a:schemeClr val="tx1"/>
+                </a:solidFill>
+                <a:effectLst/>
+                <a:latin typeface="+mn-lt"/>
+                <a:ea typeface="+mn-ea"/>
+                <a:cs typeface="+mn-cs"/>
+              </a:rPr>
+              <a:t>-Hellman generated key and the public key of the VCM. Server key will then get the hash value of the file to check if the hash values are the same key. </a:t>
+            </a:r>
           </a:p>
         </p:txBody>
       </p:sp>
@@ -1843,7 +1943,7 @@
     </p:spTree>
     <p:extLst>
       <p:ext uri="{BB962C8B-B14F-4D97-AF65-F5344CB8AC3E}">
-        <p14:creationId xmlns:p14="http://schemas.microsoft.com/office/powerpoint/2010/main" val="3870766767"/>
+        <p14:creationId xmlns:p14="http://schemas.microsoft.com/office/powerpoint/2010/main" val="2966215870"/>
       </p:ext>
     </p:extLst>
   </p:cSld>
@@ -1936,6 +2036,115 @@
     <p:extLst>
       <p:ext uri="{BB962C8B-B14F-4D97-AF65-F5344CB8AC3E}">
         <p14:creationId xmlns:p14="http://schemas.microsoft.com/office/powerpoint/2010/main" val="3040062780"/>
+      </p:ext>
+    </p:extLst>
+  </p:cSld>
+  <p:clrMapOvr>
+    <a:masterClrMapping/>
+  </p:clrMapOvr>
+</p:notes>
+</file>
+
+<file path=ppt/notesSlides/notesSlide20.xml><?xml version="1.0" encoding="utf-8"?>
+<p:notes xmlns:a="http://schemas.openxmlformats.org/drawingml/2006/main" xmlns:r="http://schemas.openxmlformats.org/officeDocument/2006/relationships" xmlns:p="http://schemas.openxmlformats.org/presentationml/2006/main">
+  <p:cSld>
+    <p:spTree>
+      <p:nvGrpSpPr>
+        <p:cNvPr id="1" name=""/>
+        <p:cNvGrpSpPr/>
+        <p:nvPr/>
+      </p:nvGrpSpPr>
+      <p:grpSpPr>
+        <a:xfrm>
+          <a:off x="0" y="0"/>
+          <a:ext cx="0" cy="0"/>
+          <a:chOff x="0" y="0"/>
+          <a:chExt cx="0" cy="0"/>
+        </a:xfrm>
+      </p:grpSpPr>
+      <p:sp>
+        <p:nvSpPr>
+          <p:cNvPr id="2" name="Slide Image Placeholder 1"/>
+          <p:cNvSpPr>
+            <a:spLocks noGrp="1" noRot="1" noChangeAspect="1"/>
+          </p:cNvSpPr>
+          <p:nvPr>
+            <p:ph type="sldImg"/>
+          </p:nvPr>
+        </p:nvSpPr>
+        <p:spPr/>
+      </p:sp>
+      <p:sp>
+        <p:nvSpPr>
+          <p:cNvPr id="3" name="Notes Placeholder 2"/>
+          <p:cNvSpPr>
+            <a:spLocks noGrp="1"/>
+          </p:cNvSpPr>
+          <p:nvPr>
+            <p:ph type="body" idx="1"/>
+          </p:nvPr>
+        </p:nvSpPr>
+        <p:spPr/>
+        <p:txBody>
+          <a:bodyPr/>
+          <a:lstStyle/>
+          <a:p>
+            <a:pPr marL="0" marR="0" lvl="0" indent="0" algn="l" defTabSz="914400" rtl="0" eaLnBrk="1" fontAlgn="auto" latinLnBrk="0" hangingPunct="1">
+              <a:lnSpc>
+                <a:spcPct val="100000"/>
+              </a:lnSpc>
+              <a:spcBef>
+                <a:spcPts val="0"/>
+              </a:spcBef>
+              <a:spcAft>
+                <a:spcPts val="0"/>
+              </a:spcAft>
+              <a:buClrTx/>
+              <a:buSzTx/>
+              <a:buFontTx/>
+              <a:buNone/>
+              <a:tabLst/>
+              <a:defRPr/>
+            </a:pPr>
+            <a:endParaRPr lang="en-PH" sz="1200" kern="1200" dirty="0">
+              <a:solidFill>
+                <a:schemeClr val="tx1"/>
+              </a:solidFill>
+              <a:effectLst/>
+              <a:latin typeface="+mn-lt"/>
+              <a:ea typeface="+mn-ea"/>
+              <a:cs typeface="+mn-cs"/>
+            </a:endParaRPr>
+          </a:p>
+        </p:txBody>
+      </p:sp>
+      <p:sp>
+        <p:nvSpPr>
+          <p:cNvPr id="4" name="Slide Number Placeholder 3"/>
+          <p:cNvSpPr>
+            <a:spLocks noGrp="1"/>
+          </p:cNvSpPr>
+          <p:nvPr>
+            <p:ph type="sldNum" sz="quarter" idx="10"/>
+          </p:nvPr>
+        </p:nvSpPr>
+        <p:spPr/>
+        <p:txBody>
+          <a:bodyPr/>
+          <a:lstStyle/>
+          <a:p>
+            <a:fld id="{213B05C4-94C7-4412-9CB1-C9F207621576}" type="slidenum">
+              <a:rPr lang="en-PH" smtClean="0"/>
+              <a:t>21</a:t>
+            </a:fld>
+            <a:endParaRPr lang="en-PH"/>
+          </a:p>
+        </p:txBody>
+      </p:sp>
+    </p:spTree>
+    <p:extLst>
+      <p:ext uri="{BB962C8B-B14F-4D97-AF65-F5344CB8AC3E}">
+        <p14:creationId xmlns:p14="http://schemas.microsoft.com/office/powerpoint/2010/main" val="3870766767"/>
       </p:ext>
     </p:extLst>
   </p:cSld>
@@ -6552,59 +6761,7 @@
           <a:p>
             <a:r>
               <a:rPr lang="en-PH" dirty="0"/>
-              <a:t>Once the poll closes on the election day</a:t>
-            </a:r>
-          </a:p>
-          <a:p>
-            <a:r>
-              <a:rPr lang="en-PH" dirty="0"/>
-              <a:t>VCM will send the election returns to the server key</a:t>
-            </a:r>
-          </a:p>
-          <a:p>
-            <a:r>
-              <a:rPr lang="en-PH" dirty="0"/>
-              <a:t>Before accepting the ERs, the </a:t>
-            </a:r>
-            <a:r>
-              <a:rPr lang="en-PH"/>
-              <a:t>server key </a:t>
-            </a:r>
-            <a:r>
-              <a:rPr lang="en-PH" dirty="0"/>
-              <a:t>will validate the VCM.</a:t>
-            </a:r>
-          </a:p>
-          <a:p>
-            <a:r>
-              <a:rPr lang="en-PH" dirty="0"/>
-              <a:t>Through the use of </a:t>
-            </a:r>
-            <a:r>
-              <a:rPr lang="en-PH" dirty="0" err="1"/>
-              <a:t>Diffie</a:t>
-            </a:r>
-            <a:r>
-              <a:rPr lang="en-PH" dirty="0"/>
-              <a:t>-Hellman algorithm</a:t>
-            </a:r>
-          </a:p>
-          <a:p>
-            <a:r>
-              <a:rPr lang="en-PH" dirty="0"/>
-              <a:t>Generates a key that uses their own private and public key</a:t>
-            </a:r>
-          </a:p>
-          <a:p>
-            <a:r>
-              <a:rPr lang="en-PH" dirty="0"/>
-              <a:t>Will only occur if both private and public key are valid</a:t>
-            </a:r>
-          </a:p>
-          <a:p>
-            <a:r>
-              <a:rPr lang="en-PH" dirty="0"/>
-              <a:t>Which serves as a validation for both sides: VCMs and servers</a:t>
+              <a:t>A server key will collect the public keys of VCMs</a:t>
             </a:r>
           </a:p>
         </p:txBody>
@@ -6669,10 +6826,172 @@
           </a:prstGeom>
         </p:spPr>
       </p:pic>
+      <p:cxnSp>
+        <p:nvCxnSpPr>
+          <p:cNvPr id="10" name="Connector: Elbow 9"/>
+          <p:cNvCxnSpPr>
+            <a:stCxn id="14" idx="1"/>
+            <a:endCxn id="11" idx="0"/>
+          </p:cNvCxnSpPr>
+          <p:nvPr/>
+        </p:nvCxnSpPr>
+        <p:spPr>
+          <a:xfrm rot="10800000" flipV="1">
+            <a:off x="3193817" y="3300675"/>
+            <a:ext cx="1360158" cy="975451"/>
+          </a:xfrm>
+          <a:prstGeom prst="bentConnector2">
+            <a:avLst/>
+          </a:prstGeom>
+          <a:ln>
+            <a:tailEnd type="triangle"/>
+          </a:ln>
+        </p:spPr>
+        <p:style>
+          <a:lnRef idx="1">
+            <a:schemeClr val="accent1"/>
+          </a:lnRef>
+          <a:fillRef idx="0">
+            <a:schemeClr val="accent1"/>
+          </a:fillRef>
+          <a:effectRef idx="0">
+            <a:schemeClr val="accent1"/>
+          </a:effectRef>
+          <a:fontRef idx="minor">
+            <a:schemeClr val="tx1"/>
+          </a:fontRef>
+        </p:style>
+      </p:cxnSp>
+      <p:cxnSp>
+        <p:nvCxnSpPr>
+          <p:cNvPr id="13" name="Connector: Elbow 12"/>
+          <p:cNvCxnSpPr>
+            <a:stCxn id="14" idx="3"/>
+            <a:endCxn id="12" idx="0"/>
+          </p:cNvCxnSpPr>
+          <p:nvPr/>
+        </p:nvCxnSpPr>
+        <p:spPr>
+          <a:xfrm>
+            <a:off x="5502612" y="3300676"/>
+            <a:ext cx="1273051" cy="975451"/>
+          </a:xfrm>
+          <a:prstGeom prst="bentConnector2">
+            <a:avLst/>
+          </a:prstGeom>
+          <a:ln>
+            <a:tailEnd type="triangle"/>
+          </a:ln>
+        </p:spPr>
+        <p:style>
+          <a:lnRef idx="1">
+            <a:schemeClr val="accent1"/>
+          </a:lnRef>
+          <a:fillRef idx="0">
+            <a:schemeClr val="accent1"/>
+          </a:fillRef>
+          <a:effectRef idx="0">
+            <a:schemeClr val="accent1"/>
+          </a:effectRef>
+          <a:fontRef idx="minor">
+            <a:schemeClr val="tx1"/>
+          </a:fontRef>
+        </p:style>
+      </p:cxnSp>
+      <p:pic>
+        <p:nvPicPr>
+          <p:cNvPr id="11" name="Content Placeholder 5"/>
+          <p:cNvPicPr>
+            <a:picLocks noChangeAspect="1"/>
+          </p:cNvPicPr>
+          <p:nvPr/>
+        </p:nvPicPr>
+        <p:blipFill>
+          <a:blip r:embed="rId5">
+            <a:extLst>
+              <a:ext uri="{28A0092B-C50C-407E-A947-70E740481C1C}">
+                <a14:useLocalDpi xmlns:a14="http://schemas.microsoft.com/office/drawing/2010/main" val="0"/>
+              </a:ext>
+            </a:extLst>
+          </a:blip>
+          <a:stretch>
+            <a:fillRect/>
+          </a:stretch>
+        </p:blipFill>
+        <p:spPr>
+          <a:xfrm>
+            <a:off x="2562749" y="4276127"/>
+            <a:ext cx="1262135" cy="1204687"/>
+          </a:xfrm>
+          <a:prstGeom prst="rect">
+            <a:avLst/>
+          </a:prstGeom>
+        </p:spPr>
+      </p:pic>
+      <p:pic>
+        <p:nvPicPr>
+          <p:cNvPr id="12" name="Content Placeholder 5"/>
+          <p:cNvPicPr>
+            <a:picLocks noChangeAspect="1"/>
+          </p:cNvPicPr>
+          <p:nvPr/>
+        </p:nvPicPr>
+        <p:blipFill>
+          <a:blip r:embed="rId5">
+            <a:extLst>
+              <a:ext uri="{28A0092B-C50C-407E-A947-70E740481C1C}">
+                <a14:useLocalDpi xmlns:a14="http://schemas.microsoft.com/office/drawing/2010/main" val="0"/>
+              </a:ext>
+            </a:extLst>
+          </a:blip>
+          <a:stretch>
+            <a:fillRect/>
+          </a:stretch>
+        </p:blipFill>
+        <p:spPr>
+          <a:xfrm>
+            <a:off x="6144595" y="4276127"/>
+            <a:ext cx="1262135" cy="1204687"/>
+          </a:xfrm>
+          <a:prstGeom prst="rect">
+            <a:avLst/>
+          </a:prstGeom>
+        </p:spPr>
+      </p:pic>
+      <p:pic>
+        <p:nvPicPr>
+          <p:cNvPr id="14" name="Picture 13"/>
+          <p:cNvPicPr>
+            <a:picLocks noChangeAspect="1"/>
+          </p:cNvPicPr>
+          <p:nvPr/>
+        </p:nvPicPr>
+        <p:blipFill>
+          <a:blip r:embed="rId6">
+            <a:extLst>
+              <a:ext uri="{28A0092B-C50C-407E-A947-70E740481C1C}">
+                <a14:useLocalDpi xmlns:a14="http://schemas.microsoft.com/office/drawing/2010/main" val="0"/>
+              </a:ext>
+            </a:extLst>
+          </a:blip>
+          <a:stretch>
+            <a:fillRect/>
+          </a:stretch>
+        </p:blipFill>
+        <p:spPr>
+          <a:xfrm>
+            <a:off x="4553975" y="2826357"/>
+            <a:ext cx="948637" cy="948637"/>
+          </a:xfrm>
+          <a:prstGeom prst="rect">
+            <a:avLst/>
+          </a:prstGeom>
+        </p:spPr>
+      </p:pic>
     </p:spTree>
     <p:extLst>
       <p:ext uri="{BB962C8B-B14F-4D97-AF65-F5344CB8AC3E}">
-        <p14:creationId xmlns:p14="http://schemas.microsoft.com/office/powerpoint/2010/main" val="432842192"/>
+        <p14:creationId xmlns:p14="http://schemas.microsoft.com/office/powerpoint/2010/main" val="2594294875"/>
       </p:ext>
     </p:extLst>
   </p:cSld>
@@ -6721,15 +7040,79 @@
           </a:p>
         </p:txBody>
       </p:sp>
+      <p:sp>
+        <p:nvSpPr>
+          <p:cNvPr id="3" name="Content Placeholder 2"/>
+          <p:cNvSpPr>
+            <a:spLocks noGrp="1"/>
+          </p:cNvSpPr>
+          <p:nvPr>
+            <p:ph idx="1"/>
+          </p:nvPr>
+        </p:nvSpPr>
+        <p:spPr/>
+        <p:txBody>
+          <a:bodyPr/>
+          <a:lstStyle/>
+          <a:p>
+            <a:r>
+              <a:rPr lang="en-PH" dirty="0"/>
+              <a:t>Once the poll closes on the election day</a:t>
+            </a:r>
+          </a:p>
+          <a:p>
+            <a:r>
+              <a:rPr lang="en-PH" dirty="0"/>
+              <a:t>VCM will send the election returns to the server key</a:t>
+            </a:r>
+          </a:p>
+          <a:p>
+            <a:r>
+              <a:rPr lang="en-PH" dirty="0"/>
+              <a:t>Before accepting the ERs, the server key will validate the VCM.</a:t>
+            </a:r>
+          </a:p>
+          <a:p>
+            <a:r>
+              <a:rPr lang="en-PH" dirty="0"/>
+              <a:t>Through the use of </a:t>
+            </a:r>
+            <a:r>
+              <a:rPr lang="en-PH" dirty="0" err="1"/>
+              <a:t>Diffie</a:t>
+            </a:r>
+            <a:r>
+              <a:rPr lang="en-PH" dirty="0"/>
+              <a:t>-Hellman algorithm</a:t>
+            </a:r>
+          </a:p>
+          <a:p>
+            <a:r>
+              <a:rPr lang="en-PH" dirty="0"/>
+              <a:t>Generates a key that uses their own private and public key</a:t>
+            </a:r>
+          </a:p>
+          <a:p>
+            <a:r>
+              <a:rPr lang="en-PH" dirty="0"/>
+              <a:t>Will only occur if both private and public key are valid</a:t>
+            </a:r>
+          </a:p>
+          <a:p>
+            <a:r>
+              <a:rPr lang="en-PH" dirty="0"/>
+              <a:t>Which serves as a validation for both sides: VCMs and servers</a:t>
+            </a:r>
+          </a:p>
+        </p:txBody>
+      </p:sp>
       <p:pic>
         <p:nvPicPr>
-          <p:cNvPr id="8" name="Content Placeholder 7"/>
+          <p:cNvPr id="4" name="Picture 3"/>
           <p:cNvPicPr>
-            <a:picLocks noGrp="1" noChangeAspect="1"/>
+            <a:picLocks noChangeAspect="1"/>
           </p:cNvPicPr>
-          <p:nvPr>
-            <p:ph idx="1"/>
-          </p:nvPr>
+          <p:nvPr/>
         </p:nvPicPr>
         <p:blipFill>
           <a:blip r:embed="rId3">
@@ -6745,21 +7128,24 @@
         </p:blipFill>
         <p:spPr>
           <a:xfrm>
-            <a:off x="5833189" y="3738483"/>
-            <a:ext cx="525622" cy="525622"/>
-          </a:xfrm>
+            <a:off x="10595595" y="4723195"/>
+            <a:ext cx="2435221" cy="2435221"/>
+          </a:xfrm>
+          <a:prstGeom prst="rect">
+            <a:avLst/>
+          </a:prstGeom>
         </p:spPr>
       </p:pic>
       <p:pic>
         <p:nvPicPr>
-          <p:cNvPr id="4" name="Picture 3"/>
+          <p:cNvPr id="5" name="Picture 4"/>
           <p:cNvPicPr>
             <a:picLocks noChangeAspect="1"/>
           </p:cNvPicPr>
           <p:nvPr/>
         </p:nvPicPr>
         <p:blipFill>
-          <a:blip r:embed="rId4">
+          <a:blip r:embed="rId4" cstate="hqprint">
             <a:extLst>
               <a:ext uri="{28A0092B-C50C-407E-A947-70E740481C1C}">
                 <a14:useLocalDpi xmlns:a14="http://schemas.microsoft.com/office/drawing/2010/main" val="0"/>
@@ -6772,119 +7158,18 @@
         </p:blipFill>
         <p:spPr>
           <a:xfrm>
-            <a:off x="10595595" y="4723195"/>
-            <a:ext cx="2435221" cy="2435221"/>
-          </a:xfrm>
-          <a:prstGeom prst="rect">
-            <a:avLst/>
-          </a:prstGeom>
-        </p:spPr>
-      </p:pic>
-      <p:pic>
-        <p:nvPicPr>
-          <p:cNvPr id="5" name="Picture 4"/>
-          <p:cNvPicPr>
-            <a:picLocks noChangeAspect="1"/>
-          </p:cNvPicPr>
-          <p:nvPr/>
-        </p:nvPicPr>
-        <p:blipFill>
-          <a:blip r:embed="rId5" cstate="hqprint">
-            <a:extLst>
-              <a:ext uri="{28A0092B-C50C-407E-A947-70E740481C1C}">
-                <a14:useLocalDpi xmlns:a14="http://schemas.microsoft.com/office/drawing/2010/main" val="0"/>
-              </a:ext>
-            </a:extLst>
-          </a:blip>
-          <a:stretch>
-            <a:fillRect/>
-          </a:stretch>
-        </p:blipFill>
-        <p:spPr>
-          <a:xfrm>
             <a:off x="10045148" y="3917853"/>
             <a:ext cx="1610683" cy="1610683"/>
           </a:xfrm>
           <a:prstGeom prst="rect">
             <a:avLst/>
           </a:prstGeom>
-        </p:spPr>
-      </p:pic>
-      <p:pic>
-        <p:nvPicPr>
-          <p:cNvPr id="6" name="Picture 5"/>
-          <p:cNvPicPr>
-            <a:picLocks noChangeAspect="1"/>
-          </p:cNvPicPr>
-          <p:nvPr/>
-        </p:nvPicPr>
-        <p:blipFill>
-          <a:blip r:embed="rId6">
-            <a:extLst>
-              <a:ext uri="{28A0092B-C50C-407E-A947-70E740481C1C}">
-                <a14:useLocalDpi xmlns:a14="http://schemas.microsoft.com/office/drawing/2010/main" val="0"/>
-              </a:ext>
-            </a:extLst>
-          </a:blip>
-          <a:stretch>
-            <a:fillRect/>
-          </a:stretch>
-        </p:blipFill>
-        <p:spPr>
-          <a:xfrm>
-            <a:off x="4484183" y="2696541"/>
-            <a:ext cx="1088221" cy="1088221"/>
-          </a:xfrm>
-          <a:prstGeom prst="rect">
-            <a:avLst/>
-          </a:prstGeom>
-        </p:spPr>
-      </p:pic>
-      <p:pic>
-        <p:nvPicPr>
-          <p:cNvPr id="7" name="Picture 2" descr="http://image.flaticon.com/icons/png/128/230/230312.png"/>
-          <p:cNvPicPr>
-            <a:picLocks noChangeAspect="1" noChangeArrowheads="1"/>
-          </p:cNvPicPr>
-          <p:nvPr/>
-        </p:nvPicPr>
-        <p:blipFill>
-          <a:blip r:embed="rId7">
-            <a:extLst>
-              <a:ext uri="{28A0092B-C50C-407E-A947-70E740481C1C}">
-                <a14:useLocalDpi xmlns:a14="http://schemas.microsoft.com/office/drawing/2010/main" val="0"/>
-              </a:ext>
-            </a:extLst>
-          </a:blip>
-          <a:srcRect/>
-          <a:stretch>
-            <a:fillRect/>
-          </a:stretch>
-        </p:blipFill>
-        <p:spPr bwMode="auto">
-          <a:xfrm>
-            <a:off x="2601471" y="4309336"/>
-            <a:ext cx="1219200" cy="1219200"/>
-          </a:xfrm>
-          <a:prstGeom prst="rect">
-            <a:avLst/>
-          </a:prstGeom>
-          <a:noFill/>
-          <a:extLst>
-            <a:ext uri="{909E8E84-426E-40DD-AFC4-6F175D3DCCD1}">
-              <a14:hiddenFill xmlns:a14="http://schemas.microsoft.com/office/drawing/2010/main">
-                <a:solidFill>
-                  <a:srgbClr val="FFFFFF"/>
-                </a:solidFill>
-              </a14:hiddenFill>
-            </a:ext>
-          </a:extLst>
         </p:spPr>
       </p:pic>
     </p:spTree>
     <p:extLst>
       <p:ext uri="{BB962C8B-B14F-4D97-AF65-F5344CB8AC3E}">
-        <p14:creationId xmlns:p14="http://schemas.microsoft.com/office/powerpoint/2010/main" val="3324807651"/>
+        <p14:creationId xmlns:p14="http://schemas.microsoft.com/office/powerpoint/2010/main" val="432842192"/>
       </p:ext>
     </p:extLst>
   </p:cSld>
@@ -6921,7 +7206,12 @@
             <p:ph type="title"/>
           </p:nvPr>
         </p:nvSpPr>
-        <p:spPr/>
+        <p:spPr>
+          <a:xfrm>
+            <a:off x="838200" y="296114"/>
+            <a:ext cx="10515600" cy="1325563"/>
+          </a:xfrm>
+        </p:spPr>
         <p:txBody>
           <a:bodyPr/>
           <a:lstStyle/>
@@ -6933,28 +7223,373 @@
           </a:p>
         </p:txBody>
       </p:sp>
-      <p:sp>
-        <p:nvSpPr>
-          <p:cNvPr id="3" name="Content Placeholder 2"/>
-          <p:cNvSpPr>
-            <a:spLocks noGrp="1"/>
-          </p:cNvSpPr>
-          <p:nvPr>
-            <p:ph idx="1"/>
-          </p:nvPr>
-        </p:nvSpPr>
-        <p:spPr/>
-        <p:txBody>
-          <a:bodyPr/>
-          <a:lstStyle/>
-          <a:p>
-            <a:endParaRPr lang="en-PH" dirty="0"/>
-          </a:p>
-        </p:txBody>
-      </p:sp>
       <p:pic>
         <p:nvPicPr>
-          <p:cNvPr id="4" name="Picture 3"/>
+          <p:cNvPr id="8" name="Content Placeholder 7"/>
+          <p:cNvPicPr>
+            <a:picLocks noGrp="1" noChangeAspect="1"/>
+          </p:cNvPicPr>
+          <p:nvPr>
+            <p:ph idx="1"/>
+          </p:nvPr>
+        </p:nvPicPr>
+        <p:blipFill>
+          <a:blip r:embed="rId3">
+            <a:extLst>
+              <a:ext uri="{28A0092B-C50C-407E-A947-70E740481C1C}">
+                <a14:useLocalDpi xmlns:a14="http://schemas.microsoft.com/office/drawing/2010/main" val="0"/>
+              </a:ext>
+            </a:extLst>
+          </a:blip>
+          <a:stretch>
+            <a:fillRect/>
+          </a:stretch>
+        </p:blipFill>
+        <p:spPr>
+          <a:xfrm>
+            <a:off x="2511668" y="4585171"/>
+            <a:ext cx="573425" cy="573425"/>
+          </a:xfrm>
+        </p:spPr>
+      </p:pic>
+      <p:pic>
+        <p:nvPicPr>
+          <p:cNvPr id="9" name="Content Placeholder 5"/>
+          <p:cNvPicPr>
+            <a:picLocks noChangeAspect="1"/>
+          </p:cNvPicPr>
+          <p:nvPr/>
+        </p:nvPicPr>
+        <p:blipFill>
+          <a:blip r:embed="rId4">
+            <a:extLst>
+              <a:ext uri="{28A0092B-C50C-407E-A947-70E740481C1C}">
+                <a14:useLocalDpi xmlns:a14="http://schemas.microsoft.com/office/drawing/2010/main" val="0"/>
+              </a:ext>
+            </a:extLst>
+          </a:blip>
+          <a:stretch>
+            <a:fillRect/>
+          </a:stretch>
+        </p:blipFill>
+        <p:spPr>
+          <a:xfrm>
+            <a:off x="475158" y="2809104"/>
+            <a:ext cx="1262135" cy="1204687"/>
+          </a:xfrm>
+          <a:prstGeom prst="rect">
+            <a:avLst/>
+          </a:prstGeom>
+        </p:spPr>
+      </p:pic>
+      <p:pic>
+        <p:nvPicPr>
+          <p:cNvPr id="10" name="Picture 9"/>
+          <p:cNvPicPr>
+            <a:picLocks noChangeAspect="1"/>
+          </p:cNvPicPr>
+          <p:nvPr/>
+        </p:nvPicPr>
+        <p:blipFill>
+          <a:blip r:embed="rId5">
+            <a:extLst>
+              <a:ext uri="{28A0092B-C50C-407E-A947-70E740481C1C}">
+                <a14:useLocalDpi xmlns:a14="http://schemas.microsoft.com/office/drawing/2010/main" val="0"/>
+              </a:ext>
+            </a:extLst>
+          </a:blip>
+          <a:stretch>
+            <a:fillRect/>
+          </a:stretch>
+        </p:blipFill>
+        <p:spPr>
+          <a:xfrm>
+            <a:off x="10702669" y="2911750"/>
+            <a:ext cx="948637" cy="948637"/>
+          </a:xfrm>
+          <a:prstGeom prst="rect">
+            <a:avLst/>
+          </a:prstGeom>
+        </p:spPr>
+      </p:pic>
+      <p:pic>
+        <p:nvPicPr>
+          <p:cNvPr id="3" name="Picture 2"/>
+          <p:cNvPicPr>
+            <a:picLocks noChangeAspect="1"/>
+          </p:cNvPicPr>
+          <p:nvPr/>
+        </p:nvPicPr>
+        <p:blipFill>
+          <a:blip r:embed="rId6">
+            <a:extLst>
+              <a:ext uri="{28A0092B-C50C-407E-A947-70E740481C1C}">
+                <a14:useLocalDpi xmlns:a14="http://schemas.microsoft.com/office/drawing/2010/main" val="0"/>
+              </a:ext>
+            </a:extLst>
+          </a:blip>
+          <a:stretch>
+            <a:fillRect/>
+          </a:stretch>
+        </p:blipFill>
+        <p:spPr>
+          <a:xfrm>
+            <a:off x="1619324" y="1678395"/>
+            <a:ext cx="892344" cy="892344"/>
+          </a:xfrm>
+          <a:prstGeom prst="rect">
+            <a:avLst/>
+          </a:prstGeom>
+        </p:spPr>
+      </p:pic>
+      <p:pic>
+        <p:nvPicPr>
+          <p:cNvPr id="11" name="Picture 10"/>
+          <p:cNvPicPr>
+            <a:picLocks noChangeAspect="1"/>
+          </p:cNvPicPr>
+          <p:nvPr/>
+        </p:nvPicPr>
+        <p:blipFill>
+          <a:blip r:embed="rId7">
+            <a:extLst>
+              <a:ext uri="{28A0092B-C50C-407E-A947-70E740481C1C}">
+                <a14:useLocalDpi xmlns:a14="http://schemas.microsoft.com/office/drawing/2010/main" val="0"/>
+              </a:ext>
+            </a:extLst>
+          </a:blip>
+          <a:stretch>
+            <a:fillRect/>
+          </a:stretch>
+        </p:blipFill>
+        <p:spPr>
+          <a:xfrm>
+            <a:off x="1429289" y="3552383"/>
+            <a:ext cx="308004" cy="308004"/>
+          </a:xfrm>
+          <a:prstGeom prst="rect">
+            <a:avLst/>
+          </a:prstGeom>
+        </p:spPr>
+      </p:pic>
+      <p:pic>
+        <p:nvPicPr>
+          <p:cNvPr id="12" name="Picture 11"/>
+          <p:cNvPicPr>
+            <a:picLocks noChangeAspect="1"/>
+          </p:cNvPicPr>
+          <p:nvPr/>
+        </p:nvPicPr>
+        <p:blipFill>
+          <a:blip r:embed="rId7">
+            <a:extLst>
+              <a:ext uri="{28A0092B-C50C-407E-A947-70E740481C1C}">
+                <a14:useLocalDpi xmlns:a14="http://schemas.microsoft.com/office/drawing/2010/main" val="0"/>
+              </a:ext>
+            </a:extLst>
+          </a:blip>
+          <a:stretch>
+            <a:fillRect/>
+          </a:stretch>
+        </p:blipFill>
+        <p:spPr>
+          <a:xfrm>
+            <a:off x="11480051" y="3601724"/>
+            <a:ext cx="308004" cy="308004"/>
+          </a:xfrm>
+          <a:prstGeom prst="rect">
+            <a:avLst/>
+          </a:prstGeom>
+        </p:spPr>
+      </p:pic>
+      <p:pic>
+        <p:nvPicPr>
+          <p:cNvPr id="13" name="Picture 12"/>
+          <p:cNvPicPr>
+            <a:picLocks noChangeAspect="1"/>
+          </p:cNvPicPr>
+          <p:nvPr/>
+        </p:nvPicPr>
+        <p:blipFill>
+          <a:blip r:embed="rId8">
+            <a:extLst>
+              <a:ext uri="{28A0092B-C50C-407E-A947-70E740481C1C}">
+                <a14:useLocalDpi xmlns:a14="http://schemas.microsoft.com/office/drawing/2010/main" val="0"/>
+              </a:ext>
+            </a:extLst>
+          </a:blip>
+          <a:stretch>
+            <a:fillRect/>
+          </a:stretch>
+        </p:blipFill>
+        <p:spPr>
+          <a:xfrm>
+            <a:off x="5812471" y="1683280"/>
+            <a:ext cx="882573" cy="882573"/>
+          </a:xfrm>
+          <a:prstGeom prst="rect">
+            <a:avLst/>
+          </a:prstGeom>
+        </p:spPr>
+      </p:pic>
+      <p:pic>
+        <p:nvPicPr>
+          <p:cNvPr id="14" name="Picture 13"/>
+          <p:cNvPicPr>
+            <a:picLocks noChangeAspect="1"/>
+          </p:cNvPicPr>
+          <p:nvPr/>
+        </p:nvPicPr>
+        <p:blipFill>
+          <a:blip r:embed="rId9">
+            <a:extLst>
+              <a:ext uri="{28A0092B-C50C-407E-A947-70E740481C1C}">
+                <a14:useLocalDpi xmlns:a14="http://schemas.microsoft.com/office/drawing/2010/main" val="0"/>
+              </a:ext>
+            </a:extLst>
+          </a:blip>
+          <a:stretch>
+            <a:fillRect/>
+          </a:stretch>
+        </p:blipFill>
+        <p:spPr>
+          <a:xfrm>
+            <a:off x="6545573" y="3057312"/>
+            <a:ext cx="737159" cy="737159"/>
+          </a:xfrm>
+          <a:prstGeom prst="rect">
+            <a:avLst/>
+          </a:prstGeom>
+        </p:spPr>
+      </p:pic>
+      <p:pic>
+        <p:nvPicPr>
+          <p:cNvPr id="15" name="Picture 14"/>
+          <p:cNvPicPr>
+            <a:picLocks noChangeAspect="1"/>
+          </p:cNvPicPr>
+          <p:nvPr/>
+        </p:nvPicPr>
+        <p:blipFill>
+          <a:blip r:embed="rId10">
+            <a:extLst>
+              <a:ext uri="{28A0092B-C50C-407E-A947-70E740481C1C}">
+                <a14:useLocalDpi xmlns:a14="http://schemas.microsoft.com/office/drawing/2010/main" val="0"/>
+              </a:ext>
+            </a:extLst>
+          </a:blip>
+          <a:stretch>
+            <a:fillRect/>
+          </a:stretch>
+        </p:blipFill>
+        <p:spPr>
+          <a:xfrm>
+            <a:off x="2477162" y="3048473"/>
+            <a:ext cx="737159" cy="737159"/>
+          </a:xfrm>
+          <a:prstGeom prst="rect">
+            <a:avLst/>
+          </a:prstGeom>
+        </p:spPr>
+      </p:pic>
+      <p:pic>
+        <p:nvPicPr>
+          <p:cNvPr id="17" name="Picture 16"/>
+          <p:cNvPicPr>
+            <a:picLocks noChangeAspect="1"/>
+          </p:cNvPicPr>
+          <p:nvPr/>
+        </p:nvPicPr>
+        <p:blipFill>
+          <a:blip r:embed="rId6">
+            <a:extLst>
+              <a:ext uri="{28A0092B-C50C-407E-A947-70E740481C1C}">
+                <a14:useLocalDpi xmlns:a14="http://schemas.microsoft.com/office/drawing/2010/main" val="0"/>
+              </a:ext>
+            </a:extLst>
+          </a:blip>
+          <a:stretch>
+            <a:fillRect/>
+          </a:stretch>
+        </p:blipFill>
+        <p:spPr>
+          <a:xfrm>
+            <a:off x="7915019" y="2979719"/>
+            <a:ext cx="892344" cy="892344"/>
+          </a:xfrm>
+          <a:prstGeom prst="rect">
+            <a:avLst/>
+          </a:prstGeom>
+        </p:spPr>
+      </p:pic>
+      <p:pic>
+        <p:nvPicPr>
+          <p:cNvPr id="18" name="Picture 17"/>
+          <p:cNvPicPr>
+            <a:picLocks noChangeAspect="1"/>
+          </p:cNvPicPr>
+          <p:nvPr/>
+        </p:nvPicPr>
+        <p:blipFill>
+          <a:blip r:embed="rId11">
+            <a:extLst>
+              <a:ext uri="{28A0092B-C50C-407E-A947-70E740481C1C}">
+                <a14:useLocalDpi xmlns:a14="http://schemas.microsoft.com/office/drawing/2010/main" val="0"/>
+              </a:ext>
+            </a:extLst>
+          </a:blip>
+          <a:stretch>
+            <a:fillRect/>
+          </a:stretch>
+        </p:blipFill>
+        <p:spPr>
+          <a:xfrm>
+            <a:off x="3892457" y="3035475"/>
+            <a:ext cx="766635" cy="766635"/>
+          </a:xfrm>
+          <a:prstGeom prst="rect">
+            <a:avLst/>
+          </a:prstGeom>
+        </p:spPr>
+      </p:pic>
+      <p:sp>
+        <p:nvSpPr>
+          <p:cNvPr id="19" name="TextBox 18"/>
+          <p:cNvSpPr txBox="1"/>
+          <p:nvPr/>
+        </p:nvSpPr>
+        <p:spPr>
+          <a:xfrm>
+            <a:off x="3357353" y="1791091"/>
+            <a:ext cx="599599" cy="523220"/>
+          </a:xfrm>
+          <a:prstGeom prst="rect">
+            <a:avLst/>
+          </a:prstGeom>
+          <a:noFill/>
+        </p:spPr>
+        <p:txBody>
+          <a:bodyPr wrap="square" rtlCol="0">
+            <a:spAutoFit/>
+          </a:bodyPr>
+          <a:lstStyle/>
+          <a:p>
+            <a:r>
+              <a:rPr lang="en-PH" sz="2800" dirty="0">
+                <a:solidFill>
+                  <a:schemeClr val="bg2">
+                    <a:lumMod val="25000"/>
+                  </a:schemeClr>
+                </a:solidFill>
+              </a:rPr>
+              <a:t>h()</a:t>
+            </a:r>
+          </a:p>
+        </p:txBody>
+      </p:sp>
+      <p:pic>
+        <p:nvPicPr>
+          <p:cNvPr id="20" name="Content Placeholder 7"/>
           <p:cNvPicPr>
             <a:picLocks noChangeAspect="1"/>
           </p:cNvPicPr>
@@ -6974,8 +7609,8 @@
         </p:blipFill>
         <p:spPr>
           <a:xfrm>
-            <a:off x="10595595" y="4723195"/>
-            <a:ext cx="2435221" cy="2435221"/>
+            <a:off x="5098155" y="4585171"/>
+            <a:ext cx="573425" cy="573425"/>
           </a:xfrm>
           <a:prstGeom prst="rect">
             <a:avLst/>
@@ -6984,14 +7619,14 @@
       </p:pic>
       <p:pic>
         <p:nvPicPr>
-          <p:cNvPr id="5" name="Picture 4"/>
+          <p:cNvPr id="21" name="Picture 20"/>
           <p:cNvPicPr>
             <a:picLocks noChangeAspect="1"/>
           </p:cNvPicPr>
           <p:nvPr/>
         </p:nvPicPr>
         <p:blipFill>
-          <a:blip r:embed="rId4" cstate="hqprint">
+          <a:blip r:embed="rId10">
             <a:extLst>
               <a:ext uri="{28A0092B-C50C-407E-A947-70E740481C1C}">
                 <a14:useLocalDpi xmlns:a14="http://schemas.microsoft.com/office/drawing/2010/main" val="0"/>
@@ -7004,18 +7639,825 @@
         </p:blipFill>
         <p:spPr>
           <a:xfrm>
-            <a:off x="10045148" y="3917853"/>
-            <a:ext cx="1610683" cy="1610683"/>
+            <a:off x="5063649" y="3048473"/>
+            <a:ext cx="737159" cy="737159"/>
           </a:xfrm>
           <a:prstGeom prst="rect">
             <a:avLst/>
           </a:prstGeom>
         </p:spPr>
       </p:pic>
+      <p:pic>
+        <p:nvPicPr>
+          <p:cNvPr id="23" name="Content Placeholder 7"/>
+          <p:cNvPicPr>
+            <a:picLocks noChangeAspect="1"/>
+          </p:cNvPicPr>
+          <p:nvPr/>
+        </p:nvPicPr>
+        <p:blipFill>
+          <a:blip r:embed="rId3">
+            <a:extLst>
+              <a:ext uri="{28A0092B-C50C-407E-A947-70E740481C1C}">
+                <a14:useLocalDpi xmlns:a14="http://schemas.microsoft.com/office/drawing/2010/main" val="0"/>
+              </a:ext>
+            </a:extLst>
+          </a:blip>
+          <a:stretch>
+            <a:fillRect/>
+          </a:stretch>
+        </p:blipFill>
+        <p:spPr>
+          <a:xfrm>
+            <a:off x="6055750" y="5528536"/>
+            <a:ext cx="573425" cy="573425"/>
+          </a:xfrm>
+          <a:prstGeom prst="rect">
+            <a:avLst/>
+          </a:prstGeom>
+        </p:spPr>
+      </p:pic>
+      <p:pic>
+        <p:nvPicPr>
+          <p:cNvPr id="24" name="Content Placeholder 7"/>
+          <p:cNvPicPr>
+            <a:picLocks noChangeAspect="1"/>
+          </p:cNvPicPr>
+          <p:nvPr/>
+        </p:nvPicPr>
+        <p:blipFill>
+          <a:blip r:embed="rId3">
+            <a:extLst>
+              <a:ext uri="{28A0092B-C50C-407E-A947-70E740481C1C}">
+                <a14:useLocalDpi xmlns:a14="http://schemas.microsoft.com/office/drawing/2010/main" val="0"/>
+              </a:ext>
+            </a:extLst>
+          </a:blip>
+          <a:stretch>
+            <a:fillRect/>
+          </a:stretch>
+        </p:blipFill>
+        <p:spPr>
+          <a:xfrm>
+            <a:off x="7179622" y="5528536"/>
+            <a:ext cx="573425" cy="573425"/>
+          </a:xfrm>
+          <a:prstGeom prst="rect">
+            <a:avLst/>
+          </a:prstGeom>
+        </p:spPr>
+      </p:pic>
+      <p:pic>
+        <p:nvPicPr>
+          <p:cNvPr id="29" name="Picture 28"/>
+          <p:cNvPicPr>
+            <a:picLocks noChangeAspect="1"/>
+          </p:cNvPicPr>
+          <p:nvPr/>
+        </p:nvPicPr>
+        <p:blipFill>
+          <a:blip r:embed="rId11">
+            <a:extLst>
+              <a:ext uri="{28A0092B-C50C-407E-A947-70E740481C1C}">
+                <a14:useLocalDpi xmlns:a14="http://schemas.microsoft.com/office/drawing/2010/main" val="0"/>
+              </a:ext>
+            </a:extLst>
+          </a:blip>
+          <a:stretch>
+            <a:fillRect/>
+          </a:stretch>
+        </p:blipFill>
+        <p:spPr>
+          <a:xfrm>
+            <a:off x="9439650" y="3035475"/>
+            <a:ext cx="766635" cy="766635"/>
+          </a:xfrm>
+          <a:prstGeom prst="rect">
+            <a:avLst/>
+          </a:prstGeom>
+        </p:spPr>
+      </p:pic>
+      <p:sp>
+        <p:nvSpPr>
+          <p:cNvPr id="30" name="TextBox 29"/>
+          <p:cNvSpPr txBox="1"/>
+          <p:nvPr/>
+        </p:nvSpPr>
+        <p:spPr>
+          <a:xfrm>
+            <a:off x="8904546" y="1791091"/>
+            <a:ext cx="599599" cy="523220"/>
+          </a:xfrm>
+          <a:prstGeom prst="rect">
+            <a:avLst/>
+          </a:prstGeom>
+          <a:noFill/>
+        </p:spPr>
+        <p:txBody>
+          <a:bodyPr wrap="square" rtlCol="0">
+            <a:spAutoFit/>
+          </a:bodyPr>
+          <a:lstStyle/>
+          <a:p>
+            <a:r>
+              <a:rPr lang="en-PH" sz="2800" dirty="0">
+                <a:solidFill>
+                  <a:schemeClr val="bg2">
+                    <a:lumMod val="25000"/>
+                  </a:schemeClr>
+                </a:solidFill>
+              </a:rPr>
+              <a:t>h()</a:t>
+            </a:r>
+          </a:p>
+        </p:txBody>
+      </p:sp>
+      <p:cxnSp>
+        <p:nvCxnSpPr>
+          <p:cNvPr id="32" name="Straight Arrow Connector 31"/>
+          <p:cNvCxnSpPr>
+            <a:stCxn id="9" idx="3"/>
+            <a:endCxn id="15" idx="1"/>
+          </p:cNvCxnSpPr>
+          <p:nvPr/>
+        </p:nvCxnSpPr>
+        <p:spPr>
+          <a:xfrm>
+            <a:off x="1737293" y="3411448"/>
+            <a:ext cx="739869" cy="5605"/>
+          </a:xfrm>
+          <a:prstGeom prst="straightConnector1">
+            <a:avLst/>
+          </a:prstGeom>
+          <a:ln>
+            <a:tailEnd type="triangle"/>
+          </a:ln>
+        </p:spPr>
+        <p:style>
+          <a:lnRef idx="1">
+            <a:schemeClr val="accent1"/>
+          </a:lnRef>
+          <a:fillRef idx="0">
+            <a:schemeClr val="accent1"/>
+          </a:fillRef>
+          <a:effectRef idx="0">
+            <a:schemeClr val="accent1"/>
+          </a:effectRef>
+          <a:fontRef idx="minor">
+            <a:schemeClr val="tx1"/>
+          </a:fontRef>
+        </p:style>
+      </p:cxnSp>
+      <p:cxnSp>
+        <p:nvCxnSpPr>
+          <p:cNvPr id="36" name="Straight Arrow Connector 35"/>
+          <p:cNvCxnSpPr>
+            <a:stCxn id="15" idx="3"/>
+            <a:endCxn id="18" idx="1"/>
+          </p:cNvCxnSpPr>
+          <p:nvPr/>
+        </p:nvCxnSpPr>
+        <p:spPr>
+          <a:xfrm>
+            <a:off x="3214321" y="3417053"/>
+            <a:ext cx="678136" cy="1740"/>
+          </a:xfrm>
+          <a:prstGeom prst="straightConnector1">
+            <a:avLst/>
+          </a:prstGeom>
+          <a:ln>
+            <a:tailEnd type="triangle"/>
+          </a:ln>
+        </p:spPr>
+        <p:style>
+          <a:lnRef idx="1">
+            <a:schemeClr val="accent1"/>
+          </a:lnRef>
+          <a:fillRef idx="0">
+            <a:schemeClr val="accent1"/>
+          </a:fillRef>
+          <a:effectRef idx="0">
+            <a:schemeClr val="accent1"/>
+          </a:effectRef>
+          <a:fontRef idx="minor">
+            <a:schemeClr val="tx1"/>
+          </a:fontRef>
+        </p:style>
+      </p:cxnSp>
+      <p:cxnSp>
+        <p:nvCxnSpPr>
+          <p:cNvPr id="39" name="Straight Arrow Connector 38"/>
+          <p:cNvCxnSpPr>
+            <a:stCxn id="18" idx="3"/>
+            <a:endCxn id="21" idx="1"/>
+          </p:cNvCxnSpPr>
+          <p:nvPr/>
+        </p:nvCxnSpPr>
+        <p:spPr>
+          <a:xfrm flipV="1">
+            <a:off x="4659092" y="3417053"/>
+            <a:ext cx="404557" cy="1740"/>
+          </a:xfrm>
+          <a:prstGeom prst="straightConnector1">
+            <a:avLst/>
+          </a:prstGeom>
+          <a:ln>
+            <a:tailEnd type="triangle"/>
+          </a:ln>
+        </p:spPr>
+        <p:style>
+          <a:lnRef idx="1">
+            <a:schemeClr val="accent1"/>
+          </a:lnRef>
+          <a:fillRef idx="0">
+            <a:schemeClr val="accent1"/>
+          </a:fillRef>
+          <a:effectRef idx="0">
+            <a:schemeClr val="accent1"/>
+          </a:effectRef>
+          <a:fontRef idx="minor">
+            <a:schemeClr val="tx1"/>
+          </a:fontRef>
+        </p:style>
+      </p:cxnSp>
+      <p:cxnSp>
+        <p:nvCxnSpPr>
+          <p:cNvPr id="42" name="Straight Arrow Connector 41"/>
+          <p:cNvCxnSpPr>
+            <a:stCxn id="21" idx="3"/>
+            <a:endCxn id="14" idx="1"/>
+          </p:cNvCxnSpPr>
+          <p:nvPr/>
+        </p:nvCxnSpPr>
+        <p:spPr>
+          <a:xfrm>
+            <a:off x="5800808" y="3417053"/>
+            <a:ext cx="744765" cy="8839"/>
+          </a:xfrm>
+          <a:prstGeom prst="straightConnector1">
+            <a:avLst/>
+          </a:prstGeom>
+          <a:ln>
+            <a:tailEnd type="triangle"/>
+          </a:ln>
+        </p:spPr>
+        <p:style>
+          <a:lnRef idx="1">
+            <a:schemeClr val="accent1"/>
+          </a:lnRef>
+          <a:fillRef idx="0">
+            <a:schemeClr val="accent1"/>
+          </a:fillRef>
+          <a:effectRef idx="0">
+            <a:schemeClr val="accent1"/>
+          </a:effectRef>
+          <a:fontRef idx="minor">
+            <a:schemeClr val="tx1"/>
+          </a:fontRef>
+        </p:style>
+      </p:cxnSp>
+      <p:cxnSp>
+        <p:nvCxnSpPr>
+          <p:cNvPr id="46" name="Straight Arrow Connector 45"/>
+          <p:cNvCxnSpPr>
+            <a:stCxn id="14" idx="3"/>
+            <a:endCxn id="17" idx="1"/>
+          </p:cNvCxnSpPr>
+          <p:nvPr/>
+        </p:nvCxnSpPr>
+        <p:spPr>
+          <a:xfrm flipV="1">
+            <a:off x="7282732" y="3425891"/>
+            <a:ext cx="632287" cy="1"/>
+          </a:xfrm>
+          <a:prstGeom prst="straightConnector1">
+            <a:avLst/>
+          </a:prstGeom>
+          <a:ln>
+            <a:tailEnd type="triangle"/>
+          </a:ln>
+        </p:spPr>
+        <p:style>
+          <a:lnRef idx="1">
+            <a:schemeClr val="accent1"/>
+          </a:lnRef>
+          <a:fillRef idx="0">
+            <a:schemeClr val="accent1"/>
+          </a:fillRef>
+          <a:effectRef idx="0">
+            <a:schemeClr val="accent1"/>
+          </a:effectRef>
+          <a:fontRef idx="minor">
+            <a:schemeClr val="tx1"/>
+          </a:fontRef>
+        </p:style>
+      </p:cxnSp>
+      <p:cxnSp>
+        <p:nvCxnSpPr>
+          <p:cNvPr id="53" name="Straight Arrow Connector 52"/>
+          <p:cNvCxnSpPr>
+            <a:stCxn id="17" idx="3"/>
+          </p:cNvCxnSpPr>
+          <p:nvPr/>
+        </p:nvCxnSpPr>
+        <p:spPr>
+          <a:xfrm>
+            <a:off x="8807363" y="3425891"/>
+            <a:ext cx="496384" cy="0"/>
+          </a:xfrm>
+          <a:prstGeom prst="straightConnector1">
+            <a:avLst/>
+          </a:prstGeom>
+          <a:ln>
+            <a:tailEnd type="triangle"/>
+          </a:ln>
+        </p:spPr>
+        <p:style>
+          <a:lnRef idx="1">
+            <a:schemeClr val="accent1"/>
+          </a:lnRef>
+          <a:fillRef idx="0">
+            <a:schemeClr val="accent1"/>
+          </a:fillRef>
+          <a:effectRef idx="0">
+            <a:schemeClr val="accent1"/>
+          </a:effectRef>
+          <a:fontRef idx="minor">
+            <a:schemeClr val="tx1"/>
+          </a:fontRef>
+        </p:style>
+      </p:cxnSp>
+      <p:cxnSp>
+        <p:nvCxnSpPr>
+          <p:cNvPr id="58" name="Straight Arrow Connector 57"/>
+          <p:cNvCxnSpPr>
+            <a:stCxn id="29" idx="3"/>
+          </p:cNvCxnSpPr>
+          <p:nvPr/>
+        </p:nvCxnSpPr>
+        <p:spPr>
+          <a:xfrm flipV="1">
+            <a:off x="10206285" y="3417923"/>
+            <a:ext cx="332374" cy="870"/>
+          </a:xfrm>
+          <a:prstGeom prst="straightConnector1">
+            <a:avLst/>
+          </a:prstGeom>
+          <a:ln>
+            <a:tailEnd type="triangle"/>
+          </a:ln>
+        </p:spPr>
+        <p:style>
+          <a:lnRef idx="1">
+            <a:schemeClr val="accent1"/>
+          </a:lnRef>
+          <a:fillRef idx="0">
+            <a:schemeClr val="accent1"/>
+          </a:fillRef>
+          <a:effectRef idx="0">
+            <a:schemeClr val="accent1"/>
+          </a:effectRef>
+          <a:fontRef idx="minor">
+            <a:schemeClr val="tx1"/>
+          </a:fontRef>
+        </p:style>
+      </p:cxnSp>
+      <p:cxnSp>
+        <p:nvCxnSpPr>
+          <p:cNvPr id="70" name="Straight Arrow Connector 69"/>
+          <p:cNvCxnSpPr>
+            <a:endCxn id="15" idx="2"/>
+          </p:cNvCxnSpPr>
+          <p:nvPr/>
+        </p:nvCxnSpPr>
+        <p:spPr>
+          <a:xfrm flipV="1">
+            <a:off x="2845742" y="3785632"/>
+            <a:ext cx="0" cy="920310"/>
+          </a:xfrm>
+          <a:prstGeom prst="straightConnector1">
+            <a:avLst/>
+          </a:prstGeom>
+          <a:ln>
+            <a:tailEnd type="triangle"/>
+          </a:ln>
+        </p:spPr>
+        <p:style>
+          <a:lnRef idx="1">
+            <a:schemeClr val="accent1"/>
+          </a:lnRef>
+          <a:fillRef idx="0">
+            <a:schemeClr val="accent1"/>
+          </a:fillRef>
+          <a:effectRef idx="0">
+            <a:schemeClr val="accent1"/>
+          </a:effectRef>
+          <a:fontRef idx="minor">
+            <a:schemeClr val="tx1"/>
+          </a:fontRef>
+        </p:style>
+      </p:cxnSp>
+      <p:cxnSp>
+        <p:nvCxnSpPr>
+          <p:cNvPr id="73" name="Straight Arrow Connector 72"/>
+          <p:cNvCxnSpPr>
+            <a:endCxn id="21" idx="2"/>
+          </p:cNvCxnSpPr>
+          <p:nvPr/>
+        </p:nvCxnSpPr>
+        <p:spPr>
+          <a:xfrm flipV="1">
+            <a:off x="5432229" y="3785632"/>
+            <a:ext cx="0" cy="920310"/>
+          </a:xfrm>
+          <a:prstGeom prst="straightConnector1">
+            <a:avLst/>
+          </a:prstGeom>
+          <a:ln>
+            <a:tailEnd type="triangle"/>
+          </a:ln>
+        </p:spPr>
+        <p:style>
+          <a:lnRef idx="1">
+            <a:schemeClr val="accent1"/>
+          </a:lnRef>
+          <a:fillRef idx="0">
+            <a:schemeClr val="accent1"/>
+          </a:fillRef>
+          <a:effectRef idx="0">
+            <a:schemeClr val="accent1"/>
+          </a:effectRef>
+          <a:fontRef idx="minor">
+            <a:schemeClr val="tx1"/>
+          </a:fontRef>
+        </p:style>
+      </p:cxnSp>
+      <p:sp>
+        <p:nvSpPr>
+          <p:cNvPr id="81" name="TextBox 80"/>
+          <p:cNvSpPr txBox="1"/>
+          <p:nvPr/>
+        </p:nvSpPr>
+        <p:spPr>
+          <a:xfrm>
+            <a:off x="1467735" y="2569228"/>
+            <a:ext cx="1378006" cy="307777"/>
+          </a:xfrm>
+          <a:prstGeom prst="rect">
+            <a:avLst/>
+          </a:prstGeom>
+          <a:noFill/>
+        </p:spPr>
+        <p:txBody>
+          <a:bodyPr wrap="none" rtlCol="0">
+            <a:spAutoFit/>
+          </a:bodyPr>
+          <a:lstStyle/>
+          <a:p>
+            <a:r>
+              <a:rPr lang="en-PH" sz="1400" dirty="0"/>
+              <a:t>Election Returns</a:t>
+            </a:r>
+          </a:p>
+        </p:txBody>
+      </p:sp>
+      <p:sp>
+        <p:nvSpPr>
+          <p:cNvPr id="82" name="TextBox 81"/>
+          <p:cNvSpPr txBox="1"/>
+          <p:nvPr/>
+        </p:nvSpPr>
+        <p:spPr>
+          <a:xfrm>
+            <a:off x="7691536" y="3860387"/>
+            <a:ext cx="1378006" cy="307777"/>
+          </a:xfrm>
+          <a:prstGeom prst="rect">
+            <a:avLst/>
+          </a:prstGeom>
+          <a:noFill/>
+        </p:spPr>
+        <p:txBody>
+          <a:bodyPr wrap="none" rtlCol="0">
+            <a:spAutoFit/>
+          </a:bodyPr>
+          <a:lstStyle/>
+          <a:p>
+            <a:r>
+              <a:rPr lang="en-PH" sz="1400" dirty="0"/>
+              <a:t>Election Returns</a:t>
+            </a:r>
+          </a:p>
+        </p:txBody>
+      </p:sp>
+      <p:sp>
+        <p:nvSpPr>
+          <p:cNvPr id="83" name="TextBox 82"/>
+          <p:cNvSpPr txBox="1"/>
+          <p:nvPr/>
+        </p:nvSpPr>
+        <p:spPr>
+          <a:xfrm>
+            <a:off x="2301000" y="5146155"/>
+            <a:ext cx="994759" cy="523220"/>
+          </a:xfrm>
+          <a:prstGeom prst="rect">
+            <a:avLst/>
+          </a:prstGeom>
+          <a:noFill/>
+        </p:spPr>
+        <p:txBody>
+          <a:bodyPr wrap="none" rtlCol="0">
+            <a:spAutoFit/>
+          </a:bodyPr>
+          <a:lstStyle/>
+          <a:p>
+            <a:pPr algn="ctr"/>
+            <a:r>
+              <a:rPr lang="en-PH" sz="1400" dirty="0"/>
+              <a:t>VCM</a:t>
+            </a:r>
+          </a:p>
+          <a:p>
+            <a:pPr algn="ctr"/>
+            <a:r>
+              <a:rPr lang="en-PH" sz="1400" dirty="0"/>
+              <a:t>Private Key</a:t>
+            </a:r>
+          </a:p>
+        </p:txBody>
+      </p:sp>
+      <p:sp>
+        <p:nvSpPr>
+          <p:cNvPr id="85" name="TextBox 84"/>
+          <p:cNvSpPr txBox="1"/>
+          <p:nvPr/>
+        </p:nvSpPr>
+        <p:spPr>
+          <a:xfrm>
+            <a:off x="4793859" y="5196935"/>
+            <a:ext cx="1259832" cy="307777"/>
+          </a:xfrm>
+          <a:prstGeom prst="rect">
+            <a:avLst/>
+          </a:prstGeom>
+          <a:noFill/>
+        </p:spPr>
+        <p:txBody>
+          <a:bodyPr wrap="none" rtlCol="0">
+            <a:spAutoFit/>
+          </a:bodyPr>
+          <a:lstStyle/>
+          <a:p>
+            <a:pPr algn="ctr"/>
+            <a:r>
+              <a:rPr lang="en-PH" sz="1400" dirty="0"/>
+              <a:t>Generated Key</a:t>
+            </a:r>
+          </a:p>
+        </p:txBody>
+      </p:sp>
+      <p:sp>
+        <p:nvSpPr>
+          <p:cNvPr id="86" name="TextBox 85"/>
+          <p:cNvSpPr txBox="1"/>
+          <p:nvPr/>
+        </p:nvSpPr>
+        <p:spPr>
+          <a:xfrm>
+            <a:off x="5742568" y="6105559"/>
+            <a:ext cx="1259832" cy="307777"/>
+          </a:xfrm>
+          <a:prstGeom prst="rect">
+            <a:avLst/>
+          </a:prstGeom>
+          <a:noFill/>
+        </p:spPr>
+        <p:txBody>
+          <a:bodyPr wrap="none" rtlCol="0">
+            <a:spAutoFit/>
+          </a:bodyPr>
+          <a:lstStyle/>
+          <a:p>
+            <a:pPr algn="ctr"/>
+            <a:r>
+              <a:rPr lang="en-PH" sz="1400" dirty="0"/>
+              <a:t>Generated Key</a:t>
+            </a:r>
+          </a:p>
+        </p:txBody>
+      </p:sp>
+      <p:sp>
+        <p:nvSpPr>
+          <p:cNvPr id="87" name="TextBox 86"/>
+          <p:cNvSpPr txBox="1"/>
+          <p:nvPr/>
+        </p:nvSpPr>
+        <p:spPr>
+          <a:xfrm>
+            <a:off x="7067043" y="6106770"/>
+            <a:ext cx="925639" cy="523220"/>
+          </a:xfrm>
+          <a:prstGeom prst="rect">
+            <a:avLst/>
+          </a:prstGeom>
+          <a:noFill/>
+        </p:spPr>
+        <p:txBody>
+          <a:bodyPr wrap="none" rtlCol="0">
+            <a:spAutoFit/>
+          </a:bodyPr>
+          <a:lstStyle/>
+          <a:p>
+            <a:pPr algn="ctr"/>
+            <a:r>
+              <a:rPr lang="en-PH" sz="1400" dirty="0"/>
+              <a:t>VCM</a:t>
+            </a:r>
+          </a:p>
+          <a:p>
+            <a:pPr algn="ctr"/>
+            <a:r>
+              <a:rPr lang="en-PH" sz="1400" dirty="0"/>
+              <a:t>Public Key</a:t>
+            </a:r>
+          </a:p>
+        </p:txBody>
+      </p:sp>
+      <p:sp>
+        <p:nvSpPr>
+          <p:cNvPr id="88" name="TextBox 87"/>
+          <p:cNvSpPr txBox="1"/>
+          <p:nvPr/>
+        </p:nvSpPr>
+        <p:spPr>
+          <a:xfrm>
+            <a:off x="2915667" y="2212625"/>
+            <a:ext cx="1482970" cy="307777"/>
+          </a:xfrm>
+          <a:prstGeom prst="rect">
+            <a:avLst/>
+          </a:prstGeom>
+          <a:noFill/>
+        </p:spPr>
+        <p:txBody>
+          <a:bodyPr wrap="none" rtlCol="0">
+            <a:spAutoFit/>
+          </a:bodyPr>
+          <a:lstStyle/>
+          <a:p>
+            <a:r>
+              <a:rPr lang="en-PH" sz="1400" dirty="0"/>
+              <a:t>MD5, SHA, </a:t>
+            </a:r>
+            <a:r>
+              <a:rPr lang="en-PH" sz="1400" dirty="0" err="1"/>
+              <a:t>Bcrypt</a:t>
+            </a:r>
+            <a:endParaRPr lang="en-PH" sz="1400" dirty="0"/>
+          </a:p>
+        </p:txBody>
+      </p:sp>
+      <p:sp>
+        <p:nvSpPr>
+          <p:cNvPr id="89" name="TextBox 88"/>
+          <p:cNvSpPr txBox="1"/>
+          <p:nvPr/>
+        </p:nvSpPr>
+        <p:spPr>
+          <a:xfrm>
+            <a:off x="8462860" y="2211587"/>
+            <a:ext cx="1482970" cy="307777"/>
+          </a:xfrm>
+          <a:prstGeom prst="rect">
+            <a:avLst/>
+          </a:prstGeom>
+          <a:noFill/>
+        </p:spPr>
+        <p:txBody>
+          <a:bodyPr wrap="none" rtlCol="0">
+            <a:spAutoFit/>
+          </a:bodyPr>
+          <a:lstStyle/>
+          <a:p>
+            <a:r>
+              <a:rPr lang="en-PH" sz="1400" dirty="0"/>
+              <a:t>MD5, SHA, </a:t>
+            </a:r>
+            <a:r>
+              <a:rPr lang="en-PH" sz="1400" dirty="0" err="1"/>
+              <a:t>Bcrypt</a:t>
+            </a:r>
+            <a:endParaRPr lang="en-PH" sz="1400" dirty="0"/>
+          </a:p>
+        </p:txBody>
+      </p:sp>
+      <p:sp>
+        <p:nvSpPr>
+          <p:cNvPr id="90" name="TextBox 89"/>
+          <p:cNvSpPr txBox="1"/>
+          <p:nvPr/>
+        </p:nvSpPr>
+        <p:spPr>
+          <a:xfrm>
+            <a:off x="5778755" y="2575905"/>
+            <a:ext cx="950004" cy="307777"/>
+          </a:xfrm>
+          <a:prstGeom prst="rect">
+            <a:avLst/>
+          </a:prstGeom>
+          <a:noFill/>
+        </p:spPr>
+        <p:txBody>
+          <a:bodyPr wrap="none" rtlCol="0">
+            <a:spAutoFit/>
+          </a:bodyPr>
+          <a:lstStyle/>
+          <a:p>
+            <a:r>
+              <a:rPr lang="en-PH" sz="1400" dirty="0" err="1"/>
+              <a:t>Ciphertext</a:t>
+            </a:r>
+            <a:endParaRPr lang="en-PH" sz="1400" dirty="0"/>
+          </a:p>
+        </p:txBody>
+      </p:sp>
+      <p:cxnSp>
+        <p:nvCxnSpPr>
+          <p:cNvPr id="92" name="Connector: Elbow 91"/>
+          <p:cNvCxnSpPr>
+            <a:stCxn id="23" idx="0"/>
+            <a:endCxn id="14" idx="2"/>
+          </p:cNvCxnSpPr>
+          <p:nvPr/>
+        </p:nvCxnSpPr>
+        <p:spPr>
+          <a:xfrm rot="5400000" flipH="1" flipV="1">
+            <a:off x="5761276" y="4375659"/>
+            <a:ext cx="1734065" cy="571690"/>
+          </a:xfrm>
+          <a:prstGeom prst="bentConnector3">
+            <a:avLst/>
+          </a:prstGeom>
+          <a:ln>
+            <a:tailEnd type="triangle"/>
+          </a:ln>
+        </p:spPr>
+        <p:style>
+          <a:lnRef idx="1">
+            <a:schemeClr val="accent1"/>
+          </a:lnRef>
+          <a:fillRef idx="0">
+            <a:schemeClr val="accent1"/>
+          </a:fillRef>
+          <a:effectRef idx="0">
+            <a:schemeClr val="accent1"/>
+          </a:effectRef>
+          <a:fontRef idx="minor">
+            <a:schemeClr val="tx1"/>
+          </a:fontRef>
+        </p:style>
+      </p:cxnSp>
+      <p:cxnSp>
+        <p:nvCxnSpPr>
+          <p:cNvPr id="95" name="Connector: Elbow 94"/>
+          <p:cNvCxnSpPr>
+            <a:stCxn id="24" idx="0"/>
+            <a:endCxn id="14" idx="2"/>
+          </p:cNvCxnSpPr>
+          <p:nvPr/>
+        </p:nvCxnSpPr>
+        <p:spPr>
+          <a:xfrm rot="16200000" flipV="1">
+            <a:off x="6323212" y="4385413"/>
+            <a:ext cx="1734065" cy="552182"/>
+          </a:xfrm>
+          <a:prstGeom prst="bentConnector3">
+            <a:avLst/>
+          </a:prstGeom>
+          <a:ln>
+            <a:tailEnd type="triangle"/>
+          </a:ln>
+        </p:spPr>
+        <p:style>
+          <a:lnRef idx="1">
+            <a:schemeClr val="accent1"/>
+          </a:lnRef>
+          <a:fillRef idx="0">
+            <a:schemeClr val="accent1"/>
+          </a:fillRef>
+          <a:effectRef idx="0">
+            <a:schemeClr val="accent1"/>
+          </a:effectRef>
+          <a:fontRef idx="minor">
+            <a:schemeClr val="tx1"/>
+          </a:fontRef>
+        </p:style>
+      </p:cxnSp>
     </p:spTree>
     <p:extLst>
       <p:ext uri="{BB962C8B-B14F-4D97-AF65-F5344CB8AC3E}">
-        <p14:creationId xmlns:p14="http://schemas.microsoft.com/office/powerpoint/2010/main" val="4042930087"/>
+        <p14:creationId xmlns:p14="http://schemas.microsoft.com/office/powerpoint/2010/main" val="1796122782"/>
       </p:ext>
     </p:extLst>
   </p:cSld>
@@ -7059,7 +8501,7 @@
           <a:p>
             <a:r>
               <a:rPr lang="en-PH" dirty="0"/>
-              <a:t>Results and Discussion</a:t>
+              <a:t>Proposed Solution to the Problem</a:t>
             </a:r>
           </a:p>
         </p:txBody>
@@ -7146,7 +8588,7 @@
     </p:spTree>
     <p:extLst>
       <p:ext uri="{BB962C8B-B14F-4D97-AF65-F5344CB8AC3E}">
-        <p14:creationId xmlns:p14="http://schemas.microsoft.com/office/powerpoint/2010/main" val="1993748265"/>
+        <p14:creationId xmlns:p14="http://schemas.microsoft.com/office/powerpoint/2010/main" val="4042930087"/>
       </p:ext>
     </p:extLst>
   </p:cSld>
@@ -7190,8 +8632,27 @@
           <a:p>
             <a:r>
               <a:rPr lang="en-PH" dirty="0"/>
-              <a:t>Results and Discussions</a:t>
-            </a:r>
+              <a:t>Results and Discussion</a:t>
+            </a:r>
+          </a:p>
+        </p:txBody>
+      </p:sp>
+      <p:sp>
+        <p:nvSpPr>
+          <p:cNvPr id="3" name="Content Placeholder 2"/>
+          <p:cNvSpPr>
+            <a:spLocks noGrp="1"/>
+          </p:cNvSpPr>
+          <p:nvPr>
+            <p:ph idx="1"/>
+          </p:nvPr>
+        </p:nvSpPr>
+        <p:spPr/>
+        <p:txBody>
+          <a:bodyPr/>
+          <a:lstStyle/>
+          <a:p>
+            <a:endParaRPr lang="en-PH" dirty="0"/>
           </a:p>
         </p:txBody>
       </p:sp>
@@ -7255,1163 +8716,10 @@
           </a:prstGeom>
         </p:spPr>
       </p:pic>
-      <p:sp>
-        <p:nvSpPr>
-          <p:cNvPr id="6" name="Content Placeholder 2"/>
-          <p:cNvSpPr txBox="1">
-            <a:spLocks/>
-          </p:cNvSpPr>
-          <p:nvPr/>
-        </p:nvSpPr>
-        <p:spPr>
-          <a:xfrm>
-            <a:off x="661183" y="1806989"/>
-            <a:ext cx="9974604" cy="4679467"/>
-          </a:xfrm>
-          <a:prstGeom prst="rect">
-            <a:avLst/>
-          </a:prstGeom>
-        </p:spPr>
-        <p:txBody>
-          <a:bodyPr vert="horz" lIns="91440" tIns="45720" rIns="91440" bIns="45720" rtlCol="0">
-            <a:normAutofit/>
-          </a:bodyPr>
-          <a:lstStyle>
-            <a:lvl1pPr marL="228600" indent="-228600" algn="l" defTabSz="914400" rtl="0" eaLnBrk="1" latinLnBrk="0" hangingPunct="1">
-              <a:lnSpc>
-                <a:spcPct val="90000"/>
-              </a:lnSpc>
-              <a:spcBef>
-                <a:spcPts val="1000"/>
-              </a:spcBef>
-              <a:buFont typeface="Arial" panose="020B0604020202020204" pitchFamily="34" charset="0"/>
-              <a:buChar char="•"/>
-              <a:defRPr sz="2800" kern="1200">
-                <a:solidFill>
-                  <a:schemeClr val="tx1"/>
-                </a:solidFill>
-                <a:latin typeface="+mn-lt"/>
-                <a:ea typeface="+mn-ea"/>
-                <a:cs typeface="+mn-cs"/>
-              </a:defRPr>
-            </a:lvl1pPr>
-            <a:lvl2pPr marL="685800" indent="-228600" algn="l" defTabSz="914400" rtl="0" eaLnBrk="1" latinLnBrk="0" hangingPunct="1">
-              <a:lnSpc>
-                <a:spcPct val="90000"/>
-              </a:lnSpc>
-              <a:spcBef>
-                <a:spcPts val="500"/>
-              </a:spcBef>
-              <a:buFont typeface="Arial" panose="020B0604020202020204" pitchFamily="34" charset="0"/>
-              <a:buChar char="•"/>
-              <a:defRPr sz="2400" kern="1200">
-                <a:solidFill>
-                  <a:schemeClr val="tx1"/>
-                </a:solidFill>
-                <a:latin typeface="+mn-lt"/>
-                <a:ea typeface="+mn-ea"/>
-                <a:cs typeface="+mn-cs"/>
-              </a:defRPr>
-            </a:lvl2pPr>
-            <a:lvl3pPr marL="1143000" indent="-228600" algn="l" defTabSz="914400" rtl="0" eaLnBrk="1" latinLnBrk="0" hangingPunct="1">
-              <a:lnSpc>
-                <a:spcPct val="90000"/>
-              </a:lnSpc>
-              <a:spcBef>
-                <a:spcPts val="500"/>
-              </a:spcBef>
-              <a:buFont typeface="Arial" panose="020B0604020202020204" pitchFamily="34" charset="0"/>
-              <a:buChar char="•"/>
-              <a:defRPr sz="2000" kern="1200">
-                <a:solidFill>
-                  <a:schemeClr val="tx1"/>
-                </a:solidFill>
-                <a:latin typeface="+mn-lt"/>
-                <a:ea typeface="+mn-ea"/>
-                <a:cs typeface="+mn-cs"/>
-              </a:defRPr>
-            </a:lvl3pPr>
-            <a:lvl4pPr marL="1600200" indent="-228600" algn="l" defTabSz="914400" rtl="0" eaLnBrk="1" latinLnBrk="0" hangingPunct="1">
-              <a:lnSpc>
-                <a:spcPct val="90000"/>
-              </a:lnSpc>
-              <a:spcBef>
-                <a:spcPts val="500"/>
-              </a:spcBef>
-              <a:buFont typeface="Arial" panose="020B0604020202020204" pitchFamily="34" charset="0"/>
-              <a:buChar char="•"/>
-              <a:defRPr sz="1800" kern="1200">
-                <a:solidFill>
-                  <a:schemeClr val="tx1"/>
-                </a:solidFill>
-                <a:latin typeface="+mn-lt"/>
-                <a:ea typeface="+mn-ea"/>
-                <a:cs typeface="+mn-cs"/>
-              </a:defRPr>
-            </a:lvl4pPr>
-            <a:lvl5pPr marL="2057400" indent="-228600" algn="l" defTabSz="914400" rtl="0" eaLnBrk="1" latinLnBrk="0" hangingPunct="1">
-              <a:lnSpc>
-                <a:spcPct val="90000"/>
-              </a:lnSpc>
-              <a:spcBef>
-                <a:spcPts val="500"/>
-              </a:spcBef>
-              <a:buFont typeface="Arial" panose="020B0604020202020204" pitchFamily="34" charset="0"/>
-              <a:buChar char="•"/>
-              <a:defRPr sz="1800" kern="1200">
-                <a:solidFill>
-                  <a:schemeClr val="tx1"/>
-                </a:solidFill>
-                <a:latin typeface="+mn-lt"/>
-                <a:ea typeface="+mn-ea"/>
-                <a:cs typeface="+mn-cs"/>
-              </a:defRPr>
-            </a:lvl5pPr>
-            <a:lvl6pPr marL="2514600" indent="-228600" algn="l" defTabSz="914400" rtl="0" eaLnBrk="1" latinLnBrk="0" hangingPunct="1">
-              <a:lnSpc>
-                <a:spcPct val="90000"/>
-              </a:lnSpc>
-              <a:spcBef>
-                <a:spcPts val="500"/>
-              </a:spcBef>
-              <a:buFont typeface="Arial" panose="020B0604020202020204" pitchFamily="34" charset="0"/>
-              <a:buChar char="•"/>
-              <a:defRPr sz="1800" kern="1200">
-                <a:solidFill>
-                  <a:schemeClr val="tx1"/>
-                </a:solidFill>
-                <a:latin typeface="+mn-lt"/>
-                <a:ea typeface="+mn-ea"/>
-                <a:cs typeface="+mn-cs"/>
-              </a:defRPr>
-            </a:lvl6pPr>
-            <a:lvl7pPr marL="2971800" indent="-228600" algn="l" defTabSz="914400" rtl="0" eaLnBrk="1" latinLnBrk="0" hangingPunct="1">
-              <a:lnSpc>
-                <a:spcPct val="90000"/>
-              </a:lnSpc>
-              <a:spcBef>
-                <a:spcPts val="500"/>
-              </a:spcBef>
-              <a:buFont typeface="Arial" panose="020B0604020202020204" pitchFamily="34" charset="0"/>
-              <a:buChar char="•"/>
-              <a:defRPr sz="1800" kern="1200">
-                <a:solidFill>
-                  <a:schemeClr val="tx1"/>
-                </a:solidFill>
-                <a:latin typeface="+mn-lt"/>
-                <a:ea typeface="+mn-ea"/>
-                <a:cs typeface="+mn-cs"/>
-              </a:defRPr>
-            </a:lvl7pPr>
-            <a:lvl8pPr marL="3429000" indent="-228600" algn="l" defTabSz="914400" rtl="0" eaLnBrk="1" latinLnBrk="0" hangingPunct="1">
-              <a:lnSpc>
-                <a:spcPct val="90000"/>
-              </a:lnSpc>
-              <a:spcBef>
-                <a:spcPts val="500"/>
-              </a:spcBef>
-              <a:buFont typeface="Arial" panose="020B0604020202020204" pitchFamily="34" charset="0"/>
-              <a:buChar char="•"/>
-              <a:defRPr sz="1800" kern="1200">
-                <a:solidFill>
-                  <a:schemeClr val="tx1"/>
-                </a:solidFill>
-                <a:latin typeface="+mn-lt"/>
-                <a:ea typeface="+mn-ea"/>
-                <a:cs typeface="+mn-cs"/>
-              </a:defRPr>
-            </a:lvl8pPr>
-            <a:lvl9pPr marL="3886200" indent="-228600" algn="l" defTabSz="914400" rtl="0" eaLnBrk="1" latinLnBrk="0" hangingPunct="1">
-              <a:lnSpc>
-                <a:spcPct val="90000"/>
-              </a:lnSpc>
-              <a:spcBef>
-                <a:spcPts val="500"/>
-              </a:spcBef>
-              <a:buFont typeface="Arial" panose="020B0604020202020204" pitchFamily="34" charset="0"/>
-              <a:buChar char="•"/>
-              <a:defRPr sz="1800" kern="1200">
-                <a:solidFill>
-                  <a:schemeClr val="tx1"/>
-                </a:solidFill>
-                <a:latin typeface="+mn-lt"/>
-                <a:ea typeface="+mn-ea"/>
-                <a:cs typeface="+mn-cs"/>
-              </a:defRPr>
-            </a:lvl9pPr>
-          </a:lstStyle>
-          <a:p>
-            <a:pPr marL="0" indent="0" algn="just">
-              <a:buFont typeface="Arial" panose="020B0604020202020204" pitchFamily="34" charset="0"/>
-              <a:buNone/>
-            </a:pPr>
-            <a:r>
-              <a:rPr lang="en-PH"/>
-              <a:t>Prototype design:</a:t>
-            </a:r>
-            <a:endParaRPr lang="en-PH" dirty="0"/>
-          </a:p>
-        </p:txBody>
-      </p:sp>
-      <p:pic>
-        <p:nvPicPr>
-          <p:cNvPr id="7" name="Picture 2" descr="http://image.flaticon.com/icons/png/128/230/230312.png"/>
-          <p:cNvPicPr>
-            <a:picLocks noChangeAspect="1" noChangeArrowheads="1"/>
-          </p:cNvPicPr>
-          <p:nvPr/>
-        </p:nvPicPr>
-        <p:blipFill>
-          <a:blip r:embed="rId5">
-            <a:extLst>
-              <a:ext uri="{28A0092B-C50C-407E-A947-70E740481C1C}">
-                <a14:useLocalDpi xmlns:a14="http://schemas.microsoft.com/office/drawing/2010/main" val="0"/>
-              </a:ext>
-            </a:extLst>
-          </a:blip>
-          <a:srcRect/>
-          <a:stretch>
-            <a:fillRect/>
-          </a:stretch>
-        </p:blipFill>
-        <p:spPr bwMode="auto">
-          <a:xfrm>
-            <a:off x="3880645" y="2486757"/>
-            <a:ext cx="1219200" cy="1219200"/>
-          </a:xfrm>
-          <a:prstGeom prst="rect">
-            <a:avLst/>
-          </a:prstGeom>
-          <a:noFill/>
-          <a:extLst>
-            <a:ext uri="{909E8E84-426E-40DD-AFC4-6F175D3DCCD1}">
-              <a14:hiddenFill xmlns:a14="http://schemas.microsoft.com/office/drawing/2010/main">
-                <a:solidFill>
-                  <a:srgbClr val="FFFFFF"/>
-                </a:solidFill>
-              </a14:hiddenFill>
-            </a:ext>
-          </a:extLst>
-        </p:spPr>
-      </p:pic>
-      <p:pic>
-        <p:nvPicPr>
-          <p:cNvPr id="8" name="Picture 4" descr="http://image.flaticon.com/icons/png/128/230/230308.png"/>
-          <p:cNvPicPr>
-            <a:picLocks noChangeAspect="1" noChangeArrowheads="1"/>
-          </p:cNvPicPr>
-          <p:nvPr/>
-        </p:nvPicPr>
-        <p:blipFill>
-          <a:blip r:embed="rId6">
-            <a:extLst>
-              <a:ext uri="{28A0092B-C50C-407E-A947-70E740481C1C}">
-                <a14:useLocalDpi xmlns:a14="http://schemas.microsoft.com/office/drawing/2010/main" val="0"/>
-              </a:ext>
-            </a:extLst>
-          </a:blip>
-          <a:srcRect/>
-          <a:stretch>
-            <a:fillRect/>
-          </a:stretch>
-        </p:blipFill>
-        <p:spPr bwMode="auto">
-          <a:xfrm>
-            <a:off x="7100107" y="2486757"/>
-            <a:ext cx="1219200" cy="1219200"/>
-          </a:xfrm>
-          <a:prstGeom prst="rect">
-            <a:avLst/>
-          </a:prstGeom>
-          <a:noFill/>
-          <a:extLst>
-            <a:ext uri="{909E8E84-426E-40DD-AFC4-6F175D3DCCD1}">
-              <a14:hiddenFill xmlns:a14="http://schemas.microsoft.com/office/drawing/2010/main">
-                <a:solidFill>
-                  <a:srgbClr val="FFFFFF"/>
-                </a:solidFill>
-              </a14:hiddenFill>
-            </a:ext>
-          </a:extLst>
-        </p:spPr>
-      </p:pic>
-      <p:pic>
-        <p:nvPicPr>
-          <p:cNvPr id="9" name="Picture 8" descr="http://image.flaticon.com/icons/png/128/186/186239.png"/>
-          <p:cNvPicPr>
-            <a:picLocks noChangeAspect="1" noChangeArrowheads="1"/>
-          </p:cNvPicPr>
-          <p:nvPr/>
-        </p:nvPicPr>
-        <p:blipFill>
-          <a:blip r:embed="rId7">
-            <a:extLst>
-              <a:ext uri="{28A0092B-C50C-407E-A947-70E740481C1C}">
-                <a14:useLocalDpi xmlns:a14="http://schemas.microsoft.com/office/drawing/2010/main" val="0"/>
-              </a:ext>
-            </a:extLst>
-          </a:blip>
-          <a:srcRect/>
-          <a:stretch>
-            <a:fillRect/>
-          </a:stretch>
-        </p:blipFill>
-        <p:spPr bwMode="auto">
-          <a:xfrm>
-            <a:off x="5486400" y="4447903"/>
-            <a:ext cx="1219200" cy="1219200"/>
-          </a:xfrm>
-          <a:prstGeom prst="rect">
-            <a:avLst/>
-          </a:prstGeom>
-          <a:noFill/>
-          <a:extLst>
-            <a:ext uri="{909E8E84-426E-40DD-AFC4-6F175D3DCCD1}">
-              <a14:hiddenFill xmlns:a14="http://schemas.microsoft.com/office/drawing/2010/main">
-                <a:solidFill>
-                  <a:srgbClr val="FFFFFF"/>
-                </a:solidFill>
-              </a14:hiddenFill>
-            </a:ext>
-          </a:extLst>
-        </p:spPr>
-      </p:pic>
-      <p:pic>
-        <p:nvPicPr>
-          <p:cNvPr id="10" name="Picture 2" descr="http://image.flaticon.com/icons/png/128/148/148998.png"/>
-          <p:cNvPicPr>
-            <a:picLocks noChangeAspect="1" noChangeArrowheads="1"/>
-          </p:cNvPicPr>
-          <p:nvPr/>
-        </p:nvPicPr>
-        <p:blipFill>
-          <a:blip r:embed="rId8">
-            <a:extLst>
-              <a:ext uri="{28A0092B-C50C-407E-A947-70E740481C1C}">
-                <a14:useLocalDpi xmlns:a14="http://schemas.microsoft.com/office/drawing/2010/main" val="0"/>
-              </a:ext>
-            </a:extLst>
-          </a:blip>
-          <a:srcRect/>
-          <a:stretch>
-            <a:fillRect/>
-          </a:stretch>
-        </p:blipFill>
-        <p:spPr bwMode="auto">
-          <a:xfrm>
-            <a:off x="2393438" y="4447903"/>
-            <a:ext cx="1219200" cy="1219200"/>
-          </a:xfrm>
-          <a:prstGeom prst="rect">
-            <a:avLst/>
-          </a:prstGeom>
-          <a:noFill/>
-          <a:extLst>
-            <a:ext uri="{909E8E84-426E-40DD-AFC4-6F175D3DCCD1}">
-              <a14:hiddenFill xmlns:a14="http://schemas.microsoft.com/office/drawing/2010/main">
-                <a:solidFill>
-                  <a:srgbClr val="FFFFFF"/>
-                </a:solidFill>
-              </a14:hiddenFill>
-            </a:ext>
-          </a:extLst>
-        </p:spPr>
-      </p:pic>
-      <p:pic>
-        <p:nvPicPr>
-          <p:cNvPr id="11" name="Picture 10"/>
-          <p:cNvPicPr>
-            <a:picLocks noChangeAspect="1"/>
-          </p:cNvPicPr>
-          <p:nvPr/>
-        </p:nvPicPr>
-        <p:blipFill>
-          <a:blip r:embed="rId9">
-            <a:extLst>
-              <a:ext uri="{28A0092B-C50C-407E-A947-70E740481C1C}">
-                <a14:useLocalDpi xmlns:a14="http://schemas.microsoft.com/office/drawing/2010/main" val="0"/>
-              </a:ext>
-            </a:extLst>
-          </a:blip>
-          <a:stretch>
-            <a:fillRect/>
-          </a:stretch>
-        </p:blipFill>
-        <p:spPr>
-          <a:xfrm>
-            <a:off x="8579362" y="4447903"/>
-            <a:ext cx="1219200" cy="1219200"/>
-          </a:xfrm>
-          <a:prstGeom prst="rect">
-            <a:avLst/>
-          </a:prstGeom>
-        </p:spPr>
-      </p:pic>
-      <p:sp>
-        <p:nvSpPr>
-          <p:cNvPr id="12" name="TextBox 11"/>
-          <p:cNvSpPr txBox="1"/>
-          <p:nvPr/>
-        </p:nvSpPr>
-        <p:spPr>
-          <a:xfrm>
-            <a:off x="3185314" y="3637592"/>
-            <a:ext cx="2609862" cy="369332"/>
-          </a:xfrm>
-          <a:prstGeom prst="rect">
-            <a:avLst/>
-          </a:prstGeom>
-          <a:noFill/>
-        </p:spPr>
-        <p:txBody>
-          <a:bodyPr wrap="square" rtlCol="0">
-            <a:spAutoFit/>
-          </a:bodyPr>
-          <a:lstStyle/>
-          <a:p>
-            <a:pPr algn="ctr"/>
-            <a:r>
-              <a:rPr lang="en-PH" dirty="0"/>
-              <a:t>Not authenticated server</a:t>
-            </a:r>
-          </a:p>
-        </p:txBody>
-      </p:sp>
-      <p:sp>
-        <p:nvSpPr>
-          <p:cNvPr id="13" name="TextBox 12"/>
-          <p:cNvSpPr txBox="1"/>
-          <p:nvPr/>
-        </p:nvSpPr>
-        <p:spPr>
-          <a:xfrm>
-            <a:off x="6404776" y="3672605"/>
-            <a:ext cx="2609862" cy="369332"/>
-          </a:xfrm>
-          <a:prstGeom prst="rect">
-            <a:avLst/>
-          </a:prstGeom>
-          <a:noFill/>
-        </p:spPr>
-        <p:txBody>
-          <a:bodyPr wrap="square" rtlCol="0">
-            <a:spAutoFit/>
-          </a:bodyPr>
-          <a:lstStyle/>
-          <a:p>
-            <a:pPr algn="ctr"/>
-            <a:r>
-              <a:rPr lang="en-PH" dirty="0"/>
-              <a:t>Authenticated server</a:t>
-            </a:r>
-          </a:p>
-        </p:txBody>
-      </p:sp>
-      <p:cxnSp>
-        <p:nvCxnSpPr>
-          <p:cNvPr id="14" name="Connector: Elbow 13"/>
-          <p:cNvCxnSpPr>
-            <a:stCxn id="10" idx="3"/>
-            <a:endCxn id="12" idx="2"/>
-          </p:cNvCxnSpPr>
-          <p:nvPr/>
-        </p:nvCxnSpPr>
-        <p:spPr>
-          <a:xfrm flipV="1">
-            <a:off x="3612638" y="4006924"/>
-            <a:ext cx="877607" cy="1050579"/>
-          </a:xfrm>
-          <a:prstGeom prst="bentConnector2">
-            <a:avLst/>
-          </a:prstGeom>
-          <a:ln>
-            <a:solidFill>
-              <a:srgbClr val="FF0000"/>
-            </a:solidFill>
-            <a:tailEnd type="triangle"/>
-          </a:ln>
-        </p:spPr>
-        <p:style>
-          <a:lnRef idx="1">
-            <a:schemeClr val="accent2"/>
-          </a:lnRef>
-          <a:fillRef idx="0">
-            <a:schemeClr val="accent2"/>
-          </a:fillRef>
-          <a:effectRef idx="0">
-            <a:schemeClr val="accent2"/>
-          </a:effectRef>
-          <a:fontRef idx="minor">
-            <a:schemeClr val="tx1"/>
-          </a:fontRef>
-        </p:style>
-      </p:cxnSp>
-      <p:cxnSp>
-        <p:nvCxnSpPr>
-          <p:cNvPr id="15" name="Connector: Elbow 14"/>
-          <p:cNvCxnSpPr>
-            <a:stCxn id="9" idx="1"/>
-          </p:cNvCxnSpPr>
-          <p:nvPr/>
-        </p:nvCxnSpPr>
-        <p:spPr>
-          <a:xfrm rot="10800000">
-            <a:off x="4831838" y="4006925"/>
-            <a:ext cx="654562" cy="1050579"/>
-          </a:xfrm>
-          <a:prstGeom prst="bentConnector2">
-            <a:avLst/>
-          </a:prstGeom>
-          <a:ln>
-            <a:solidFill>
-              <a:srgbClr val="FF0000"/>
-            </a:solidFill>
-            <a:tailEnd type="triangle"/>
-          </a:ln>
-        </p:spPr>
-        <p:style>
-          <a:lnRef idx="1">
-            <a:schemeClr val="accent2"/>
-          </a:lnRef>
-          <a:fillRef idx="0">
-            <a:schemeClr val="accent2"/>
-          </a:fillRef>
-          <a:effectRef idx="0">
-            <a:schemeClr val="accent2"/>
-          </a:effectRef>
-          <a:fontRef idx="minor">
-            <a:schemeClr val="tx1"/>
-          </a:fontRef>
-        </p:style>
-      </p:cxnSp>
-      <p:cxnSp>
-        <p:nvCxnSpPr>
-          <p:cNvPr id="16" name="Connector: Elbow 15"/>
-          <p:cNvCxnSpPr/>
-          <p:nvPr/>
-        </p:nvCxnSpPr>
-        <p:spPr>
-          <a:xfrm rot="5400000" flipH="1">
-            <a:off x="6184286" y="2487655"/>
-            <a:ext cx="1660179" cy="4698717"/>
-          </a:xfrm>
-          <a:prstGeom prst="bentConnector3">
-            <a:avLst>
-              <a:gd name="adj1" fmla="val -13770"/>
-            </a:avLst>
-          </a:prstGeom>
-          <a:ln>
-            <a:solidFill>
-              <a:srgbClr val="FF0000"/>
-            </a:solidFill>
-            <a:tailEnd type="triangle"/>
-          </a:ln>
-        </p:spPr>
-        <p:style>
-          <a:lnRef idx="1">
-            <a:schemeClr val="accent2"/>
-          </a:lnRef>
-          <a:fillRef idx="0">
-            <a:schemeClr val="accent2"/>
-          </a:fillRef>
-          <a:effectRef idx="0">
-            <a:schemeClr val="accent2"/>
-          </a:effectRef>
-          <a:fontRef idx="minor">
-            <a:schemeClr val="tx1"/>
-          </a:fontRef>
-        </p:style>
-      </p:cxnSp>
-      <p:cxnSp>
-        <p:nvCxnSpPr>
-          <p:cNvPr id="17" name="Connector: Elbow 16"/>
-          <p:cNvCxnSpPr>
-            <a:stCxn id="10" idx="2"/>
-            <a:endCxn id="8" idx="3"/>
-          </p:cNvCxnSpPr>
-          <p:nvPr/>
-        </p:nvCxnSpPr>
-        <p:spPr>
-          <a:xfrm rot="5400000" flipH="1" flipV="1">
-            <a:off x="4375799" y="1723595"/>
-            <a:ext cx="2570746" cy="5316269"/>
-          </a:xfrm>
-          <a:prstGeom prst="bentConnector4">
-            <a:avLst>
-              <a:gd name="adj1" fmla="val -35159"/>
-              <a:gd name="adj2" fmla="val 137112"/>
-            </a:avLst>
-          </a:prstGeom>
-          <a:ln>
-            <a:tailEnd type="triangle"/>
-          </a:ln>
-        </p:spPr>
-        <p:style>
-          <a:lnRef idx="1">
-            <a:schemeClr val="accent4"/>
-          </a:lnRef>
-          <a:fillRef idx="0">
-            <a:schemeClr val="accent4"/>
-          </a:fillRef>
-          <a:effectRef idx="0">
-            <a:schemeClr val="accent4"/>
-          </a:effectRef>
-          <a:fontRef idx="minor">
-            <a:schemeClr val="tx1"/>
-          </a:fontRef>
-        </p:style>
-      </p:cxnSp>
-      <p:cxnSp>
-        <p:nvCxnSpPr>
-          <p:cNvPr id="18" name="Connector: Elbow 17"/>
-          <p:cNvCxnSpPr>
-            <a:stCxn id="9" idx="3"/>
-            <a:endCxn id="13" idx="2"/>
-          </p:cNvCxnSpPr>
-          <p:nvPr/>
-        </p:nvCxnSpPr>
-        <p:spPr>
-          <a:xfrm flipV="1">
-            <a:off x="6705600" y="4041937"/>
-            <a:ext cx="1004107" cy="1015566"/>
-          </a:xfrm>
-          <a:prstGeom prst="bentConnector2">
-            <a:avLst/>
-          </a:prstGeom>
-          <a:ln>
-            <a:tailEnd type="triangle"/>
-          </a:ln>
-        </p:spPr>
-        <p:style>
-          <a:lnRef idx="1">
-            <a:schemeClr val="accent4"/>
-          </a:lnRef>
-          <a:fillRef idx="0">
-            <a:schemeClr val="accent4"/>
-          </a:fillRef>
-          <a:effectRef idx="0">
-            <a:schemeClr val="accent4"/>
-          </a:effectRef>
-          <a:fontRef idx="minor">
-            <a:schemeClr val="tx1"/>
-          </a:fontRef>
-        </p:style>
-      </p:cxnSp>
-      <p:cxnSp>
-        <p:nvCxnSpPr>
-          <p:cNvPr id="19" name="Connector: Elbow 18"/>
-          <p:cNvCxnSpPr>
-            <a:stCxn id="11" idx="1"/>
-          </p:cNvCxnSpPr>
-          <p:nvPr/>
-        </p:nvCxnSpPr>
-        <p:spPr>
-          <a:xfrm rot="10800000">
-            <a:off x="8079522" y="4041937"/>
-            <a:ext cx="499841" cy="1015566"/>
-          </a:xfrm>
-          <a:prstGeom prst="bentConnector2">
-            <a:avLst/>
-          </a:prstGeom>
-          <a:ln>
-            <a:tailEnd type="triangle"/>
-          </a:ln>
-        </p:spPr>
-        <p:style>
-          <a:lnRef idx="1">
-            <a:schemeClr val="accent4"/>
-          </a:lnRef>
-          <a:fillRef idx="0">
-            <a:schemeClr val="accent4"/>
-          </a:fillRef>
-          <a:effectRef idx="0">
-            <a:schemeClr val="accent4"/>
-          </a:effectRef>
-          <a:fontRef idx="minor">
-            <a:schemeClr val="tx1"/>
-          </a:fontRef>
-        </p:style>
-      </p:cxnSp>
-      <p:cxnSp>
-        <p:nvCxnSpPr>
-          <p:cNvPr id="20" name="Connector: Elbow 19"/>
-          <p:cNvCxnSpPr/>
-          <p:nvPr/>
-        </p:nvCxnSpPr>
-        <p:spPr>
-          <a:xfrm rot="5400000" flipH="1" flipV="1">
-            <a:off x="4375800" y="1723595"/>
-            <a:ext cx="2570746" cy="5316269"/>
-          </a:xfrm>
-          <a:prstGeom prst="bentConnector4">
-            <a:avLst>
-              <a:gd name="adj1" fmla="val -35159"/>
-              <a:gd name="adj2" fmla="val 137112"/>
-            </a:avLst>
-          </a:prstGeom>
-          <a:ln>
-            <a:solidFill>
-              <a:srgbClr val="00B050"/>
-            </a:solidFill>
-            <a:tailEnd type="triangle"/>
-          </a:ln>
-        </p:spPr>
-        <p:style>
-          <a:lnRef idx="1">
-            <a:schemeClr val="accent6"/>
-          </a:lnRef>
-          <a:fillRef idx="0">
-            <a:schemeClr val="accent6"/>
-          </a:fillRef>
-          <a:effectRef idx="0">
-            <a:schemeClr val="accent6"/>
-          </a:effectRef>
-          <a:fontRef idx="minor">
-            <a:schemeClr val="tx1"/>
-          </a:fontRef>
-        </p:style>
-      </p:cxnSp>
-      <p:cxnSp>
-        <p:nvCxnSpPr>
-          <p:cNvPr id="21" name="Connector: Elbow 20"/>
-          <p:cNvCxnSpPr/>
-          <p:nvPr/>
-        </p:nvCxnSpPr>
-        <p:spPr>
-          <a:xfrm flipV="1">
-            <a:off x="6705601" y="4041937"/>
-            <a:ext cx="1004107" cy="1015566"/>
-          </a:xfrm>
-          <a:prstGeom prst="bentConnector2">
-            <a:avLst/>
-          </a:prstGeom>
-          <a:ln>
-            <a:solidFill>
-              <a:srgbClr val="00B050"/>
-            </a:solidFill>
-            <a:tailEnd type="triangle"/>
-          </a:ln>
-        </p:spPr>
-        <p:style>
-          <a:lnRef idx="1">
-            <a:schemeClr val="accent6"/>
-          </a:lnRef>
-          <a:fillRef idx="0">
-            <a:schemeClr val="accent6"/>
-          </a:fillRef>
-          <a:effectRef idx="0">
-            <a:schemeClr val="accent6"/>
-          </a:effectRef>
-          <a:fontRef idx="minor">
-            <a:schemeClr val="tx1"/>
-          </a:fontRef>
-        </p:style>
-      </p:cxnSp>
-      <p:cxnSp>
-        <p:nvCxnSpPr>
-          <p:cNvPr id="22" name="Connector: Elbow 21"/>
-          <p:cNvCxnSpPr/>
-          <p:nvPr/>
-        </p:nvCxnSpPr>
-        <p:spPr>
-          <a:xfrm rot="10800000">
-            <a:off x="8079523" y="4041937"/>
-            <a:ext cx="499841" cy="1015566"/>
-          </a:xfrm>
-          <a:prstGeom prst="bentConnector2">
-            <a:avLst/>
-          </a:prstGeom>
-          <a:ln>
-            <a:solidFill>
-              <a:srgbClr val="00B050"/>
-            </a:solidFill>
-            <a:tailEnd type="triangle"/>
-          </a:ln>
-        </p:spPr>
-        <p:style>
-          <a:lnRef idx="1">
-            <a:schemeClr val="accent6"/>
-          </a:lnRef>
-          <a:fillRef idx="0">
-            <a:schemeClr val="accent6"/>
-          </a:fillRef>
-          <a:effectRef idx="0">
-            <a:schemeClr val="accent6"/>
-          </a:effectRef>
-          <a:fontRef idx="minor">
-            <a:schemeClr val="tx1"/>
-          </a:fontRef>
-        </p:style>
-      </p:cxnSp>
-      <p:pic>
-        <p:nvPicPr>
-          <p:cNvPr id="23" name="Picture 22"/>
-          <p:cNvPicPr>
-            <a:picLocks noChangeAspect="1"/>
-          </p:cNvPicPr>
-          <p:nvPr/>
-        </p:nvPicPr>
-        <p:blipFill>
-          <a:blip r:embed="rId10">
-            <a:extLst>
-              <a:ext uri="{28A0092B-C50C-407E-A947-70E740481C1C}">
-                <a14:useLocalDpi xmlns:a14="http://schemas.microsoft.com/office/drawing/2010/main" val="0"/>
-              </a:ext>
-            </a:extLst>
-          </a:blip>
-          <a:stretch>
-            <a:fillRect/>
-          </a:stretch>
-        </p:blipFill>
-        <p:spPr>
-          <a:xfrm>
-            <a:off x="5815499" y="2801717"/>
-            <a:ext cx="589277" cy="589277"/>
-          </a:xfrm>
-          <a:prstGeom prst="rect">
-            <a:avLst/>
-          </a:prstGeom>
-        </p:spPr>
-      </p:pic>
-      <p:cxnSp>
-        <p:nvCxnSpPr>
-          <p:cNvPr id="24" name="Straight Arrow Connector 23"/>
-          <p:cNvCxnSpPr>
-            <a:stCxn id="7" idx="3"/>
-            <a:endCxn id="23" idx="1"/>
-          </p:cNvCxnSpPr>
-          <p:nvPr/>
-        </p:nvCxnSpPr>
-        <p:spPr>
-          <a:xfrm flipV="1">
-            <a:off x="5099845" y="3096356"/>
-            <a:ext cx="715654" cy="1"/>
-          </a:xfrm>
-          <a:prstGeom prst="straightConnector1">
-            <a:avLst/>
-          </a:prstGeom>
-          <a:ln>
-            <a:prstDash val="lgDash"/>
-            <a:headEnd type="triangle"/>
-            <a:tailEnd type="triangle"/>
-          </a:ln>
-        </p:spPr>
-        <p:style>
-          <a:lnRef idx="2">
-            <a:schemeClr val="accent3"/>
-          </a:lnRef>
-          <a:fillRef idx="0">
-            <a:schemeClr val="accent3"/>
-          </a:fillRef>
-          <a:effectRef idx="1">
-            <a:schemeClr val="accent3"/>
-          </a:effectRef>
-          <a:fontRef idx="minor">
-            <a:schemeClr val="tx1"/>
-          </a:fontRef>
-        </p:style>
-      </p:cxnSp>
-      <p:cxnSp>
-        <p:nvCxnSpPr>
-          <p:cNvPr id="25" name="Straight Arrow Connector 24"/>
-          <p:cNvCxnSpPr/>
-          <p:nvPr/>
-        </p:nvCxnSpPr>
-        <p:spPr>
-          <a:xfrm flipV="1">
-            <a:off x="6347773" y="3096355"/>
-            <a:ext cx="715654" cy="1"/>
-          </a:xfrm>
-          <a:prstGeom prst="straightConnector1">
-            <a:avLst/>
-          </a:prstGeom>
-          <a:ln>
-            <a:prstDash val="lgDash"/>
-            <a:headEnd type="triangle"/>
-            <a:tailEnd type="triangle"/>
-          </a:ln>
-        </p:spPr>
-        <p:style>
-          <a:lnRef idx="2">
-            <a:schemeClr val="accent3"/>
-          </a:lnRef>
-          <a:fillRef idx="0">
-            <a:schemeClr val="accent3"/>
-          </a:fillRef>
-          <a:effectRef idx="1">
-            <a:schemeClr val="accent3"/>
-          </a:effectRef>
-          <a:fontRef idx="minor">
-            <a:schemeClr val="tx1"/>
-          </a:fontRef>
-        </p:style>
-      </p:cxnSp>
-      <p:cxnSp>
-        <p:nvCxnSpPr>
-          <p:cNvPr id="26" name="Connector: Elbow 25"/>
-          <p:cNvCxnSpPr>
-            <a:stCxn id="23" idx="0"/>
-            <a:endCxn id="10" idx="0"/>
-          </p:cNvCxnSpPr>
-          <p:nvPr/>
-        </p:nvCxnSpPr>
-        <p:spPr>
-          <a:xfrm rot="16200000" flipH="1" flipV="1">
-            <a:off x="3733495" y="2071260"/>
-            <a:ext cx="1646186" cy="3107100"/>
-          </a:xfrm>
-          <a:prstGeom prst="bentConnector3">
-            <a:avLst>
-              <a:gd name="adj1" fmla="val -25851"/>
-            </a:avLst>
-          </a:prstGeom>
-          <a:ln>
-            <a:prstDash val="lgDash"/>
-            <a:headEnd type="triangle"/>
-            <a:tailEnd type="triangle"/>
-          </a:ln>
-        </p:spPr>
-        <p:style>
-          <a:lnRef idx="2">
-            <a:schemeClr val="accent3"/>
-          </a:lnRef>
-          <a:fillRef idx="0">
-            <a:schemeClr val="accent3"/>
-          </a:fillRef>
-          <a:effectRef idx="1">
-            <a:schemeClr val="accent3"/>
-          </a:effectRef>
-          <a:fontRef idx="minor">
-            <a:schemeClr val="tx1"/>
-          </a:fontRef>
-        </p:style>
-      </p:cxnSp>
-      <p:cxnSp>
-        <p:nvCxnSpPr>
-          <p:cNvPr id="27" name="Straight Arrow Connector 26"/>
-          <p:cNvCxnSpPr>
-            <a:stCxn id="23" idx="2"/>
-            <a:endCxn id="9" idx="0"/>
-          </p:cNvCxnSpPr>
-          <p:nvPr/>
-        </p:nvCxnSpPr>
-        <p:spPr>
-          <a:xfrm flipH="1">
-            <a:off x="6096000" y="3390994"/>
-            <a:ext cx="14138" cy="1056909"/>
-          </a:xfrm>
-          <a:prstGeom prst="straightConnector1">
-            <a:avLst/>
-          </a:prstGeom>
-          <a:ln>
-            <a:prstDash val="lgDash"/>
-            <a:headEnd type="triangle"/>
-            <a:tailEnd type="triangle"/>
-          </a:ln>
-        </p:spPr>
-        <p:style>
-          <a:lnRef idx="2">
-            <a:schemeClr val="accent3"/>
-          </a:lnRef>
-          <a:fillRef idx="0">
-            <a:schemeClr val="accent3"/>
-          </a:fillRef>
-          <a:effectRef idx="1">
-            <a:schemeClr val="accent3"/>
-          </a:effectRef>
-          <a:fontRef idx="minor">
-            <a:schemeClr val="tx1"/>
-          </a:fontRef>
-        </p:style>
-      </p:cxnSp>
-      <p:cxnSp>
-        <p:nvCxnSpPr>
-          <p:cNvPr id="28" name="Connector: Elbow 27"/>
-          <p:cNvCxnSpPr>
-            <a:stCxn id="23" idx="0"/>
-            <a:endCxn id="11" idx="0"/>
-          </p:cNvCxnSpPr>
-          <p:nvPr/>
-        </p:nvCxnSpPr>
-        <p:spPr>
-          <a:xfrm rot="16200000" flipH="1">
-            <a:off x="6826457" y="2085398"/>
-            <a:ext cx="1646186" cy="3078824"/>
-          </a:xfrm>
-          <a:prstGeom prst="bentConnector3">
-            <a:avLst>
-              <a:gd name="adj1" fmla="val -25851"/>
-            </a:avLst>
-          </a:prstGeom>
-          <a:ln>
-            <a:prstDash val="lgDash"/>
-            <a:headEnd type="triangle"/>
-            <a:tailEnd type="triangle"/>
-          </a:ln>
-        </p:spPr>
-        <p:style>
-          <a:lnRef idx="2">
-            <a:schemeClr val="accent3"/>
-          </a:lnRef>
-          <a:fillRef idx="0">
-            <a:schemeClr val="accent3"/>
-          </a:fillRef>
-          <a:effectRef idx="1">
-            <a:schemeClr val="accent3"/>
-          </a:effectRef>
-          <a:fontRef idx="minor">
-            <a:schemeClr val="tx1"/>
-          </a:fontRef>
-        </p:style>
-      </p:cxnSp>
-      <p:cxnSp>
-        <p:nvCxnSpPr>
-          <p:cNvPr id="29" name="Straight Arrow Connector 28"/>
-          <p:cNvCxnSpPr/>
-          <p:nvPr/>
-        </p:nvCxnSpPr>
-        <p:spPr>
-          <a:xfrm flipV="1">
-            <a:off x="5099845" y="3096355"/>
-            <a:ext cx="715654" cy="1"/>
-          </a:xfrm>
-          <a:prstGeom prst="straightConnector1">
-            <a:avLst/>
-          </a:prstGeom>
-          <a:ln>
-            <a:prstDash val="lgDash"/>
-            <a:headEnd type="triangle"/>
-            <a:tailEnd type="triangle"/>
-          </a:ln>
-        </p:spPr>
-        <p:style>
-          <a:lnRef idx="2">
-            <a:schemeClr val="accent3"/>
-          </a:lnRef>
-          <a:fillRef idx="0">
-            <a:schemeClr val="accent3"/>
-          </a:fillRef>
-          <a:effectRef idx="1">
-            <a:schemeClr val="accent3"/>
-          </a:effectRef>
-          <a:fontRef idx="minor">
-            <a:schemeClr val="tx1"/>
-          </a:fontRef>
-        </p:style>
-      </p:cxnSp>
-      <p:cxnSp>
-        <p:nvCxnSpPr>
-          <p:cNvPr id="30" name="Connector: Elbow 29"/>
-          <p:cNvCxnSpPr/>
-          <p:nvPr/>
-        </p:nvCxnSpPr>
-        <p:spPr>
-          <a:xfrm rot="16200000" flipH="1" flipV="1">
-            <a:off x="3733495" y="2071259"/>
-            <a:ext cx="1646186" cy="3107100"/>
-          </a:xfrm>
-          <a:prstGeom prst="bentConnector3">
-            <a:avLst>
-              <a:gd name="adj1" fmla="val -25851"/>
-            </a:avLst>
-          </a:prstGeom>
-          <a:ln>
-            <a:prstDash val="lgDash"/>
-            <a:headEnd type="triangle"/>
-            <a:tailEnd type="triangle"/>
-          </a:ln>
-        </p:spPr>
-        <p:style>
-          <a:lnRef idx="2">
-            <a:schemeClr val="accent3"/>
-          </a:lnRef>
-          <a:fillRef idx="0">
-            <a:schemeClr val="accent3"/>
-          </a:fillRef>
-          <a:effectRef idx="1">
-            <a:schemeClr val="accent3"/>
-          </a:effectRef>
-          <a:fontRef idx="minor">
-            <a:schemeClr val="tx1"/>
-          </a:fontRef>
-        </p:style>
-      </p:cxnSp>
-      <p:pic>
-        <p:nvPicPr>
-          <p:cNvPr id="31" name="Picture 30"/>
-          <p:cNvPicPr>
-            <a:picLocks noChangeAspect="1"/>
-          </p:cNvPicPr>
-          <p:nvPr/>
-        </p:nvPicPr>
-        <p:blipFill>
-          <a:blip r:embed="rId10">
-            <a:extLst>
-              <a:ext uri="{28A0092B-C50C-407E-A947-70E740481C1C}">
-                <a14:useLocalDpi xmlns:a14="http://schemas.microsoft.com/office/drawing/2010/main" val="0"/>
-              </a:ext>
-            </a:extLst>
-          </a:blip>
-          <a:stretch>
-            <a:fillRect/>
-          </a:stretch>
-        </p:blipFill>
-        <p:spPr>
-          <a:xfrm>
-            <a:off x="6488403" y="2431999"/>
-            <a:ext cx="379874" cy="379874"/>
-          </a:xfrm>
-          <a:prstGeom prst="rect">
-            <a:avLst/>
-          </a:prstGeom>
-        </p:spPr>
-      </p:pic>
-      <p:cxnSp>
-        <p:nvCxnSpPr>
-          <p:cNvPr id="32" name="Connector: Elbow 31"/>
-          <p:cNvCxnSpPr/>
-          <p:nvPr/>
-        </p:nvCxnSpPr>
-        <p:spPr>
-          <a:xfrm flipV="1">
-            <a:off x="6277433" y="2593385"/>
-            <a:ext cx="222204" cy="208333"/>
-          </a:xfrm>
-          <a:prstGeom prst="bentConnector3">
-            <a:avLst>
-              <a:gd name="adj1" fmla="val -648"/>
-            </a:avLst>
-          </a:prstGeom>
-          <a:ln>
-            <a:solidFill>
-              <a:schemeClr val="accent4">
-                <a:lumMod val="60000"/>
-                <a:lumOff val="40000"/>
-              </a:schemeClr>
-            </a:solidFill>
-            <a:headEnd type="triangle"/>
-            <a:tailEnd type="triangle"/>
-          </a:ln>
-        </p:spPr>
-        <p:style>
-          <a:lnRef idx="1">
-            <a:schemeClr val="accent1"/>
-          </a:lnRef>
-          <a:fillRef idx="0">
-            <a:schemeClr val="accent1"/>
-          </a:fillRef>
-          <a:effectRef idx="0">
-            <a:schemeClr val="accent1"/>
-          </a:effectRef>
-          <a:fontRef idx="minor">
-            <a:schemeClr val="tx1"/>
-          </a:fontRef>
-        </p:style>
-      </p:cxnSp>
     </p:spTree>
     <p:extLst>
       <p:ext uri="{BB962C8B-B14F-4D97-AF65-F5344CB8AC3E}">
-        <p14:creationId xmlns:p14="http://schemas.microsoft.com/office/powerpoint/2010/main" val="3485932585"/>
+        <p14:creationId xmlns:p14="http://schemas.microsoft.com/office/powerpoint/2010/main" val="1993748265"/>
       </p:ext>
     </p:extLst>
   </p:cSld>
@@ -8598,6 +8906,218 @@
 </file>
 
 <file path=ppt/slides/slide20.xml><?xml version="1.0" encoding="utf-8"?>
+<p:sld xmlns:a="http://schemas.openxmlformats.org/drawingml/2006/main" xmlns:r="http://schemas.openxmlformats.org/officeDocument/2006/relationships" xmlns:p="http://schemas.openxmlformats.org/presentationml/2006/main">
+  <p:cSld>
+    <p:spTree>
+      <p:nvGrpSpPr>
+        <p:cNvPr id="1" name=""/>
+        <p:cNvGrpSpPr/>
+        <p:nvPr/>
+      </p:nvGrpSpPr>
+      <p:grpSpPr>
+        <a:xfrm>
+          <a:off x="0" y="0"/>
+          <a:ext cx="0" cy="0"/>
+          <a:chOff x="0" y="0"/>
+          <a:chExt cx="0" cy="0"/>
+        </a:xfrm>
+      </p:grpSpPr>
+      <p:sp>
+        <p:nvSpPr>
+          <p:cNvPr id="2" name="Title 1"/>
+          <p:cNvSpPr>
+            <a:spLocks noGrp="1"/>
+          </p:cNvSpPr>
+          <p:nvPr>
+            <p:ph type="title"/>
+          </p:nvPr>
+        </p:nvSpPr>
+        <p:spPr/>
+        <p:txBody>
+          <a:bodyPr/>
+          <a:lstStyle/>
+          <a:p>
+            <a:r>
+              <a:rPr lang="en-PH" dirty="0"/>
+              <a:t>Results and Discussion</a:t>
+            </a:r>
+          </a:p>
+        </p:txBody>
+      </p:sp>
+      <p:pic>
+        <p:nvPicPr>
+          <p:cNvPr id="8" name="Content Placeholder 7"/>
+          <p:cNvPicPr>
+            <a:picLocks noGrp="1" noChangeAspect="1"/>
+          </p:cNvPicPr>
+          <p:nvPr>
+            <p:ph idx="1"/>
+          </p:nvPr>
+        </p:nvPicPr>
+        <p:blipFill>
+          <a:blip r:embed="rId3">
+            <a:extLst>
+              <a:ext uri="{28A0092B-C50C-407E-A947-70E740481C1C}">
+                <a14:useLocalDpi xmlns:a14="http://schemas.microsoft.com/office/drawing/2010/main" val="0"/>
+              </a:ext>
+            </a:extLst>
+          </a:blip>
+          <a:stretch>
+            <a:fillRect/>
+          </a:stretch>
+        </p:blipFill>
+        <p:spPr>
+          <a:xfrm>
+            <a:off x="3878048" y="2541459"/>
+            <a:ext cx="525622" cy="525622"/>
+          </a:xfrm>
+        </p:spPr>
+      </p:pic>
+      <p:pic>
+        <p:nvPicPr>
+          <p:cNvPr id="4" name="Picture 3"/>
+          <p:cNvPicPr>
+            <a:picLocks noChangeAspect="1"/>
+          </p:cNvPicPr>
+          <p:nvPr/>
+        </p:nvPicPr>
+        <p:blipFill>
+          <a:blip r:embed="rId4">
+            <a:extLst>
+              <a:ext uri="{28A0092B-C50C-407E-A947-70E740481C1C}">
+                <a14:useLocalDpi xmlns:a14="http://schemas.microsoft.com/office/drawing/2010/main" val="0"/>
+              </a:ext>
+            </a:extLst>
+          </a:blip>
+          <a:stretch>
+            <a:fillRect/>
+          </a:stretch>
+        </p:blipFill>
+        <p:spPr>
+          <a:xfrm>
+            <a:off x="10595595" y="4723195"/>
+            <a:ext cx="2435221" cy="2435221"/>
+          </a:xfrm>
+          <a:prstGeom prst="rect">
+            <a:avLst/>
+          </a:prstGeom>
+        </p:spPr>
+      </p:pic>
+      <p:pic>
+        <p:nvPicPr>
+          <p:cNvPr id="5" name="Picture 4"/>
+          <p:cNvPicPr>
+            <a:picLocks noChangeAspect="1"/>
+          </p:cNvPicPr>
+          <p:nvPr/>
+        </p:nvPicPr>
+        <p:blipFill>
+          <a:blip r:embed="rId5" cstate="hqprint">
+            <a:extLst>
+              <a:ext uri="{28A0092B-C50C-407E-A947-70E740481C1C}">
+                <a14:useLocalDpi xmlns:a14="http://schemas.microsoft.com/office/drawing/2010/main" val="0"/>
+              </a:ext>
+            </a:extLst>
+          </a:blip>
+          <a:stretch>
+            <a:fillRect/>
+          </a:stretch>
+        </p:blipFill>
+        <p:spPr>
+          <a:xfrm>
+            <a:off x="10045148" y="3917853"/>
+            <a:ext cx="1610683" cy="1610683"/>
+          </a:xfrm>
+          <a:prstGeom prst="rect">
+            <a:avLst/>
+          </a:prstGeom>
+        </p:spPr>
+      </p:pic>
+      <p:pic>
+        <p:nvPicPr>
+          <p:cNvPr id="6" name="Picture 5"/>
+          <p:cNvPicPr>
+            <a:picLocks noChangeAspect="1"/>
+          </p:cNvPicPr>
+          <p:nvPr/>
+        </p:nvPicPr>
+        <p:blipFill>
+          <a:blip r:embed="rId6">
+            <a:extLst>
+              <a:ext uri="{28A0092B-C50C-407E-A947-70E740481C1C}">
+                <a14:useLocalDpi xmlns:a14="http://schemas.microsoft.com/office/drawing/2010/main" val="0"/>
+              </a:ext>
+            </a:extLst>
+          </a:blip>
+          <a:stretch>
+            <a:fillRect/>
+          </a:stretch>
+        </p:blipFill>
+        <p:spPr>
+          <a:xfrm>
+            <a:off x="5551889" y="2915897"/>
+            <a:ext cx="1088221" cy="1088221"/>
+          </a:xfrm>
+          <a:prstGeom prst="rect">
+            <a:avLst/>
+          </a:prstGeom>
+        </p:spPr>
+      </p:pic>
+      <p:pic>
+        <p:nvPicPr>
+          <p:cNvPr id="7" name="Picture 2" descr="http://image.flaticon.com/icons/png/128/230/230312.png"/>
+          <p:cNvPicPr>
+            <a:picLocks noChangeAspect="1" noChangeArrowheads="1"/>
+          </p:cNvPicPr>
+          <p:nvPr/>
+        </p:nvPicPr>
+        <p:blipFill>
+          <a:blip r:embed="rId7">
+            <a:extLst>
+              <a:ext uri="{28A0092B-C50C-407E-A947-70E740481C1C}">
+                <a14:useLocalDpi xmlns:a14="http://schemas.microsoft.com/office/drawing/2010/main" val="0"/>
+              </a:ext>
+            </a:extLst>
+          </a:blip>
+          <a:srcRect/>
+          <a:stretch>
+            <a:fillRect/>
+          </a:stretch>
+        </p:blipFill>
+        <p:spPr bwMode="auto">
+          <a:xfrm>
+            <a:off x="2161221" y="2971813"/>
+            <a:ext cx="1219200" cy="1219200"/>
+          </a:xfrm>
+          <a:prstGeom prst="rect">
+            <a:avLst/>
+          </a:prstGeom>
+          <a:noFill/>
+          <a:extLst>
+            <a:ext uri="{909E8E84-426E-40DD-AFC4-6F175D3DCCD1}">
+              <a14:hiddenFill xmlns:a14="http://schemas.microsoft.com/office/drawing/2010/main">
+                <a:solidFill>
+                  <a:srgbClr val="FFFFFF"/>
+                </a:solidFill>
+              </a14:hiddenFill>
+            </a:ext>
+          </a:extLst>
+        </p:spPr>
+      </p:pic>
+    </p:spTree>
+    <p:extLst>
+      <p:ext uri="{BB962C8B-B14F-4D97-AF65-F5344CB8AC3E}">
+        <p14:creationId xmlns:p14="http://schemas.microsoft.com/office/powerpoint/2010/main" val="3324807651"/>
+      </p:ext>
+    </p:extLst>
+  </p:cSld>
+  <p:clrMapOvr>
+    <a:masterClrMapping/>
+  </p:clrMapOvr>
+</p:sld>
+</file>
+
+<file path=ppt/slides/slide21.xml><?xml version="1.0" encoding="utf-8"?>
 <p:sld xmlns:a="http://schemas.openxmlformats.org/drawingml/2006/main" xmlns:r="http://schemas.openxmlformats.org/officeDocument/2006/relationships" xmlns:p="http://schemas.openxmlformats.org/presentationml/2006/main">
   <p:cSld>
     <p:spTree>

</xml_diff>